<commit_message>
presentation and phase estimation
</commit_message>
<xml_diff>
--- a/Master's meetings presentation.pptx
+++ b/Master's meetings presentation.pptx
@@ -6,16 +6,14 @@
   </p:sldMasterIdLst>
   <p:sldIdLst>
     <p:sldId id="258" r:id="rId2"/>
-    <p:sldId id="266" r:id="rId3"/>
-    <p:sldId id="259" r:id="rId4"/>
-    <p:sldId id="257" r:id="rId5"/>
-    <p:sldId id="261" r:id="rId6"/>
-    <p:sldId id="260" r:id="rId7"/>
-    <p:sldId id="262" r:id="rId8"/>
-    <p:sldId id="263" r:id="rId9"/>
-    <p:sldId id="264" r:id="rId10"/>
-    <p:sldId id="265" r:id="rId11"/>
-    <p:sldId id="267" r:id="rId12"/>
+    <p:sldId id="259" r:id="rId3"/>
+    <p:sldId id="257" r:id="rId4"/>
+    <p:sldId id="261" r:id="rId5"/>
+    <p:sldId id="260" r:id="rId6"/>
+    <p:sldId id="262" r:id="rId7"/>
+    <p:sldId id="263" r:id="rId8"/>
+    <p:sldId id="264" r:id="rId9"/>
+    <p:sldId id="265" r:id="rId10"/>
   </p:sldIdLst>
   <p:sldSz cx="12192000" cy="6858000"/>
   <p:notesSz cx="6858000" cy="9144000"/>
@@ -122,17 +120,87 @@
 </p:presentation>
 </file>
 
+<file path=ppt/revisionInfo.xml><?xml version="1.0" encoding="utf-8"?>
+<p1510:revInfo xmlns:a="http://schemas.openxmlformats.org/drawingml/2006/main" xmlns:r="http://schemas.openxmlformats.org/officeDocument/2006/relationships" xmlns:p1510="http://schemas.microsoft.com/office/powerpoint/2015/10/main">
+  <p1510:revLst>
+    <p1510:client id="{99393E6A-E5DA-4161-AF94-5EF99894ADD1}" v="1" dt="2020-11-07T17:58:05.207"/>
+  </p1510:revLst>
+</p1510:revInfo>
+</file>
+
 <file path=ppt/changesInfos/changesInfo1.xml><?xml version="1.0" encoding="utf-8"?>
 <pc:chgInfo xmlns:a="http://schemas.openxmlformats.org/drawingml/2006/main" xmlns:r="http://schemas.openxmlformats.org/officeDocument/2006/relationships" xmlns:ac="http://schemas.microsoft.com/office/drawing/2013/main/command" xmlns:pc="http://schemas.microsoft.com/office/powerpoint/2013/main/command">
   <pc:docChgLst>
     <pc:chgData name="emilios christou" userId="24346211dd9f44dd" providerId="LiveId" clId="{99393E6A-E5DA-4161-AF94-5EF99894ADD1}"/>
-    <pc:docChg chg="undo custSel addSld modSld sldOrd">
-      <pc:chgData name="emilios christou" userId="24346211dd9f44dd" providerId="LiveId" clId="{99393E6A-E5DA-4161-AF94-5EF99894ADD1}" dt="2020-11-04T14:44:26.824" v="151" actId="5793"/>
+    <pc:docChg chg="undo custSel addSld delSld modSld sldOrd">
+      <pc:chgData name="emilios christou" userId="24346211dd9f44dd" providerId="LiveId" clId="{99393E6A-E5DA-4161-AF94-5EF99894ADD1}" dt="2020-11-07T17:59:07.837" v="280" actId="20577"/>
       <pc:docMkLst>
         <pc:docMk/>
       </pc:docMkLst>
-      <pc:sldChg chg="modSp new mod ord">
-        <pc:chgData name="emilios christou" userId="24346211dd9f44dd" providerId="LiveId" clId="{99393E6A-E5DA-4161-AF94-5EF99894ADD1}" dt="2020-11-04T14:44:26.824" v="151" actId="5793"/>
+      <pc:sldChg chg="addSp delSp modSp mod">
+        <pc:chgData name="emilios christou" userId="24346211dd9f44dd" providerId="LiveId" clId="{99393E6A-E5DA-4161-AF94-5EF99894ADD1}" dt="2020-11-07T17:58:11.012" v="162" actId="1076"/>
+        <pc:sldMkLst>
+          <pc:docMk/>
+          <pc:sldMk cId="2055518084" sldId="264"/>
+        </pc:sldMkLst>
+        <pc:spChg chg="add del mod">
+          <ac:chgData name="emilios christou" userId="24346211dd9f44dd" providerId="LiveId" clId="{99393E6A-E5DA-4161-AF94-5EF99894ADD1}" dt="2020-11-07T17:57:53.653" v="156" actId="478"/>
+          <ac:spMkLst>
+            <pc:docMk/>
+            <pc:sldMk cId="2055518084" sldId="264"/>
+            <ac:spMk id="3" creationId="{D50FA920-5398-484F-BE62-987D02D849D9}"/>
+          </ac:spMkLst>
+        </pc:spChg>
+        <pc:spChg chg="add mod">
+          <ac:chgData name="emilios christou" userId="24346211dd9f44dd" providerId="LiveId" clId="{99393E6A-E5DA-4161-AF94-5EF99894ADD1}" dt="2020-11-07T17:58:11.012" v="162" actId="1076"/>
+          <ac:spMkLst>
+            <pc:docMk/>
+            <pc:sldMk cId="2055518084" sldId="264"/>
+            <ac:spMk id="6" creationId="{E695985B-799F-4D2A-B6B4-6264CA2DB280}"/>
+          </ac:spMkLst>
+        </pc:spChg>
+        <pc:picChg chg="add del">
+          <ac:chgData name="emilios christou" userId="24346211dd9f44dd" providerId="LiveId" clId="{99393E6A-E5DA-4161-AF94-5EF99894ADD1}" dt="2020-11-07T17:57:53.653" v="156" actId="478"/>
+          <ac:picMkLst>
+            <pc:docMk/>
+            <pc:sldMk cId="2055518084" sldId="264"/>
+            <ac:picMk id="4" creationId="{372D27E2-9851-4529-BBDD-B76B7D416D5E}"/>
+          </ac:picMkLst>
+        </pc:picChg>
+      </pc:sldChg>
+      <pc:sldChg chg="addSp delSp modSp mod">
+        <pc:chgData name="emilios christou" userId="24346211dd9f44dd" providerId="LiveId" clId="{99393E6A-E5DA-4161-AF94-5EF99894ADD1}" dt="2020-11-07T17:59:07.837" v="280" actId="20577"/>
+        <pc:sldMkLst>
+          <pc:docMk/>
+          <pc:sldMk cId="2645954593" sldId="265"/>
+        </pc:sldMkLst>
+        <pc:spChg chg="del">
+          <ac:chgData name="emilios christou" userId="24346211dd9f44dd" providerId="LiveId" clId="{99393E6A-E5DA-4161-AF94-5EF99894ADD1}" dt="2020-11-07T17:57:44.743" v="154" actId="478"/>
+          <ac:spMkLst>
+            <pc:docMk/>
+            <pc:sldMk cId="2645954593" sldId="265"/>
+            <ac:spMk id="2" creationId="{AD1405ED-3941-4D1C-8485-C86896B5B362}"/>
+          </ac:spMkLst>
+        </pc:spChg>
+        <pc:spChg chg="mod">
+          <ac:chgData name="emilios christou" userId="24346211dd9f44dd" providerId="LiveId" clId="{99393E6A-E5DA-4161-AF94-5EF99894ADD1}" dt="2020-11-07T17:59:07.837" v="280" actId="20577"/>
+          <ac:spMkLst>
+            <pc:docMk/>
+            <pc:sldMk cId="2645954593" sldId="265"/>
+            <ac:spMk id="3" creationId="{DF115913-C391-409D-A2C5-914051AC17A6}"/>
+          </ac:spMkLst>
+        </pc:spChg>
+        <pc:spChg chg="add mod">
+          <ac:chgData name="emilios christou" userId="24346211dd9f44dd" providerId="LiveId" clId="{99393E6A-E5DA-4161-AF94-5EF99894ADD1}" dt="2020-11-07T17:58:28.352" v="185" actId="20577"/>
+          <ac:spMkLst>
+            <pc:docMk/>
+            <pc:sldMk cId="2645954593" sldId="265"/>
+            <ac:spMk id="5" creationId="{9D62023B-BD1E-4C25-AF60-46F068140980}"/>
+          </ac:spMkLst>
+        </pc:spChg>
+      </pc:sldChg>
+      <pc:sldChg chg="modSp new del mod ord">
+        <pc:chgData name="emilios christou" userId="24346211dd9f44dd" providerId="LiveId" clId="{99393E6A-E5DA-4161-AF94-5EF99894ADD1}" dt="2020-11-07T17:54:47.148" v="152" actId="2696"/>
         <pc:sldMkLst>
           <pc:docMk/>
           <pc:sldMk cId="4092302029" sldId="266"/>
@@ -321,7 +389,7 @@
           <a:p>
             <a:fld id="{1D6AAEF1-BB65-438A-947A-6BD8EC392D5A}" type="datetimeFigureOut">
               <a:rPr lang="en-US" smtClean="0"/>
-              <a:t>11/4/2020</a:t>
+              <a:t>11/10/2020</a:t>
             </a:fld>
             <a:endParaRPr lang="en-US"/>
           </a:p>
@@ -519,7 +587,7 @@
           <a:p>
             <a:fld id="{1D6AAEF1-BB65-438A-947A-6BD8EC392D5A}" type="datetimeFigureOut">
               <a:rPr lang="en-US" smtClean="0"/>
-              <a:t>11/4/2020</a:t>
+              <a:t>11/10/2020</a:t>
             </a:fld>
             <a:endParaRPr lang="en-US"/>
           </a:p>
@@ -727,7 +795,7 @@
           <a:p>
             <a:fld id="{1D6AAEF1-BB65-438A-947A-6BD8EC392D5A}" type="datetimeFigureOut">
               <a:rPr lang="en-US" smtClean="0"/>
-              <a:t>11/4/2020</a:t>
+              <a:t>11/10/2020</a:t>
             </a:fld>
             <a:endParaRPr lang="en-US"/>
           </a:p>
@@ -925,7 +993,7 @@
           <a:p>
             <a:fld id="{1D6AAEF1-BB65-438A-947A-6BD8EC392D5A}" type="datetimeFigureOut">
               <a:rPr lang="en-US" smtClean="0"/>
-              <a:t>11/4/2020</a:t>
+              <a:t>11/10/2020</a:t>
             </a:fld>
             <a:endParaRPr lang="en-US"/>
           </a:p>
@@ -1200,7 +1268,7 @@
           <a:p>
             <a:fld id="{1D6AAEF1-BB65-438A-947A-6BD8EC392D5A}" type="datetimeFigureOut">
               <a:rPr lang="en-US" smtClean="0"/>
-              <a:t>11/4/2020</a:t>
+              <a:t>11/10/2020</a:t>
             </a:fld>
             <a:endParaRPr lang="en-US"/>
           </a:p>
@@ -1465,7 +1533,7 @@
           <a:p>
             <a:fld id="{1D6AAEF1-BB65-438A-947A-6BD8EC392D5A}" type="datetimeFigureOut">
               <a:rPr lang="en-US" smtClean="0"/>
-              <a:t>11/4/2020</a:t>
+              <a:t>11/10/2020</a:t>
             </a:fld>
             <a:endParaRPr lang="en-US"/>
           </a:p>
@@ -1877,7 +1945,7 @@
           <a:p>
             <a:fld id="{1D6AAEF1-BB65-438A-947A-6BD8EC392D5A}" type="datetimeFigureOut">
               <a:rPr lang="en-US" smtClean="0"/>
-              <a:t>11/4/2020</a:t>
+              <a:t>11/10/2020</a:t>
             </a:fld>
             <a:endParaRPr lang="en-US"/>
           </a:p>
@@ -2018,7 +2086,7 @@
           <a:p>
             <a:fld id="{1D6AAEF1-BB65-438A-947A-6BD8EC392D5A}" type="datetimeFigureOut">
               <a:rPr lang="en-US" smtClean="0"/>
-              <a:t>11/4/2020</a:t>
+              <a:t>11/10/2020</a:t>
             </a:fld>
             <a:endParaRPr lang="en-US"/>
           </a:p>
@@ -2131,7 +2199,7 @@
           <a:p>
             <a:fld id="{1D6AAEF1-BB65-438A-947A-6BD8EC392D5A}" type="datetimeFigureOut">
               <a:rPr lang="en-US" smtClean="0"/>
-              <a:t>11/4/2020</a:t>
+              <a:t>11/10/2020</a:t>
             </a:fld>
             <a:endParaRPr lang="en-US"/>
           </a:p>
@@ -2442,7 +2510,7 @@
           <a:p>
             <a:fld id="{1D6AAEF1-BB65-438A-947A-6BD8EC392D5A}" type="datetimeFigureOut">
               <a:rPr lang="en-US" smtClean="0"/>
-              <a:t>11/4/2020</a:t>
+              <a:t>11/10/2020</a:t>
             </a:fld>
             <a:endParaRPr lang="en-US"/>
           </a:p>
@@ -2730,7 +2798,7 @@
           <a:p>
             <a:fld id="{1D6AAEF1-BB65-438A-947A-6BD8EC392D5A}" type="datetimeFigureOut">
               <a:rPr lang="en-US" smtClean="0"/>
-              <a:t>11/4/2020</a:t>
+              <a:t>11/10/2020</a:t>
             </a:fld>
             <a:endParaRPr lang="en-US"/>
           </a:p>
@@ -2971,7 +3039,7 @@
           <a:p>
             <a:fld id="{1D6AAEF1-BB65-438A-947A-6BD8EC392D5A}" type="datetimeFigureOut">
               <a:rPr lang="en-US" smtClean="0"/>
-              <a:t>11/4/2020</a:t>
+              <a:t>11/10/2020</a:t>
             </a:fld>
             <a:endParaRPr lang="en-US"/>
           </a:p>
@@ -3523,329 +3591,7 @@
 </p:sld>
 </file>
 
-<file path=ppt/slides/slide10.xml><?xml version="1.0" encoding="utf-8"?>
-<p:sld xmlns:a="http://schemas.openxmlformats.org/drawingml/2006/main" xmlns:r="http://schemas.openxmlformats.org/officeDocument/2006/relationships" xmlns:p="http://schemas.openxmlformats.org/presentationml/2006/main">
-  <p:cSld>
-    <p:spTree>
-      <p:nvGrpSpPr>
-        <p:cNvPr id="1" name=""/>
-        <p:cNvGrpSpPr/>
-        <p:nvPr/>
-      </p:nvGrpSpPr>
-      <p:grpSpPr>
-        <a:xfrm>
-          <a:off x="0" y="0"/>
-          <a:ext cx="0" cy="0"/>
-          <a:chOff x="0" y="0"/>
-          <a:chExt cx="0" cy="0"/>
-        </a:xfrm>
-      </p:grpSpPr>
-      <p:sp>
-        <p:nvSpPr>
-          <p:cNvPr id="2" name="Title 1">
-            <a:extLst>
-              <a:ext uri="{FF2B5EF4-FFF2-40B4-BE49-F238E27FC236}">
-                <a16:creationId xmlns:a16="http://schemas.microsoft.com/office/drawing/2014/main" id="{AD1405ED-3941-4D1C-8485-C86896B5B362}"/>
-              </a:ext>
-            </a:extLst>
-          </p:cNvPr>
-          <p:cNvSpPr>
-            <a:spLocks noGrp="1"/>
-          </p:cNvSpPr>
-          <p:nvPr>
-            <p:ph type="title"/>
-          </p:nvPr>
-        </p:nvSpPr>
-        <p:spPr/>
-        <p:txBody>
-          <a:bodyPr/>
-          <a:lstStyle/>
-          <a:p>
-            <a:r>
-              <a:rPr lang="en-US" dirty="0">
-                <a:latin typeface="Arial Nova Light" panose="020B0304020202020204" pitchFamily="34" charset="0"/>
-              </a:rPr>
-              <a:t>Future goals</a:t>
-            </a:r>
-          </a:p>
-        </p:txBody>
-      </p:sp>
-      <p:sp>
-        <p:nvSpPr>
-          <p:cNvPr id="3" name="Content Placeholder 2">
-            <a:extLst>
-              <a:ext uri="{FF2B5EF4-FFF2-40B4-BE49-F238E27FC236}">
-                <a16:creationId xmlns:a16="http://schemas.microsoft.com/office/drawing/2014/main" id="{DF115913-C391-409D-A2C5-914051AC17A6}"/>
-              </a:ext>
-            </a:extLst>
-          </p:cNvPr>
-          <p:cNvSpPr>
-            <a:spLocks noGrp="1"/>
-          </p:cNvSpPr>
-          <p:nvPr>
-            <p:ph idx="1"/>
-          </p:nvPr>
-        </p:nvSpPr>
-        <p:spPr/>
-        <p:txBody>
-          <a:bodyPr/>
-          <a:lstStyle/>
-          <a:p>
-            <a:r>
-              <a:rPr lang="en-US" dirty="0">
-                <a:latin typeface="Arial" panose="020B0604020202020204" pitchFamily="34" charset="0"/>
-                <a:cs typeface="Arial" panose="020B0604020202020204" pitchFamily="34" charset="0"/>
-              </a:rPr>
-              <a:t>Continue implementation, iteratively including more components of simulated transceiver models until the industry standard is met</a:t>
-            </a:r>
-          </a:p>
-          <a:p>
-            <a:pPr marL="0" indent="0">
-              <a:buNone/>
-            </a:pPr>
-            <a:endParaRPr lang="en-US" dirty="0">
-              <a:latin typeface="Arial" panose="020B0604020202020204" pitchFamily="34" charset="0"/>
-              <a:cs typeface="Arial" panose="020B0604020202020204" pitchFamily="34" charset="0"/>
-            </a:endParaRPr>
-          </a:p>
-          <a:p>
-            <a:r>
-              <a:rPr lang="en-US" dirty="0">
-                <a:latin typeface="Arial" panose="020B0604020202020204" pitchFamily="34" charset="0"/>
-                <a:cs typeface="Arial" panose="020B0604020202020204" pitchFamily="34" charset="0"/>
-              </a:rPr>
-              <a:t>Work towards using synchronization, equalization and shaping algorithms (probabilistic shaping)</a:t>
-            </a:r>
-          </a:p>
-          <a:p>
-            <a:endParaRPr lang="en-US" dirty="0">
-              <a:latin typeface="Arial" panose="020B0604020202020204" pitchFamily="34" charset="0"/>
-              <a:cs typeface="Arial" panose="020B0604020202020204" pitchFamily="34" charset="0"/>
-            </a:endParaRPr>
-          </a:p>
-          <a:p>
-            <a:r>
-              <a:rPr lang="en-US" dirty="0">
-                <a:latin typeface="Arial" panose="020B0604020202020204" pitchFamily="34" charset="0"/>
-                <a:cs typeface="Arial" panose="020B0604020202020204" pitchFamily="34" charset="0"/>
-              </a:rPr>
-              <a:t>Explore physical constraints limiting the simulation</a:t>
-            </a:r>
-          </a:p>
-          <a:p>
-            <a:pPr marL="0" indent="0">
-              <a:buNone/>
-            </a:pPr>
-            <a:endParaRPr lang="en-US" dirty="0">
-              <a:latin typeface="Arial" panose="020B0604020202020204" pitchFamily="34" charset="0"/>
-              <a:cs typeface="Arial" panose="020B0604020202020204" pitchFamily="34" charset="0"/>
-            </a:endParaRPr>
-          </a:p>
-        </p:txBody>
-      </p:sp>
-    </p:spTree>
-    <p:extLst>
-      <p:ext uri="{BB962C8B-B14F-4D97-AF65-F5344CB8AC3E}">
-        <p14:creationId xmlns:p14="http://schemas.microsoft.com/office/powerpoint/2010/main" val="2645954593"/>
-      </p:ext>
-    </p:extLst>
-  </p:cSld>
-  <p:clrMapOvr>
-    <a:masterClrMapping/>
-  </p:clrMapOvr>
-</p:sld>
-</file>
-
-<file path=ppt/slides/slide11.xml><?xml version="1.0" encoding="utf-8"?>
-<p:sld xmlns:a="http://schemas.openxmlformats.org/drawingml/2006/main" xmlns:r="http://schemas.openxmlformats.org/officeDocument/2006/relationships" xmlns:p="http://schemas.openxmlformats.org/presentationml/2006/main">
-  <p:cSld>
-    <p:spTree>
-      <p:nvGrpSpPr>
-        <p:cNvPr id="1" name=""/>
-        <p:cNvGrpSpPr/>
-        <p:nvPr/>
-      </p:nvGrpSpPr>
-      <p:grpSpPr>
-        <a:xfrm>
-          <a:off x="0" y="0"/>
-          <a:ext cx="0" cy="0"/>
-          <a:chOff x="0" y="0"/>
-          <a:chExt cx="0" cy="0"/>
-        </a:xfrm>
-      </p:grpSpPr>
-      <p:sp>
-        <p:nvSpPr>
-          <p:cNvPr id="2" name="Title 1">
-            <a:extLst>
-              <a:ext uri="{FF2B5EF4-FFF2-40B4-BE49-F238E27FC236}">
-                <a16:creationId xmlns:a16="http://schemas.microsoft.com/office/drawing/2014/main" id="{52FFD31E-BC13-44E7-8C55-59A8BC430DDB}"/>
-              </a:ext>
-            </a:extLst>
-          </p:cNvPr>
-          <p:cNvSpPr>
-            <a:spLocks noGrp="1"/>
-          </p:cNvSpPr>
-          <p:nvPr>
-            <p:ph type="title"/>
-          </p:nvPr>
-        </p:nvSpPr>
-        <p:spPr/>
-        <p:txBody>
-          <a:bodyPr/>
-          <a:lstStyle/>
-          <a:p>
-            <a:r>
-              <a:rPr lang="en-US" dirty="0"/>
-              <a:t>Timeline	</a:t>
-            </a:r>
-          </a:p>
-        </p:txBody>
-      </p:sp>
-      <p:sp>
-        <p:nvSpPr>
-          <p:cNvPr id="3" name="Content Placeholder 2">
-            <a:extLst>
-              <a:ext uri="{FF2B5EF4-FFF2-40B4-BE49-F238E27FC236}">
-                <a16:creationId xmlns:a16="http://schemas.microsoft.com/office/drawing/2014/main" id="{6CD57023-3500-43BA-81DA-A53A0CF285E8}"/>
-              </a:ext>
-            </a:extLst>
-          </p:cNvPr>
-          <p:cNvSpPr>
-            <a:spLocks noGrp="1"/>
-          </p:cNvSpPr>
-          <p:nvPr>
-            <p:ph idx="1"/>
-          </p:nvPr>
-        </p:nvSpPr>
-        <p:spPr/>
-        <p:txBody>
-          <a:bodyPr/>
-          <a:lstStyle/>
-          <a:p>
-            <a:endParaRPr lang="en-US" dirty="0"/>
-          </a:p>
-        </p:txBody>
-      </p:sp>
-    </p:spTree>
-    <p:extLst>
-      <p:ext uri="{BB962C8B-B14F-4D97-AF65-F5344CB8AC3E}">
-        <p14:creationId xmlns:p14="http://schemas.microsoft.com/office/powerpoint/2010/main" val="675081134"/>
-      </p:ext>
-    </p:extLst>
-  </p:cSld>
-  <p:clrMapOvr>
-    <a:masterClrMapping/>
-  </p:clrMapOvr>
-</p:sld>
-</file>
-
 <file path=ppt/slides/slide2.xml><?xml version="1.0" encoding="utf-8"?>
-<p:sld xmlns:a="http://schemas.openxmlformats.org/drawingml/2006/main" xmlns:r="http://schemas.openxmlformats.org/officeDocument/2006/relationships" xmlns:p="http://schemas.openxmlformats.org/presentationml/2006/main">
-  <p:cSld>
-    <p:spTree>
-      <p:nvGrpSpPr>
-        <p:cNvPr id="1" name=""/>
-        <p:cNvGrpSpPr/>
-        <p:nvPr/>
-      </p:nvGrpSpPr>
-      <p:grpSpPr>
-        <a:xfrm>
-          <a:off x="0" y="0"/>
-          <a:ext cx="0" cy="0"/>
-          <a:chOff x="0" y="0"/>
-          <a:chExt cx="0" cy="0"/>
-        </a:xfrm>
-      </p:grpSpPr>
-      <p:sp>
-        <p:nvSpPr>
-          <p:cNvPr id="2" name="Title 1">
-            <a:extLst>
-              <a:ext uri="{FF2B5EF4-FFF2-40B4-BE49-F238E27FC236}">
-                <a16:creationId xmlns:a16="http://schemas.microsoft.com/office/drawing/2014/main" id="{8A385D4B-A36E-4A51-AA58-00CBA04506EC}"/>
-              </a:ext>
-            </a:extLst>
-          </p:cNvPr>
-          <p:cNvSpPr>
-            <a:spLocks noGrp="1"/>
-          </p:cNvSpPr>
-          <p:nvPr>
-            <p:ph type="title"/>
-          </p:nvPr>
-        </p:nvSpPr>
-        <p:spPr/>
-        <p:txBody>
-          <a:bodyPr/>
-          <a:lstStyle/>
-          <a:p>
-            <a:r>
-              <a:rPr lang="en-US" dirty="0"/>
-              <a:t>Introductory Slide</a:t>
-            </a:r>
-          </a:p>
-        </p:txBody>
-      </p:sp>
-      <p:sp>
-        <p:nvSpPr>
-          <p:cNvPr id="3" name="Content Placeholder 2">
-            <a:extLst>
-              <a:ext uri="{FF2B5EF4-FFF2-40B4-BE49-F238E27FC236}">
-                <a16:creationId xmlns:a16="http://schemas.microsoft.com/office/drawing/2014/main" id="{497C39CC-9C80-432D-A95E-C175D03EAD23}"/>
-              </a:ext>
-            </a:extLst>
-          </p:cNvPr>
-          <p:cNvSpPr>
-            <a:spLocks noGrp="1"/>
-          </p:cNvSpPr>
-          <p:nvPr>
-            <p:ph idx="1"/>
-          </p:nvPr>
-        </p:nvSpPr>
-        <p:spPr/>
-        <p:txBody>
-          <a:bodyPr/>
-          <a:lstStyle/>
-          <a:p>
-            <a:r>
-              <a:rPr lang="en-US" dirty="0"/>
-              <a:t>Give information about optical </a:t>
-            </a:r>
-            <a:r>
-              <a:rPr lang="en-US" dirty="0" err="1"/>
-              <a:t>fibres</a:t>
-            </a:r>
-            <a:r>
-              <a:rPr lang="en-US" dirty="0"/>
-              <a:t> (99% of all data)</a:t>
-            </a:r>
-          </a:p>
-          <a:p>
-            <a:r>
-              <a:rPr lang="en-US" dirty="0"/>
-              <a:t>Give context of the problem tackled</a:t>
-            </a:r>
-          </a:p>
-          <a:p>
-            <a:pPr marL="0" indent="0">
-              <a:buNone/>
-            </a:pPr>
-            <a:endParaRPr lang="en-US" dirty="0"/>
-          </a:p>
-        </p:txBody>
-      </p:sp>
-    </p:spTree>
-    <p:extLst>
-      <p:ext uri="{BB962C8B-B14F-4D97-AF65-F5344CB8AC3E}">
-        <p14:creationId xmlns:p14="http://schemas.microsoft.com/office/powerpoint/2010/main" val="4092302029"/>
-      </p:ext>
-    </p:extLst>
-  </p:cSld>
-  <p:clrMapOvr>
-    <a:masterClrMapping/>
-  </p:clrMapOvr>
-</p:sld>
-</file>
-
-<file path=ppt/slides/slide3.xml><?xml version="1.0" encoding="utf-8"?>
 <p:sld xmlns:a="http://schemas.openxmlformats.org/drawingml/2006/main" xmlns:r="http://schemas.openxmlformats.org/officeDocument/2006/relationships" xmlns:p="http://schemas.openxmlformats.org/presentationml/2006/main">
   <p:cSld>
     <p:spTree>
@@ -4093,7 +3839,7 @@
 </p:sld>
 </file>
 
-<file path=ppt/slides/slide4.xml><?xml version="1.0" encoding="utf-8"?>
+<file path=ppt/slides/slide3.xml><?xml version="1.0" encoding="utf-8"?>
 <p:sld xmlns:a="http://schemas.openxmlformats.org/drawingml/2006/main" xmlns:r="http://schemas.openxmlformats.org/officeDocument/2006/relationships" xmlns:p="http://schemas.openxmlformats.org/presentationml/2006/main">
   <p:cSld>
     <p:spTree>
@@ -4251,7 +3997,7 @@
 </p:sld>
 </file>
 
-<file path=ppt/slides/slide5.xml><?xml version="1.0" encoding="utf-8"?>
+<file path=ppt/slides/slide4.xml><?xml version="1.0" encoding="utf-8"?>
 <p:sld xmlns:a="http://schemas.openxmlformats.org/drawingml/2006/main" xmlns:r="http://schemas.openxmlformats.org/officeDocument/2006/relationships" xmlns:p="http://schemas.openxmlformats.org/presentationml/2006/main">
   <p:cSld>
     <p:spTree>
@@ -4633,7 +4379,7 @@
 </p:sld>
 </file>
 
-<file path=ppt/slides/slide6.xml><?xml version="1.0" encoding="utf-8"?>
+<file path=ppt/slides/slide5.xml><?xml version="1.0" encoding="utf-8"?>
 <p:sld xmlns:a="http://schemas.openxmlformats.org/drawingml/2006/main" xmlns:r="http://schemas.openxmlformats.org/officeDocument/2006/relationships" xmlns:p="http://schemas.openxmlformats.org/presentationml/2006/main">
   <p:cSld>
     <p:spTree>
@@ -4708,7 +4454,7 @@
         </p:blipFill>
         <p:spPr>
           <a:xfrm>
-            <a:off x="5763352" y="2141537"/>
+            <a:off x="5763352" y="2124912"/>
             <a:ext cx="5384780" cy="4351338"/>
           </a:xfrm>
         </p:spPr>
@@ -4773,7 +4519,7 @@
 </p:sld>
 </file>
 
-<file path=ppt/slides/slide7.xml><?xml version="1.0" encoding="utf-8"?>
+<file path=ppt/slides/slide6.xml><?xml version="1.0" encoding="utf-8"?>
 <p:sld xmlns:a="http://schemas.openxmlformats.org/drawingml/2006/main" xmlns:r="http://schemas.openxmlformats.org/officeDocument/2006/relationships" xmlns:p="http://schemas.openxmlformats.org/presentationml/2006/main">
   <p:cSld>
     <p:spTree>
@@ -4856,8 +4602,8 @@
         </p:blipFill>
         <p:spPr bwMode="auto">
           <a:xfrm>
-            <a:off x="6227558" y="1904283"/>
-            <a:ext cx="5801784" cy="4351338"/>
+            <a:off x="6344112" y="1671235"/>
+            <a:ext cx="5422787" cy="4067091"/>
           </a:xfrm>
           <a:prstGeom prst="rect">
             <a:avLst/>
@@ -4899,7 +4645,7 @@
         </p:spPr>
         <p:txBody>
           <a:bodyPr vert="horz" lIns="91440" tIns="45720" rIns="91440" bIns="45720" rtlCol="0">
-            <a:normAutofit/>
+            <a:normAutofit lnSpcReduction="10000"/>
           </a:bodyPr>
           <a:lstStyle>
             <a:lvl1pPr marL="228600" indent="-228600" algn="l" defTabSz="914400" rtl="0" eaLnBrk="1" latinLnBrk="0" hangingPunct="1">
@@ -5071,7 +4817,7 @@
                 <a:latin typeface="Arial" panose="020B0604020202020204" pitchFamily="34" charset="0"/>
                 <a:cs typeface="Arial" panose="020B0604020202020204" pitchFamily="34" charset="0"/>
               </a:rPr>
-              <a:t>This noise only affects phase</a:t>
+              <a:t>Plotting noise in a wrong way, bugs in code that need to be fixed</a:t>
             </a:r>
           </a:p>
           <a:p>
@@ -5080,16 +4826,21 @@
                 <a:latin typeface="Arial" panose="020B0604020202020204" pitchFamily="34" charset="0"/>
                 <a:cs typeface="Arial" panose="020B0604020202020204" pitchFamily="34" charset="0"/>
               </a:rPr>
-              <a:t>Therefore the SNR is 1 regardless of the amount of phase noise added (0dB on graph)</a:t>
-            </a:r>
-          </a:p>
-          <a:p>
+              <a:t>Attempting to measure noise with the snr </a:t>
+            </a:r>
+            <a:r>
+              <a:rPr lang="en-US" dirty="0" err="1">
+                <a:latin typeface="Arial" panose="020B0604020202020204" pitchFamily="34" charset="0"/>
+                <a:cs typeface="Arial" panose="020B0604020202020204" pitchFamily="34" charset="0"/>
+              </a:rPr>
+              <a:t>Matlab</a:t>
+            </a:r>
             <a:r>
               <a:rPr lang="en-US" dirty="0">
                 <a:latin typeface="Arial" panose="020B0604020202020204" pitchFamily="34" charset="0"/>
                 <a:cs typeface="Arial" panose="020B0604020202020204" pitchFamily="34" charset="0"/>
               </a:rPr>
-              <a:t>Thus even though BER increases, the SNR cannot give us a measure of the level of noise added</a:t>
+              <a:t> function, cannot find the ratio between noisy signal and unfiltered signal correctly</a:t>
             </a:r>
           </a:p>
           <a:p>
@@ -5098,7 +4849,7 @@
                 <a:latin typeface="Arial" panose="020B0604020202020204" pitchFamily="34" charset="0"/>
                 <a:cs typeface="Arial" panose="020B0604020202020204" pitchFamily="34" charset="0"/>
               </a:rPr>
-              <a:t>Different technique needed, need to measure jitter</a:t>
+              <a:t> Cannot find snr between symbols vector and their added phase noise vector either, approach replaced with specifying SNR directly instead of measuring it </a:t>
             </a:r>
           </a:p>
         </p:txBody>
@@ -5155,7 +4906,7 @@
 </p:sld>
 </file>
 
-<file path=ppt/slides/slide8.xml><?xml version="1.0" encoding="utf-8"?>
+<file path=ppt/slides/slide7.xml><?xml version="1.0" encoding="utf-8"?>
 <p:sld xmlns:a="http://schemas.openxmlformats.org/drawingml/2006/main" xmlns:r="http://schemas.openxmlformats.org/officeDocument/2006/relationships" xmlns:p="http://schemas.openxmlformats.org/presentationml/2006/main">
   <p:cSld>
     <p:spTree>
@@ -5197,7 +4948,7 @@
               <a:rPr lang="en-US" dirty="0">
                 <a:latin typeface="Arial Nova Light" panose="020B0304020202020204" pitchFamily="34" charset="0"/>
               </a:rPr>
-              <a:t>SNR and BER for AWGN</a:t>
+              <a:t>SNR and BER with AWGN</a:t>
             </a:r>
           </a:p>
         </p:txBody>
@@ -5260,10 +5011,10 @@
       </p:sp>
       <p:pic>
         <p:nvPicPr>
-          <p:cNvPr id="4097" name="Picture 1">
-            <a:extLst>
-              <a:ext uri="{FF2B5EF4-FFF2-40B4-BE49-F238E27FC236}">
-                <a16:creationId xmlns:a16="http://schemas.microsoft.com/office/drawing/2014/main" id="{CC20EA11-2EDA-4D8B-B9C8-E8F9F3FC8886}"/>
+          <p:cNvPr id="1025" name="Picture 1">
+            <a:extLst>
+              <a:ext uri="{FF2B5EF4-FFF2-40B4-BE49-F238E27FC236}">
+                <a16:creationId xmlns:a16="http://schemas.microsoft.com/office/drawing/2014/main" id="{8215D771-3314-446E-B053-0412426623DA}"/>
               </a:ext>
             </a:extLst>
           </p:cNvPr>
@@ -5287,8 +5038,8 @@
         </p:blipFill>
         <p:spPr bwMode="auto">
           <a:xfrm>
-            <a:off x="5402399" y="1690688"/>
-            <a:ext cx="6667500" cy="5000625"/>
+            <a:off x="5673212" y="1966373"/>
+            <a:ext cx="5867061" cy="4400296"/>
           </a:xfrm>
           <a:prstGeom prst="rect">
             <a:avLst/>
@@ -5318,7 +5069,7 @@
 </p:sld>
 </file>
 
-<file path=ppt/slides/slide9.xml><?xml version="1.0" encoding="utf-8"?>
+<file path=ppt/slides/slide8.xml><?xml version="1.0" encoding="utf-8"?>
 <p:sld xmlns:a="http://schemas.openxmlformats.org/drawingml/2006/main" xmlns:r="http://schemas.openxmlformats.org/officeDocument/2006/relationships" xmlns:p="http://schemas.openxmlformats.org/presentationml/2006/main">
   <p:cSld>
     <p:spTree>
@@ -5402,10 +5153,256 @@
           </a:p>
         </p:txBody>
       </p:sp>
+      <p:sp>
+        <p:nvSpPr>
+          <p:cNvPr id="6" name="TextBox 5">
+            <a:extLst>
+              <a:ext uri="{FF2B5EF4-FFF2-40B4-BE49-F238E27FC236}">
+                <a16:creationId xmlns:a16="http://schemas.microsoft.com/office/drawing/2014/main" id="{E695985B-799F-4D2A-B6B4-6264CA2DB280}"/>
+              </a:ext>
+            </a:extLst>
+          </p:cNvPr>
+          <p:cNvSpPr txBox="1"/>
+          <p:nvPr/>
+        </p:nvSpPr>
+        <p:spPr>
+          <a:xfrm>
+            <a:off x="11528036" y="6488668"/>
+            <a:ext cx="663964" cy="369332"/>
+          </a:xfrm>
+          <a:prstGeom prst="rect">
+            <a:avLst/>
+          </a:prstGeom>
+          <a:noFill/>
+        </p:spPr>
+        <p:txBody>
+          <a:bodyPr wrap="none" rtlCol="0">
+            <a:spAutoFit/>
+          </a:bodyPr>
+          <a:lstStyle/>
+          <a:p>
+            <a:r>
+              <a:rPr lang="en-GB" dirty="0" err="1"/>
+              <a:t>Wk</a:t>
+            </a:r>
+            <a:r>
+              <a:rPr lang="en-GB" dirty="0"/>
+              <a:t> 4</a:t>
+            </a:r>
+            <a:endParaRPr lang="en-US" dirty="0"/>
+          </a:p>
+        </p:txBody>
+      </p:sp>
     </p:spTree>
     <p:extLst>
       <p:ext uri="{BB962C8B-B14F-4D97-AF65-F5344CB8AC3E}">
         <p14:creationId xmlns:p14="http://schemas.microsoft.com/office/powerpoint/2010/main" val="2055518084"/>
+      </p:ext>
+    </p:extLst>
+  </p:cSld>
+  <p:clrMapOvr>
+    <a:masterClrMapping/>
+  </p:clrMapOvr>
+</p:sld>
+</file>
+
+<file path=ppt/slides/slide9.xml><?xml version="1.0" encoding="utf-8"?>
+<p:sld xmlns:a="http://schemas.openxmlformats.org/drawingml/2006/main" xmlns:r="http://schemas.openxmlformats.org/officeDocument/2006/relationships" xmlns:p="http://schemas.openxmlformats.org/presentationml/2006/main">
+  <p:cSld>
+    <p:spTree>
+      <p:nvGrpSpPr>
+        <p:cNvPr id="1" name=""/>
+        <p:cNvGrpSpPr/>
+        <p:nvPr/>
+      </p:nvGrpSpPr>
+      <p:grpSpPr>
+        <a:xfrm>
+          <a:off x="0" y="0"/>
+          <a:ext cx="0" cy="0"/>
+          <a:chOff x="0" y="0"/>
+          <a:chExt cx="0" cy="0"/>
+        </a:xfrm>
+      </p:grpSpPr>
+      <p:sp>
+        <p:nvSpPr>
+          <p:cNvPr id="5" name="Title 4">
+            <a:extLst>
+              <a:ext uri="{FF2B5EF4-FFF2-40B4-BE49-F238E27FC236}">
+                <a16:creationId xmlns:a16="http://schemas.microsoft.com/office/drawing/2014/main" id="{9D62023B-BD1E-4C25-AF60-46F068140980}"/>
+              </a:ext>
+            </a:extLst>
+          </p:cNvPr>
+          <p:cNvSpPr>
+            <a:spLocks noGrp="1"/>
+          </p:cNvSpPr>
+          <p:nvPr>
+            <p:ph type="title"/>
+          </p:nvPr>
+        </p:nvSpPr>
+        <p:spPr/>
+        <p:txBody>
+          <a:bodyPr/>
+          <a:lstStyle/>
+          <a:p>
+            <a:r>
+              <a:rPr lang="en-GB"/>
+              <a:t>Upscaling and FFT</a:t>
+            </a:r>
+            <a:endParaRPr lang="en-US" dirty="0"/>
+          </a:p>
+        </p:txBody>
+      </p:sp>
+      <p:sp>
+        <p:nvSpPr>
+          <p:cNvPr id="2" name="TextBox 1">
+            <a:extLst>
+              <a:ext uri="{FF2B5EF4-FFF2-40B4-BE49-F238E27FC236}">
+                <a16:creationId xmlns:a16="http://schemas.microsoft.com/office/drawing/2014/main" id="{A1D2021C-D070-4818-B863-EE116C64237A}"/>
+              </a:ext>
+            </a:extLst>
+          </p:cNvPr>
+          <p:cNvSpPr txBox="1"/>
+          <p:nvPr/>
+        </p:nvSpPr>
+        <p:spPr>
+          <a:xfrm>
+            <a:off x="11528036" y="6488668"/>
+            <a:ext cx="663964" cy="369332"/>
+          </a:xfrm>
+          <a:prstGeom prst="rect">
+            <a:avLst/>
+          </a:prstGeom>
+          <a:noFill/>
+        </p:spPr>
+        <p:txBody>
+          <a:bodyPr wrap="none" rtlCol="0">
+            <a:spAutoFit/>
+          </a:bodyPr>
+          <a:lstStyle/>
+          <a:p>
+            <a:r>
+              <a:rPr lang="en-US"/>
+              <a:t>Wk 5</a:t>
+            </a:r>
+            <a:endParaRPr lang="en-US" dirty="0"/>
+          </a:p>
+        </p:txBody>
+      </p:sp>
+      <p:sp>
+        <p:nvSpPr>
+          <p:cNvPr id="6" name="Content Placeholder 5">
+            <a:extLst>
+              <a:ext uri="{FF2B5EF4-FFF2-40B4-BE49-F238E27FC236}">
+                <a16:creationId xmlns:a16="http://schemas.microsoft.com/office/drawing/2014/main" id="{91584520-D7C0-4959-8B44-98202581C100}"/>
+              </a:ext>
+            </a:extLst>
+          </p:cNvPr>
+          <p:cNvSpPr>
+            <a:spLocks noGrp="1"/>
+          </p:cNvSpPr>
+          <p:nvPr>
+            <p:ph idx="1"/>
+          </p:nvPr>
+        </p:nvSpPr>
+        <p:spPr>
+          <a:xfrm>
+            <a:off x="501895" y="1546810"/>
+            <a:ext cx="4611279" cy="4351338"/>
+          </a:xfrm>
+        </p:spPr>
+        <p:txBody>
+          <a:bodyPr/>
+          <a:lstStyle/>
+          <a:p>
+            <a:pPr algn="just"/>
+            <a:r>
+              <a:rPr lang="en-US"/>
+              <a:t>Upscaled the symbols by 8, plotted the spectrum before and after modulation</a:t>
+            </a:r>
+          </a:p>
+          <a:p>
+            <a:pPr algn="just"/>
+            <a:r>
+              <a:rPr lang="en-US"/>
+              <a:t>Compared the spectrum with the spectrum of the symbols without upscaling</a:t>
+            </a:r>
+          </a:p>
+          <a:p>
+            <a:pPr algn="just"/>
+            <a:r>
+              <a:rPr lang="en-US"/>
+              <a:t>Learning about the Filter Bank method for spectrum plotting</a:t>
+            </a:r>
+          </a:p>
+          <a:p>
+            <a:endParaRPr lang="en-US" dirty="0"/>
+          </a:p>
+        </p:txBody>
+      </p:sp>
+      <p:pic>
+        <p:nvPicPr>
+          <p:cNvPr id="8" name="Picture 7">
+            <a:extLst>
+              <a:ext uri="{FF2B5EF4-FFF2-40B4-BE49-F238E27FC236}">
+                <a16:creationId xmlns:a16="http://schemas.microsoft.com/office/drawing/2014/main" id="{298FBE25-1E9B-4236-A4C3-81B277DC358D}"/>
+              </a:ext>
+            </a:extLst>
+          </p:cNvPr>
+          <p:cNvPicPr>
+            <a:picLocks noChangeAspect="1"/>
+          </p:cNvPicPr>
+          <p:nvPr/>
+        </p:nvPicPr>
+        <p:blipFill>
+          <a:blip r:embed="rId2"/>
+          <a:stretch>
+            <a:fillRect/>
+          </a:stretch>
+        </p:blipFill>
+        <p:spPr>
+          <a:xfrm>
+            <a:off x="5442726" y="28951"/>
+            <a:ext cx="5911073" cy="3400049"/>
+          </a:xfrm>
+          <a:prstGeom prst="rect">
+            <a:avLst/>
+          </a:prstGeom>
+        </p:spPr>
+      </p:pic>
+      <p:pic>
+        <p:nvPicPr>
+          <p:cNvPr id="9" name="Picture 8">
+            <a:extLst>
+              <a:ext uri="{FF2B5EF4-FFF2-40B4-BE49-F238E27FC236}">
+                <a16:creationId xmlns:a16="http://schemas.microsoft.com/office/drawing/2014/main" id="{FEEF5CAB-5234-466E-BDD8-1E3E7134C4D1}"/>
+              </a:ext>
+            </a:extLst>
+          </p:cNvPr>
+          <p:cNvPicPr>
+            <a:picLocks noChangeAspect="1"/>
+          </p:cNvPicPr>
+          <p:nvPr/>
+        </p:nvPicPr>
+        <p:blipFill>
+          <a:blip r:embed="rId3"/>
+          <a:stretch>
+            <a:fillRect/>
+          </a:stretch>
+        </p:blipFill>
+        <p:spPr>
+          <a:xfrm>
+            <a:off x="5442727" y="3429000"/>
+            <a:ext cx="5911073" cy="3400049"/>
+          </a:xfrm>
+          <a:prstGeom prst="rect">
+            <a:avLst/>
+          </a:prstGeom>
+        </p:spPr>
+      </p:pic>
+    </p:spTree>
+    <p:extLst>
+      <p:ext uri="{BB962C8B-B14F-4D97-AF65-F5344CB8AC3E}">
+        <p14:creationId xmlns:p14="http://schemas.microsoft.com/office/powerpoint/2010/main" val="2645954593"/>
       </p:ext>
     </p:extLst>
   </p:cSld>

</xml_diff>

<commit_message>
Chromatic Dispersion first implementation
</commit_message>
<xml_diff>
--- a/Master's meetings presentation.pptx
+++ b/Master's meetings presentation.pptx
@@ -389,7 +389,7 @@
           <a:p>
             <a:fld id="{1D6AAEF1-BB65-438A-947A-6BD8EC392D5A}" type="datetimeFigureOut">
               <a:rPr lang="en-US" smtClean="0"/>
-              <a:t>11/10/2020</a:t>
+              <a:t>11/11/2020</a:t>
             </a:fld>
             <a:endParaRPr lang="en-US"/>
           </a:p>
@@ -587,7 +587,7 @@
           <a:p>
             <a:fld id="{1D6AAEF1-BB65-438A-947A-6BD8EC392D5A}" type="datetimeFigureOut">
               <a:rPr lang="en-US" smtClean="0"/>
-              <a:t>11/10/2020</a:t>
+              <a:t>11/11/2020</a:t>
             </a:fld>
             <a:endParaRPr lang="en-US"/>
           </a:p>
@@ -795,7 +795,7 @@
           <a:p>
             <a:fld id="{1D6AAEF1-BB65-438A-947A-6BD8EC392D5A}" type="datetimeFigureOut">
               <a:rPr lang="en-US" smtClean="0"/>
-              <a:t>11/10/2020</a:t>
+              <a:t>11/11/2020</a:t>
             </a:fld>
             <a:endParaRPr lang="en-US"/>
           </a:p>
@@ -993,7 +993,7 @@
           <a:p>
             <a:fld id="{1D6AAEF1-BB65-438A-947A-6BD8EC392D5A}" type="datetimeFigureOut">
               <a:rPr lang="en-US" smtClean="0"/>
-              <a:t>11/10/2020</a:t>
+              <a:t>11/11/2020</a:t>
             </a:fld>
             <a:endParaRPr lang="en-US"/>
           </a:p>
@@ -1268,7 +1268,7 @@
           <a:p>
             <a:fld id="{1D6AAEF1-BB65-438A-947A-6BD8EC392D5A}" type="datetimeFigureOut">
               <a:rPr lang="en-US" smtClean="0"/>
-              <a:t>11/10/2020</a:t>
+              <a:t>11/11/2020</a:t>
             </a:fld>
             <a:endParaRPr lang="en-US"/>
           </a:p>
@@ -1533,7 +1533,7 @@
           <a:p>
             <a:fld id="{1D6AAEF1-BB65-438A-947A-6BD8EC392D5A}" type="datetimeFigureOut">
               <a:rPr lang="en-US" smtClean="0"/>
-              <a:t>11/10/2020</a:t>
+              <a:t>11/11/2020</a:t>
             </a:fld>
             <a:endParaRPr lang="en-US"/>
           </a:p>
@@ -1945,7 +1945,7 @@
           <a:p>
             <a:fld id="{1D6AAEF1-BB65-438A-947A-6BD8EC392D5A}" type="datetimeFigureOut">
               <a:rPr lang="en-US" smtClean="0"/>
-              <a:t>11/10/2020</a:t>
+              <a:t>11/11/2020</a:t>
             </a:fld>
             <a:endParaRPr lang="en-US"/>
           </a:p>
@@ -2086,7 +2086,7 @@
           <a:p>
             <a:fld id="{1D6AAEF1-BB65-438A-947A-6BD8EC392D5A}" type="datetimeFigureOut">
               <a:rPr lang="en-US" smtClean="0"/>
-              <a:t>11/10/2020</a:t>
+              <a:t>11/11/2020</a:t>
             </a:fld>
             <a:endParaRPr lang="en-US"/>
           </a:p>
@@ -2199,7 +2199,7 @@
           <a:p>
             <a:fld id="{1D6AAEF1-BB65-438A-947A-6BD8EC392D5A}" type="datetimeFigureOut">
               <a:rPr lang="en-US" smtClean="0"/>
-              <a:t>11/10/2020</a:t>
+              <a:t>11/11/2020</a:t>
             </a:fld>
             <a:endParaRPr lang="en-US"/>
           </a:p>
@@ -2510,7 +2510,7 @@
           <a:p>
             <a:fld id="{1D6AAEF1-BB65-438A-947A-6BD8EC392D5A}" type="datetimeFigureOut">
               <a:rPr lang="en-US" smtClean="0"/>
-              <a:t>11/10/2020</a:t>
+              <a:t>11/11/2020</a:t>
             </a:fld>
             <a:endParaRPr lang="en-US"/>
           </a:p>
@@ -2798,7 +2798,7 @@
           <a:p>
             <a:fld id="{1D6AAEF1-BB65-438A-947A-6BD8EC392D5A}" type="datetimeFigureOut">
               <a:rPr lang="en-US" smtClean="0"/>
-              <a:t>11/10/2020</a:t>
+              <a:t>11/11/2020</a:t>
             </a:fld>
             <a:endParaRPr lang="en-US"/>
           </a:p>
@@ -3039,7 +3039,7 @@
           <a:p>
             <a:fld id="{1D6AAEF1-BB65-438A-947A-6BD8EC392D5A}" type="datetimeFigureOut">
               <a:rPr lang="en-US" smtClean="0"/>
-              <a:t>11/10/2020</a:t>
+              <a:t>11/11/2020</a:t>
             </a:fld>
             <a:endParaRPr lang="en-US"/>
           </a:p>
@@ -5316,21 +5316,21 @@
           <a:p>
             <a:pPr algn="just"/>
             <a:r>
-              <a:rPr lang="en-US"/>
+              <a:rPr lang="en-US" dirty="0"/>
               <a:t>Upscaled the symbols by 8, plotted the spectrum before and after modulation</a:t>
             </a:r>
           </a:p>
           <a:p>
             <a:pPr algn="just"/>
             <a:r>
-              <a:rPr lang="en-US"/>
+              <a:rPr lang="en-US" dirty="0"/>
               <a:t>Compared the spectrum with the spectrum of the symbols without upscaling</a:t>
             </a:r>
           </a:p>
           <a:p>
             <a:pPr algn="just"/>
             <a:r>
-              <a:rPr lang="en-US"/>
+              <a:rPr lang="en-US" dirty="0"/>
               <a:t>Learning about the Filter Bank method for spectrum plotting</a:t>
             </a:r>
           </a:p>

</xml_diff>

<commit_message>
cleanup on chromatic dispersion and pulse shaping
</commit_message>
<xml_diff>
--- a/Master's meetings presentation.pptx
+++ b/Master's meetings presentation.pptx
@@ -14,6 +14,7 @@
     <p:sldId id="263" r:id="rId8"/>
     <p:sldId id="264" r:id="rId9"/>
     <p:sldId id="265" r:id="rId10"/>
+    <p:sldId id="266" r:id="rId11"/>
   </p:sldIdLst>
   <p:sldSz cx="12192000" cy="6858000"/>
   <p:notesSz cx="6858000" cy="9144000"/>
@@ -389,7 +390,7 @@
           <a:p>
             <a:fld id="{1D6AAEF1-BB65-438A-947A-6BD8EC392D5A}" type="datetimeFigureOut">
               <a:rPr lang="en-US" smtClean="0"/>
-              <a:t>11/11/2020</a:t>
+              <a:t>11/26/2020</a:t>
             </a:fld>
             <a:endParaRPr lang="en-US"/>
           </a:p>
@@ -587,7 +588,7 @@
           <a:p>
             <a:fld id="{1D6AAEF1-BB65-438A-947A-6BD8EC392D5A}" type="datetimeFigureOut">
               <a:rPr lang="en-US" smtClean="0"/>
-              <a:t>11/11/2020</a:t>
+              <a:t>11/26/2020</a:t>
             </a:fld>
             <a:endParaRPr lang="en-US"/>
           </a:p>
@@ -795,7 +796,7 @@
           <a:p>
             <a:fld id="{1D6AAEF1-BB65-438A-947A-6BD8EC392D5A}" type="datetimeFigureOut">
               <a:rPr lang="en-US" smtClean="0"/>
-              <a:t>11/11/2020</a:t>
+              <a:t>11/26/2020</a:t>
             </a:fld>
             <a:endParaRPr lang="en-US"/>
           </a:p>
@@ -993,7 +994,7 @@
           <a:p>
             <a:fld id="{1D6AAEF1-BB65-438A-947A-6BD8EC392D5A}" type="datetimeFigureOut">
               <a:rPr lang="en-US" smtClean="0"/>
-              <a:t>11/11/2020</a:t>
+              <a:t>11/26/2020</a:t>
             </a:fld>
             <a:endParaRPr lang="en-US"/>
           </a:p>
@@ -1268,7 +1269,7 @@
           <a:p>
             <a:fld id="{1D6AAEF1-BB65-438A-947A-6BD8EC392D5A}" type="datetimeFigureOut">
               <a:rPr lang="en-US" smtClean="0"/>
-              <a:t>11/11/2020</a:t>
+              <a:t>11/26/2020</a:t>
             </a:fld>
             <a:endParaRPr lang="en-US"/>
           </a:p>
@@ -1533,7 +1534,7 @@
           <a:p>
             <a:fld id="{1D6AAEF1-BB65-438A-947A-6BD8EC392D5A}" type="datetimeFigureOut">
               <a:rPr lang="en-US" smtClean="0"/>
-              <a:t>11/11/2020</a:t>
+              <a:t>11/26/2020</a:t>
             </a:fld>
             <a:endParaRPr lang="en-US"/>
           </a:p>
@@ -1945,7 +1946,7 @@
           <a:p>
             <a:fld id="{1D6AAEF1-BB65-438A-947A-6BD8EC392D5A}" type="datetimeFigureOut">
               <a:rPr lang="en-US" smtClean="0"/>
-              <a:t>11/11/2020</a:t>
+              <a:t>11/26/2020</a:t>
             </a:fld>
             <a:endParaRPr lang="en-US"/>
           </a:p>
@@ -2086,7 +2087,7 @@
           <a:p>
             <a:fld id="{1D6AAEF1-BB65-438A-947A-6BD8EC392D5A}" type="datetimeFigureOut">
               <a:rPr lang="en-US" smtClean="0"/>
-              <a:t>11/11/2020</a:t>
+              <a:t>11/26/2020</a:t>
             </a:fld>
             <a:endParaRPr lang="en-US"/>
           </a:p>
@@ -2199,7 +2200,7 @@
           <a:p>
             <a:fld id="{1D6AAEF1-BB65-438A-947A-6BD8EC392D5A}" type="datetimeFigureOut">
               <a:rPr lang="en-US" smtClean="0"/>
-              <a:t>11/11/2020</a:t>
+              <a:t>11/26/2020</a:t>
             </a:fld>
             <a:endParaRPr lang="en-US"/>
           </a:p>
@@ -2510,7 +2511,7 @@
           <a:p>
             <a:fld id="{1D6AAEF1-BB65-438A-947A-6BD8EC392D5A}" type="datetimeFigureOut">
               <a:rPr lang="en-US" smtClean="0"/>
-              <a:t>11/11/2020</a:t>
+              <a:t>11/26/2020</a:t>
             </a:fld>
             <a:endParaRPr lang="en-US"/>
           </a:p>
@@ -2798,7 +2799,7 @@
           <a:p>
             <a:fld id="{1D6AAEF1-BB65-438A-947A-6BD8EC392D5A}" type="datetimeFigureOut">
               <a:rPr lang="en-US" smtClean="0"/>
-              <a:t>11/11/2020</a:t>
+              <a:t>11/26/2020</a:t>
             </a:fld>
             <a:endParaRPr lang="en-US"/>
           </a:p>
@@ -3039,7 +3040,7 @@
           <a:p>
             <a:fld id="{1D6AAEF1-BB65-438A-947A-6BD8EC392D5A}" type="datetimeFigureOut">
               <a:rPr lang="en-US" smtClean="0"/>
-              <a:t>11/11/2020</a:t>
+              <a:t>11/26/2020</a:t>
             </a:fld>
             <a:endParaRPr lang="en-US"/>
           </a:p>
@@ -3582,6 +3583,1114 @@
     <p:extLst>
       <p:ext uri="{BB962C8B-B14F-4D97-AF65-F5344CB8AC3E}">
         <p14:creationId xmlns:p14="http://schemas.microsoft.com/office/powerpoint/2010/main" val="159174094"/>
+      </p:ext>
+    </p:extLst>
+  </p:cSld>
+  <p:clrMapOvr>
+    <a:masterClrMapping/>
+  </p:clrMapOvr>
+</p:sld>
+</file>
+
+<file path=ppt/slides/slide10.xml><?xml version="1.0" encoding="utf-8"?>
+<p:sld xmlns:a="http://schemas.openxmlformats.org/drawingml/2006/main" xmlns:r="http://schemas.openxmlformats.org/officeDocument/2006/relationships" xmlns:p="http://schemas.openxmlformats.org/presentationml/2006/main">
+  <p:cSld>
+    <p:spTree>
+      <p:nvGrpSpPr>
+        <p:cNvPr id="1" name=""/>
+        <p:cNvGrpSpPr/>
+        <p:nvPr/>
+      </p:nvGrpSpPr>
+      <p:grpSpPr>
+        <a:xfrm>
+          <a:off x="0" y="0"/>
+          <a:ext cx="0" cy="0"/>
+          <a:chOff x="0" y="0"/>
+          <a:chExt cx="0" cy="0"/>
+        </a:xfrm>
+      </p:grpSpPr>
+      <p:sp>
+        <p:nvSpPr>
+          <p:cNvPr id="2" name="Title 1">
+            <a:extLst>
+              <a:ext uri="{FF2B5EF4-FFF2-40B4-BE49-F238E27FC236}">
+                <a16:creationId xmlns:a16="http://schemas.microsoft.com/office/drawing/2014/main" id="{CDA5F6B7-00D9-45BC-B9BE-B4676D88CD79}"/>
+              </a:ext>
+            </a:extLst>
+          </p:cNvPr>
+          <p:cNvSpPr>
+            <a:spLocks noGrp="1"/>
+          </p:cNvSpPr>
+          <p:nvPr>
+            <p:ph type="title"/>
+          </p:nvPr>
+        </p:nvSpPr>
+        <p:spPr/>
+        <p:txBody>
+          <a:bodyPr/>
+          <a:lstStyle/>
+          <a:p>
+            <a:r>
+              <a:rPr lang="en-US" dirty="0"/>
+              <a:t>Chromatic Dispersion</a:t>
+            </a:r>
+          </a:p>
+        </p:txBody>
+      </p:sp>
+      <mc:AlternateContent xmlns:mc="http://schemas.openxmlformats.org/markup-compatibility/2006">
+        <mc:Choice xmlns:a14="http://schemas.microsoft.com/office/drawing/2010/main" Requires="a14">
+          <p:sp>
+            <p:nvSpPr>
+              <p:cNvPr id="3" name="Content Placeholder 2">
+                <a:extLst>
+                  <a:ext uri="{FF2B5EF4-FFF2-40B4-BE49-F238E27FC236}">
+                    <a16:creationId xmlns:a16="http://schemas.microsoft.com/office/drawing/2014/main" id="{E981E42B-E536-4B4D-9077-02E56249404E}"/>
+                  </a:ext>
+                </a:extLst>
+              </p:cNvPr>
+              <p:cNvSpPr>
+                <a:spLocks noGrp="1"/>
+              </p:cNvSpPr>
+              <p:nvPr>
+                <p:ph idx="1"/>
+              </p:nvPr>
+            </p:nvSpPr>
+            <p:spPr>
+              <a:xfrm>
+                <a:off x="838200" y="1509742"/>
+                <a:ext cx="10515600" cy="4351338"/>
+              </a:xfrm>
+            </p:spPr>
+            <p:txBody>
+              <a:bodyPr>
+                <a:normAutofit fontScale="92500" lnSpcReduction="20000"/>
+              </a:bodyPr>
+              <a:lstStyle/>
+              <a:p>
+                <a:r>
+                  <a:rPr lang="en-US" dirty="0"/>
+                  <a:t>Chromatic Dispersion Model:</a:t>
+                </a:r>
+              </a:p>
+              <a:p>
+                <a:pPr marL="0" indent="0">
+                  <a:buNone/>
+                </a:pPr>
+                <a:r>
+                  <a:rPr lang="en-US" dirty="0"/>
+                  <a:t>C(exp(j</a:t>
+                </a:r>
+                <a:r>
+                  <a:rPr lang="el-GR" dirty="0"/>
+                  <a:t>ω</a:t>
+                </a:r>
+                <a:r>
+                  <a:rPr lang="en-US" dirty="0"/>
+                  <a:t>T )) = exp(−</a:t>
+                </a:r>
+                <a:r>
+                  <a:rPr lang="en-US" dirty="0" err="1"/>
+                  <a:t>jK</a:t>
+                </a:r>
+                <a:r>
+                  <a:rPr lang="en-US" dirty="0"/>
+                  <a:t> (</a:t>
+                </a:r>
+                <a:r>
+                  <a:rPr lang="el-GR" dirty="0"/>
+                  <a:t>ω</a:t>
+                </a:r>
+                <a:r>
+                  <a:rPr lang="en-US" dirty="0"/>
+                  <a:t>T )</a:t>
+                </a:r>
+                <a:r>
+                  <a:rPr lang="en-US" baseline="30000" dirty="0"/>
+                  <a:t>2</a:t>
+                </a:r>
+                <a:r>
+                  <a:rPr lang="en-US" dirty="0"/>
+                  <a:t>), Where K = D</a:t>
+                </a:r>
+                <a:r>
+                  <a:rPr lang="el-GR" dirty="0"/>
+                  <a:t>λ</a:t>
+                </a:r>
+                <a:r>
+                  <a:rPr lang="en-US" baseline="30000" dirty="0"/>
+                  <a:t>2</a:t>
+                </a:r>
+                <a:r>
+                  <a:rPr lang="en-US" dirty="0"/>
+                  <a:t>z/4</a:t>
+                </a:r>
+                <a:r>
+                  <a:rPr lang="el-GR" dirty="0"/>
+                  <a:t>π</a:t>
+                </a:r>
+                <a:r>
+                  <a:rPr lang="en-US" dirty="0"/>
+                  <a:t>cT</a:t>
+                </a:r>
+                <a:r>
+                  <a:rPr lang="en-US" baseline="30000" dirty="0"/>
+                  <a:t>2</a:t>
+                </a:r>
+              </a:p>
+              <a:p>
+                <a:pPr marL="0" indent="0">
+                  <a:buNone/>
+                </a:pPr>
+                <a:endParaRPr lang="en-US" baseline="30000" dirty="0"/>
+              </a:p>
+              <a:p>
+                <a:r>
+                  <a:rPr lang="en-US" dirty="0"/>
+                  <a:t>Chromatic Dispersion Filter:</a:t>
+                </a:r>
+              </a:p>
+              <a:p>
+                <a:pPr marL="0" indent="0">
+                  <a:buNone/>
+                </a:pPr>
+                <a:r>
+                  <a:rPr lang="en-US" dirty="0"/>
+                  <a:t> </a:t>
+                </a:r>
+                <a14:m>
+                  <m:oMath xmlns:m="http://schemas.openxmlformats.org/officeDocument/2006/math">
+                    <m:r>
+                      <m:rPr>
+                        <m:sty m:val="p"/>
+                      </m:rPr>
+                      <a:rPr lang="en-US" b="0" i="0" smtClean="0">
+                        <a:latin typeface="Cambria Math" panose="02040503050406030204" pitchFamily="18" charset="0"/>
+                      </a:rPr>
+                      <m:t>h</m:t>
+                    </m:r>
+                    <m:d>
+                      <m:dPr>
+                        <m:ctrlPr>
+                          <a:rPr lang="en-US" b="0" i="0" smtClean="0">
+                            <a:latin typeface="Cambria Math" panose="02040503050406030204" pitchFamily="18" charset="0"/>
+                          </a:rPr>
+                        </m:ctrlPr>
+                      </m:dPr>
+                      <m:e>
+                        <m:r>
+                          <m:rPr>
+                            <m:sty m:val="p"/>
+                          </m:rPr>
+                          <a:rPr lang="en-US" b="0" i="0" smtClean="0">
+                            <a:latin typeface="Cambria Math" panose="02040503050406030204" pitchFamily="18" charset="0"/>
+                          </a:rPr>
+                          <m:t>n</m:t>
+                        </m:r>
+                      </m:e>
+                    </m:d>
+                    <m:r>
+                      <a:rPr lang="en-US" b="0" i="1" smtClean="0">
+                        <a:latin typeface="Cambria Math" panose="02040503050406030204" pitchFamily="18" charset="0"/>
+                      </a:rPr>
+                      <m:t>= </m:t>
+                    </m:r>
+                    <m:rad>
+                      <m:radPr>
+                        <m:degHide m:val="on"/>
+                        <m:ctrlPr>
+                          <a:rPr lang="en-US" i="1" smtClean="0">
+                            <a:latin typeface="Cambria Math" panose="02040503050406030204" pitchFamily="18" charset="0"/>
+                          </a:rPr>
+                        </m:ctrlPr>
+                      </m:radPr>
+                      <m:deg/>
+                      <m:e>
+                        <m:f>
+                          <m:fPr>
+                            <m:ctrlPr>
+                              <a:rPr lang="en-US" i="1" smtClean="0">
+                                <a:latin typeface="Cambria Math" panose="02040503050406030204" pitchFamily="18" charset="0"/>
+                              </a:rPr>
+                            </m:ctrlPr>
+                          </m:fPr>
+                          <m:num>
+                            <m:r>
+                              <a:rPr lang="en-US" b="0" i="1" smtClean="0">
+                                <a:latin typeface="Cambria Math" panose="02040503050406030204" pitchFamily="18" charset="0"/>
+                              </a:rPr>
+                              <m:t>𝑗</m:t>
+                            </m:r>
+                          </m:num>
+                          <m:den>
+                            <m:r>
+                              <a:rPr lang="en-US" b="0" i="1" smtClean="0">
+                                <a:latin typeface="Cambria Math" panose="02040503050406030204" pitchFamily="18" charset="0"/>
+                              </a:rPr>
+                              <m:t>4</m:t>
+                            </m:r>
+                            <m:r>
+                              <a:rPr lang="en-US" b="0" i="1" smtClean="0">
+                                <a:latin typeface="Cambria Math" panose="02040503050406030204" pitchFamily="18" charset="0"/>
+                              </a:rPr>
+                              <m:t>𝐾</m:t>
+                            </m:r>
+                            <m:r>
+                              <a:rPr lang="en-US" b="0" i="1" smtClean="0">
+                                <a:latin typeface="Cambria Math" panose="02040503050406030204" pitchFamily="18" charset="0"/>
+                                <a:ea typeface="Cambria Math" panose="02040503050406030204" pitchFamily="18" charset="0"/>
+                              </a:rPr>
+                              <m:t>𝜋</m:t>
+                            </m:r>
+                          </m:den>
+                        </m:f>
+                      </m:e>
+                    </m:rad>
+                    <m:sSup>
+                      <m:sSupPr>
+                        <m:ctrlPr>
+                          <a:rPr lang="en-US" b="0" i="1" smtClean="0">
+                            <a:latin typeface="Cambria Math" panose="02040503050406030204" pitchFamily="18" charset="0"/>
+                          </a:rPr>
+                        </m:ctrlPr>
+                      </m:sSupPr>
+                      <m:e>
+                        <m:r>
+                          <a:rPr lang="en-US" b="0" i="1" smtClean="0">
+                            <a:latin typeface="Cambria Math" panose="02040503050406030204" pitchFamily="18" charset="0"/>
+                          </a:rPr>
+                          <m:t>𝑒</m:t>
+                        </m:r>
+                      </m:e>
+                      <m:sup>
+                        <m:r>
+                          <a:rPr lang="en-US" b="0" i="1" smtClean="0">
+                            <a:latin typeface="Cambria Math" panose="02040503050406030204" pitchFamily="18" charset="0"/>
+                          </a:rPr>
+                          <m:t>−</m:t>
+                        </m:r>
+                        <m:r>
+                          <a:rPr lang="en-US" b="0" i="1" smtClean="0">
+                            <a:latin typeface="Cambria Math" panose="02040503050406030204" pitchFamily="18" charset="0"/>
+                          </a:rPr>
+                          <m:t>𝑗</m:t>
+                        </m:r>
+                        <m:f>
+                          <m:fPr>
+                            <m:ctrlPr>
+                              <a:rPr lang="en-US" b="0" i="1" smtClean="0">
+                                <a:latin typeface="Cambria Math" panose="02040503050406030204" pitchFamily="18" charset="0"/>
+                              </a:rPr>
+                            </m:ctrlPr>
+                          </m:fPr>
+                          <m:num>
+                            <m:sSup>
+                              <m:sSupPr>
+                                <m:ctrlPr>
+                                  <a:rPr lang="en-US" b="0" i="1" smtClean="0">
+                                    <a:latin typeface="Cambria Math" panose="02040503050406030204" pitchFamily="18" charset="0"/>
+                                  </a:rPr>
+                                </m:ctrlPr>
+                              </m:sSupPr>
+                              <m:e>
+                                <m:r>
+                                  <a:rPr lang="en-US" b="0" i="1" smtClean="0">
+                                    <a:latin typeface="Cambria Math" panose="02040503050406030204" pitchFamily="18" charset="0"/>
+                                  </a:rPr>
+                                  <m:t>𝑛</m:t>
+                                </m:r>
+                              </m:e>
+                              <m:sup>
+                                <m:r>
+                                  <a:rPr lang="en-US" b="0" i="1" smtClean="0">
+                                    <a:latin typeface="Cambria Math" panose="02040503050406030204" pitchFamily="18" charset="0"/>
+                                  </a:rPr>
+                                  <m:t>2</m:t>
+                                </m:r>
+                              </m:sup>
+                            </m:sSup>
+                          </m:num>
+                          <m:den>
+                            <m:r>
+                              <a:rPr lang="en-US" b="0" i="1" smtClean="0">
+                                <a:latin typeface="Cambria Math" panose="02040503050406030204" pitchFamily="18" charset="0"/>
+                              </a:rPr>
+                              <m:t>4</m:t>
+                            </m:r>
+                            <m:r>
+                              <a:rPr lang="en-US" b="0" i="1" smtClean="0">
+                                <a:latin typeface="Cambria Math" panose="02040503050406030204" pitchFamily="18" charset="0"/>
+                              </a:rPr>
+                              <m:t>𝐾</m:t>
+                            </m:r>
+                          </m:den>
+                        </m:f>
+                      </m:sup>
+                    </m:sSup>
+                    <m:r>
+                      <a:rPr lang="en-US" b="0" i="1" smtClean="0">
+                        <a:latin typeface="Cambria Math" panose="02040503050406030204" pitchFamily="18" charset="0"/>
+                      </a:rPr>
+                      <m:t>,     −</m:t>
+                    </m:r>
+                    <m:d>
+                      <m:dPr>
+                        <m:begChr m:val="⌊"/>
+                        <m:endChr m:val="⌋"/>
+                        <m:ctrlPr>
+                          <a:rPr lang="en-US" b="0" i="1" smtClean="0">
+                            <a:latin typeface="Cambria Math" panose="02040503050406030204" pitchFamily="18" charset="0"/>
+                          </a:rPr>
+                        </m:ctrlPr>
+                      </m:dPr>
+                      <m:e>
+                        <m:f>
+                          <m:fPr>
+                            <m:ctrlPr>
+                              <a:rPr lang="en-US" b="0" i="1" smtClean="0">
+                                <a:latin typeface="Cambria Math" panose="02040503050406030204" pitchFamily="18" charset="0"/>
+                              </a:rPr>
+                            </m:ctrlPr>
+                          </m:fPr>
+                          <m:num>
+                            <m:r>
+                              <a:rPr lang="en-US" b="0" i="1" smtClean="0">
+                                <a:latin typeface="Cambria Math" panose="02040503050406030204" pitchFamily="18" charset="0"/>
+                              </a:rPr>
+                              <m:t>𝑁</m:t>
+                            </m:r>
+                          </m:num>
+                          <m:den>
+                            <m:r>
+                              <a:rPr lang="en-US" b="0" i="1" smtClean="0">
+                                <a:latin typeface="Cambria Math" panose="02040503050406030204" pitchFamily="18" charset="0"/>
+                              </a:rPr>
+                              <m:t>2</m:t>
+                            </m:r>
+                          </m:den>
+                        </m:f>
+                      </m:e>
+                    </m:d>
+                    <m:r>
+                      <a:rPr lang="en-US" b="0" i="1" smtClean="0">
+                        <a:latin typeface="Cambria Math" panose="02040503050406030204" pitchFamily="18" charset="0"/>
+                      </a:rPr>
+                      <m:t>&lt;</m:t>
+                    </m:r>
+                    <m:r>
+                      <a:rPr lang="en-US" b="0" i="1" smtClean="0">
+                        <a:latin typeface="Cambria Math" panose="02040503050406030204" pitchFamily="18" charset="0"/>
+                      </a:rPr>
+                      <m:t>𝑛</m:t>
+                    </m:r>
+                    <m:r>
+                      <a:rPr lang="en-US" b="0" i="1" smtClean="0">
+                        <a:latin typeface="Cambria Math" panose="02040503050406030204" pitchFamily="18" charset="0"/>
+                      </a:rPr>
+                      <m:t>&lt;</m:t>
+                    </m:r>
+                    <m:d>
+                      <m:dPr>
+                        <m:begChr m:val="⌊"/>
+                        <m:endChr m:val="⌋"/>
+                        <m:ctrlPr>
+                          <a:rPr lang="en-US" i="1">
+                            <a:latin typeface="Cambria Math" panose="02040503050406030204" pitchFamily="18" charset="0"/>
+                          </a:rPr>
+                        </m:ctrlPr>
+                      </m:dPr>
+                      <m:e>
+                        <m:f>
+                          <m:fPr>
+                            <m:ctrlPr>
+                              <a:rPr lang="en-US" i="1">
+                                <a:latin typeface="Cambria Math" panose="02040503050406030204" pitchFamily="18" charset="0"/>
+                              </a:rPr>
+                            </m:ctrlPr>
+                          </m:fPr>
+                          <m:num>
+                            <m:r>
+                              <a:rPr lang="en-US" i="1">
+                                <a:latin typeface="Cambria Math" panose="02040503050406030204" pitchFamily="18" charset="0"/>
+                              </a:rPr>
+                              <m:t>𝑁</m:t>
+                            </m:r>
+                          </m:num>
+                          <m:den>
+                            <m:r>
+                              <a:rPr lang="en-US" i="1">
+                                <a:latin typeface="Cambria Math" panose="02040503050406030204" pitchFamily="18" charset="0"/>
+                              </a:rPr>
+                              <m:t>2</m:t>
+                            </m:r>
+                          </m:den>
+                        </m:f>
+                      </m:e>
+                    </m:d>
+                    <m:r>
+                      <a:rPr lang="en-US" b="0" i="1" smtClean="0">
+                        <a:latin typeface="Cambria Math" panose="02040503050406030204" pitchFamily="18" charset="0"/>
+                      </a:rPr>
+                      <m:t>,    </m:t>
+                    </m:r>
+                    <m:r>
+                      <a:rPr lang="en-US" b="0" i="1" smtClean="0">
+                        <a:latin typeface="Cambria Math" panose="02040503050406030204" pitchFamily="18" charset="0"/>
+                      </a:rPr>
+                      <m:t>𝑁</m:t>
+                    </m:r>
+                    <m:r>
+                      <a:rPr lang="en-US" b="0" i="1" smtClean="0">
+                        <a:latin typeface="Cambria Math" panose="02040503050406030204" pitchFamily="18" charset="0"/>
+                      </a:rPr>
+                      <m:t>=2</m:t>
+                    </m:r>
+                    <m:d>
+                      <m:dPr>
+                        <m:begChr m:val="⌊"/>
+                        <m:endChr m:val="⌋"/>
+                        <m:ctrlPr>
+                          <a:rPr lang="en-US" b="0" i="1" smtClean="0">
+                            <a:latin typeface="Cambria Math" panose="02040503050406030204" pitchFamily="18" charset="0"/>
+                          </a:rPr>
+                        </m:ctrlPr>
+                      </m:dPr>
+                      <m:e>
+                        <m:r>
+                          <a:rPr lang="en-US" b="0" i="1" smtClean="0">
+                            <a:latin typeface="Cambria Math" panose="02040503050406030204" pitchFamily="18" charset="0"/>
+                          </a:rPr>
+                          <m:t>2</m:t>
+                        </m:r>
+                        <m:r>
+                          <a:rPr lang="en-US" b="0" i="1" smtClean="0">
+                            <a:latin typeface="Cambria Math" panose="02040503050406030204" pitchFamily="18" charset="0"/>
+                          </a:rPr>
+                          <m:t>𝐾</m:t>
+                        </m:r>
+                        <m:r>
+                          <a:rPr lang="en-US" b="0" i="1" smtClean="0">
+                            <a:latin typeface="Cambria Math" panose="02040503050406030204" pitchFamily="18" charset="0"/>
+                            <a:ea typeface="Cambria Math" panose="02040503050406030204" pitchFamily="18" charset="0"/>
+                          </a:rPr>
+                          <m:t>𝜋</m:t>
+                        </m:r>
+                      </m:e>
+                    </m:d>
+                    <m:r>
+                      <a:rPr lang="en-US" b="0" i="1" smtClean="0">
+                        <a:latin typeface="Cambria Math" panose="02040503050406030204" pitchFamily="18" charset="0"/>
+                      </a:rPr>
+                      <m:t>+1</m:t>
+                    </m:r>
+                  </m:oMath>
+                </a14:m>
+                <a:endParaRPr lang="en-US" dirty="0"/>
+              </a:p>
+              <a:p>
+                <a:endParaRPr lang="en-US" dirty="0"/>
+              </a:p>
+              <a:p>
+                <a:r>
+                  <a:rPr lang="en-US" dirty="0"/>
+                  <a:t>Least Squares Filter:</a:t>
+                </a:r>
+              </a:p>
+              <a:p>
+                <a:pPr marL="0" indent="0">
+                  <a:buNone/>
+                </a:pPr>
+                <a14:m>
+                  <m:oMathPara xmlns:m="http://schemas.openxmlformats.org/officeDocument/2006/math">
+                    <m:oMathParaPr>
+                      <m:jc m:val="centerGroup"/>
+                    </m:oMathParaPr>
+                    <m:oMath xmlns:m="http://schemas.openxmlformats.org/officeDocument/2006/math">
+                      <m:r>
+                        <a:rPr lang="en-US" b="0" i="1" smtClean="0">
+                          <a:latin typeface="Cambria Math" panose="02040503050406030204" pitchFamily="18" charset="0"/>
+                        </a:rPr>
+                        <m:t>𝐷</m:t>
+                      </m:r>
+                      <m:d>
+                        <m:dPr>
+                          <m:ctrlPr>
+                            <a:rPr lang="en-US" b="0" i="1" smtClean="0">
+                              <a:latin typeface="Cambria Math" panose="02040503050406030204" pitchFamily="18" charset="0"/>
+                            </a:rPr>
+                          </m:ctrlPr>
+                        </m:dPr>
+                        <m:e>
+                          <m:r>
+                            <a:rPr lang="en-US" b="0" i="1" smtClean="0">
+                              <a:latin typeface="Cambria Math" panose="02040503050406030204" pitchFamily="18" charset="0"/>
+                            </a:rPr>
+                            <m:t>𝑛</m:t>
+                          </m:r>
+                        </m:e>
+                      </m:d>
+                      <m:r>
+                        <a:rPr lang="en-US" b="0" i="1" smtClean="0">
+                          <a:latin typeface="Cambria Math" panose="02040503050406030204" pitchFamily="18" charset="0"/>
+                        </a:rPr>
+                        <m:t>= </m:t>
+                      </m:r>
+                      <m:f>
+                        <m:fPr>
+                          <m:ctrlPr>
+                            <a:rPr lang="en-US" b="0" i="1" smtClean="0">
+                              <a:latin typeface="Cambria Math" panose="02040503050406030204" pitchFamily="18" charset="0"/>
+                            </a:rPr>
+                          </m:ctrlPr>
+                        </m:fPr>
+                        <m:num>
+                          <m:sSup>
+                            <m:sSupPr>
+                              <m:ctrlPr>
+                                <a:rPr lang="en-US" b="0" i="1" smtClean="0">
+                                  <a:latin typeface="Cambria Math" panose="02040503050406030204" pitchFamily="18" charset="0"/>
+                                </a:rPr>
+                              </m:ctrlPr>
+                            </m:sSupPr>
+                            <m:e>
+                              <m:r>
+                                <a:rPr lang="en-US" b="0" i="1" smtClean="0">
+                                  <a:latin typeface="Cambria Math" panose="02040503050406030204" pitchFamily="18" charset="0"/>
+                                </a:rPr>
+                                <m:t>𝑒</m:t>
+                              </m:r>
+                            </m:e>
+                            <m:sup>
+                              <m:r>
+                                <a:rPr lang="en-US" b="0" i="1" smtClean="0">
+                                  <a:latin typeface="Cambria Math" panose="02040503050406030204" pitchFamily="18" charset="0"/>
+                                </a:rPr>
+                                <m:t>−</m:t>
+                              </m:r>
+                              <m:r>
+                                <a:rPr lang="en-US" b="0" i="1" smtClean="0">
+                                  <a:latin typeface="Cambria Math" panose="02040503050406030204" pitchFamily="18" charset="0"/>
+                                </a:rPr>
+                                <m:t>𝑗</m:t>
+                              </m:r>
+                              <m:r>
+                                <a:rPr lang="en-US" b="0" i="1" smtClean="0">
+                                  <a:latin typeface="Cambria Math" panose="02040503050406030204" pitchFamily="18" charset="0"/>
+                                </a:rPr>
+                                <m:t>(</m:t>
+                              </m:r>
+                              <m:f>
+                                <m:fPr>
+                                  <m:ctrlPr>
+                                    <a:rPr lang="en-US" b="0" i="1" smtClean="0">
+                                      <a:latin typeface="Cambria Math" panose="02040503050406030204" pitchFamily="18" charset="0"/>
+                                    </a:rPr>
+                                  </m:ctrlPr>
+                                </m:fPr>
+                                <m:num>
+                                  <m:sSup>
+                                    <m:sSupPr>
+                                      <m:ctrlPr>
+                                        <a:rPr lang="en-US" b="0" i="1" smtClean="0">
+                                          <a:latin typeface="Cambria Math" panose="02040503050406030204" pitchFamily="18" charset="0"/>
+                                        </a:rPr>
+                                      </m:ctrlPr>
+                                    </m:sSupPr>
+                                    <m:e>
+                                      <m:r>
+                                        <a:rPr lang="en-US" b="0" i="1" smtClean="0">
+                                          <a:latin typeface="Cambria Math" panose="02040503050406030204" pitchFamily="18" charset="0"/>
+                                        </a:rPr>
+                                        <m:t>𝑛</m:t>
+                                      </m:r>
+                                    </m:e>
+                                    <m:sup>
+                                      <m:r>
+                                        <a:rPr lang="en-US" b="0" i="1" smtClean="0">
+                                          <a:latin typeface="Cambria Math" panose="02040503050406030204" pitchFamily="18" charset="0"/>
+                                        </a:rPr>
+                                        <m:t>2</m:t>
+                                      </m:r>
+                                    </m:sup>
+                                  </m:sSup>
+                                </m:num>
+                                <m:den>
+                                  <m:r>
+                                    <a:rPr lang="en-US" b="0" i="1" smtClean="0">
+                                      <a:latin typeface="Cambria Math" panose="02040503050406030204" pitchFamily="18" charset="0"/>
+                                    </a:rPr>
+                                    <m:t>4</m:t>
+                                  </m:r>
+                                  <m:r>
+                                    <a:rPr lang="en-US" b="0" i="1" smtClean="0">
+                                      <a:latin typeface="Cambria Math" panose="02040503050406030204" pitchFamily="18" charset="0"/>
+                                    </a:rPr>
+                                    <m:t>𝐾</m:t>
+                                  </m:r>
+                                </m:den>
+                              </m:f>
+                              <m:r>
+                                <a:rPr lang="en-US" b="0" i="1" smtClean="0">
+                                  <a:latin typeface="Cambria Math" panose="02040503050406030204" pitchFamily="18" charset="0"/>
+                                </a:rPr>
+                                <m:t>+</m:t>
+                              </m:r>
+                              <m:f>
+                                <m:fPr>
+                                  <m:ctrlPr>
+                                    <a:rPr lang="el-GR" b="0" i="1" smtClean="0">
+                                      <a:latin typeface="Cambria Math" panose="02040503050406030204" pitchFamily="18" charset="0"/>
+                                    </a:rPr>
+                                  </m:ctrlPr>
+                                </m:fPr>
+                                <m:num>
+                                  <m:r>
+                                    <a:rPr lang="en-US" b="0" i="1" smtClean="0">
+                                      <a:latin typeface="Cambria Math" panose="02040503050406030204" pitchFamily="18" charset="0"/>
+                                    </a:rPr>
+                                    <m:t>3</m:t>
+                                  </m:r>
+                                  <m:r>
+                                    <a:rPr lang="el-GR" b="0" i="1" smtClean="0">
+                                      <a:latin typeface="Cambria Math" panose="02040503050406030204" pitchFamily="18" charset="0"/>
+                                    </a:rPr>
+                                    <m:t>𝜋</m:t>
+                                  </m:r>
+                                </m:num>
+                                <m:den>
+                                  <m:r>
+                                    <a:rPr lang="en-US" b="0" i="1" smtClean="0">
+                                      <a:latin typeface="Cambria Math" panose="02040503050406030204" pitchFamily="18" charset="0"/>
+                                    </a:rPr>
+                                    <m:t>4</m:t>
+                                  </m:r>
+                                </m:den>
+                              </m:f>
+                              <m:r>
+                                <a:rPr lang="en-US" b="0" i="1" smtClean="0">
+                                  <a:latin typeface="Cambria Math" panose="02040503050406030204" pitchFamily="18" charset="0"/>
+                                </a:rPr>
+                                <m:t>)</m:t>
+                              </m:r>
+                            </m:sup>
+                          </m:sSup>
+                        </m:num>
+                        <m:den>
+                          <m:r>
+                            <a:rPr lang="en-US" b="0" i="1" smtClean="0">
+                              <a:latin typeface="Cambria Math" panose="02040503050406030204" pitchFamily="18" charset="0"/>
+                            </a:rPr>
+                            <m:t>4</m:t>
+                          </m:r>
+                          <m:rad>
+                            <m:radPr>
+                              <m:degHide m:val="on"/>
+                              <m:ctrlPr>
+                                <a:rPr lang="en-US" b="0" i="1" smtClean="0">
+                                  <a:latin typeface="Cambria Math" panose="02040503050406030204" pitchFamily="18" charset="0"/>
+                                </a:rPr>
+                              </m:ctrlPr>
+                            </m:radPr>
+                            <m:deg/>
+                            <m:e>
+                              <m:r>
+                                <a:rPr lang="en-US" b="0" i="1" smtClean="0">
+                                  <a:latin typeface="Cambria Math" panose="02040503050406030204" pitchFamily="18" charset="0"/>
+                                  <a:ea typeface="Cambria Math" panose="02040503050406030204" pitchFamily="18" charset="0"/>
+                                </a:rPr>
+                                <m:t>𝜋</m:t>
+                              </m:r>
+                              <m:r>
+                                <a:rPr lang="en-US" b="0" i="1" smtClean="0">
+                                  <a:latin typeface="Cambria Math" panose="02040503050406030204" pitchFamily="18" charset="0"/>
+                                </a:rPr>
+                                <m:t>𝐾</m:t>
+                              </m:r>
+                            </m:e>
+                          </m:rad>
+                        </m:den>
+                      </m:f>
+                      <m:d>
+                        <m:dPr>
+                          <m:ctrlPr>
+                            <a:rPr lang="en-US" b="0" i="1" smtClean="0">
+                              <a:latin typeface="Cambria Math" panose="02040503050406030204" pitchFamily="18" charset="0"/>
+                            </a:rPr>
+                          </m:ctrlPr>
+                        </m:dPr>
+                        <m:e>
+                          <m:r>
+                            <a:rPr lang="en-US" b="0" i="1" smtClean="0">
+                              <a:latin typeface="Cambria Math" panose="02040503050406030204" pitchFamily="18" charset="0"/>
+                            </a:rPr>
+                            <m:t>𝑒𝑟𝑓𝑖</m:t>
+                          </m:r>
+                          <m:d>
+                            <m:dPr>
+                              <m:ctrlPr>
+                                <a:rPr lang="en-US" b="0" i="1" smtClean="0">
+                                  <a:latin typeface="Cambria Math" panose="02040503050406030204" pitchFamily="18" charset="0"/>
+                                </a:rPr>
+                              </m:ctrlPr>
+                            </m:dPr>
+                            <m:e>
+                              <m:f>
+                                <m:fPr>
+                                  <m:ctrlPr>
+                                    <a:rPr lang="en-US" i="1">
+                                      <a:latin typeface="Cambria Math" panose="02040503050406030204" pitchFamily="18" charset="0"/>
+                                    </a:rPr>
+                                  </m:ctrlPr>
+                                </m:fPr>
+                                <m:num>
+                                  <m:sSup>
+                                    <m:sSupPr>
+                                      <m:ctrlPr>
+                                        <a:rPr lang="en-US" i="1">
+                                          <a:latin typeface="Cambria Math" panose="02040503050406030204" pitchFamily="18" charset="0"/>
+                                        </a:rPr>
+                                      </m:ctrlPr>
+                                    </m:sSupPr>
+                                    <m:e>
+                                      <m:r>
+                                        <a:rPr lang="en-US" i="1">
+                                          <a:latin typeface="Cambria Math" panose="02040503050406030204" pitchFamily="18" charset="0"/>
+                                        </a:rPr>
+                                        <m:t>𝑒</m:t>
+                                      </m:r>
+                                    </m:e>
+                                    <m:sup>
+                                      <m:r>
+                                        <a:rPr lang="en-US" i="1">
+                                          <a:latin typeface="Cambria Math" panose="02040503050406030204" pitchFamily="18" charset="0"/>
+                                        </a:rPr>
+                                        <m:t>𝑗</m:t>
+                                      </m:r>
+                                      <m:f>
+                                        <m:fPr>
+                                          <m:ctrlPr>
+                                            <a:rPr lang="el-GR" i="1">
+                                              <a:latin typeface="Cambria Math" panose="02040503050406030204" pitchFamily="18" charset="0"/>
+                                            </a:rPr>
+                                          </m:ctrlPr>
+                                        </m:fPr>
+                                        <m:num>
+                                          <m:r>
+                                            <a:rPr lang="en-US" i="1">
+                                              <a:latin typeface="Cambria Math" panose="02040503050406030204" pitchFamily="18" charset="0"/>
+                                            </a:rPr>
+                                            <m:t>3</m:t>
+                                          </m:r>
+                                          <m:r>
+                                            <a:rPr lang="el-GR" i="1">
+                                              <a:latin typeface="Cambria Math" panose="02040503050406030204" pitchFamily="18" charset="0"/>
+                                            </a:rPr>
+                                            <m:t>𝜋</m:t>
+                                          </m:r>
+                                        </m:num>
+                                        <m:den>
+                                          <m:r>
+                                            <a:rPr lang="en-US" i="1">
+                                              <a:latin typeface="Cambria Math" panose="02040503050406030204" pitchFamily="18" charset="0"/>
+                                            </a:rPr>
+                                            <m:t>4</m:t>
+                                          </m:r>
+                                        </m:den>
+                                      </m:f>
+                                    </m:sup>
+                                  </m:sSup>
+                                  <m:r>
+                                    <a:rPr lang="en-US" b="0" i="1" smtClean="0">
+                                      <a:latin typeface="Cambria Math" panose="02040503050406030204" pitchFamily="18" charset="0"/>
+                                    </a:rPr>
+                                    <m:t>(2</m:t>
+                                  </m:r>
+                                  <m:r>
+                                    <a:rPr lang="en-US" b="0" i="1" smtClean="0">
+                                      <a:latin typeface="Cambria Math" panose="02040503050406030204" pitchFamily="18" charset="0"/>
+                                    </a:rPr>
+                                    <m:t>𝐾</m:t>
+                                  </m:r>
+                                  <m:r>
+                                    <a:rPr lang="en-US" b="0" i="1" smtClean="0">
+                                      <a:latin typeface="Cambria Math" panose="02040503050406030204" pitchFamily="18" charset="0"/>
+                                      <a:ea typeface="Cambria Math" panose="02040503050406030204" pitchFamily="18" charset="0"/>
+                                    </a:rPr>
+                                    <m:t>𝜋</m:t>
+                                  </m:r>
+                                  <m:r>
+                                    <a:rPr lang="en-US" b="0" i="1" smtClean="0">
+                                      <a:latin typeface="Cambria Math" panose="02040503050406030204" pitchFamily="18" charset="0"/>
+                                    </a:rPr>
+                                    <m:t>−</m:t>
+                                  </m:r>
+                                  <m:r>
+                                    <a:rPr lang="en-US" b="0" i="1" smtClean="0">
+                                      <a:latin typeface="Cambria Math" panose="02040503050406030204" pitchFamily="18" charset="0"/>
+                                    </a:rPr>
+                                    <m:t>𝑛</m:t>
+                                  </m:r>
+                                  <m:r>
+                                    <a:rPr lang="en-US" b="0" i="1" smtClean="0">
+                                      <a:latin typeface="Cambria Math" panose="02040503050406030204" pitchFamily="18" charset="0"/>
+                                    </a:rPr>
+                                    <m:t>)</m:t>
+                                  </m:r>
+                                </m:num>
+                                <m:den>
+                                  <m:r>
+                                    <a:rPr lang="en-US" b="0" i="1" smtClean="0">
+                                      <a:latin typeface="Cambria Math" panose="02040503050406030204" pitchFamily="18" charset="0"/>
+                                    </a:rPr>
+                                    <m:t>2</m:t>
+                                  </m:r>
+                                  <m:rad>
+                                    <m:radPr>
+                                      <m:degHide m:val="on"/>
+                                      <m:ctrlPr>
+                                        <a:rPr lang="en-US" i="1">
+                                          <a:latin typeface="Cambria Math" panose="02040503050406030204" pitchFamily="18" charset="0"/>
+                                        </a:rPr>
+                                      </m:ctrlPr>
+                                    </m:radPr>
+                                    <m:deg/>
+                                    <m:e>
+                                      <m:r>
+                                        <a:rPr lang="en-US" i="1">
+                                          <a:latin typeface="Cambria Math" panose="02040503050406030204" pitchFamily="18" charset="0"/>
+                                        </a:rPr>
+                                        <m:t>𝐾</m:t>
+                                      </m:r>
+                                    </m:e>
+                                  </m:rad>
+                                </m:den>
+                              </m:f>
+                            </m:e>
+                          </m:d>
+                          <m:r>
+                            <a:rPr lang="en-US" b="0" i="1" smtClean="0">
+                              <a:latin typeface="Cambria Math" panose="02040503050406030204" pitchFamily="18" charset="0"/>
+                            </a:rPr>
+                            <m:t>+</m:t>
+                          </m:r>
+                          <m:r>
+                            <a:rPr lang="en-US" b="0" i="1" smtClean="0">
+                              <a:latin typeface="Cambria Math" panose="02040503050406030204" pitchFamily="18" charset="0"/>
+                            </a:rPr>
+                            <m:t>𝑒𝑟𝑓𝑖</m:t>
+                          </m:r>
+                          <m:d>
+                            <m:dPr>
+                              <m:ctrlPr>
+                                <a:rPr lang="en-US" i="1">
+                                  <a:latin typeface="Cambria Math" panose="02040503050406030204" pitchFamily="18" charset="0"/>
+                                </a:rPr>
+                              </m:ctrlPr>
+                            </m:dPr>
+                            <m:e>
+                              <m:f>
+                                <m:fPr>
+                                  <m:ctrlPr>
+                                    <a:rPr lang="en-US" i="1">
+                                      <a:latin typeface="Cambria Math" panose="02040503050406030204" pitchFamily="18" charset="0"/>
+                                    </a:rPr>
+                                  </m:ctrlPr>
+                                </m:fPr>
+                                <m:num>
+                                  <m:sSup>
+                                    <m:sSupPr>
+                                      <m:ctrlPr>
+                                        <a:rPr lang="en-US" i="1">
+                                          <a:latin typeface="Cambria Math" panose="02040503050406030204" pitchFamily="18" charset="0"/>
+                                        </a:rPr>
+                                      </m:ctrlPr>
+                                    </m:sSupPr>
+                                    <m:e>
+                                      <m:r>
+                                        <a:rPr lang="en-US" i="1">
+                                          <a:latin typeface="Cambria Math" panose="02040503050406030204" pitchFamily="18" charset="0"/>
+                                        </a:rPr>
+                                        <m:t>𝑒</m:t>
+                                      </m:r>
+                                    </m:e>
+                                    <m:sup>
+                                      <m:r>
+                                        <a:rPr lang="en-US" i="1">
+                                          <a:latin typeface="Cambria Math" panose="02040503050406030204" pitchFamily="18" charset="0"/>
+                                        </a:rPr>
+                                        <m:t>𝑗</m:t>
+                                      </m:r>
+                                      <m:f>
+                                        <m:fPr>
+                                          <m:ctrlPr>
+                                            <a:rPr lang="el-GR" i="1">
+                                              <a:latin typeface="Cambria Math" panose="02040503050406030204" pitchFamily="18" charset="0"/>
+                                            </a:rPr>
+                                          </m:ctrlPr>
+                                        </m:fPr>
+                                        <m:num>
+                                          <m:r>
+                                            <a:rPr lang="en-US" i="1">
+                                              <a:latin typeface="Cambria Math" panose="02040503050406030204" pitchFamily="18" charset="0"/>
+                                            </a:rPr>
+                                            <m:t>3</m:t>
+                                          </m:r>
+                                          <m:r>
+                                            <a:rPr lang="el-GR" i="1">
+                                              <a:latin typeface="Cambria Math" panose="02040503050406030204" pitchFamily="18" charset="0"/>
+                                            </a:rPr>
+                                            <m:t>𝜋</m:t>
+                                          </m:r>
+                                        </m:num>
+                                        <m:den>
+                                          <m:r>
+                                            <a:rPr lang="en-US" i="1">
+                                              <a:latin typeface="Cambria Math" panose="02040503050406030204" pitchFamily="18" charset="0"/>
+                                            </a:rPr>
+                                            <m:t>4</m:t>
+                                          </m:r>
+                                        </m:den>
+                                      </m:f>
+                                    </m:sup>
+                                  </m:sSup>
+                                  <m:r>
+                                    <a:rPr lang="en-US" i="1">
+                                      <a:latin typeface="Cambria Math" panose="02040503050406030204" pitchFamily="18" charset="0"/>
+                                    </a:rPr>
+                                    <m:t>(2</m:t>
+                                  </m:r>
+                                  <m:r>
+                                    <a:rPr lang="en-US" i="1">
+                                      <a:latin typeface="Cambria Math" panose="02040503050406030204" pitchFamily="18" charset="0"/>
+                                    </a:rPr>
+                                    <m:t>𝐾</m:t>
+                                  </m:r>
+                                  <m:r>
+                                    <a:rPr lang="en-US" i="1">
+                                      <a:latin typeface="Cambria Math" panose="02040503050406030204" pitchFamily="18" charset="0"/>
+                                      <a:ea typeface="Cambria Math" panose="02040503050406030204" pitchFamily="18" charset="0"/>
+                                    </a:rPr>
+                                    <m:t>𝜋</m:t>
+                                  </m:r>
+                                  <m:r>
+                                    <a:rPr lang="en-US" b="0" i="1" smtClean="0">
+                                      <a:latin typeface="Cambria Math" panose="02040503050406030204" pitchFamily="18" charset="0"/>
+                                      <a:ea typeface="Cambria Math" panose="02040503050406030204" pitchFamily="18" charset="0"/>
+                                    </a:rPr>
+                                    <m:t>+</m:t>
+                                  </m:r>
+                                  <m:r>
+                                    <a:rPr lang="en-US" i="1">
+                                      <a:latin typeface="Cambria Math" panose="02040503050406030204" pitchFamily="18" charset="0"/>
+                                    </a:rPr>
+                                    <m:t>𝑛</m:t>
+                                  </m:r>
+                                  <m:r>
+                                    <a:rPr lang="en-US" i="1">
+                                      <a:latin typeface="Cambria Math" panose="02040503050406030204" pitchFamily="18" charset="0"/>
+                                    </a:rPr>
+                                    <m:t>)</m:t>
+                                  </m:r>
+                                </m:num>
+                                <m:den>
+                                  <m:r>
+                                    <a:rPr lang="en-US" i="1">
+                                      <a:latin typeface="Cambria Math" panose="02040503050406030204" pitchFamily="18" charset="0"/>
+                                    </a:rPr>
+                                    <m:t>2</m:t>
+                                  </m:r>
+                                  <m:rad>
+                                    <m:radPr>
+                                      <m:degHide m:val="on"/>
+                                      <m:ctrlPr>
+                                        <a:rPr lang="en-US" i="1">
+                                          <a:latin typeface="Cambria Math" panose="02040503050406030204" pitchFamily="18" charset="0"/>
+                                        </a:rPr>
+                                      </m:ctrlPr>
+                                    </m:radPr>
+                                    <m:deg/>
+                                    <m:e>
+                                      <m:r>
+                                        <a:rPr lang="en-US" i="1">
+                                          <a:latin typeface="Cambria Math" panose="02040503050406030204" pitchFamily="18" charset="0"/>
+                                        </a:rPr>
+                                        <m:t>𝐾</m:t>
+                                      </m:r>
+                                    </m:e>
+                                  </m:rad>
+                                </m:den>
+                              </m:f>
+                            </m:e>
+                          </m:d>
+                        </m:e>
+                      </m:d>
+                    </m:oMath>
+                  </m:oMathPara>
+                </a14:m>
+                <a:endParaRPr lang="en-US" dirty="0"/>
+              </a:p>
+              <a:p>
+                <a:pPr marL="0" indent="0">
+                  <a:buNone/>
+                </a:pPr>
+                <a:endParaRPr lang="en-US" dirty="0"/>
+              </a:p>
+              <a:p>
+                <a:pPr marL="0" indent="0">
+                  <a:buNone/>
+                </a:pPr>
+                <a:endParaRPr lang="en-US" dirty="0"/>
+              </a:p>
+            </p:txBody>
+          </p:sp>
+        </mc:Choice>
+        <mc:Fallback>
+          <p:sp>
+            <p:nvSpPr>
+              <p:cNvPr id="3" name="Content Placeholder 2">
+                <a:extLst>
+                  <a:ext uri="{FF2B5EF4-FFF2-40B4-BE49-F238E27FC236}">
+                    <a16:creationId xmlns:a16="http://schemas.microsoft.com/office/drawing/2014/main" id="{E981E42B-E536-4B4D-9077-02E56249404E}"/>
+                  </a:ext>
+                </a:extLst>
+              </p:cNvPr>
+              <p:cNvSpPr>
+                <a:spLocks noGrp="1" noRot="1" noChangeAspect="1" noMove="1" noResize="1" noEditPoints="1" noAdjustHandles="1" noChangeArrowheads="1" noChangeShapeType="1" noTextEdit="1"/>
+              </p:cNvSpPr>
+              <p:nvPr>
+                <p:ph idx="1"/>
+              </p:nvPr>
+            </p:nvSpPr>
+            <p:spPr>
+              <a:xfrm>
+                <a:off x="838200" y="1509742"/>
+                <a:ext cx="10515600" cy="4351338"/>
+              </a:xfrm>
+              <a:blipFill>
+                <a:blip r:embed="rId2"/>
+                <a:stretch>
+                  <a:fillRect l="-1043" t="-3647"/>
+                </a:stretch>
+              </a:blipFill>
+            </p:spPr>
+            <p:txBody>
+              <a:bodyPr/>
+              <a:lstStyle/>
+              <a:p>
+                <a:r>
+                  <a:rPr lang="en-US">
+                    <a:noFill/>
+                  </a:rPr>
+                  <a:t> </a:t>
+                </a:r>
+              </a:p>
+            </p:txBody>
+          </p:sp>
+        </mc:Fallback>
+      </mc:AlternateContent>
+    </p:spTree>
+    <p:extLst>
+      <p:ext uri="{BB962C8B-B14F-4D97-AF65-F5344CB8AC3E}">
+        <p14:creationId xmlns:p14="http://schemas.microsoft.com/office/powerpoint/2010/main" val="1768451308"/>
       </p:ext>
     </p:extLst>
   </p:cSld>

</xml_diff>

<commit_message>
Made FEC Encoding more robust
</commit_message>
<xml_diff>
--- a/Master's meetings presentation.pptx
+++ b/Master's meetings presentation.pptx
@@ -20,7 +20,8 @@
     <p:sldId id="269" r:id="rId15"/>
     <p:sldId id="272" r:id="rId16"/>
     <p:sldId id="270" r:id="rId17"/>
-    <p:sldId id="271" r:id="rId18"/>
+    <p:sldId id="273" r:id="rId18"/>
+    <p:sldId id="271" r:id="rId19"/>
   </p:sldIdLst>
   <p:sldSz cx="12192000" cy="6858000"/>
   <p:notesSz cx="6858000" cy="9144000"/>
@@ -10424,7 +10425,7 @@
           <a:p>
             <a:fld id="{1D6AAEF1-BB65-438A-947A-6BD8EC392D5A}" type="datetimeFigureOut">
               <a:rPr lang="en-US" smtClean="0"/>
-              <a:t>1/8/2021</a:t>
+              <a:t>1/12/2021</a:t>
             </a:fld>
             <a:endParaRPr lang="en-US"/>
           </a:p>
@@ -10622,7 +10623,7 @@
           <a:p>
             <a:fld id="{1D6AAEF1-BB65-438A-947A-6BD8EC392D5A}" type="datetimeFigureOut">
               <a:rPr lang="en-US" smtClean="0"/>
-              <a:t>1/8/2021</a:t>
+              <a:t>1/12/2021</a:t>
             </a:fld>
             <a:endParaRPr lang="en-US"/>
           </a:p>
@@ -10830,7 +10831,7 @@
           <a:p>
             <a:fld id="{1D6AAEF1-BB65-438A-947A-6BD8EC392D5A}" type="datetimeFigureOut">
               <a:rPr lang="en-US" smtClean="0"/>
-              <a:t>1/8/2021</a:t>
+              <a:t>1/12/2021</a:t>
             </a:fld>
             <a:endParaRPr lang="en-US"/>
           </a:p>
@@ -11028,7 +11029,7 @@
           <a:p>
             <a:fld id="{1D6AAEF1-BB65-438A-947A-6BD8EC392D5A}" type="datetimeFigureOut">
               <a:rPr lang="en-US" smtClean="0"/>
-              <a:t>1/8/2021</a:t>
+              <a:t>1/12/2021</a:t>
             </a:fld>
             <a:endParaRPr lang="en-US"/>
           </a:p>
@@ -11303,7 +11304,7 @@
           <a:p>
             <a:fld id="{1D6AAEF1-BB65-438A-947A-6BD8EC392D5A}" type="datetimeFigureOut">
               <a:rPr lang="en-US" smtClean="0"/>
-              <a:t>1/8/2021</a:t>
+              <a:t>1/12/2021</a:t>
             </a:fld>
             <a:endParaRPr lang="en-US"/>
           </a:p>
@@ -11568,7 +11569,7 @@
           <a:p>
             <a:fld id="{1D6AAEF1-BB65-438A-947A-6BD8EC392D5A}" type="datetimeFigureOut">
               <a:rPr lang="en-US" smtClean="0"/>
-              <a:t>1/8/2021</a:t>
+              <a:t>1/12/2021</a:t>
             </a:fld>
             <a:endParaRPr lang="en-US"/>
           </a:p>
@@ -11980,7 +11981,7 @@
           <a:p>
             <a:fld id="{1D6AAEF1-BB65-438A-947A-6BD8EC392D5A}" type="datetimeFigureOut">
               <a:rPr lang="en-US" smtClean="0"/>
-              <a:t>1/8/2021</a:t>
+              <a:t>1/12/2021</a:t>
             </a:fld>
             <a:endParaRPr lang="en-US"/>
           </a:p>
@@ -12121,7 +12122,7 @@
           <a:p>
             <a:fld id="{1D6AAEF1-BB65-438A-947A-6BD8EC392D5A}" type="datetimeFigureOut">
               <a:rPr lang="en-US" smtClean="0"/>
-              <a:t>1/8/2021</a:t>
+              <a:t>1/12/2021</a:t>
             </a:fld>
             <a:endParaRPr lang="en-US"/>
           </a:p>
@@ -12234,7 +12235,7 @@
           <a:p>
             <a:fld id="{1D6AAEF1-BB65-438A-947A-6BD8EC392D5A}" type="datetimeFigureOut">
               <a:rPr lang="en-US" smtClean="0"/>
-              <a:t>1/8/2021</a:t>
+              <a:t>1/12/2021</a:t>
             </a:fld>
             <a:endParaRPr lang="en-US"/>
           </a:p>
@@ -12545,7 +12546,7 @@
           <a:p>
             <a:fld id="{1D6AAEF1-BB65-438A-947A-6BD8EC392D5A}" type="datetimeFigureOut">
               <a:rPr lang="en-US" smtClean="0"/>
-              <a:t>1/8/2021</a:t>
+              <a:t>1/12/2021</a:t>
             </a:fld>
             <a:endParaRPr lang="en-US"/>
           </a:p>
@@ -12833,7 +12834,7 @@
           <a:p>
             <a:fld id="{1D6AAEF1-BB65-438A-947A-6BD8EC392D5A}" type="datetimeFigureOut">
               <a:rPr lang="en-US" smtClean="0"/>
-              <a:t>1/8/2021</a:t>
+              <a:t>1/12/2021</a:t>
             </a:fld>
             <a:endParaRPr lang="en-US"/>
           </a:p>
@@ -13074,7 +13075,7 @@
           <a:p>
             <a:fld id="{1D6AAEF1-BB65-438A-947A-6BD8EC392D5A}" type="datetimeFigureOut">
               <a:rPr lang="en-US" smtClean="0"/>
-              <a:t>1/8/2021</a:t>
+              <a:t>1/12/2021</a:t>
             </a:fld>
             <a:endParaRPr lang="en-US"/>
           </a:p>
@@ -16001,7 +16002,7 @@
           <a:p>
             <a:r>
               <a:rPr lang="en-US" dirty="0"/>
-              <a:t>Filter Delay (Done)</a:t>
+              <a:t>Filter Delay</a:t>
             </a:r>
           </a:p>
           <a:p>
@@ -16062,6 +16063,741 @@
 </file>
 
 <file path=ppt/slides/slide16.xml><?xml version="1.0" encoding="utf-8"?>
+<p:sld xmlns:a="http://schemas.openxmlformats.org/drawingml/2006/main" xmlns:r="http://schemas.openxmlformats.org/officeDocument/2006/relationships" xmlns:p="http://schemas.openxmlformats.org/presentationml/2006/main">
+  <p:cSld>
+    <p:spTree>
+      <p:nvGrpSpPr>
+        <p:cNvPr id="1" name=""/>
+        <p:cNvGrpSpPr/>
+        <p:nvPr/>
+      </p:nvGrpSpPr>
+      <p:grpSpPr>
+        <a:xfrm>
+          <a:off x="0" y="0"/>
+          <a:ext cx="0" cy="0"/>
+          <a:chOff x="0" y="0"/>
+          <a:chExt cx="0" cy="0"/>
+        </a:xfrm>
+      </p:grpSpPr>
+      <p:pic>
+        <p:nvPicPr>
+          <p:cNvPr id="1026" name="Picture 2">
+            <a:extLst>
+              <a:ext uri="{FF2B5EF4-FFF2-40B4-BE49-F238E27FC236}">
+                <a16:creationId xmlns:a16="http://schemas.microsoft.com/office/drawing/2014/main" id="{B426CD0F-7E94-4ADF-8982-8B00FA1DA422}"/>
+              </a:ext>
+            </a:extLst>
+          </p:cNvPr>
+          <p:cNvPicPr>
+            <a:picLocks noChangeAspect="1" noChangeArrowheads="1"/>
+          </p:cNvPicPr>
+          <p:nvPr/>
+        </p:nvPicPr>
+        <p:blipFill>
+          <a:blip r:embed="rId2">
+            <a:extLst>
+              <a:ext uri="{28A0092B-C50C-407E-A947-70E740481C1C}">
+                <a14:useLocalDpi xmlns:a14="http://schemas.microsoft.com/office/drawing/2010/main" val="0"/>
+              </a:ext>
+            </a:extLst>
+          </a:blip>
+          <a:srcRect/>
+          <a:stretch>
+            <a:fillRect/>
+          </a:stretch>
+        </p:blipFill>
+        <p:spPr bwMode="auto">
+          <a:xfrm>
+            <a:off x="127000" y="-23637875"/>
+            <a:ext cx="6667500" cy="5000625"/>
+          </a:xfrm>
+          <a:prstGeom prst="rect">
+            <a:avLst/>
+          </a:prstGeom>
+          <a:noFill/>
+          <a:extLst>
+            <a:ext uri="{909E8E84-426E-40DD-AFC4-6F175D3DCCD1}">
+              <a14:hiddenFill xmlns:a14="http://schemas.microsoft.com/office/drawing/2010/main">
+                <a:solidFill>
+                  <a:srgbClr val="FFFFFF"/>
+                </a:solidFill>
+              </a14:hiddenFill>
+            </a:ext>
+          </a:extLst>
+        </p:spPr>
+      </p:pic>
+      <p:pic>
+        <p:nvPicPr>
+          <p:cNvPr id="1027" name="Picture 3">
+            <a:extLst>
+              <a:ext uri="{FF2B5EF4-FFF2-40B4-BE49-F238E27FC236}">
+                <a16:creationId xmlns:a16="http://schemas.microsoft.com/office/drawing/2014/main" id="{42181F10-5ED3-40ED-BF2E-5A102EA49F2A}"/>
+              </a:ext>
+            </a:extLst>
+          </p:cNvPr>
+          <p:cNvPicPr>
+            <a:picLocks noChangeAspect="1" noChangeArrowheads="1"/>
+          </p:cNvPicPr>
+          <p:nvPr/>
+        </p:nvPicPr>
+        <p:blipFill>
+          <a:blip r:embed="rId3">
+            <a:extLst>
+              <a:ext uri="{28A0092B-C50C-407E-A947-70E740481C1C}">
+                <a14:useLocalDpi xmlns:a14="http://schemas.microsoft.com/office/drawing/2010/main" val="0"/>
+              </a:ext>
+            </a:extLst>
+          </a:blip>
+          <a:srcRect/>
+          <a:stretch>
+            <a:fillRect/>
+          </a:stretch>
+        </p:blipFill>
+        <p:spPr bwMode="auto">
+          <a:xfrm>
+            <a:off x="127000" y="-18837275"/>
+            <a:ext cx="11258550" cy="4629150"/>
+          </a:xfrm>
+          <a:prstGeom prst="rect">
+            <a:avLst/>
+          </a:prstGeom>
+          <a:noFill/>
+          <a:extLst>
+            <a:ext uri="{909E8E84-426E-40DD-AFC4-6F175D3DCCD1}">
+              <a14:hiddenFill xmlns:a14="http://schemas.microsoft.com/office/drawing/2010/main">
+                <a:solidFill>
+                  <a:srgbClr val="FFFFFF"/>
+                </a:solidFill>
+              </a14:hiddenFill>
+            </a:ext>
+          </a:extLst>
+        </p:spPr>
+      </p:pic>
+      <p:pic>
+        <p:nvPicPr>
+          <p:cNvPr id="1028" name="Picture 4">
+            <a:extLst>
+              <a:ext uri="{FF2B5EF4-FFF2-40B4-BE49-F238E27FC236}">
+                <a16:creationId xmlns:a16="http://schemas.microsoft.com/office/drawing/2014/main" id="{7FF0846A-DD88-4C16-9F1E-509223A0CAD8}"/>
+              </a:ext>
+            </a:extLst>
+          </p:cNvPr>
+          <p:cNvPicPr>
+            <a:picLocks noChangeAspect="1" noChangeArrowheads="1"/>
+          </p:cNvPicPr>
+          <p:nvPr/>
+        </p:nvPicPr>
+        <p:blipFill>
+          <a:blip r:embed="rId4">
+            <a:extLst>
+              <a:ext uri="{28A0092B-C50C-407E-A947-70E740481C1C}">
+                <a14:useLocalDpi xmlns:a14="http://schemas.microsoft.com/office/drawing/2010/main" val="0"/>
+              </a:ext>
+            </a:extLst>
+          </a:blip>
+          <a:srcRect/>
+          <a:stretch>
+            <a:fillRect/>
+          </a:stretch>
+        </p:blipFill>
+        <p:spPr bwMode="auto">
+          <a:xfrm>
+            <a:off x="127000" y="-14401800"/>
+            <a:ext cx="6667500" cy="5000625"/>
+          </a:xfrm>
+          <a:prstGeom prst="rect">
+            <a:avLst/>
+          </a:prstGeom>
+          <a:noFill/>
+          <a:extLst>
+            <a:ext uri="{909E8E84-426E-40DD-AFC4-6F175D3DCCD1}">
+              <a14:hiddenFill xmlns:a14="http://schemas.microsoft.com/office/drawing/2010/main">
+                <a:solidFill>
+                  <a:srgbClr val="FFFFFF"/>
+                </a:solidFill>
+              </a14:hiddenFill>
+            </a:ext>
+          </a:extLst>
+        </p:spPr>
+      </p:pic>
+      <p:pic>
+        <p:nvPicPr>
+          <p:cNvPr id="1029" name="Picture 5">
+            <a:extLst>
+              <a:ext uri="{FF2B5EF4-FFF2-40B4-BE49-F238E27FC236}">
+                <a16:creationId xmlns:a16="http://schemas.microsoft.com/office/drawing/2014/main" id="{026E5410-3217-4F14-9408-84B1E0196EF0}"/>
+              </a:ext>
+            </a:extLst>
+          </p:cNvPr>
+          <p:cNvPicPr>
+            <a:picLocks noChangeAspect="1" noChangeArrowheads="1"/>
+          </p:cNvPicPr>
+          <p:nvPr/>
+        </p:nvPicPr>
+        <p:blipFill>
+          <a:blip r:embed="rId5">
+            <a:extLst>
+              <a:ext uri="{28A0092B-C50C-407E-A947-70E740481C1C}">
+                <a14:useLocalDpi xmlns:a14="http://schemas.microsoft.com/office/drawing/2010/main" val="0"/>
+              </a:ext>
+            </a:extLst>
+          </a:blip>
+          <a:srcRect/>
+          <a:stretch>
+            <a:fillRect/>
+          </a:stretch>
+        </p:blipFill>
+        <p:spPr bwMode="auto">
+          <a:xfrm>
+            <a:off x="127000" y="-9601200"/>
+            <a:ext cx="6667500" cy="5000625"/>
+          </a:xfrm>
+          <a:prstGeom prst="rect">
+            <a:avLst/>
+          </a:prstGeom>
+          <a:noFill/>
+          <a:extLst>
+            <a:ext uri="{909E8E84-426E-40DD-AFC4-6F175D3DCCD1}">
+              <a14:hiddenFill xmlns:a14="http://schemas.microsoft.com/office/drawing/2010/main">
+                <a:solidFill>
+                  <a:srgbClr val="FFFFFF"/>
+                </a:solidFill>
+              </a14:hiddenFill>
+            </a:ext>
+          </a:extLst>
+        </p:spPr>
+      </p:pic>
+      <p:pic>
+        <p:nvPicPr>
+          <p:cNvPr id="1031" name="Picture 7">
+            <a:extLst>
+              <a:ext uri="{FF2B5EF4-FFF2-40B4-BE49-F238E27FC236}">
+                <a16:creationId xmlns:a16="http://schemas.microsoft.com/office/drawing/2014/main" id="{42C0C556-3295-494A-9872-C940CFACF385}"/>
+              </a:ext>
+            </a:extLst>
+          </p:cNvPr>
+          <p:cNvPicPr>
+            <a:picLocks noChangeAspect="1" noChangeArrowheads="1"/>
+          </p:cNvPicPr>
+          <p:nvPr/>
+        </p:nvPicPr>
+        <p:blipFill>
+          <a:blip r:embed="rId6">
+            <a:extLst>
+              <a:ext uri="{28A0092B-C50C-407E-A947-70E740481C1C}">
+                <a14:useLocalDpi xmlns:a14="http://schemas.microsoft.com/office/drawing/2010/main" val="0"/>
+              </a:ext>
+            </a:extLst>
+          </a:blip>
+          <a:srcRect/>
+          <a:stretch>
+            <a:fillRect/>
+          </a:stretch>
+        </p:blipFill>
+        <p:spPr bwMode="auto">
+          <a:xfrm>
+            <a:off x="8756246" y="2456120"/>
+            <a:ext cx="3059575" cy="1708976"/>
+          </a:xfrm>
+          <a:prstGeom prst="rect">
+            <a:avLst/>
+          </a:prstGeom>
+          <a:noFill/>
+          <a:extLst>
+            <a:ext uri="{909E8E84-426E-40DD-AFC4-6F175D3DCCD1}">
+              <a14:hiddenFill xmlns:a14="http://schemas.microsoft.com/office/drawing/2010/main">
+                <a:solidFill>
+                  <a:srgbClr val="FFFFFF"/>
+                </a:solidFill>
+              </a14:hiddenFill>
+            </a:ext>
+          </a:extLst>
+        </p:spPr>
+      </p:pic>
+      <p:pic>
+        <p:nvPicPr>
+          <p:cNvPr id="1032" name="Picture 8">
+            <a:extLst>
+              <a:ext uri="{FF2B5EF4-FFF2-40B4-BE49-F238E27FC236}">
+                <a16:creationId xmlns:a16="http://schemas.microsoft.com/office/drawing/2014/main" id="{4277CC1B-9420-48C3-87A1-5D3E761673F6}"/>
+              </a:ext>
+            </a:extLst>
+          </p:cNvPr>
+          <p:cNvPicPr>
+            <a:picLocks noChangeAspect="1" noChangeArrowheads="1"/>
+          </p:cNvPicPr>
+          <p:nvPr/>
+        </p:nvPicPr>
+        <p:blipFill>
+          <a:blip r:embed="rId7">
+            <a:extLst>
+              <a:ext uri="{28A0092B-C50C-407E-A947-70E740481C1C}">
+                <a14:useLocalDpi xmlns:a14="http://schemas.microsoft.com/office/drawing/2010/main" val="0"/>
+              </a:ext>
+            </a:extLst>
+          </a:blip>
+          <a:srcRect/>
+          <a:stretch>
+            <a:fillRect/>
+          </a:stretch>
+        </p:blipFill>
+        <p:spPr bwMode="auto">
+          <a:xfrm>
+            <a:off x="4741747" y="4312391"/>
+            <a:ext cx="3302643" cy="2476983"/>
+          </a:xfrm>
+          <a:prstGeom prst="rect">
+            <a:avLst/>
+          </a:prstGeom>
+          <a:noFill/>
+          <a:extLst>
+            <a:ext uri="{909E8E84-426E-40DD-AFC4-6F175D3DCCD1}">
+              <a14:hiddenFill xmlns:a14="http://schemas.microsoft.com/office/drawing/2010/main">
+                <a:solidFill>
+                  <a:srgbClr val="FFFFFF"/>
+                </a:solidFill>
+              </a14:hiddenFill>
+            </a:ext>
+          </a:extLst>
+        </p:spPr>
+      </p:pic>
+      <p:pic>
+        <p:nvPicPr>
+          <p:cNvPr id="1033" name="Picture 9">
+            <a:extLst>
+              <a:ext uri="{FF2B5EF4-FFF2-40B4-BE49-F238E27FC236}">
+                <a16:creationId xmlns:a16="http://schemas.microsoft.com/office/drawing/2014/main" id="{A50FE1B9-9EE3-4D29-9202-C0D16C9D2FC9}"/>
+              </a:ext>
+            </a:extLst>
+          </p:cNvPr>
+          <p:cNvPicPr>
+            <a:picLocks noChangeAspect="1" noChangeArrowheads="1"/>
+          </p:cNvPicPr>
+          <p:nvPr/>
+        </p:nvPicPr>
+        <p:blipFill>
+          <a:blip r:embed="rId8">
+            <a:extLst>
+              <a:ext uri="{28A0092B-C50C-407E-A947-70E740481C1C}">
+                <a14:useLocalDpi xmlns:a14="http://schemas.microsoft.com/office/drawing/2010/main" val="0"/>
+              </a:ext>
+            </a:extLst>
+          </a:blip>
+          <a:srcRect/>
+          <a:stretch>
+            <a:fillRect/>
+          </a:stretch>
+        </p:blipFill>
+        <p:spPr bwMode="auto">
+          <a:xfrm>
+            <a:off x="127000" y="9236075"/>
+            <a:ext cx="6667500" cy="5000625"/>
+          </a:xfrm>
+          <a:prstGeom prst="rect">
+            <a:avLst/>
+          </a:prstGeom>
+          <a:noFill/>
+          <a:extLst>
+            <a:ext uri="{909E8E84-426E-40DD-AFC4-6F175D3DCCD1}">
+              <a14:hiddenFill xmlns:a14="http://schemas.microsoft.com/office/drawing/2010/main">
+                <a:solidFill>
+                  <a:srgbClr val="FFFFFF"/>
+                </a:solidFill>
+              </a14:hiddenFill>
+            </a:ext>
+          </a:extLst>
+        </p:spPr>
+      </p:pic>
+      <p:pic>
+        <p:nvPicPr>
+          <p:cNvPr id="1034" name="Picture 10">
+            <a:extLst>
+              <a:ext uri="{FF2B5EF4-FFF2-40B4-BE49-F238E27FC236}">
+                <a16:creationId xmlns:a16="http://schemas.microsoft.com/office/drawing/2014/main" id="{14CDA239-45F1-497D-BB29-B74DB8053272}"/>
+              </a:ext>
+            </a:extLst>
+          </p:cNvPr>
+          <p:cNvPicPr>
+            <a:picLocks noChangeAspect="1" noChangeArrowheads="1"/>
+          </p:cNvPicPr>
+          <p:nvPr/>
+        </p:nvPicPr>
+        <p:blipFill>
+          <a:blip r:embed="rId9">
+            <a:extLst>
+              <a:ext uri="{28A0092B-C50C-407E-A947-70E740481C1C}">
+                <a14:useLocalDpi xmlns:a14="http://schemas.microsoft.com/office/drawing/2010/main" val="0"/>
+              </a:ext>
+            </a:extLst>
+          </a:blip>
+          <a:srcRect/>
+          <a:stretch>
+            <a:fillRect/>
+          </a:stretch>
+        </p:blipFill>
+        <p:spPr bwMode="auto">
+          <a:xfrm>
+            <a:off x="127000" y="14036675"/>
+            <a:ext cx="6667500" cy="5000625"/>
+          </a:xfrm>
+          <a:prstGeom prst="rect">
+            <a:avLst/>
+          </a:prstGeom>
+          <a:noFill/>
+          <a:extLst>
+            <a:ext uri="{909E8E84-426E-40DD-AFC4-6F175D3DCCD1}">
+              <a14:hiddenFill xmlns:a14="http://schemas.microsoft.com/office/drawing/2010/main">
+                <a:solidFill>
+                  <a:srgbClr val="FFFFFF"/>
+                </a:solidFill>
+              </a14:hiddenFill>
+            </a:ext>
+          </a:extLst>
+        </p:spPr>
+      </p:pic>
+      <p:pic>
+        <p:nvPicPr>
+          <p:cNvPr id="1035" name="Picture 11">
+            <a:extLst>
+              <a:ext uri="{FF2B5EF4-FFF2-40B4-BE49-F238E27FC236}">
+                <a16:creationId xmlns:a16="http://schemas.microsoft.com/office/drawing/2014/main" id="{D6D58A71-2C22-49EE-8EEF-77D2C9485F43}"/>
+              </a:ext>
+            </a:extLst>
+          </p:cNvPr>
+          <p:cNvPicPr>
+            <a:picLocks noChangeAspect="1" noChangeArrowheads="1"/>
+          </p:cNvPicPr>
+          <p:nvPr/>
+        </p:nvPicPr>
+        <p:blipFill>
+          <a:blip r:embed="rId10">
+            <a:extLst>
+              <a:ext uri="{28A0092B-C50C-407E-A947-70E740481C1C}">
+                <a14:useLocalDpi xmlns:a14="http://schemas.microsoft.com/office/drawing/2010/main" val="0"/>
+              </a:ext>
+            </a:extLst>
+          </a:blip>
+          <a:srcRect/>
+          <a:stretch>
+            <a:fillRect/>
+          </a:stretch>
+        </p:blipFill>
+        <p:spPr bwMode="auto">
+          <a:xfrm>
+            <a:off x="127000" y="18837275"/>
+            <a:ext cx="6667500" cy="5000625"/>
+          </a:xfrm>
+          <a:prstGeom prst="rect">
+            <a:avLst/>
+          </a:prstGeom>
+          <a:noFill/>
+          <a:extLst>
+            <a:ext uri="{909E8E84-426E-40DD-AFC4-6F175D3DCCD1}">
+              <a14:hiddenFill xmlns:a14="http://schemas.microsoft.com/office/drawing/2010/main">
+                <a:solidFill>
+                  <a:srgbClr val="FFFFFF"/>
+                </a:solidFill>
+              </a14:hiddenFill>
+            </a:ext>
+          </a:extLst>
+        </p:spPr>
+      </p:pic>
+      <p:pic>
+        <p:nvPicPr>
+          <p:cNvPr id="1036" name="Picture 12">
+            <a:extLst>
+              <a:ext uri="{FF2B5EF4-FFF2-40B4-BE49-F238E27FC236}">
+                <a16:creationId xmlns:a16="http://schemas.microsoft.com/office/drawing/2014/main" id="{104C8779-B59D-4C69-8E4C-4003A00F349B}"/>
+              </a:ext>
+            </a:extLst>
+          </p:cNvPr>
+          <p:cNvPicPr>
+            <a:picLocks noChangeAspect="1" noChangeArrowheads="1"/>
+          </p:cNvPicPr>
+          <p:nvPr/>
+        </p:nvPicPr>
+        <p:blipFill>
+          <a:blip r:embed="rId2">
+            <a:extLst>
+              <a:ext uri="{28A0092B-C50C-407E-A947-70E740481C1C}">
+                <a14:useLocalDpi xmlns:a14="http://schemas.microsoft.com/office/drawing/2010/main" val="0"/>
+              </a:ext>
+            </a:extLst>
+          </a:blip>
+          <a:srcRect/>
+          <a:stretch>
+            <a:fillRect/>
+          </a:stretch>
+        </p:blipFill>
+        <p:spPr bwMode="auto">
+          <a:xfrm>
+            <a:off x="56378" y="200024"/>
+            <a:ext cx="4577590" cy="3433193"/>
+          </a:xfrm>
+          <a:prstGeom prst="rect">
+            <a:avLst/>
+          </a:prstGeom>
+          <a:noFill/>
+          <a:extLst>
+            <a:ext uri="{909E8E84-426E-40DD-AFC4-6F175D3DCCD1}">
+              <a14:hiddenFill xmlns:a14="http://schemas.microsoft.com/office/drawing/2010/main">
+                <a:solidFill>
+                  <a:srgbClr val="FFFFFF"/>
+                </a:solidFill>
+              </a14:hiddenFill>
+            </a:ext>
+          </a:extLst>
+        </p:spPr>
+      </p:pic>
+      <p:pic>
+        <p:nvPicPr>
+          <p:cNvPr id="1037" name="Picture 13">
+            <a:extLst>
+              <a:ext uri="{FF2B5EF4-FFF2-40B4-BE49-F238E27FC236}">
+                <a16:creationId xmlns:a16="http://schemas.microsoft.com/office/drawing/2014/main" id="{70DD5886-C6CC-4CD2-91CB-49E354F9F03C}"/>
+              </a:ext>
+            </a:extLst>
+          </p:cNvPr>
+          <p:cNvPicPr>
+            <a:picLocks noChangeAspect="1" noChangeArrowheads="1"/>
+          </p:cNvPicPr>
+          <p:nvPr/>
+        </p:nvPicPr>
+        <p:blipFill>
+          <a:blip r:embed="rId3">
+            <a:extLst>
+              <a:ext uri="{28A0092B-C50C-407E-A947-70E740481C1C}">
+                <a14:useLocalDpi xmlns:a14="http://schemas.microsoft.com/office/drawing/2010/main" val="0"/>
+              </a:ext>
+            </a:extLst>
+          </a:blip>
+          <a:srcRect/>
+          <a:stretch>
+            <a:fillRect/>
+          </a:stretch>
+        </p:blipFill>
+        <p:spPr bwMode="auto">
+          <a:xfrm>
+            <a:off x="4540332" y="113851"/>
+            <a:ext cx="3727048" cy="1846509"/>
+          </a:xfrm>
+          <a:prstGeom prst="rect">
+            <a:avLst/>
+          </a:prstGeom>
+          <a:noFill/>
+          <a:extLst>
+            <a:ext uri="{909E8E84-426E-40DD-AFC4-6F175D3DCCD1}">
+              <a14:hiddenFill xmlns:a14="http://schemas.microsoft.com/office/drawing/2010/main">
+                <a:solidFill>
+                  <a:srgbClr val="FFFFFF"/>
+                </a:solidFill>
+              </a14:hiddenFill>
+            </a:ext>
+          </a:extLst>
+        </p:spPr>
+      </p:pic>
+      <p:pic>
+        <p:nvPicPr>
+          <p:cNvPr id="1038" name="Picture 14">
+            <a:extLst>
+              <a:ext uri="{FF2B5EF4-FFF2-40B4-BE49-F238E27FC236}">
+                <a16:creationId xmlns:a16="http://schemas.microsoft.com/office/drawing/2014/main" id="{1D1D0080-E6D1-4D51-A892-7FB11BBB68DE}"/>
+              </a:ext>
+            </a:extLst>
+          </p:cNvPr>
+          <p:cNvPicPr>
+            <a:picLocks noChangeAspect="1" noChangeArrowheads="1"/>
+          </p:cNvPicPr>
+          <p:nvPr/>
+        </p:nvPicPr>
+        <p:blipFill>
+          <a:blip r:embed="rId5">
+            <a:extLst>
+              <a:ext uri="{28A0092B-C50C-407E-A947-70E740481C1C}">
+                <a14:useLocalDpi xmlns:a14="http://schemas.microsoft.com/office/drawing/2010/main" val="0"/>
+              </a:ext>
+            </a:extLst>
+          </a:blip>
+          <a:srcRect/>
+          <a:stretch>
+            <a:fillRect/>
+          </a:stretch>
+        </p:blipFill>
+        <p:spPr bwMode="auto">
+          <a:xfrm>
+            <a:off x="4828385" y="1968291"/>
+            <a:ext cx="3114890" cy="2336168"/>
+          </a:xfrm>
+          <a:prstGeom prst="rect">
+            <a:avLst/>
+          </a:prstGeom>
+          <a:noFill/>
+          <a:extLst>
+            <a:ext uri="{909E8E84-426E-40DD-AFC4-6F175D3DCCD1}">
+              <a14:hiddenFill xmlns:a14="http://schemas.microsoft.com/office/drawing/2010/main">
+                <a:solidFill>
+                  <a:srgbClr val="FFFFFF"/>
+                </a:solidFill>
+              </a14:hiddenFill>
+            </a:ext>
+          </a:extLst>
+        </p:spPr>
+      </p:pic>
+      <p:pic>
+        <p:nvPicPr>
+          <p:cNvPr id="1039" name="Picture 15">
+            <a:extLst>
+              <a:ext uri="{FF2B5EF4-FFF2-40B4-BE49-F238E27FC236}">
+                <a16:creationId xmlns:a16="http://schemas.microsoft.com/office/drawing/2014/main" id="{C1208B76-EBBE-4F6B-A2F4-F1403FA093BE}"/>
+              </a:ext>
+            </a:extLst>
+          </p:cNvPr>
+          <p:cNvPicPr>
+            <a:picLocks noChangeAspect="1" noChangeArrowheads="1"/>
+          </p:cNvPicPr>
+          <p:nvPr/>
+        </p:nvPicPr>
+        <p:blipFill>
+          <a:blip r:embed="rId8">
+            <a:extLst>
+              <a:ext uri="{28A0092B-C50C-407E-A947-70E740481C1C}">
+                <a14:useLocalDpi xmlns:a14="http://schemas.microsoft.com/office/drawing/2010/main" val="0"/>
+              </a:ext>
+            </a:extLst>
+          </a:blip>
+          <a:srcRect/>
+          <a:stretch>
+            <a:fillRect/>
+          </a:stretch>
+        </p:blipFill>
+        <p:spPr bwMode="auto">
+          <a:xfrm>
+            <a:off x="8662444" y="4165096"/>
+            <a:ext cx="3302643" cy="2476982"/>
+          </a:xfrm>
+          <a:prstGeom prst="rect">
+            <a:avLst/>
+          </a:prstGeom>
+          <a:noFill/>
+          <a:extLst>
+            <a:ext uri="{909E8E84-426E-40DD-AFC4-6F175D3DCCD1}">
+              <a14:hiddenFill xmlns:a14="http://schemas.microsoft.com/office/drawing/2010/main">
+                <a:solidFill>
+                  <a:srgbClr val="FFFFFF"/>
+                </a:solidFill>
+              </a14:hiddenFill>
+            </a:ext>
+          </a:extLst>
+        </p:spPr>
+      </p:pic>
+      <p:pic>
+        <p:nvPicPr>
+          <p:cNvPr id="1040" name="Picture 16">
+            <a:extLst>
+              <a:ext uri="{FF2B5EF4-FFF2-40B4-BE49-F238E27FC236}">
+                <a16:creationId xmlns:a16="http://schemas.microsoft.com/office/drawing/2014/main" id="{7A4846BF-89B6-4052-943D-124DCAE458D0}"/>
+              </a:ext>
+            </a:extLst>
+          </p:cNvPr>
+          <p:cNvPicPr>
+            <a:picLocks noChangeAspect="1" noChangeArrowheads="1"/>
+          </p:cNvPicPr>
+          <p:nvPr/>
+        </p:nvPicPr>
+        <p:blipFill>
+          <a:blip r:embed="rId9">
+            <a:extLst>
+              <a:ext uri="{28A0092B-C50C-407E-A947-70E740481C1C}">
+                <a14:useLocalDpi xmlns:a14="http://schemas.microsoft.com/office/drawing/2010/main" val="0"/>
+              </a:ext>
+            </a:extLst>
+          </a:blip>
+          <a:srcRect/>
+          <a:stretch>
+            <a:fillRect/>
+          </a:stretch>
+        </p:blipFill>
+        <p:spPr bwMode="auto">
+          <a:xfrm>
+            <a:off x="9178724" y="73500"/>
+            <a:ext cx="2845441" cy="2134081"/>
+          </a:xfrm>
+          <a:prstGeom prst="rect">
+            <a:avLst/>
+          </a:prstGeom>
+          <a:noFill/>
+          <a:extLst>
+            <a:ext uri="{909E8E84-426E-40DD-AFC4-6F175D3DCCD1}">
+              <a14:hiddenFill xmlns:a14="http://schemas.microsoft.com/office/drawing/2010/main">
+                <a:solidFill>
+                  <a:srgbClr val="FFFFFF"/>
+                </a:solidFill>
+              </a14:hiddenFill>
+            </a:ext>
+          </a:extLst>
+        </p:spPr>
+      </p:pic>
+      <p:pic>
+        <p:nvPicPr>
+          <p:cNvPr id="1041" name="Picture 17">
+            <a:extLst>
+              <a:ext uri="{FF2B5EF4-FFF2-40B4-BE49-F238E27FC236}">
+                <a16:creationId xmlns:a16="http://schemas.microsoft.com/office/drawing/2014/main" id="{8F4C5C7D-0753-40EC-9250-F984CABE3A5C}"/>
+              </a:ext>
+            </a:extLst>
+          </p:cNvPr>
+          <p:cNvPicPr>
+            <a:picLocks noChangeAspect="1" noChangeArrowheads="1"/>
+          </p:cNvPicPr>
+          <p:nvPr/>
+        </p:nvPicPr>
+        <p:blipFill>
+          <a:blip r:embed="rId4">
+            <a:extLst>
+              <a:ext uri="{28A0092B-C50C-407E-A947-70E740481C1C}">
+                <a14:useLocalDpi xmlns:a14="http://schemas.microsoft.com/office/drawing/2010/main" val="0"/>
+              </a:ext>
+            </a:extLst>
+          </a:blip>
+          <a:srcRect/>
+          <a:stretch>
+            <a:fillRect/>
+          </a:stretch>
+        </p:blipFill>
+        <p:spPr bwMode="auto">
+          <a:xfrm>
+            <a:off x="126574" y="3633218"/>
+            <a:ext cx="4192350" cy="3144262"/>
+          </a:xfrm>
+          <a:prstGeom prst="rect">
+            <a:avLst/>
+          </a:prstGeom>
+          <a:noFill/>
+          <a:extLst>
+            <a:ext uri="{909E8E84-426E-40DD-AFC4-6F175D3DCCD1}">
+              <a14:hiddenFill xmlns:a14="http://schemas.microsoft.com/office/drawing/2010/main">
+                <a:solidFill>
+                  <a:srgbClr val="FFFFFF"/>
+                </a:solidFill>
+              </a14:hiddenFill>
+            </a:ext>
+          </a:extLst>
+        </p:spPr>
+      </p:pic>
+    </p:spTree>
+    <p:extLst>
+      <p:ext uri="{BB962C8B-B14F-4D97-AF65-F5344CB8AC3E}">
+        <p14:creationId xmlns:p14="http://schemas.microsoft.com/office/powerpoint/2010/main" val="2898554826"/>
+      </p:ext>
+    </p:extLst>
+  </p:cSld>
+  <p:clrMapOvr>
+    <a:masterClrMapping/>
+  </p:clrMapOvr>
+</p:sld>
+</file>
+
+<file path=ppt/slides/slide17.xml><?xml version="1.0" encoding="utf-8"?>
 <p:sld xmlns:a="http://schemas.openxmlformats.org/drawingml/2006/main" xmlns:r="http://schemas.openxmlformats.org/officeDocument/2006/relationships" xmlns:p="http://schemas.openxmlformats.org/presentationml/2006/main">
   <p:cSld>
     <p:spTree>

</xml_diff>

<commit_message>
Implemented Optimised Least Squares Filter and expanded LDPC coding
</commit_message>
<xml_diff>
--- a/Master's meetings presentation.pptx
+++ b/Master's meetings presentation.pptx
@@ -2440,7 +2440,7 @@
 <dgm:dataModel xmlns:dgm="http://schemas.openxmlformats.org/drawingml/2006/diagram" xmlns:a="http://schemas.openxmlformats.org/drawingml/2006/main">
   <dgm:ptLst>
     <dgm:pt modelId="{CDE4AA0B-5F06-4BD9-BB42-A3C5FE46EDD5}" type="doc">
-      <dgm:prSet loTypeId="urn:microsoft.com/office/officeart/2005/8/layout/process5" loCatId="process" qsTypeId="urn:microsoft.com/office/officeart/2005/8/quickstyle/3d3" qsCatId="3D" csTypeId="urn:microsoft.com/office/officeart/2005/8/colors/accent0_1" csCatId="mainScheme" phldr="1"/>
+      <dgm:prSet loTypeId="urn:microsoft.com/office/officeart/2005/8/layout/process5" loCatId="process" qsTypeId="urn:microsoft.com/office/officeart/2005/8/quickstyle/simple1" qsCatId="simple" csTypeId="urn:microsoft.com/office/officeart/2005/8/colors/accent0_1" csCatId="mainScheme" phldr="1"/>
       <dgm:spPr/>
     </dgm:pt>
     <dgm:pt modelId="{FB1CB032-2E4F-42E3-AC99-E83CFD9D0C41}">
@@ -3018,7 +3018,7 @@
         </a:p>
       </dgm:t>
     </dgm:pt>
-    <dgm:pt modelId="{5BD61685-EFEA-46D1-8EAC-C7F5FA652F5A}" type="pres">
+    <dgm:pt modelId="{DD3C201D-6F0E-4E80-8A4B-54BFE3AB5355}" type="pres">
       <dgm:prSet presAssocID="{CDE4AA0B-5F06-4BD9-BB42-A3C5FE46EDD5}" presName="diagram" presStyleCnt="0">
         <dgm:presLayoutVars>
           <dgm:dir/>
@@ -3027,7 +3027,7 @@
       </dgm:prSet>
       <dgm:spPr/>
     </dgm:pt>
-    <dgm:pt modelId="{8D0241DE-6AAC-4256-9E26-64AD3F43CDBB}" type="pres">
+    <dgm:pt modelId="{D8CE9071-4049-4819-A4D8-5167789C7C51}" type="pres">
       <dgm:prSet presAssocID="{FB1CB032-2E4F-42E3-AC99-E83CFD9D0C41}" presName="node" presStyleLbl="node1" presStyleIdx="0" presStyleCnt="15">
         <dgm:presLayoutVars>
           <dgm:bulletEnabled val="1"/>
@@ -3035,15 +3035,15 @@
       </dgm:prSet>
       <dgm:spPr/>
     </dgm:pt>
-    <dgm:pt modelId="{E5FE6FB6-CC7E-4A7D-AAD3-A1B8B90A387C}" type="pres">
+    <dgm:pt modelId="{D8BC0FC3-1732-4A41-910A-DC713AC915F0}" type="pres">
       <dgm:prSet presAssocID="{51AC868D-C5E3-446C-B42D-B2F6B6ADBEEF}" presName="sibTrans" presStyleLbl="sibTrans2D1" presStyleIdx="0" presStyleCnt="14"/>
       <dgm:spPr/>
     </dgm:pt>
-    <dgm:pt modelId="{BDEC236D-2E8B-43AC-AD2E-7FCAE4266E42}" type="pres">
+    <dgm:pt modelId="{14A77041-243A-4B4E-AFB6-5564FDEED79A}" type="pres">
       <dgm:prSet presAssocID="{51AC868D-C5E3-446C-B42D-B2F6B6ADBEEF}" presName="connectorText" presStyleLbl="sibTrans2D1" presStyleIdx="0" presStyleCnt="14"/>
       <dgm:spPr/>
     </dgm:pt>
-    <dgm:pt modelId="{AE445B88-DC01-4FCA-A481-B4C32925223B}" type="pres">
+    <dgm:pt modelId="{D262D2C9-DD8B-435E-BD6B-2A90010EE04B}" type="pres">
       <dgm:prSet presAssocID="{47D5DD2B-C168-44CD-81E3-F2673A343299}" presName="node" presStyleLbl="node1" presStyleIdx="1" presStyleCnt="15">
         <dgm:presLayoutVars>
           <dgm:bulletEnabled val="1"/>
@@ -3051,15 +3051,15 @@
       </dgm:prSet>
       <dgm:spPr/>
     </dgm:pt>
-    <dgm:pt modelId="{ED444A14-DA62-4744-B946-403D32E225A0}" type="pres">
+    <dgm:pt modelId="{68C0E020-4FD0-4491-BAE4-B0295B8EB972}" type="pres">
       <dgm:prSet presAssocID="{74EA2338-CB9C-4403-BAF6-7ABBFA33645C}" presName="sibTrans" presStyleLbl="sibTrans2D1" presStyleIdx="1" presStyleCnt="14"/>
       <dgm:spPr/>
     </dgm:pt>
-    <dgm:pt modelId="{C5346EBF-FCC3-4C23-A68D-A5863D3FBBA7}" type="pres">
+    <dgm:pt modelId="{54104EE3-829A-4FA2-AEE6-EB6EC90522B7}" type="pres">
       <dgm:prSet presAssocID="{74EA2338-CB9C-4403-BAF6-7ABBFA33645C}" presName="connectorText" presStyleLbl="sibTrans2D1" presStyleIdx="1" presStyleCnt="14"/>
       <dgm:spPr/>
     </dgm:pt>
-    <dgm:pt modelId="{F46EE843-9331-4658-BB07-9E488F6BE40F}" type="pres">
+    <dgm:pt modelId="{AC5DA3F6-BC12-4EFB-8885-CBED78A91B80}" type="pres">
       <dgm:prSet presAssocID="{37E92ECD-7D5C-4CCA-B6F2-FCB64D1C662B}" presName="node" presStyleLbl="node1" presStyleIdx="2" presStyleCnt="15">
         <dgm:presLayoutVars>
           <dgm:bulletEnabled val="1"/>
@@ -3067,15 +3067,15 @@
       </dgm:prSet>
       <dgm:spPr/>
     </dgm:pt>
-    <dgm:pt modelId="{2B2B9ABD-C83B-408B-9C62-8BCF95D32E0E}" type="pres">
+    <dgm:pt modelId="{7AF6076B-F6E4-48D2-B941-932FBF7B5BF8}" type="pres">
       <dgm:prSet presAssocID="{F7548BA1-AB8C-4CEB-945D-12F806610994}" presName="sibTrans" presStyleLbl="sibTrans2D1" presStyleIdx="2" presStyleCnt="14"/>
       <dgm:spPr/>
     </dgm:pt>
-    <dgm:pt modelId="{E162542E-51C1-447F-8CEF-84EDCBA169EC}" type="pres">
+    <dgm:pt modelId="{8894FEA4-08FF-40D1-BEBA-E252738416C6}" type="pres">
       <dgm:prSet presAssocID="{F7548BA1-AB8C-4CEB-945D-12F806610994}" presName="connectorText" presStyleLbl="sibTrans2D1" presStyleIdx="2" presStyleCnt="14"/>
       <dgm:spPr/>
     </dgm:pt>
-    <dgm:pt modelId="{E1B631AD-BBC2-4EDF-B8AF-97B4C55E6634}" type="pres">
+    <dgm:pt modelId="{BDC9D4F9-6BFA-4FBD-ABCD-1E6096C92643}" type="pres">
       <dgm:prSet presAssocID="{2FE520D4-4C2D-44DC-918D-77C1D1D78EB9}" presName="node" presStyleLbl="node1" presStyleIdx="3" presStyleCnt="15">
         <dgm:presLayoutVars>
           <dgm:bulletEnabled val="1"/>
@@ -3083,15 +3083,15 @@
       </dgm:prSet>
       <dgm:spPr/>
     </dgm:pt>
-    <dgm:pt modelId="{AFA14F17-7D20-4997-B6B3-B68C9189D6AE}" type="pres">
+    <dgm:pt modelId="{5EBDDE8C-1468-4CA2-9D2A-300F69E062E0}" type="pres">
       <dgm:prSet presAssocID="{4F48D43F-60A8-46CA-ABB7-394A2F5C667C}" presName="sibTrans" presStyleLbl="sibTrans2D1" presStyleIdx="3" presStyleCnt="14"/>
       <dgm:spPr/>
     </dgm:pt>
-    <dgm:pt modelId="{7B47C134-96BE-4C55-93AC-837215C84E97}" type="pres">
+    <dgm:pt modelId="{7DA26E4B-50EA-43A1-BA6A-2BC6B90858A8}" type="pres">
       <dgm:prSet presAssocID="{4F48D43F-60A8-46CA-ABB7-394A2F5C667C}" presName="connectorText" presStyleLbl="sibTrans2D1" presStyleIdx="3" presStyleCnt="14"/>
       <dgm:spPr/>
     </dgm:pt>
-    <dgm:pt modelId="{698E58E8-AF14-4031-A07C-A81D1EE1B47E}" type="pres">
+    <dgm:pt modelId="{C58AF20F-1669-42BD-9ACE-636E78C80D8D}" type="pres">
       <dgm:prSet presAssocID="{D9CED4B3-B54E-414C-B1E1-7BB7F935BC9C}" presName="node" presStyleLbl="node1" presStyleIdx="4" presStyleCnt="15">
         <dgm:presLayoutVars>
           <dgm:bulletEnabled val="1"/>
@@ -3099,15 +3099,15 @@
       </dgm:prSet>
       <dgm:spPr/>
     </dgm:pt>
-    <dgm:pt modelId="{4AAFA0DD-427F-4A02-AB70-3B417E712B3A}" type="pres">
+    <dgm:pt modelId="{7557190D-BD84-403C-8960-28C9063E0A41}" type="pres">
       <dgm:prSet presAssocID="{E5BFD00D-A1FF-4783-AF22-0707B739E7DE}" presName="sibTrans" presStyleLbl="sibTrans2D1" presStyleIdx="4" presStyleCnt="14"/>
       <dgm:spPr/>
     </dgm:pt>
-    <dgm:pt modelId="{234403FD-10B0-4917-8A6D-84BC4AC222D9}" type="pres">
+    <dgm:pt modelId="{AF370918-BBE7-47DE-9DDB-042D6DBD5351}" type="pres">
       <dgm:prSet presAssocID="{E5BFD00D-A1FF-4783-AF22-0707B739E7DE}" presName="connectorText" presStyleLbl="sibTrans2D1" presStyleIdx="4" presStyleCnt="14"/>
       <dgm:spPr/>
     </dgm:pt>
-    <dgm:pt modelId="{392791E9-5F4B-4A5D-9FA8-CE02DFB0F3B7}" type="pres">
+    <dgm:pt modelId="{CEA0BD65-F717-4769-8AAE-60686BDF38C6}" type="pres">
       <dgm:prSet presAssocID="{CAF7ED6A-33B4-4AC9-9016-D2C2B48CC68B}" presName="node" presStyleLbl="node1" presStyleIdx="5" presStyleCnt="15">
         <dgm:presLayoutVars>
           <dgm:bulletEnabled val="1"/>
@@ -3115,15 +3115,15 @@
       </dgm:prSet>
       <dgm:spPr/>
     </dgm:pt>
-    <dgm:pt modelId="{CFEF9A24-ECDB-444A-AB45-0FBA21847897}" type="pres">
+    <dgm:pt modelId="{410531A4-8815-4C70-A912-5F4BFF301227}" type="pres">
       <dgm:prSet presAssocID="{9D1DBAF5-A177-4549-AF7E-9F54CDCC0D0B}" presName="sibTrans" presStyleLbl="sibTrans2D1" presStyleIdx="5" presStyleCnt="14"/>
       <dgm:spPr/>
     </dgm:pt>
-    <dgm:pt modelId="{9DFB2884-E0D6-4CFA-B761-B53B83D4D073}" type="pres">
+    <dgm:pt modelId="{5751433D-ADA2-46FB-B9AA-C072072411AA}" type="pres">
       <dgm:prSet presAssocID="{9D1DBAF5-A177-4549-AF7E-9F54CDCC0D0B}" presName="connectorText" presStyleLbl="sibTrans2D1" presStyleIdx="5" presStyleCnt="14"/>
       <dgm:spPr/>
     </dgm:pt>
-    <dgm:pt modelId="{A8C86915-318E-4FAB-860D-17954FCE7779}" type="pres">
+    <dgm:pt modelId="{341AA5BA-4B19-42C6-8956-FA95EC009B5C}" type="pres">
       <dgm:prSet presAssocID="{03909401-4526-43BB-B2C8-7FEF824CE94A}" presName="node" presStyleLbl="node1" presStyleIdx="6" presStyleCnt="15">
         <dgm:presLayoutVars>
           <dgm:bulletEnabled val="1"/>
@@ -3131,15 +3131,15 @@
       </dgm:prSet>
       <dgm:spPr/>
     </dgm:pt>
-    <dgm:pt modelId="{FA5F4AB8-BF6B-4051-86D7-68585D786623}" type="pres">
+    <dgm:pt modelId="{4B7269C3-4712-4AFA-A269-612EBE88A570}" type="pres">
       <dgm:prSet presAssocID="{1BE9B9AC-2847-4D1D-9B3A-95528B4026F9}" presName="sibTrans" presStyleLbl="sibTrans2D1" presStyleIdx="6" presStyleCnt="14"/>
       <dgm:spPr/>
     </dgm:pt>
-    <dgm:pt modelId="{6E7E26B3-49A5-4080-9343-56991CB4723C}" type="pres">
+    <dgm:pt modelId="{07A07C47-5489-4A8A-A94A-24D34432A1A3}" type="pres">
       <dgm:prSet presAssocID="{1BE9B9AC-2847-4D1D-9B3A-95528B4026F9}" presName="connectorText" presStyleLbl="sibTrans2D1" presStyleIdx="6" presStyleCnt="14"/>
       <dgm:spPr/>
     </dgm:pt>
-    <dgm:pt modelId="{950E5EBE-44BB-4C92-9EE4-BC22460A4EF9}" type="pres">
+    <dgm:pt modelId="{17C43CC8-89E5-42D9-897A-A0E634920B88}" type="pres">
       <dgm:prSet presAssocID="{9D5190EE-90E8-4688-ACFD-DD1D70934FBD}" presName="node" presStyleLbl="node1" presStyleIdx="7" presStyleCnt="15">
         <dgm:presLayoutVars>
           <dgm:bulletEnabled val="1"/>
@@ -3147,15 +3147,15 @@
       </dgm:prSet>
       <dgm:spPr/>
     </dgm:pt>
-    <dgm:pt modelId="{46AA52BC-8B6D-46A3-A636-CF9997F06AA4}" type="pres">
+    <dgm:pt modelId="{753DAADC-2DC2-4646-8545-1D7C89C91F5A}" type="pres">
       <dgm:prSet presAssocID="{F5F65E4D-82C4-4F09-9442-76B3337D509D}" presName="sibTrans" presStyleLbl="sibTrans2D1" presStyleIdx="7" presStyleCnt="14"/>
       <dgm:spPr/>
     </dgm:pt>
-    <dgm:pt modelId="{803980FC-9D68-4298-A4D7-ECFD6CFD77FD}" type="pres">
+    <dgm:pt modelId="{0B087793-5D7E-4ADA-835F-F373F886BEAA}" type="pres">
       <dgm:prSet presAssocID="{F5F65E4D-82C4-4F09-9442-76B3337D509D}" presName="connectorText" presStyleLbl="sibTrans2D1" presStyleIdx="7" presStyleCnt="14"/>
       <dgm:spPr/>
     </dgm:pt>
-    <dgm:pt modelId="{49308249-96A5-498C-8AC7-09736140A2A8}" type="pres">
+    <dgm:pt modelId="{2CA64BA6-F8FC-4DB6-8782-658549C2A2F5}" type="pres">
       <dgm:prSet presAssocID="{8F3F4507-EBFA-48D9-90DA-32B749CEA48E}" presName="node" presStyleLbl="node1" presStyleIdx="8" presStyleCnt="15">
         <dgm:presLayoutVars>
           <dgm:bulletEnabled val="1"/>
@@ -3163,15 +3163,15 @@
       </dgm:prSet>
       <dgm:spPr/>
     </dgm:pt>
-    <dgm:pt modelId="{7BF54FDC-96D6-4CEB-B263-D3B76D35F08D}" type="pres">
+    <dgm:pt modelId="{C8DC4A97-B93F-49C9-A57A-6ED88871F429}" type="pres">
       <dgm:prSet presAssocID="{00E75FAF-9A0E-4DA8-A5DD-FC4E8C0ADA8F}" presName="sibTrans" presStyleLbl="sibTrans2D1" presStyleIdx="8" presStyleCnt="14"/>
       <dgm:spPr/>
     </dgm:pt>
-    <dgm:pt modelId="{5E0E70C2-F2A8-4577-B34E-60B0163DDDE2}" type="pres">
+    <dgm:pt modelId="{BAAC5FEA-FA57-400D-8C70-0A96EBCF3498}" type="pres">
       <dgm:prSet presAssocID="{00E75FAF-9A0E-4DA8-A5DD-FC4E8C0ADA8F}" presName="connectorText" presStyleLbl="sibTrans2D1" presStyleIdx="8" presStyleCnt="14"/>
       <dgm:spPr/>
     </dgm:pt>
-    <dgm:pt modelId="{BC801E3C-457A-409A-B127-A8456892A3E7}" type="pres">
+    <dgm:pt modelId="{7A916C5C-A383-4442-8ABE-0E566FAF7F88}" type="pres">
       <dgm:prSet presAssocID="{90AC0117-74CB-4956-BEF9-713A80FB6BDB}" presName="node" presStyleLbl="node1" presStyleIdx="9" presStyleCnt="15">
         <dgm:presLayoutVars>
           <dgm:bulletEnabled val="1"/>
@@ -3179,15 +3179,15 @@
       </dgm:prSet>
       <dgm:spPr/>
     </dgm:pt>
-    <dgm:pt modelId="{4FFE8EC9-D9A2-40A7-A437-D999A4E561AD}" type="pres">
+    <dgm:pt modelId="{F09400A7-1C09-4CAA-8CEC-B5CC4FCF0436}" type="pres">
       <dgm:prSet presAssocID="{0EF9CF17-6B6A-4250-967C-C41A4A825FF9}" presName="sibTrans" presStyleLbl="sibTrans2D1" presStyleIdx="9" presStyleCnt="14"/>
       <dgm:spPr/>
     </dgm:pt>
-    <dgm:pt modelId="{10EA3286-211D-46AB-9E8F-954B658B9276}" type="pres">
+    <dgm:pt modelId="{E52CB78F-1830-4D1F-86FE-30FF2625FC56}" type="pres">
       <dgm:prSet presAssocID="{0EF9CF17-6B6A-4250-967C-C41A4A825FF9}" presName="connectorText" presStyleLbl="sibTrans2D1" presStyleIdx="9" presStyleCnt="14"/>
       <dgm:spPr/>
     </dgm:pt>
-    <dgm:pt modelId="{9F885388-DD9F-4FC9-B8FD-7AEB89374FF2}" type="pres">
+    <dgm:pt modelId="{3B377935-DD62-49ED-861C-ADAE53057C46}" type="pres">
       <dgm:prSet presAssocID="{2853FD51-99DB-4110-8FF7-3CF4CD15FD29}" presName="node" presStyleLbl="node1" presStyleIdx="10" presStyleCnt="15">
         <dgm:presLayoutVars>
           <dgm:bulletEnabled val="1"/>
@@ -3195,15 +3195,15 @@
       </dgm:prSet>
       <dgm:spPr/>
     </dgm:pt>
-    <dgm:pt modelId="{82A205C9-B43F-4750-8554-98B9F4070306}" type="pres">
+    <dgm:pt modelId="{E0F896DA-1C5B-4BB5-9200-9DB6D15CD0F4}" type="pres">
       <dgm:prSet presAssocID="{54A618FA-50AE-40D3-A867-4BE0E473E5D5}" presName="sibTrans" presStyleLbl="sibTrans2D1" presStyleIdx="10" presStyleCnt="14"/>
       <dgm:spPr/>
     </dgm:pt>
-    <dgm:pt modelId="{9607A927-0406-4927-9141-DA4EF53542AA}" type="pres">
+    <dgm:pt modelId="{F613C6D6-D82E-4D35-B82B-BDF59FF814FF}" type="pres">
       <dgm:prSet presAssocID="{54A618FA-50AE-40D3-A867-4BE0E473E5D5}" presName="connectorText" presStyleLbl="sibTrans2D1" presStyleIdx="10" presStyleCnt="14"/>
       <dgm:spPr/>
     </dgm:pt>
-    <dgm:pt modelId="{FBCBAEE7-C221-48EF-A1A6-E811F960AB76}" type="pres">
+    <dgm:pt modelId="{0D152BF3-CDA8-438C-9FBF-80B154BE6C02}" type="pres">
       <dgm:prSet presAssocID="{FFE1BB70-6F2D-4347-BEDF-D8F830EC40E7}" presName="node" presStyleLbl="node1" presStyleIdx="11" presStyleCnt="15">
         <dgm:presLayoutVars>
           <dgm:bulletEnabled val="1"/>
@@ -3211,15 +3211,15 @@
       </dgm:prSet>
       <dgm:spPr/>
     </dgm:pt>
-    <dgm:pt modelId="{61B62871-FB35-4F21-8737-103845057CBF}" type="pres">
+    <dgm:pt modelId="{3C1633DE-B658-47F6-9062-D832C6035B5D}" type="pres">
       <dgm:prSet presAssocID="{1B688F23-BB39-4C54-BF1C-5B1DE45DF827}" presName="sibTrans" presStyleLbl="sibTrans2D1" presStyleIdx="11" presStyleCnt="14"/>
       <dgm:spPr/>
     </dgm:pt>
-    <dgm:pt modelId="{8E230428-6428-4476-9C7F-2D74146CF5BB}" type="pres">
+    <dgm:pt modelId="{96BC49EA-65BD-4002-BF42-F4F2AA393C28}" type="pres">
       <dgm:prSet presAssocID="{1B688F23-BB39-4C54-BF1C-5B1DE45DF827}" presName="connectorText" presStyleLbl="sibTrans2D1" presStyleIdx="11" presStyleCnt="14"/>
       <dgm:spPr/>
     </dgm:pt>
-    <dgm:pt modelId="{F5037606-C157-4155-BED8-849633FCB3A8}" type="pres">
+    <dgm:pt modelId="{92184039-C2F0-49BA-9552-41BCEBCC15D8}" type="pres">
       <dgm:prSet presAssocID="{AFBFDAA9-83D6-432F-901D-87A0890536EF}" presName="node" presStyleLbl="node1" presStyleIdx="12" presStyleCnt="15">
         <dgm:presLayoutVars>
           <dgm:bulletEnabled val="1"/>
@@ -3227,15 +3227,15 @@
       </dgm:prSet>
       <dgm:spPr/>
     </dgm:pt>
-    <dgm:pt modelId="{8E93EF29-2DA9-4450-A94E-E84C7B43096D}" type="pres">
+    <dgm:pt modelId="{EF4EE57F-91C1-43A1-A371-A8AAD541BC2A}" type="pres">
       <dgm:prSet presAssocID="{C2DAEA33-3A24-40F8-9C82-54578B2CCB12}" presName="sibTrans" presStyleLbl="sibTrans2D1" presStyleIdx="12" presStyleCnt="14"/>
       <dgm:spPr/>
     </dgm:pt>
-    <dgm:pt modelId="{778A386A-4C20-4FF7-83E2-F3C8471FE77A}" type="pres">
+    <dgm:pt modelId="{D0A73825-3220-4CB7-8032-F0492EDBDBE9}" type="pres">
       <dgm:prSet presAssocID="{C2DAEA33-3A24-40F8-9C82-54578B2CCB12}" presName="connectorText" presStyleLbl="sibTrans2D1" presStyleIdx="12" presStyleCnt="14"/>
       <dgm:spPr/>
     </dgm:pt>
-    <dgm:pt modelId="{AA2CF8B9-19B1-4347-9C12-2F0D171E7FED}" type="pres">
+    <dgm:pt modelId="{12CE1CFD-B93F-4649-9E0B-098C55B343AE}" type="pres">
       <dgm:prSet presAssocID="{2CE5D9A6-FB9D-466A-AAD0-0C32D6EF82DE}" presName="node" presStyleLbl="node1" presStyleIdx="13" presStyleCnt="15">
         <dgm:presLayoutVars>
           <dgm:bulletEnabled val="1"/>
@@ -3243,15 +3243,15 @@
       </dgm:prSet>
       <dgm:spPr/>
     </dgm:pt>
-    <dgm:pt modelId="{2BE4EF29-79FD-4B6C-B4B7-7871815716AD}" type="pres">
+    <dgm:pt modelId="{EBF866C1-118F-4269-9E20-52CB3BB6C7E7}" type="pres">
       <dgm:prSet presAssocID="{778579CA-6198-486D-A374-038D3E1E2D28}" presName="sibTrans" presStyleLbl="sibTrans2D1" presStyleIdx="13" presStyleCnt="14"/>
       <dgm:spPr/>
     </dgm:pt>
-    <dgm:pt modelId="{0536B591-B061-4898-842A-3728931B5BEF}" type="pres">
+    <dgm:pt modelId="{74A26CB0-783A-457D-8F81-BF72E2882B62}" type="pres">
       <dgm:prSet presAssocID="{778579CA-6198-486D-A374-038D3E1E2D28}" presName="connectorText" presStyleLbl="sibTrans2D1" presStyleIdx="13" presStyleCnt="14"/>
       <dgm:spPr/>
     </dgm:pt>
-    <dgm:pt modelId="{895B3D7B-4668-43EF-92F3-F16B71473439}" type="pres">
+    <dgm:pt modelId="{B5F89BEC-1ADB-4A7C-9AC2-FA8321D875EE}" type="pres">
       <dgm:prSet presAssocID="{D68049C6-70CD-4A5A-9A63-F07EE23435DC}" presName="node" presStyleLbl="node1" presStyleIdx="14" presStyleCnt="15">
         <dgm:presLayoutVars>
           <dgm:bulletEnabled val="1"/>
@@ -3261,108 +3261,108 @@
     </dgm:pt>
   </dgm:ptLst>
   <dgm:cxnLst>
-    <dgm:cxn modelId="{53403001-CED4-4343-9053-2820042B52BB}" type="presOf" srcId="{0EF9CF17-6B6A-4250-967C-C41A4A825FF9}" destId="{10EA3286-211D-46AB-9E8F-954B658B9276}" srcOrd="1" destOrd="0" presId="urn:microsoft.com/office/officeart/2005/8/layout/process5"/>
-    <dgm:cxn modelId="{211D6F09-FCF1-450D-94D1-53E3D9D76458}" type="presOf" srcId="{51AC868D-C5E3-446C-B42D-B2F6B6ADBEEF}" destId="{BDEC236D-2E8B-43AC-AD2E-7FCAE4266E42}" srcOrd="1" destOrd="0" presId="urn:microsoft.com/office/officeart/2005/8/layout/process5"/>
-    <dgm:cxn modelId="{02953618-C4B5-41A6-88EC-E25E22F253D2}" type="presOf" srcId="{CAF7ED6A-33B4-4AC9-9016-D2C2B48CC68B}" destId="{392791E9-5F4B-4A5D-9FA8-CE02DFB0F3B7}" srcOrd="0" destOrd="0" presId="urn:microsoft.com/office/officeart/2005/8/layout/process5"/>
-    <dgm:cxn modelId="{BF3E2F1B-6E52-403C-B250-D76430672BED}" type="presOf" srcId="{8F3F4507-EBFA-48D9-90DA-32B749CEA48E}" destId="{49308249-96A5-498C-8AC7-09736140A2A8}" srcOrd="0" destOrd="0" presId="urn:microsoft.com/office/officeart/2005/8/layout/process5"/>
+    <dgm:cxn modelId="{57089008-81A4-4E5A-ACAF-2E817657CC01}" type="presOf" srcId="{1BE9B9AC-2847-4D1D-9B3A-95528B4026F9}" destId="{4B7269C3-4712-4AFA-A269-612EBE88A570}" srcOrd="0" destOrd="0" presId="urn:microsoft.com/office/officeart/2005/8/layout/process5"/>
+    <dgm:cxn modelId="{FB05EA0B-ED9A-43E4-87E4-44F5D070DEE6}" type="presOf" srcId="{74EA2338-CB9C-4403-BAF6-7ABBFA33645C}" destId="{54104EE3-829A-4FA2-AEE6-EB6EC90522B7}" srcOrd="1" destOrd="0" presId="urn:microsoft.com/office/officeart/2005/8/layout/process5"/>
+    <dgm:cxn modelId="{3D827513-8A11-4DDB-82F3-688B365F542C}" type="presOf" srcId="{FB1CB032-2E4F-42E3-AC99-E83CFD9D0C41}" destId="{D8CE9071-4049-4819-A4D8-5167789C7C51}" srcOrd="0" destOrd="0" presId="urn:microsoft.com/office/officeart/2005/8/layout/process5"/>
+    <dgm:cxn modelId="{6788F414-6857-4E60-A21D-8F8B2BAB10C5}" type="presOf" srcId="{0EF9CF17-6B6A-4250-967C-C41A4A825FF9}" destId="{F09400A7-1C09-4CAA-8CEC-B5CC4FCF0436}" srcOrd="0" destOrd="0" presId="urn:microsoft.com/office/officeart/2005/8/layout/process5"/>
+    <dgm:cxn modelId="{56FBD116-E4B2-4D83-A760-6D79C46C87E8}" type="presOf" srcId="{47D5DD2B-C168-44CD-81E3-F2673A343299}" destId="{D262D2C9-DD8B-435E-BD6B-2A90010EE04B}" srcOrd="0" destOrd="0" presId="urn:microsoft.com/office/officeart/2005/8/layout/process5"/>
     <dgm:cxn modelId="{F40BF01C-DBF2-4FE8-BD20-B6ABBBF410F5}" srcId="{CDE4AA0B-5F06-4BD9-BB42-A3C5FE46EDD5}" destId="{03909401-4526-43BB-B2C8-7FEF824CE94A}" srcOrd="6" destOrd="0" parTransId="{03DE9359-CFC4-4707-9015-EE9BB8074B58}" sibTransId="{1BE9B9AC-2847-4D1D-9B3A-95528B4026F9}"/>
     <dgm:cxn modelId="{E0656820-4483-4087-B765-12B0A0EFD367}" srcId="{CDE4AA0B-5F06-4BD9-BB42-A3C5FE46EDD5}" destId="{90AC0117-74CB-4956-BEF9-713A80FB6BDB}" srcOrd="9" destOrd="0" parTransId="{11344F20-516A-4026-B243-0BBAA54A1A30}" sibTransId="{0EF9CF17-6B6A-4250-967C-C41A4A825FF9}"/>
-    <dgm:cxn modelId="{852E3629-3B0C-47E3-A757-9CA9F4A27C0D}" type="presOf" srcId="{1BE9B9AC-2847-4D1D-9B3A-95528B4026F9}" destId="{FA5F4AB8-BF6B-4051-86D7-68585D786623}" srcOrd="0" destOrd="0" presId="urn:microsoft.com/office/officeart/2005/8/layout/process5"/>
+    <dgm:cxn modelId="{86B01122-F372-471E-AB5F-2AF6D3AB002E}" type="presOf" srcId="{D68049C6-70CD-4A5A-9A63-F07EE23435DC}" destId="{B5F89BEC-1ADB-4A7C-9AC2-FA8321D875EE}" srcOrd="0" destOrd="0" presId="urn:microsoft.com/office/officeart/2005/8/layout/process5"/>
     <dgm:cxn modelId="{A19FFA2B-ADC0-4F78-97AA-95D5822D71B7}" srcId="{CDE4AA0B-5F06-4BD9-BB42-A3C5FE46EDD5}" destId="{8F3F4507-EBFA-48D9-90DA-32B749CEA48E}" srcOrd="8" destOrd="0" parTransId="{DD262953-69A9-4E1D-BCDA-042EF62940F1}" sibTransId="{00E75FAF-9A0E-4DA8-A5DD-FC4E8C0ADA8F}"/>
-    <dgm:cxn modelId="{14CA7E2F-2B70-49A2-BF16-FB95EFA3D908}" type="presOf" srcId="{D9CED4B3-B54E-414C-B1E1-7BB7F935BC9C}" destId="{698E58E8-AF14-4031-A07C-A81D1EE1B47E}" srcOrd="0" destOrd="0" presId="urn:microsoft.com/office/officeart/2005/8/layout/process5"/>
-    <dgm:cxn modelId="{17F42B35-B399-44BC-92EF-7437D1F320B6}" type="presOf" srcId="{00E75FAF-9A0E-4DA8-A5DD-FC4E8C0ADA8F}" destId="{7BF54FDC-96D6-4CEB-B263-D3B76D35F08D}" srcOrd="0" destOrd="0" presId="urn:microsoft.com/office/officeart/2005/8/layout/process5"/>
-    <dgm:cxn modelId="{EF86EE3E-9351-4B18-A00B-B2C6D73F77D3}" type="presOf" srcId="{9D1DBAF5-A177-4549-AF7E-9F54CDCC0D0B}" destId="{9DFB2884-E0D6-4CFA-B761-B53B83D4D073}" srcOrd="1" destOrd="0" presId="urn:microsoft.com/office/officeart/2005/8/layout/process5"/>
-    <dgm:cxn modelId="{09A6F440-1EF3-4462-B65F-E1A4F19EF6D1}" type="presOf" srcId="{F7548BA1-AB8C-4CEB-945D-12F806610994}" destId="{2B2B9ABD-C83B-408B-9C62-8BCF95D32E0E}" srcOrd="0" destOrd="0" presId="urn:microsoft.com/office/officeart/2005/8/layout/process5"/>
-    <dgm:cxn modelId="{E570E95C-DE14-49A8-BBFB-B61F376A8489}" type="presOf" srcId="{03909401-4526-43BB-B2C8-7FEF824CE94A}" destId="{A8C86915-318E-4FAB-860D-17954FCE7779}" srcOrd="0" destOrd="0" presId="urn:microsoft.com/office/officeart/2005/8/layout/process5"/>
-    <dgm:cxn modelId="{29675D5E-4FC2-4D19-9723-EFFB1E33E79D}" type="presOf" srcId="{778579CA-6198-486D-A374-038D3E1E2D28}" destId="{0536B591-B061-4898-842A-3728931B5BEF}" srcOrd="1" destOrd="0" presId="urn:microsoft.com/office/officeart/2005/8/layout/process5"/>
-    <dgm:cxn modelId="{123A6E61-933C-4D8E-91A5-1ACDA499B333}" type="presOf" srcId="{F5F65E4D-82C4-4F09-9442-76B3337D509D}" destId="{46AA52BC-8B6D-46A3-A636-CF9997F06AA4}" srcOrd="0" destOrd="0" presId="urn:microsoft.com/office/officeart/2005/8/layout/process5"/>
-    <dgm:cxn modelId="{9B80AF61-9D3C-4EF3-A7D8-B75B3A17719A}" type="presOf" srcId="{D68049C6-70CD-4A5A-9A63-F07EE23435DC}" destId="{895B3D7B-4668-43EF-92F3-F16B71473439}" srcOrd="0" destOrd="0" presId="urn:microsoft.com/office/officeart/2005/8/layout/process5"/>
-    <dgm:cxn modelId="{3D37FA41-039B-4A1B-9039-DAF30FF51353}" type="presOf" srcId="{E5BFD00D-A1FF-4783-AF22-0707B739E7DE}" destId="{4AAFA0DD-427F-4A02-AB70-3B417E712B3A}" srcOrd="0" destOrd="0" presId="urn:microsoft.com/office/officeart/2005/8/layout/process5"/>
+    <dgm:cxn modelId="{79A05A2D-F844-4357-94A5-6B749E1B7A9C}" type="presOf" srcId="{1B688F23-BB39-4C54-BF1C-5B1DE45DF827}" destId="{3C1633DE-B658-47F6-9062-D832C6035B5D}" srcOrd="0" destOrd="0" presId="urn:microsoft.com/office/officeart/2005/8/layout/process5"/>
+    <dgm:cxn modelId="{E7F9A037-4EA0-42BB-819B-CE59A0410311}" type="presOf" srcId="{AFBFDAA9-83D6-432F-901D-87A0890536EF}" destId="{92184039-C2F0-49BA-9552-41BCEBCC15D8}" srcOrd="0" destOrd="0" presId="urn:microsoft.com/office/officeart/2005/8/layout/process5"/>
+    <dgm:cxn modelId="{51940C5C-9300-4A18-8327-07C9DBA6B9D1}" type="presOf" srcId="{51AC868D-C5E3-446C-B42D-B2F6B6ADBEEF}" destId="{D8BC0FC3-1732-4A41-910A-DC713AC915F0}" srcOrd="0" destOrd="0" presId="urn:microsoft.com/office/officeart/2005/8/layout/process5"/>
+    <dgm:cxn modelId="{4A3A6E5C-E6D9-4958-9571-F5A2204CA2EA}" type="presOf" srcId="{1BE9B9AC-2847-4D1D-9B3A-95528B4026F9}" destId="{07A07C47-5489-4A8A-A94A-24D34432A1A3}" srcOrd="1" destOrd="0" presId="urn:microsoft.com/office/officeart/2005/8/layout/process5"/>
+    <dgm:cxn modelId="{95ED6762-F22D-4CAA-8C51-FB3E8BE720CF}" type="presOf" srcId="{778579CA-6198-486D-A374-038D3E1E2D28}" destId="{74A26CB0-783A-457D-8F81-BF72E2882B62}" srcOrd="1" destOrd="0" presId="urn:microsoft.com/office/officeart/2005/8/layout/process5"/>
+    <dgm:cxn modelId="{1DF6A562-BF94-44CE-A8A8-35F8D93B6EFE}" type="presOf" srcId="{CAF7ED6A-33B4-4AC9-9016-D2C2B48CC68B}" destId="{CEA0BD65-F717-4769-8AAE-60686BDF38C6}" srcOrd="0" destOrd="0" presId="urn:microsoft.com/office/officeart/2005/8/layout/process5"/>
+    <dgm:cxn modelId="{AEAB5643-60E8-4140-B102-18D5E86E449C}" type="presOf" srcId="{51AC868D-C5E3-446C-B42D-B2F6B6ADBEEF}" destId="{14A77041-243A-4B4E-AFB6-5564FDEED79A}" srcOrd="1" destOrd="0" presId="urn:microsoft.com/office/officeart/2005/8/layout/process5"/>
+    <dgm:cxn modelId="{0CB37345-E44C-45C0-9339-52AF9BE3C8D4}" type="presOf" srcId="{74EA2338-CB9C-4403-BAF6-7ABBFA33645C}" destId="{68C0E020-4FD0-4491-BAE4-B0295B8EB972}" srcOrd="0" destOrd="0" presId="urn:microsoft.com/office/officeart/2005/8/layout/process5"/>
+    <dgm:cxn modelId="{2898FF66-E314-4E3B-9007-20E185F87D1F}" type="presOf" srcId="{778579CA-6198-486D-A374-038D3E1E2D28}" destId="{EBF866C1-118F-4269-9E20-52CB3BB6C7E7}" srcOrd="0" destOrd="0" presId="urn:microsoft.com/office/officeart/2005/8/layout/process5"/>
+    <dgm:cxn modelId="{4F247767-BBCF-4224-93F1-F9026F983934}" type="presOf" srcId="{2853FD51-99DB-4110-8FF7-3CF4CD15FD29}" destId="{3B377935-DD62-49ED-861C-ADAE53057C46}" srcOrd="0" destOrd="0" presId="urn:microsoft.com/office/officeart/2005/8/layout/process5"/>
     <dgm:cxn modelId="{2C3D8D68-C1ED-45A2-A01A-86563A578933}" srcId="{CDE4AA0B-5F06-4BD9-BB42-A3C5FE46EDD5}" destId="{2853FD51-99DB-4110-8FF7-3CF4CD15FD29}" srcOrd="10" destOrd="0" parTransId="{442EC5F0-C235-4964-A5FA-D98A7FA4F871}" sibTransId="{54A618FA-50AE-40D3-A867-4BE0E473E5D5}"/>
     <dgm:cxn modelId="{E0A81B69-433E-46F6-8EE5-D67878A0433C}" srcId="{CDE4AA0B-5F06-4BD9-BB42-A3C5FE46EDD5}" destId="{D68049C6-70CD-4A5A-9A63-F07EE23435DC}" srcOrd="14" destOrd="0" parTransId="{D065A0AE-0D31-456E-94DF-3C61191B5D30}" sibTransId="{04126CFE-B4FA-4A54-9BF9-7307F73A5B8C}"/>
-    <dgm:cxn modelId="{B5974E4B-99A9-42F4-BBF6-E8424A919943}" type="presOf" srcId="{2FE520D4-4C2D-44DC-918D-77C1D1D78EB9}" destId="{E1B631AD-BBC2-4EDF-B8AF-97B4C55E6634}" srcOrd="0" destOrd="0" presId="urn:microsoft.com/office/officeart/2005/8/layout/process5"/>
-    <dgm:cxn modelId="{D9B3DE4B-1270-4A0B-A7D6-B4CC71861196}" type="presOf" srcId="{AFBFDAA9-83D6-432F-901D-87A0890536EF}" destId="{F5037606-C157-4155-BED8-849633FCB3A8}" srcOrd="0" destOrd="0" presId="urn:microsoft.com/office/officeart/2005/8/layout/process5"/>
-    <dgm:cxn modelId="{45B7E44D-2706-469B-9191-4F713B412C64}" type="presOf" srcId="{9D1DBAF5-A177-4549-AF7E-9F54CDCC0D0B}" destId="{CFEF9A24-ECDB-444A-AB45-0FBA21847897}" srcOrd="0" destOrd="0" presId="urn:microsoft.com/office/officeart/2005/8/layout/process5"/>
+    <dgm:cxn modelId="{0733116C-92DB-444F-A6C7-A0FE270C062D}" type="presOf" srcId="{03909401-4526-43BB-B2C8-7FEF824CE94A}" destId="{341AA5BA-4B19-42C6-8956-FA95EC009B5C}" srcOrd="0" destOrd="0" presId="urn:microsoft.com/office/officeart/2005/8/layout/process5"/>
     <dgm:cxn modelId="{5614944F-AA41-43E1-A1F7-9741C01688E2}" srcId="{CDE4AA0B-5F06-4BD9-BB42-A3C5FE46EDD5}" destId="{CAF7ED6A-33B4-4AC9-9016-D2C2B48CC68B}" srcOrd="5" destOrd="0" parTransId="{84943193-10B6-4691-8934-608BC5BB17EA}" sibTransId="{9D1DBAF5-A177-4549-AF7E-9F54CDCC0D0B}"/>
     <dgm:cxn modelId="{B3CCDC6F-85DE-4DC4-B62A-2036BFB0127E}" srcId="{CDE4AA0B-5F06-4BD9-BB42-A3C5FE46EDD5}" destId="{D9CED4B3-B54E-414C-B1E1-7BB7F935BC9C}" srcOrd="4" destOrd="0" parTransId="{92BACA1F-1027-4123-8BBB-1B6E2B7D29CA}" sibTransId="{E5BFD00D-A1FF-4783-AF22-0707B739E7DE}"/>
-    <dgm:cxn modelId="{D541A151-8E38-492C-B8A8-9B3B99A7FB82}" type="presOf" srcId="{C2DAEA33-3A24-40F8-9C82-54578B2CCB12}" destId="{8E93EF29-2DA9-4450-A94E-E84C7B43096D}" srcOrd="0" destOrd="0" presId="urn:microsoft.com/office/officeart/2005/8/layout/process5"/>
-    <dgm:cxn modelId="{0BE93375-89FF-4B8D-9F65-05290EF6ED0D}" type="presOf" srcId="{FB1CB032-2E4F-42E3-AC99-E83CFD9D0C41}" destId="{8D0241DE-6AAC-4256-9E26-64AD3F43CDBB}" srcOrd="0" destOrd="0" presId="urn:microsoft.com/office/officeart/2005/8/layout/process5"/>
-    <dgm:cxn modelId="{4FAF1258-8752-44FD-B9C7-62A0B60DD61F}" type="presOf" srcId="{F5F65E4D-82C4-4F09-9442-76B3337D509D}" destId="{803980FC-9D68-4298-A4D7-ECFD6CFD77FD}" srcOrd="1" destOrd="0" presId="urn:microsoft.com/office/officeart/2005/8/layout/process5"/>
-    <dgm:cxn modelId="{510DE858-F997-4BAB-A4D6-8A9FFB9EE24B}" type="presOf" srcId="{FFE1BB70-6F2D-4347-BEDF-D8F830EC40E7}" destId="{FBCBAEE7-C221-48EF-A1A6-E811F960AB76}" srcOrd="0" destOrd="0" presId="urn:microsoft.com/office/officeart/2005/8/layout/process5"/>
-    <dgm:cxn modelId="{3CA9FF59-5797-4910-A5BC-6C1C64EF4C5A}" type="presOf" srcId="{C2DAEA33-3A24-40F8-9C82-54578B2CCB12}" destId="{778A386A-4C20-4FF7-83E2-F3C8471FE77A}" srcOrd="1" destOrd="0" presId="urn:microsoft.com/office/officeart/2005/8/layout/process5"/>
-    <dgm:cxn modelId="{47D2227C-FF9B-4CF1-A280-92AE87CA7182}" type="presOf" srcId="{74EA2338-CB9C-4403-BAF6-7ABBFA33645C}" destId="{C5346EBF-FCC3-4C23-A68D-A5863D3FBBA7}" srcOrd="1" destOrd="0" presId="urn:microsoft.com/office/officeart/2005/8/layout/process5"/>
+    <dgm:cxn modelId="{5DBB5352-3150-4173-A7F3-5BFB83E335DA}" type="presOf" srcId="{54A618FA-50AE-40D3-A867-4BE0E473E5D5}" destId="{E0F896DA-1C5B-4BB5-9200-9DB6D15CD0F4}" srcOrd="0" destOrd="0" presId="urn:microsoft.com/office/officeart/2005/8/layout/process5"/>
+    <dgm:cxn modelId="{DF38DD76-CF0C-41CE-8FA4-0BD06EDA7610}" type="presOf" srcId="{FFE1BB70-6F2D-4347-BEDF-D8F830EC40E7}" destId="{0D152BF3-CDA8-438C-9FBF-80B154BE6C02}" srcOrd="0" destOrd="0" presId="urn:microsoft.com/office/officeart/2005/8/layout/process5"/>
+    <dgm:cxn modelId="{1E114D57-D426-4BC3-BA22-D0C20CBA8C15}" type="presOf" srcId="{C2DAEA33-3A24-40F8-9C82-54578B2CCB12}" destId="{EF4EE57F-91C1-43A1-A371-A8AAD541BC2A}" srcOrd="0" destOrd="0" presId="urn:microsoft.com/office/officeart/2005/8/layout/process5"/>
+    <dgm:cxn modelId="{84407E7D-EDA0-47E5-AFDF-37C6EDB7369F}" type="presOf" srcId="{E5BFD00D-A1FF-4783-AF22-0707B739E7DE}" destId="{7557190D-BD84-403C-8960-28C9063E0A41}" srcOrd="0" destOrd="0" presId="urn:microsoft.com/office/officeart/2005/8/layout/process5"/>
+    <dgm:cxn modelId="{3952BF7D-AD66-49A8-9744-956AC9961B5F}" type="presOf" srcId="{9D1DBAF5-A177-4549-AF7E-9F54CDCC0D0B}" destId="{5751433D-ADA2-46FB-B9AA-C072072411AA}" srcOrd="1" destOrd="0" presId="urn:microsoft.com/office/officeart/2005/8/layout/process5"/>
     <dgm:cxn modelId="{585F8E84-1CD6-4DD9-B6E8-8EFCF70CCF5F}" srcId="{CDE4AA0B-5F06-4BD9-BB42-A3C5FE46EDD5}" destId="{FB1CB032-2E4F-42E3-AC99-E83CFD9D0C41}" srcOrd="0" destOrd="0" parTransId="{F9A5A989-2ED1-4073-AB0E-7B70D74FB5D7}" sibTransId="{51AC868D-C5E3-446C-B42D-B2F6B6ADBEEF}"/>
-    <dgm:cxn modelId="{DBD25095-3C00-4E16-B029-5D0B241BAA74}" type="presOf" srcId="{2853FD51-99DB-4110-8FF7-3CF4CD15FD29}" destId="{9F885388-DD9F-4FC9-B8FD-7AEB89374FF2}" srcOrd="0" destOrd="0" presId="urn:microsoft.com/office/officeart/2005/8/layout/process5"/>
-    <dgm:cxn modelId="{F573E39D-D4F2-4CBE-BFAE-DC0829A55E27}" type="presOf" srcId="{778579CA-6198-486D-A374-038D3E1E2D28}" destId="{2BE4EF29-79FD-4B6C-B4B7-7871815716AD}" srcOrd="0" destOrd="0" presId="urn:microsoft.com/office/officeart/2005/8/layout/process5"/>
-    <dgm:cxn modelId="{A09F809E-60DD-4EE3-A3BE-78DD2086076B}" type="presOf" srcId="{54A618FA-50AE-40D3-A867-4BE0E473E5D5}" destId="{82A205C9-B43F-4750-8554-98B9F4070306}" srcOrd="0" destOrd="0" presId="urn:microsoft.com/office/officeart/2005/8/layout/process5"/>
+    <dgm:cxn modelId="{BF305188-7D73-4C59-9153-80F840CBE7AA}" type="presOf" srcId="{F7548BA1-AB8C-4CEB-945D-12F806610994}" destId="{7AF6076B-F6E4-48D2-B941-932FBF7B5BF8}" srcOrd="0" destOrd="0" presId="urn:microsoft.com/office/officeart/2005/8/layout/process5"/>
+    <dgm:cxn modelId="{B5EFFE8A-1100-42E1-AA34-135ED347B785}" type="presOf" srcId="{F5F65E4D-82C4-4F09-9442-76B3337D509D}" destId="{0B087793-5D7E-4ADA-835F-F373F886BEAA}" srcOrd="1" destOrd="0" presId="urn:microsoft.com/office/officeart/2005/8/layout/process5"/>
+    <dgm:cxn modelId="{8756D391-39C8-4F6E-B099-1C9D12DCE617}" type="presOf" srcId="{8F3F4507-EBFA-48D9-90DA-32B749CEA48E}" destId="{2CA64BA6-F8FC-4DB6-8782-658549C2A2F5}" srcOrd="0" destOrd="0" presId="urn:microsoft.com/office/officeart/2005/8/layout/process5"/>
+    <dgm:cxn modelId="{2E626C94-9593-4634-9CB9-13185D8934F7}" type="presOf" srcId="{2CE5D9A6-FB9D-466A-AAD0-0C32D6EF82DE}" destId="{12CE1CFD-B93F-4649-9E0B-098C55B343AE}" srcOrd="0" destOrd="0" presId="urn:microsoft.com/office/officeart/2005/8/layout/process5"/>
+    <dgm:cxn modelId="{D06AED9B-76A3-4A89-B878-284F774CC747}" type="presOf" srcId="{54A618FA-50AE-40D3-A867-4BE0E473E5D5}" destId="{F613C6D6-D82E-4D35-B82B-BDF59FF814FF}" srcOrd="1" destOrd="0" presId="urn:microsoft.com/office/officeart/2005/8/layout/process5"/>
+    <dgm:cxn modelId="{8359489F-852B-4A5A-89C2-881D30E832B0}" type="presOf" srcId="{00E75FAF-9A0E-4DA8-A5DD-FC4E8C0ADA8F}" destId="{C8DC4A97-B93F-49C9-A57A-6ED88871F429}" srcOrd="0" destOrd="0" presId="urn:microsoft.com/office/officeart/2005/8/layout/process5"/>
     <dgm:cxn modelId="{E8AA4BA0-30DE-44E9-BB4D-C919047BDA66}" srcId="{CDE4AA0B-5F06-4BD9-BB42-A3C5FE46EDD5}" destId="{FFE1BB70-6F2D-4347-BEDF-D8F830EC40E7}" srcOrd="11" destOrd="0" parTransId="{3A522C26-99FA-47B0-931B-13389090F77F}" sibTransId="{1B688F23-BB39-4C54-BF1C-5B1DE45DF827}"/>
-    <dgm:cxn modelId="{4BCD60A4-01DA-4642-8F7E-9D8F57AE9614}" type="presOf" srcId="{4F48D43F-60A8-46CA-ABB7-394A2F5C667C}" destId="{AFA14F17-7D20-4997-B6B3-B68C9189D6AE}" srcOrd="0" destOrd="0" presId="urn:microsoft.com/office/officeart/2005/8/layout/process5"/>
-    <dgm:cxn modelId="{043B1CA6-6BCD-4CA2-916C-E9D1C7616703}" type="presOf" srcId="{90AC0117-74CB-4956-BEF9-713A80FB6BDB}" destId="{BC801E3C-457A-409A-B127-A8456892A3E7}" srcOrd="0" destOrd="0" presId="urn:microsoft.com/office/officeart/2005/8/layout/process5"/>
+    <dgm:cxn modelId="{7D5A2EA2-9B62-4957-A269-E50ACC86BF40}" type="presOf" srcId="{4F48D43F-60A8-46CA-ABB7-394A2F5C667C}" destId="{5EBDDE8C-1468-4CA2-9D2A-300F69E062E0}" srcOrd="0" destOrd="0" presId="urn:microsoft.com/office/officeart/2005/8/layout/process5"/>
     <dgm:cxn modelId="{A4511EAB-B475-4A4C-BD08-FE3283B52822}" srcId="{CDE4AA0B-5F06-4BD9-BB42-A3C5FE46EDD5}" destId="{2FE520D4-4C2D-44DC-918D-77C1D1D78EB9}" srcOrd="3" destOrd="0" parTransId="{28C6B240-84DC-4335-B710-F024ED6EF484}" sibTransId="{4F48D43F-60A8-46CA-ABB7-394A2F5C667C}"/>
-    <dgm:cxn modelId="{BC73E0AF-706E-4C09-AFAB-36DAF83CED14}" type="presOf" srcId="{9D5190EE-90E8-4688-ACFD-DD1D70934FBD}" destId="{950E5EBE-44BB-4C92-9EE4-BC22460A4EF9}" srcOrd="0" destOrd="0" presId="urn:microsoft.com/office/officeart/2005/8/layout/process5"/>
-    <dgm:cxn modelId="{51C75AB1-431F-4AED-90E5-529E13415C98}" type="presOf" srcId="{74EA2338-CB9C-4403-BAF6-7ABBFA33645C}" destId="{ED444A14-DA62-4744-B946-403D32E225A0}" srcOrd="0" destOrd="0" presId="urn:microsoft.com/office/officeart/2005/8/layout/process5"/>
-    <dgm:cxn modelId="{1AC1DDBB-3CC8-46F1-8B79-B7968BE902A8}" type="presOf" srcId="{54A618FA-50AE-40D3-A867-4BE0E473E5D5}" destId="{9607A927-0406-4927-9141-DA4EF53542AA}" srcOrd="1" destOrd="0" presId="urn:microsoft.com/office/officeart/2005/8/layout/process5"/>
+    <dgm:cxn modelId="{7DB5FAAD-49DB-4522-A82B-70DF6D6CDA15}" type="presOf" srcId="{0EF9CF17-6B6A-4250-967C-C41A4A825FF9}" destId="{E52CB78F-1830-4D1F-86FE-30FF2625FC56}" srcOrd="1" destOrd="0" presId="urn:microsoft.com/office/officeart/2005/8/layout/process5"/>
     <dgm:cxn modelId="{E5763CBC-1515-4A81-8D46-A3F5B52BD979}" srcId="{CDE4AA0B-5F06-4BD9-BB42-A3C5FE46EDD5}" destId="{2CE5D9A6-FB9D-466A-AAD0-0C32D6EF82DE}" srcOrd="13" destOrd="0" parTransId="{274A5EC3-507F-4B20-8D05-8E33265B4AF3}" sibTransId="{778579CA-6198-486D-A374-038D3E1E2D28}"/>
-    <dgm:cxn modelId="{D688E9BC-C762-4948-BFA1-0646A53CB474}" type="presOf" srcId="{1B688F23-BB39-4C54-BF1C-5B1DE45DF827}" destId="{8E230428-6428-4476-9C7F-2D74146CF5BB}" srcOrd="1" destOrd="0" presId="urn:microsoft.com/office/officeart/2005/8/layout/process5"/>
-    <dgm:cxn modelId="{CB6495BD-AE81-49E0-A7CB-2C7DC18E4EF3}" type="presOf" srcId="{E5BFD00D-A1FF-4783-AF22-0707B739E7DE}" destId="{234403FD-10B0-4917-8A6D-84BC4AC222D9}" srcOrd="1" destOrd="0" presId="urn:microsoft.com/office/officeart/2005/8/layout/process5"/>
-    <dgm:cxn modelId="{9EAA02CB-C228-431E-9552-CDD9F0B523DE}" type="presOf" srcId="{47D5DD2B-C168-44CD-81E3-F2673A343299}" destId="{AE445B88-DC01-4FCA-A481-B4C32925223B}" srcOrd="0" destOrd="0" presId="urn:microsoft.com/office/officeart/2005/8/layout/process5"/>
-    <dgm:cxn modelId="{3D54F2D8-2523-4E4D-9177-BC384CFE9543}" type="presOf" srcId="{4F48D43F-60A8-46CA-ABB7-394A2F5C667C}" destId="{7B47C134-96BE-4C55-93AC-837215C84E97}" srcOrd="1" destOrd="0" presId="urn:microsoft.com/office/officeart/2005/8/layout/process5"/>
+    <dgm:cxn modelId="{030030C0-A0BA-4038-9005-7BB1C0E046CD}" type="presOf" srcId="{9D1DBAF5-A177-4549-AF7E-9F54CDCC0D0B}" destId="{410531A4-8815-4C70-A912-5F4BFF301227}" srcOrd="0" destOrd="0" presId="urn:microsoft.com/office/officeart/2005/8/layout/process5"/>
+    <dgm:cxn modelId="{2B21ECC5-0B93-4BE2-A6DC-53981F1D59EA}" type="presOf" srcId="{90AC0117-74CB-4956-BEF9-713A80FB6BDB}" destId="{7A916C5C-A383-4442-8ABE-0E566FAF7F88}" srcOrd="0" destOrd="0" presId="urn:microsoft.com/office/officeart/2005/8/layout/process5"/>
+    <dgm:cxn modelId="{A60146C6-2D91-430F-874D-E195A0B7BF8E}" type="presOf" srcId="{E5BFD00D-A1FF-4783-AF22-0707B739E7DE}" destId="{AF370918-BBE7-47DE-9DDB-042D6DBD5351}" srcOrd="1" destOrd="0" presId="urn:microsoft.com/office/officeart/2005/8/layout/process5"/>
+    <dgm:cxn modelId="{56B118CA-9B82-4798-B900-245B706B11FF}" type="presOf" srcId="{C2DAEA33-3A24-40F8-9C82-54578B2CCB12}" destId="{D0A73825-3220-4CB7-8032-F0492EDBDBE9}" srcOrd="1" destOrd="0" presId="urn:microsoft.com/office/officeart/2005/8/layout/process5"/>
+    <dgm:cxn modelId="{02F06ED3-F50C-4EEC-865E-F2162402ACBE}" type="presOf" srcId="{37E92ECD-7D5C-4CCA-B6F2-FCB64D1C662B}" destId="{AC5DA3F6-BC12-4EFB-8885-CBED78A91B80}" srcOrd="0" destOrd="0" presId="urn:microsoft.com/office/officeart/2005/8/layout/process5"/>
+    <dgm:cxn modelId="{02E8B0D3-E3A9-47DF-A076-B2E4CBEABC00}" type="presOf" srcId="{00E75FAF-9A0E-4DA8-A5DD-FC4E8C0ADA8F}" destId="{BAAC5FEA-FA57-400D-8C70-0A96EBCF3498}" srcOrd="1" destOrd="0" presId="urn:microsoft.com/office/officeart/2005/8/layout/process5"/>
     <dgm:cxn modelId="{0C09F8D8-5C8A-4358-AD1E-2BAB7CA79209}" srcId="{CDE4AA0B-5F06-4BD9-BB42-A3C5FE46EDD5}" destId="{AFBFDAA9-83D6-432F-901D-87A0890536EF}" srcOrd="12" destOrd="0" parTransId="{4F8AF022-27EB-4F99-95AC-43FAAF04228A}" sibTransId="{C2DAEA33-3A24-40F8-9C82-54578B2CCB12}"/>
+    <dgm:cxn modelId="{963F57D9-88C1-4D4A-9C15-2983F3DF4B74}" type="presOf" srcId="{D9CED4B3-B54E-414C-B1E1-7BB7F935BC9C}" destId="{C58AF20F-1669-42BD-9ACE-636E78C80D8D}" srcOrd="0" destOrd="0" presId="urn:microsoft.com/office/officeart/2005/8/layout/process5"/>
+    <dgm:cxn modelId="{71DCF5DC-81DA-489B-BE5B-7E5D412591EB}" type="presOf" srcId="{4F48D43F-60A8-46CA-ABB7-394A2F5C667C}" destId="{7DA26E4B-50EA-43A1-BA6A-2BC6B90858A8}" srcOrd="1" destOrd="0" presId="urn:microsoft.com/office/officeart/2005/8/layout/process5"/>
     <dgm:cxn modelId="{A723CEDD-E5A2-4CEE-A7BA-7CAA9D1CB5D5}" srcId="{CDE4AA0B-5F06-4BD9-BB42-A3C5FE46EDD5}" destId="{37E92ECD-7D5C-4CCA-B6F2-FCB64D1C662B}" srcOrd="2" destOrd="0" parTransId="{C2EB40F5-5127-4E50-AF66-7267D3B6F7B6}" sibTransId="{F7548BA1-AB8C-4CEB-945D-12F806610994}"/>
-    <dgm:cxn modelId="{44B770DE-0C20-4E0E-AE8E-6F1357939F3D}" type="presOf" srcId="{51AC868D-C5E3-446C-B42D-B2F6B6ADBEEF}" destId="{E5FE6FB6-CC7E-4A7D-AAD3-A1B8B90A387C}" srcOrd="0" destOrd="0" presId="urn:microsoft.com/office/officeart/2005/8/layout/process5"/>
+    <dgm:cxn modelId="{C1AC62DE-A4B5-4BEA-B821-B1EC733095CC}" type="presOf" srcId="{9D5190EE-90E8-4688-ACFD-DD1D70934FBD}" destId="{17C43CC8-89E5-42D9-897A-A0E634920B88}" srcOrd="0" destOrd="0" presId="urn:microsoft.com/office/officeart/2005/8/layout/process5"/>
     <dgm:cxn modelId="{915B19E1-354E-44BF-8A56-13EB919673A6}" srcId="{CDE4AA0B-5F06-4BD9-BB42-A3C5FE46EDD5}" destId="{9D5190EE-90E8-4688-ACFD-DD1D70934FBD}" srcOrd="7" destOrd="0" parTransId="{B17DFC00-3239-4524-B93C-0F857E1ADCCD}" sibTransId="{F5F65E4D-82C4-4F09-9442-76B3337D509D}"/>
-    <dgm:cxn modelId="{213AEFE6-43AD-4471-AB01-7ABC6109C935}" type="presOf" srcId="{1B688F23-BB39-4C54-BF1C-5B1DE45DF827}" destId="{61B62871-FB35-4F21-8737-103845057CBF}" srcOrd="0" destOrd="0" presId="urn:microsoft.com/office/officeart/2005/8/layout/process5"/>
-    <dgm:cxn modelId="{FFA77AE7-C228-4D9B-9225-7A211F7F919C}" type="presOf" srcId="{1BE9B9AC-2847-4D1D-9B3A-95528B4026F9}" destId="{6E7E26B3-49A5-4080-9343-56991CB4723C}" srcOrd="1" destOrd="0" presId="urn:microsoft.com/office/officeart/2005/8/layout/process5"/>
-    <dgm:cxn modelId="{303A21E9-19D4-4070-BFC6-C9CD03D56231}" type="presOf" srcId="{F7548BA1-AB8C-4CEB-945D-12F806610994}" destId="{E162542E-51C1-447F-8CEF-84EDCBA169EC}" srcOrd="1" destOrd="0" presId="urn:microsoft.com/office/officeart/2005/8/layout/process5"/>
-    <dgm:cxn modelId="{CBAD9AEA-C99B-48F1-9200-9319EDA2E6F2}" type="presOf" srcId="{0EF9CF17-6B6A-4250-967C-C41A4A825FF9}" destId="{4FFE8EC9-D9A2-40A7-A437-D999A4E561AD}" srcOrd="0" destOrd="0" presId="urn:microsoft.com/office/officeart/2005/8/layout/process5"/>
-    <dgm:cxn modelId="{BC82B2EB-9F84-46C1-9578-D3E965D35D80}" type="presOf" srcId="{CDE4AA0B-5F06-4BD9-BB42-A3C5FE46EDD5}" destId="{5BD61685-EFEA-46D1-8EAC-C7F5FA652F5A}" srcOrd="0" destOrd="0" presId="urn:microsoft.com/office/officeart/2005/8/layout/process5"/>
-    <dgm:cxn modelId="{50B485F1-91DE-4A19-8EBE-6B50EFE02CA7}" type="presOf" srcId="{2CE5D9A6-FB9D-466A-AAD0-0C32D6EF82DE}" destId="{AA2CF8B9-19B1-4347-9C12-2F0D171E7FED}" srcOrd="0" destOrd="0" presId="urn:microsoft.com/office/officeart/2005/8/layout/process5"/>
-    <dgm:cxn modelId="{4ADDC5F8-914E-4304-A3DC-3AD8866708B4}" type="presOf" srcId="{00E75FAF-9A0E-4DA8-A5DD-FC4E8C0ADA8F}" destId="{5E0E70C2-F2A8-4577-B34E-60B0163DDDE2}" srcOrd="1" destOrd="0" presId="urn:microsoft.com/office/officeart/2005/8/layout/process5"/>
-    <dgm:cxn modelId="{744015FA-359D-46C9-BE88-4C69459C9D3B}" type="presOf" srcId="{37E92ECD-7D5C-4CCA-B6F2-FCB64D1C662B}" destId="{F46EE843-9331-4658-BB07-9E488F6BE40F}" srcOrd="0" destOrd="0" presId="urn:microsoft.com/office/officeart/2005/8/layout/process5"/>
+    <dgm:cxn modelId="{184F83E7-A76E-43A4-A8C3-FD062AD2D74E}" type="presOf" srcId="{F5F65E4D-82C4-4F09-9442-76B3337D509D}" destId="{753DAADC-2DC2-4646-8545-1D7C89C91F5A}" srcOrd="0" destOrd="0" presId="urn:microsoft.com/office/officeart/2005/8/layout/process5"/>
+    <dgm:cxn modelId="{2EC159EA-B33A-47A3-B160-E7F3682D077C}" type="presOf" srcId="{1B688F23-BB39-4C54-BF1C-5B1DE45DF827}" destId="{96BC49EA-65BD-4002-BF42-F4F2AA393C28}" srcOrd="1" destOrd="0" presId="urn:microsoft.com/office/officeart/2005/8/layout/process5"/>
+    <dgm:cxn modelId="{D739B7EE-273C-4F17-B215-BA6A963DA737}" type="presOf" srcId="{CDE4AA0B-5F06-4BD9-BB42-A3C5FE46EDD5}" destId="{DD3C201D-6F0E-4E80-8A4B-54BFE3AB5355}" srcOrd="0" destOrd="0" presId="urn:microsoft.com/office/officeart/2005/8/layout/process5"/>
+    <dgm:cxn modelId="{C0F01DF6-31C4-4929-9DE1-C1702F9776F3}" type="presOf" srcId="{F7548BA1-AB8C-4CEB-945D-12F806610994}" destId="{8894FEA4-08FF-40D1-BEBA-E252738416C6}" srcOrd="1" destOrd="0" presId="urn:microsoft.com/office/officeart/2005/8/layout/process5"/>
+    <dgm:cxn modelId="{939634FA-99F0-458C-A394-E3EAA63266C6}" type="presOf" srcId="{2FE520D4-4C2D-44DC-918D-77C1D1D78EB9}" destId="{BDC9D4F9-6BFA-4FBD-ABCD-1E6096C92643}" srcOrd="0" destOrd="0" presId="urn:microsoft.com/office/officeart/2005/8/layout/process5"/>
     <dgm:cxn modelId="{9B7D28FF-0BB3-4D78-A692-440B2C165613}" srcId="{CDE4AA0B-5F06-4BD9-BB42-A3C5FE46EDD5}" destId="{47D5DD2B-C168-44CD-81E3-F2673A343299}" srcOrd="1" destOrd="0" parTransId="{FD85C7FF-BE6D-4463-88FF-7978D4079341}" sibTransId="{74EA2338-CB9C-4403-BAF6-7ABBFA33645C}"/>
-    <dgm:cxn modelId="{73EA128D-59C3-4CA2-A775-8F76CE967BAC}" type="presParOf" srcId="{5BD61685-EFEA-46D1-8EAC-C7F5FA652F5A}" destId="{8D0241DE-6AAC-4256-9E26-64AD3F43CDBB}" srcOrd="0" destOrd="0" presId="urn:microsoft.com/office/officeart/2005/8/layout/process5"/>
-    <dgm:cxn modelId="{371F086A-01EF-4EDD-BD22-86E905406FC8}" type="presParOf" srcId="{5BD61685-EFEA-46D1-8EAC-C7F5FA652F5A}" destId="{E5FE6FB6-CC7E-4A7D-AAD3-A1B8B90A387C}" srcOrd="1" destOrd="0" presId="urn:microsoft.com/office/officeart/2005/8/layout/process5"/>
-    <dgm:cxn modelId="{D6352AF1-64DE-4B4F-8317-E67ABCCE7F10}" type="presParOf" srcId="{E5FE6FB6-CC7E-4A7D-AAD3-A1B8B90A387C}" destId="{BDEC236D-2E8B-43AC-AD2E-7FCAE4266E42}" srcOrd="0" destOrd="0" presId="urn:microsoft.com/office/officeart/2005/8/layout/process5"/>
-    <dgm:cxn modelId="{478F78F9-028A-4877-9EAC-BBF22E8390BC}" type="presParOf" srcId="{5BD61685-EFEA-46D1-8EAC-C7F5FA652F5A}" destId="{AE445B88-DC01-4FCA-A481-B4C32925223B}" srcOrd="2" destOrd="0" presId="urn:microsoft.com/office/officeart/2005/8/layout/process5"/>
-    <dgm:cxn modelId="{5811DA85-AECB-4A29-AAB1-FAD861BC0DAE}" type="presParOf" srcId="{5BD61685-EFEA-46D1-8EAC-C7F5FA652F5A}" destId="{ED444A14-DA62-4744-B946-403D32E225A0}" srcOrd="3" destOrd="0" presId="urn:microsoft.com/office/officeart/2005/8/layout/process5"/>
-    <dgm:cxn modelId="{3BE682EB-A6A7-4C01-A74F-24EF9C767A91}" type="presParOf" srcId="{ED444A14-DA62-4744-B946-403D32E225A0}" destId="{C5346EBF-FCC3-4C23-A68D-A5863D3FBBA7}" srcOrd="0" destOrd="0" presId="urn:microsoft.com/office/officeart/2005/8/layout/process5"/>
-    <dgm:cxn modelId="{7239A483-728C-469E-B248-FF5192396291}" type="presParOf" srcId="{5BD61685-EFEA-46D1-8EAC-C7F5FA652F5A}" destId="{F46EE843-9331-4658-BB07-9E488F6BE40F}" srcOrd="4" destOrd="0" presId="urn:microsoft.com/office/officeart/2005/8/layout/process5"/>
-    <dgm:cxn modelId="{F078BC96-13B8-4DF5-8A49-291876395376}" type="presParOf" srcId="{5BD61685-EFEA-46D1-8EAC-C7F5FA652F5A}" destId="{2B2B9ABD-C83B-408B-9C62-8BCF95D32E0E}" srcOrd="5" destOrd="0" presId="urn:microsoft.com/office/officeart/2005/8/layout/process5"/>
-    <dgm:cxn modelId="{79893E40-EC4F-41EF-B55C-ECCB37E4FE65}" type="presParOf" srcId="{2B2B9ABD-C83B-408B-9C62-8BCF95D32E0E}" destId="{E162542E-51C1-447F-8CEF-84EDCBA169EC}" srcOrd="0" destOrd="0" presId="urn:microsoft.com/office/officeart/2005/8/layout/process5"/>
-    <dgm:cxn modelId="{2942F7E1-033D-4980-8017-FC6D7D24658B}" type="presParOf" srcId="{5BD61685-EFEA-46D1-8EAC-C7F5FA652F5A}" destId="{E1B631AD-BBC2-4EDF-B8AF-97B4C55E6634}" srcOrd="6" destOrd="0" presId="urn:microsoft.com/office/officeart/2005/8/layout/process5"/>
-    <dgm:cxn modelId="{E0E51FC6-61CD-47AE-8699-7AC5739F4E4C}" type="presParOf" srcId="{5BD61685-EFEA-46D1-8EAC-C7F5FA652F5A}" destId="{AFA14F17-7D20-4997-B6B3-B68C9189D6AE}" srcOrd="7" destOrd="0" presId="urn:microsoft.com/office/officeart/2005/8/layout/process5"/>
-    <dgm:cxn modelId="{016B29D4-9F87-4C60-A8E3-3197E6FD0C2E}" type="presParOf" srcId="{AFA14F17-7D20-4997-B6B3-B68C9189D6AE}" destId="{7B47C134-96BE-4C55-93AC-837215C84E97}" srcOrd="0" destOrd="0" presId="urn:microsoft.com/office/officeart/2005/8/layout/process5"/>
-    <dgm:cxn modelId="{127EFA45-2DFB-4507-BA94-0BDDF1A5C0B5}" type="presParOf" srcId="{5BD61685-EFEA-46D1-8EAC-C7F5FA652F5A}" destId="{698E58E8-AF14-4031-A07C-A81D1EE1B47E}" srcOrd="8" destOrd="0" presId="urn:microsoft.com/office/officeart/2005/8/layout/process5"/>
-    <dgm:cxn modelId="{ED84050D-2645-412D-AB54-7B97D5996055}" type="presParOf" srcId="{5BD61685-EFEA-46D1-8EAC-C7F5FA652F5A}" destId="{4AAFA0DD-427F-4A02-AB70-3B417E712B3A}" srcOrd="9" destOrd="0" presId="urn:microsoft.com/office/officeart/2005/8/layout/process5"/>
-    <dgm:cxn modelId="{A2009680-7334-4F77-8EBD-07336D7143C7}" type="presParOf" srcId="{4AAFA0DD-427F-4A02-AB70-3B417E712B3A}" destId="{234403FD-10B0-4917-8A6D-84BC4AC222D9}" srcOrd="0" destOrd="0" presId="urn:microsoft.com/office/officeart/2005/8/layout/process5"/>
-    <dgm:cxn modelId="{AA93C635-4FAD-4E6F-9CCC-C6E97004C69B}" type="presParOf" srcId="{5BD61685-EFEA-46D1-8EAC-C7F5FA652F5A}" destId="{392791E9-5F4B-4A5D-9FA8-CE02DFB0F3B7}" srcOrd="10" destOrd="0" presId="urn:microsoft.com/office/officeart/2005/8/layout/process5"/>
-    <dgm:cxn modelId="{45A5B7ED-5CBC-499B-8D09-B89657FCB10A}" type="presParOf" srcId="{5BD61685-EFEA-46D1-8EAC-C7F5FA652F5A}" destId="{CFEF9A24-ECDB-444A-AB45-0FBA21847897}" srcOrd="11" destOrd="0" presId="urn:microsoft.com/office/officeart/2005/8/layout/process5"/>
-    <dgm:cxn modelId="{6631168B-1A16-4BDA-8588-34AC18ED7438}" type="presParOf" srcId="{CFEF9A24-ECDB-444A-AB45-0FBA21847897}" destId="{9DFB2884-E0D6-4CFA-B761-B53B83D4D073}" srcOrd="0" destOrd="0" presId="urn:microsoft.com/office/officeart/2005/8/layout/process5"/>
-    <dgm:cxn modelId="{BE817F4B-73EF-43AD-A803-3572EE00C253}" type="presParOf" srcId="{5BD61685-EFEA-46D1-8EAC-C7F5FA652F5A}" destId="{A8C86915-318E-4FAB-860D-17954FCE7779}" srcOrd="12" destOrd="0" presId="urn:microsoft.com/office/officeart/2005/8/layout/process5"/>
-    <dgm:cxn modelId="{4C64A989-0B2A-47AA-8B9B-802DBA65E52F}" type="presParOf" srcId="{5BD61685-EFEA-46D1-8EAC-C7F5FA652F5A}" destId="{FA5F4AB8-BF6B-4051-86D7-68585D786623}" srcOrd="13" destOrd="0" presId="urn:microsoft.com/office/officeart/2005/8/layout/process5"/>
-    <dgm:cxn modelId="{27A45E21-0DD2-48DA-BDEE-038D42901B2B}" type="presParOf" srcId="{FA5F4AB8-BF6B-4051-86D7-68585D786623}" destId="{6E7E26B3-49A5-4080-9343-56991CB4723C}" srcOrd="0" destOrd="0" presId="urn:microsoft.com/office/officeart/2005/8/layout/process5"/>
-    <dgm:cxn modelId="{C62DFF99-07E6-42A9-9712-7E5CB6743C9A}" type="presParOf" srcId="{5BD61685-EFEA-46D1-8EAC-C7F5FA652F5A}" destId="{950E5EBE-44BB-4C92-9EE4-BC22460A4EF9}" srcOrd="14" destOrd="0" presId="urn:microsoft.com/office/officeart/2005/8/layout/process5"/>
-    <dgm:cxn modelId="{C3761E36-BCA3-4D92-B005-88FB3CF9D16A}" type="presParOf" srcId="{5BD61685-EFEA-46D1-8EAC-C7F5FA652F5A}" destId="{46AA52BC-8B6D-46A3-A636-CF9997F06AA4}" srcOrd="15" destOrd="0" presId="urn:microsoft.com/office/officeart/2005/8/layout/process5"/>
-    <dgm:cxn modelId="{10AE5419-3FE7-4631-863F-DA482FE4C649}" type="presParOf" srcId="{46AA52BC-8B6D-46A3-A636-CF9997F06AA4}" destId="{803980FC-9D68-4298-A4D7-ECFD6CFD77FD}" srcOrd="0" destOrd="0" presId="urn:microsoft.com/office/officeart/2005/8/layout/process5"/>
-    <dgm:cxn modelId="{0FC96F97-5D14-4FFB-BC23-33AD95BE047C}" type="presParOf" srcId="{5BD61685-EFEA-46D1-8EAC-C7F5FA652F5A}" destId="{49308249-96A5-498C-8AC7-09736140A2A8}" srcOrd="16" destOrd="0" presId="urn:microsoft.com/office/officeart/2005/8/layout/process5"/>
-    <dgm:cxn modelId="{534DD88E-48FD-4048-A4D5-370E38BCBB3D}" type="presParOf" srcId="{5BD61685-EFEA-46D1-8EAC-C7F5FA652F5A}" destId="{7BF54FDC-96D6-4CEB-B263-D3B76D35F08D}" srcOrd="17" destOrd="0" presId="urn:microsoft.com/office/officeart/2005/8/layout/process5"/>
-    <dgm:cxn modelId="{C838BA5C-D164-4F0E-82F0-31087BA245B3}" type="presParOf" srcId="{7BF54FDC-96D6-4CEB-B263-D3B76D35F08D}" destId="{5E0E70C2-F2A8-4577-B34E-60B0163DDDE2}" srcOrd="0" destOrd="0" presId="urn:microsoft.com/office/officeart/2005/8/layout/process5"/>
-    <dgm:cxn modelId="{693AD5AB-1313-4245-9A79-082D5139509F}" type="presParOf" srcId="{5BD61685-EFEA-46D1-8EAC-C7F5FA652F5A}" destId="{BC801E3C-457A-409A-B127-A8456892A3E7}" srcOrd="18" destOrd="0" presId="urn:microsoft.com/office/officeart/2005/8/layout/process5"/>
-    <dgm:cxn modelId="{D6F13BB4-6990-447B-AAC2-70B7A1CA1385}" type="presParOf" srcId="{5BD61685-EFEA-46D1-8EAC-C7F5FA652F5A}" destId="{4FFE8EC9-D9A2-40A7-A437-D999A4E561AD}" srcOrd="19" destOrd="0" presId="urn:microsoft.com/office/officeart/2005/8/layout/process5"/>
-    <dgm:cxn modelId="{C26ECC02-C31A-40DC-A98E-99443058453F}" type="presParOf" srcId="{4FFE8EC9-D9A2-40A7-A437-D999A4E561AD}" destId="{10EA3286-211D-46AB-9E8F-954B658B9276}" srcOrd="0" destOrd="0" presId="urn:microsoft.com/office/officeart/2005/8/layout/process5"/>
-    <dgm:cxn modelId="{AF44ADD3-F608-4A49-A451-5D88ECE4A80C}" type="presParOf" srcId="{5BD61685-EFEA-46D1-8EAC-C7F5FA652F5A}" destId="{9F885388-DD9F-4FC9-B8FD-7AEB89374FF2}" srcOrd="20" destOrd="0" presId="urn:microsoft.com/office/officeart/2005/8/layout/process5"/>
-    <dgm:cxn modelId="{BE05DB49-8378-409A-8B4B-F4CF49D0F850}" type="presParOf" srcId="{5BD61685-EFEA-46D1-8EAC-C7F5FA652F5A}" destId="{82A205C9-B43F-4750-8554-98B9F4070306}" srcOrd="21" destOrd="0" presId="urn:microsoft.com/office/officeart/2005/8/layout/process5"/>
-    <dgm:cxn modelId="{C8789969-5A1C-4C14-AA60-60482486EE1C}" type="presParOf" srcId="{82A205C9-B43F-4750-8554-98B9F4070306}" destId="{9607A927-0406-4927-9141-DA4EF53542AA}" srcOrd="0" destOrd="0" presId="urn:microsoft.com/office/officeart/2005/8/layout/process5"/>
-    <dgm:cxn modelId="{72088C1E-06B5-4B50-8D2A-43BC349EE979}" type="presParOf" srcId="{5BD61685-EFEA-46D1-8EAC-C7F5FA652F5A}" destId="{FBCBAEE7-C221-48EF-A1A6-E811F960AB76}" srcOrd="22" destOrd="0" presId="urn:microsoft.com/office/officeart/2005/8/layout/process5"/>
-    <dgm:cxn modelId="{A665520E-E9CA-4AA1-B727-8009F8E2DF59}" type="presParOf" srcId="{5BD61685-EFEA-46D1-8EAC-C7F5FA652F5A}" destId="{61B62871-FB35-4F21-8737-103845057CBF}" srcOrd="23" destOrd="0" presId="urn:microsoft.com/office/officeart/2005/8/layout/process5"/>
-    <dgm:cxn modelId="{0C59C304-F716-4E97-BA9F-3ADEE3E3D63B}" type="presParOf" srcId="{61B62871-FB35-4F21-8737-103845057CBF}" destId="{8E230428-6428-4476-9C7F-2D74146CF5BB}" srcOrd="0" destOrd="0" presId="urn:microsoft.com/office/officeart/2005/8/layout/process5"/>
-    <dgm:cxn modelId="{969EC660-22D2-4760-85B6-3A6D6EE07491}" type="presParOf" srcId="{5BD61685-EFEA-46D1-8EAC-C7F5FA652F5A}" destId="{F5037606-C157-4155-BED8-849633FCB3A8}" srcOrd="24" destOrd="0" presId="urn:microsoft.com/office/officeart/2005/8/layout/process5"/>
-    <dgm:cxn modelId="{0CBB3538-DD55-400C-8B87-BBC12D1096C4}" type="presParOf" srcId="{5BD61685-EFEA-46D1-8EAC-C7F5FA652F5A}" destId="{8E93EF29-2DA9-4450-A94E-E84C7B43096D}" srcOrd="25" destOrd="0" presId="urn:microsoft.com/office/officeart/2005/8/layout/process5"/>
-    <dgm:cxn modelId="{E1C0B2AD-C6CF-4CD4-865C-8F7DD394B693}" type="presParOf" srcId="{8E93EF29-2DA9-4450-A94E-E84C7B43096D}" destId="{778A386A-4C20-4FF7-83E2-F3C8471FE77A}" srcOrd="0" destOrd="0" presId="urn:microsoft.com/office/officeart/2005/8/layout/process5"/>
-    <dgm:cxn modelId="{5F6254AB-C4C7-4A6A-BCDE-53B5B33F9F04}" type="presParOf" srcId="{5BD61685-EFEA-46D1-8EAC-C7F5FA652F5A}" destId="{AA2CF8B9-19B1-4347-9C12-2F0D171E7FED}" srcOrd="26" destOrd="0" presId="urn:microsoft.com/office/officeart/2005/8/layout/process5"/>
-    <dgm:cxn modelId="{691263A7-EA14-478A-AD8D-85C49E7FEB16}" type="presParOf" srcId="{5BD61685-EFEA-46D1-8EAC-C7F5FA652F5A}" destId="{2BE4EF29-79FD-4B6C-B4B7-7871815716AD}" srcOrd="27" destOrd="0" presId="urn:microsoft.com/office/officeart/2005/8/layout/process5"/>
-    <dgm:cxn modelId="{E3404015-E02A-403E-A5A8-D548B0E6FDE8}" type="presParOf" srcId="{2BE4EF29-79FD-4B6C-B4B7-7871815716AD}" destId="{0536B591-B061-4898-842A-3728931B5BEF}" srcOrd="0" destOrd="0" presId="urn:microsoft.com/office/officeart/2005/8/layout/process5"/>
-    <dgm:cxn modelId="{BE42DE19-20A9-4606-AC39-71D32451DA70}" type="presParOf" srcId="{5BD61685-EFEA-46D1-8EAC-C7F5FA652F5A}" destId="{895B3D7B-4668-43EF-92F3-F16B71473439}" srcOrd="28" destOrd="0" presId="urn:microsoft.com/office/officeart/2005/8/layout/process5"/>
+    <dgm:cxn modelId="{D4023FEE-157F-49C6-ACAC-91D36DD048C7}" type="presParOf" srcId="{DD3C201D-6F0E-4E80-8A4B-54BFE3AB5355}" destId="{D8CE9071-4049-4819-A4D8-5167789C7C51}" srcOrd="0" destOrd="0" presId="urn:microsoft.com/office/officeart/2005/8/layout/process5"/>
+    <dgm:cxn modelId="{CAC6EF46-C5AE-446A-9FE1-192AD98E8180}" type="presParOf" srcId="{DD3C201D-6F0E-4E80-8A4B-54BFE3AB5355}" destId="{D8BC0FC3-1732-4A41-910A-DC713AC915F0}" srcOrd="1" destOrd="0" presId="urn:microsoft.com/office/officeart/2005/8/layout/process5"/>
+    <dgm:cxn modelId="{08DA0B38-3A94-485B-9B9E-8B8AFF68FDF4}" type="presParOf" srcId="{D8BC0FC3-1732-4A41-910A-DC713AC915F0}" destId="{14A77041-243A-4B4E-AFB6-5564FDEED79A}" srcOrd="0" destOrd="0" presId="urn:microsoft.com/office/officeart/2005/8/layout/process5"/>
+    <dgm:cxn modelId="{E88FF328-F48F-4914-8E9E-93BF88B5EE45}" type="presParOf" srcId="{DD3C201D-6F0E-4E80-8A4B-54BFE3AB5355}" destId="{D262D2C9-DD8B-435E-BD6B-2A90010EE04B}" srcOrd="2" destOrd="0" presId="urn:microsoft.com/office/officeart/2005/8/layout/process5"/>
+    <dgm:cxn modelId="{A218EC70-ECA6-4433-AA01-E642F38B4309}" type="presParOf" srcId="{DD3C201D-6F0E-4E80-8A4B-54BFE3AB5355}" destId="{68C0E020-4FD0-4491-BAE4-B0295B8EB972}" srcOrd="3" destOrd="0" presId="urn:microsoft.com/office/officeart/2005/8/layout/process5"/>
+    <dgm:cxn modelId="{5463A9D7-7C5D-4B91-B5A1-EACDBFE82E30}" type="presParOf" srcId="{68C0E020-4FD0-4491-BAE4-B0295B8EB972}" destId="{54104EE3-829A-4FA2-AEE6-EB6EC90522B7}" srcOrd="0" destOrd="0" presId="urn:microsoft.com/office/officeart/2005/8/layout/process5"/>
+    <dgm:cxn modelId="{67881C4E-FA85-4282-BA3A-DBCD44EF4F0E}" type="presParOf" srcId="{DD3C201D-6F0E-4E80-8A4B-54BFE3AB5355}" destId="{AC5DA3F6-BC12-4EFB-8885-CBED78A91B80}" srcOrd="4" destOrd="0" presId="urn:microsoft.com/office/officeart/2005/8/layout/process5"/>
+    <dgm:cxn modelId="{DD05DC8D-EA8D-41B7-9ED8-E8874314E645}" type="presParOf" srcId="{DD3C201D-6F0E-4E80-8A4B-54BFE3AB5355}" destId="{7AF6076B-F6E4-48D2-B941-932FBF7B5BF8}" srcOrd="5" destOrd="0" presId="urn:microsoft.com/office/officeart/2005/8/layout/process5"/>
+    <dgm:cxn modelId="{4C5FB5B1-952B-4F97-ABA2-5DABD03F991D}" type="presParOf" srcId="{7AF6076B-F6E4-48D2-B941-932FBF7B5BF8}" destId="{8894FEA4-08FF-40D1-BEBA-E252738416C6}" srcOrd="0" destOrd="0" presId="urn:microsoft.com/office/officeart/2005/8/layout/process5"/>
+    <dgm:cxn modelId="{9619B76B-CBA0-4356-9725-F787B8863747}" type="presParOf" srcId="{DD3C201D-6F0E-4E80-8A4B-54BFE3AB5355}" destId="{BDC9D4F9-6BFA-4FBD-ABCD-1E6096C92643}" srcOrd="6" destOrd="0" presId="urn:microsoft.com/office/officeart/2005/8/layout/process5"/>
+    <dgm:cxn modelId="{66D18A5B-45FF-4F3E-B116-92B78B814A94}" type="presParOf" srcId="{DD3C201D-6F0E-4E80-8A4B-54BFE3AB5355}" destId="{5EBDDE8C-1468-4CA2-9D2A-300F69E062E0}" srcOrd="7" destOrd="0" presId="urn:microsoft.com/office/officeart/2005/8/layout/process5"/>
+    <dgm:cxn modelId="{003D40B5-2C7A-4213-A4D1-8EFEAE9AE27D}" type="presParOf" srcId="{5EBDDE8C-1468-4CA2-9D2A-300F69E062E0}" destId="{7DA26E4B-50EA-43A1-BA6A-2BC6B90858A8}" srcOrd="0" destOrd="0" presId="urn:microsoft.com/office/officeart/2005/8/layout/process5"/>
+    <dgm:cxn modelId="{04393FA4-90E3-46F3-949C-905834B85B0D}" type="presParOf" srcId="{DD3C201D-6F0E-4E80-8A4B-54BFE3AB5355}" destId="{C58AF20F-1669-42BD-9ACE-636E78C80D8D}" srcOrd="8" destOrd="0" presId="urn:microsoft.com/office/officeart/2005/8/layout/process5"/>
+    <dgm:cxn modelId="{8C649149-8809-4520-B307-3CFAE16F5A76}" type="presParOf" srcId="{DD3C201D-6F0E-4E80-8A4B-54BFE3AB5355}" destId="{7557190D-BD84-403C-8960-28C9063E0A41}" srcOrd="9" destOrd="0" presId="urn:microsoft.com/office/officeart/2005/8/layout/process5"/>
+    <dgm:cxn modelId="{6E8BEC5B-8B47-46B2-8A5A-19398BEE9837}" type="presParOf" srcId="{7557190D-BD84-403C-8960-28C9063E0A41}" destId="{AF370918-BBE7-47DE-9DDB-042D6DBD5351}" srcOrd="0" destOrd="0" presId="urn:microsoft.com/office/officeart/2005/8/layout/process5"/>
+    <dgm:cxn modelId="{08AB0B86-C9C4-485D-9DD0-D74C68DE4265}" type="presParOf" srcId="{DD3C201D-6F0E-4E80-8A4B-54BFE3AB5355}" destId="{CEA0BD65-F717-4769-8AAE-60686BDF38C6}" srcOrd="10" destOrd="0" presId="urn:microsoft.com/office/officeart/2005/8/layout/process5"/>
+    <dgm:cxn modelId="{9EA05C14-F0B1-4A64-972D-03D720A22ADF}" type="presParOf" srcId="{DD3C201D-6F0E-4E80-8A4B-54BFE3AB5355}" destId="{410531A4-8815-4C70-A912-5F4BFF301227}" srcOrd="11" destOrd="0" presId="urn:microsoft.com/office/officeart/2005/8/layout/process5"/>
+    <dgm:cxn modelId="{DD26D59B-6C44-4A48-9723-3D5EB65803C9}" type="presParOf" srcId="{410531A4-8815-4C70-A912-5F4BFF301227}" destId="{5751433D-ADA2-46FB-B9AA-C072072411AA}" srcOrd="0" destOrd="0" presId="urn:microsoft.com/office/officeart/2005/8/layout/process5"/>
+    <dgm:cxn modelId="{091F1206-383E-449D-BE68-A1EE8BA4BF4D}" type="presParOf" srcId="{DD3C201D-6F0E-4E80-8A4B-54BFE3AB5355}" destId="{341AA5BA-4B19-42C6-8956-FA95EC009B5C}" srcOrd="12" destOrd="0" presId="urn:microsoft.com/office/officeart/2005/8/layout/process5"/>
+    <dgm:cxn modelId="{68D04261-8678-4F08-BBC5-1EECBC5C7647}" type="presParOf" srcId="{DD3C201D-6F0E-4E80-8A4B-54BFE3AB5355}" destId="{4B7269C3-4712-4AFA-A269-612EBE88A570}" srcOrd="13" destOrd="0" presId="urn:microsoft.com/office/officeart/2005/8/layout/process5"/>
+    <dgm:cxn modelId="{10299F4B-194D-4B44-B06E-4CC8D7D66335}" type="presParOf" srcId="{4B7269C3-4712-4AFA-A269-612EBE88A570}" destId="{07A07C47-5489-4A8A-A94A-24D34432A1A3}" srcOrd="0" destOrd="0" presId="urn:microsoft.com/office/officeart/2005/8/layout/process5"/>
+    <dgm:cxn modelId="{1437F9BF-376A-4982-9FDA-AA689B126AC5}" type="presParOf" srcId="{DD3C201D-6F0E-4E80-8A4B-54BFE3AB5355}" destId="{17C43CC8-89E5-42D9-897A-A0E634920B88}" srcOrd="14" destOrd="0" presId="urn:microsoft.com/office/officeart/2005/8/layout/process5"/>
+    <dgm:cxn modelId="{3FBC5228-5204-4E43-ADF4-12B7A4F14C0B}" type="presParOf" srcId="{DD3C201D-6F0E-4E80-8A4B-54BFE3AB5355}" destId="{753DAADC-2DC2-4646-8545-1D7C89C91F5A}" srcOrd="15" destOrd="0" presId="urn:microsoft.com/office/officeart/2005/8/layout/process5"/>
+    <dgm:cxn modelId="{1ABDBCCE-135D-4B28-96A3-D2BC5325F543}" type="presParOf" srcId="{753DAADC-2DC2-4646-8545-1D7C89C91F5A}" destId="{0B087793-5D7E-4ADA-835F-F373F886BEAA}" srcOrd="0" destOrd="0" presId="urn:microsoft.com/office/officeart/2005/8/layout/process5"/>
+    <dgm:cxn modelId="{3F25A3CD-175F-4007-949C-FBD95C043401}" type="presParOf" srcId="{DD3C201D-6F0E-4E80-8A4B-54BFE3AB5355}" destId="{2CA64BA6-F8FC-4DB6-8782-658549C2A2F5}" srcOrd="16" destOrd="0" presId="urn:microsoft.com/office/officeart/2005/8/layout/process5"/>
+    <dgm:cxn modelId="{F073BFFE-0848-4BEB-8BE5-910FB74F9CFC}" type="presParOf" srcId="{DD3C201D-6F0E-4E80-8A4B-54BFE3AB5355}" destId="{C8DC4A97-B93F-49C9-A57A-6ED88871F429}" srcOrd="17" destOrd="0" presId="urn:microsoft.com/office/officeart/2005/8/layout/process5"/>
+    <dgm:cxn modelId="{CF4A0F75-8FB0-4816-B7EE-B8C7257242E4}" type="presParOf" srcId="{C8DC4A97-B93F-49C9-A57A-6ED88871F429}" destId="{BAAC5FEA-FA57-400D-8C70-0A96EBCF3498}" srcOrd="0" destOrd="0" presId="urn:microsoft.com/office/officeart/2005/8/layout/process5"/>
+    <dgm:cxn modelId="{B4C6378E-E136-4020-9E00-B9D57C14422D}" type="presParOf" srcId="{DD3C201D-6F0E-4E80-8A4B-54BFE3AB5355}" destId="{7A916C5C-A383-4442-8ABE-0E566FAF7F88}" srcOrd="18" destOrd="0" presId="urn:microsoft.com/office/officeart/2005/8/layout/process5"/>
+    <dgm:cxn modelId="{6C2CE79A-70C4-4FD3-BAEA-6427503F2D1B}" type="presParOf" srcId="{DD3C201D-6F0E-4E80-8A4B-54BFE3AB5355}" destId="{F09400A7-1C09-4CAA-8CEC-B5CC4FCF0436}" srcOrd="19" destOrd="0" presId="urn:microsoft.com/office/officeart/2005/8/layout/process5"/>
+    <dgm:cxn modelId="{65FF5E85-BC37-4BAF-BD41-F7F7EFC0F4DF}" type="presParOf" srcId="{F09400A7-1C09-4CAA-8CEC-B5CC4FCF0436}" destId="{E52CB78F-1830-4D1F-86FE-30FF2625FC56}" srcOrd="0" destOrd="0" presId="urn:microsoft.com/office/officeart/2005/8/layout/process5"/>
+    <dgm:cxn modelId="{F0AFC259-230A-4816-A450-CC7939F27184}" type="presParOf" srcId="{DD3C201D-6F0E-4E80-8A4B-54BFE3AB5355}" destId="{3B377935-DD62-49ED-861C-ADAE53057C46}" srcOrd="20" destOrd="0" presId="urn:microsoft.com/office/officeart/2005/8/layout/process5"/>
+    <dgm:cxn modelId="{CAAAA632-F44A-4C4F-A298-D8745061E2B5}" type="presParOf" srcId="{DD3C201D-6F0E-4E80-8A4B-54BFE3AB5355}" destId="{E0F896DA-1C5B-4BB5-9200-9DB6D15CD0F4}" srcOrd="21" destOrd="0" presId="urn:microsoft.com/office/officeart/2005/8/layout/process5"/>
+    <dgm:cxn modelId="{DBFF865A-5B1A-4C09-8974-1A797D488D9B}" type="presParOf" srcId="{E0F896DA-1C5B-4BB5-9200-9DB6D15CD0F4}" destId="{F613C6D6-D82E-4D35-B82B-BDF59FF814FF}" srcOrd="0" destOrd="0" presId="urn:microsoft.com/office/officeart/2005/8/layout/process5"/>
+    <dgm:cxn modelId="{38E2D8E1-CC8D-435F-B27A-1AD09C786118}" type="presParOf" srcId="{DD3C201D-6F0E-4E80-8A4B-54BFE3AB5355}" destId="{0D152BF3-CDA8-438C-9FBF-80B154BE6C02}" srcOrd="22" destOrd="0" presId="urn:microsoft.com/office/officeart/2005/8/layout/process5"/>
+    <dgm:cxn modelId="{3EFED807-A63F-469E-B5EC-FE6E7657CBC8}" type="presParOf" srcId="{DD3C201D-6F0E-4E80-8A4B-54BFE3AB5355}" destId="{3C1633DE-B658-47F6-9062-D832C6035B5D}" srcOrd="23" destOrd="0" presId="urn:microsoft.com/office/officeart/2005/8/layout/process5"/>
+    <dgm:cxn modelId="{6CACEF55-D3DA-4B15-930F-529F50A513FF}" type="presParOf" srcId="{3C1633DE-B658-47F6-9062-D832C6035B5D}" destId="{96BC49EA-65BD-4002-BF42-F4F2AA393C28}" srcOrd="0" destOrd="0" presId="urn:microsoft.com/office/officeart/2005/8/layout/process5"/>
+    <dgm:cxn modelId="{B4646398-F1A1-4A5C-9867-6D8CA7547245}" type="presParOf" srcId="{DD3C201D-6F0E-4E80-8A4B-54BFE3AB5355}" destId="{92184039-C2F0-49BA-9552-41BCEBCC15D8}" srcOrd="24" destOrd="0" presId="urn:microsoft.com/office/officeart/2005/8/layout/process5"/>
+    <dgm:cxn modelId="{69B9614C-CCE6-44BF-A3A4-47F546B20775}" type="presParOf" srcId="{DD3C201D-6F0E-4E80-8A4B-54BFE3AB5355}" destId="{EF4EE57F-91C1-43A1-A371-A8AAD541BC2A}" srcOrd="25" destOrd="0" presId="urn:microsoft.com/office/officeart/2005/8/layout/process5"/>
+    <dgm:cxn modelId="{C389B6B8-A3CA-4521-82B6-EE1CF211AB32}" type="presParOf" srcId="{EF4EE57F-91C1-43A1-A371-A8AAD541BC2A}" destId="{D0A73825-3220-4CB7-8032-F0492EDBDBE9}" srcOrd="0" destOrd="0" presId="urn:microsoft.com/office/officeart/2005/8/layout/process5"/>
+    <dgm:cxn modelId="{39BFBDD0-A748-4DF1-BF17-481F1D84E43E}" type="presParOf" srcId="{DD3C201D-6F0E-4E80-8A4B-54BFE3AB5355}" destId="{12CE1CFD-B93F-4649-9E0B-098C55B343AE}" srcOrd="26" destOrd="0" presId="urn:microsoft.com/office/officeart/2005/8/layout/process5"/>
+    <dgm:cxn modelId="{839B002F-C461-4A04-AC09-2CF8C17B9C91}" type="presParOf" srcId="{DD3C201D-6F0E-4E80-8A4B-54BFE3AB5355}" destId="{EBF866C1-118F-4269-9E20-52CB3BB6C7E7}" srcOrd="27" destOrd="0" presId="urn:microsoft.com/office/officeart/2005/8/layout/process5"/>
+    <dgm:cxn modelId="{A9764235-E844-4AF4-B1CF-A429FBD06277}" type="presParOf" srcId="{EBF866C1-118F-4269-9E20-52CB3BB6C7E7}" destId="{74A26CB0-783A-457D-8F81-BF72E2882B62}" srcOrd="0" destOrd="0" presId="urn:microsoft.com/office/officeart/2005/8/layout/process5"/>
+    <dgm:cxn modelId="{E42FDAFD-D060-47AA-80E1-1D333FBF2DC6}" type="presParOf" srcId="{DD3C201D-6F0E-4E80-8A4B-54BFE3AB5355}" destId="{B5F89BEC-1ADB-4A7C-9AC2-FA8321D875EE}" srcOrd="28" destOrd="0" presId="urn:microsoft.com/office/officeart/2005/8/layout/process5"/>
   </dgm:cxnLst>
   <dgm:bg/>
   <dgm:whole/>
@@ -4820,7 +4820,7 @@
       <dsp:cNvGrpSpPr/>
     </dsp:nvGrpSpPr>
     <dsp:grpSpPr/>
-    <dsp:sp modelId="{8D0241DE-6AAC-4256-9E26-64AD3F43CDBB}">
+    <dsp:sp modelId="{D8CE9071-4049-4819-A4D8-5167789C7C51}">
       <dsp:nvSpPr>
         <dsp:cNvPr id="0" name=""/>
         <dsp:cNvSpPr/>
@@ -4843,31 +4843,29 @@
             <a:alphaOff val="0"/>
           </a:schemeClr>
         </a:solidFill>
-        <a:ln>
-          <a:noFill/>
+        <a:ln w="12700" cap="flat" cmpd="sng" algn="ctr">
+          <a:solidFill>
+            <a:schemeClr val="dk1">
+              <a:shade val="80000"/>
+              <a:hueOff val="0"/>
+              <a:satOff val="0"/>
+              <a:lumOff val="0"/>
+              <a:alphaOff val="0"/>
+            </a:schemeClr>
+          </a:solidFill>
+          <a:prstDash val="solid"/>
+          <a:miter lim="800000"/>
         </a:ln>
         <a:effectLst/>
-        <a:scene3d>
-          <a:camera prst="orthographicFront">
-            <a:rot lat="0" lon="0" rev="0"/>
-          </a:camera>
-          <a:lightRig rig="contrasting" dir="t">
-            <a:rot lat="0" lon="0" rev="1200000"/>
-          </a:lightRig>
-        </a:scene3d>
-        <a:sp3d contourW="19050" prstMaterial="metal">
-          <a:bevelT w="88900" h="203200"/>
-          <a:bevelB w="165100" h="254000"/>
-        </a:sp3d>
       </dsp:spPr>
       <dsp:style>
-        <a:lnRef idx="0">
+        <a:lnRef idx="2">
           <a:scrgbClr r="0" g="0" b="0"/>
         </a:lnRef>
         <a:fillRef idx="1">
           <a:scrgbClr r="0" g="0" b="0"/>
         </a:fillRef>
-        <a:effectRef idx="2">
+        <a:effectRef idx="0">
           <a:scrgbClr r="0" g="0" b="0"/>
         </a:effectRef>
         <a:fontRef idx="minor">
@@ -4904,7 +4902,7 @@
         <a:ext cx="1598684" cy="935916"/>
       </dsp:txXfrm>
     </dsp:sp>
-    <dsp:sp modelId="{E5FE6FB6-CC7E-4A7D-AAD3-A1B8B90A387C}">
+    <dsp:sp modelId="{D8BC0FC3-1732-4A41-910A-DC713AC915F0}">
       <dsp:nvSpPr>
         <dsp:cNvPr id="0" name=""/>
         <dsp:cNvSpPr/>
@@ -4933,18 +4931,6 @@
           <a:noFill/>
         </a:ln>
         <a:effectLst/>
-        <a:scene3d>
-          <a:camera prst="orthographicFront">
-            <a:rot lat="0" lon="0" rev="0"/>
-          </a:camera>
-          <a:lightRig rig="contrasting" dir="t">
-            <a:rot lat="0" lon="0" rev="1200000"/>
-          </a:lightRig>
-        </a:scene3d>
-        <a:sp3d z="-182000" contourW="19050" prstMaterial="metal">
-          <a:bevelT w="88900" h="203200"/>
-          <a:bevelB w="165100" h="254000"/>
-        </a:sp3d>
       </dsp:spPr>
       <dsp:style>
         <a:lnRef idx="0">
@@ -4986,7 +4972,7 @@
         <a:ext cx="245887" cy="246550"/>
       </dsp:txXfrm>
     </dsp:sp>
-    <dsp:sp modelId="{AE445B88-DC01-4FCA-A481-B4C32925223B}">
+    <dsp:sp modelId="{D262D2C9-DD8B-435E-BD6B-2A90010EE04B}">
       <dsp:nvSpPr>
         <dsp:cNvPr id="0" name=""/>
         <dsp:cNvSpPr/>
@@ -5009,31 +4995,29 @@
             <a:alphaOff val="0"/>
           </a:schemeClr>
         </a:solidFill>
-        <a:ln>
-          <a:noFill/>
+        <a:ln w="12700" cap="flat" cmpd="sng" algn="ctr">
+          <a:solidFill>
+            <a:schemeClr val="dk1">
+              <a:shade val="80000"/>
+              <a:hueOff val="0"/>
+              <a:satOff val="0"/>
+              <a:lumOff val="0"/>
+              <a:alphaOff val="0"/>
+            </a:schemeClr>
+          </a:solidFill>
+          <a:prstDash val="solid"/>
+          <a:miter lim="800000"/>
         </a:ln>
         <a:effectLst/>
-        <a:scene3d>
-          <a:camera prst="orthographicFront">
-            <a:rot lat="0" lon="0" rev="0"/>
-          </a:camera>
-          <a:lightRig rig="contrasting" dir="t">
-            <a:rot lat="0" lon="0" rev="1200000"/>
-          </a:lightRig>
-        </a:scene3d>
-        <a:sp3d contourW="19050" prstMaterial="metal">
-          <a:bevelT w="88900" h="203200"/>
-          <a:bevelB w="165100" h="254000"/>
-        </a:sp3d>
       </dsp:spPr>
       <dsp:style>
-        <a:lnRef idx="0">
+        <a:lnRef idx="2">
           <a:scrgbClr r="0" g="0" b="0"/>
         </a:lnRef>
         <a:fillRef idx="1">
           <a:scrgbClr r="0" g="0" b="0"/>
         </a:fillRef>
-        <a:effectRef idx="2">
+        <a:effectRef idx="0">
           <a:scrgbClr r="0" g="0" b="0"/>
         </a:effectRef>
         <a:fontRef idx="minor">
@@ -5069,7 +5053,7 @@
         <a:ext cx="1598684" cy="935916"/>
       </dsp:txXfrm>
     </dsp:sp>
-    <dsp:sp modelId="{ED444A14-DA62-4744-B946-403D32E225A0}">
+    <dsp:sp modelId="{68C0E020-4FD0-4491-BAE4-B0295B8EB972}">
       <dsp:nvSpPr>
         <dsp:cNvPr id="0" name=""/>
         <dsp:cNvSpPr/>
@@ -5098,18 +5082,6 @@
           <a:noFill/>
         </a:ln>
         <a:effectLst/>
-        <a:scene3d>
-          <a:camera prst="orthographicFront">
-            <a:rot lat="0" lon="0" rev="0"/>
-          </a:camera>
-          <a:lightRig rig="contrasting" dir="t">
-            <a:rot lat="0" lon="0" rev="1200000"/>
-          </a:lightRig>
-        </a:scene3d>
-        <a:sp3d z="-182000" contourW="19050" prstMaterial="metal">
-          <a:bevelT w="88900" h="203200"/>
-          <a:bevelB w="165100" h="254000"/>
-        </a:sp3d>
       </dsp:spPr>
       <dsp:style>
         <a:lnRef idx="0">
@@ -5151,7 +5123,7 @@
         <a:ext cx="245887" cy="246550"/>
       </dsp:txXfrm>
     </dsp:sp>
-    <dsp:sp modelId="{F46EE843-9331-4658-BB07-9E488F6BE40F}">
+    <dsp:sp modelId="{AC5DA3F6-BC12-4EFB-8885-CBED78A91B80}">
       <dsp:nvSpPr>
         <dsp:cNvPr id="0" name=""/>
         <dsp:cNvSpPr/>
@@ -5174,31 +5146,29 @@
             <a:alphaOff val="0"/>
           </a:schemeClr>
         </a:solidFill>
-        <a:ln>
-          <a:noFill/>
+        <a:ln w="12700" cap="flat" cmpd="sng" algn="ctr">
+          <a:solidFill>
+            <a:schemeClr val="dk1">
+              <a:shade val="80000"/>
+              <a:hueOff val="0"/>
+              <a:satOff val="0"/>
+              <a:lumOff val="0"/>
+              <a:alphaOff val="0"/>
+            </a:schemeClr>
+          </a:solidFill>
+          <a:prstDash val="solid"/>
+          <a:miter lim="800000"/>
         </a:ln>
         <a:effectLst/>
-        <a:scene3d>
-          <a:camera prst="orthographicFront">
-            <a:rot lat="0" lon="0" rev="0"/>
-          </a:camera>
-          <a:lightRig rig="contrasting" dir="t">
-            <a:rot lat="0" lon="0" rev="1200000"/>
-          </a:lightRig>
-        </a:scene3d>
-        <a:sp3d contourW="19050" prstMaterial="metal">
-          <a:bevelT w="88900" h="203200"/>
-          <a:bevelB w="165100" h="254000"/>
-        </a:sp3d>
       </dsp:spPr>
       <dsp:style>
-        <a:lnRef idx="0">
+        <a:lnRef idx="2">
           <a:scrgbClr r="0" g="0" b="0"/>
         </a:lnRef>
         <a:fillRef idx="1">
           <a:scrgbClr r="0" g="0" b="0"/>
         </a:fillRef>
-        <a:effectRef idx="2">
+        <a:effectRef idx="0">
           <a:scrgbClr r="0" g="0" b="0"/>
         </a:effectRef>
         <a:fontRef idx="minor">
@@ -5282,7 +5252,7 @@
         <a:ext cx="1598684" cy="935916"/>
       </dsp:txXfrm>
     </dsp:sp>
-    <dsp:sp modelId="{2B2B9ABD-C83B-408B-9C62-8BCF95D32E0E}">
+    <dsp:sp modelId="{7AF6076B-F6E4-48D2-B941-932FBF7B5BF8}">
       <dsp:nvSpPr>
         <dsp:cNvPr id="0" name=""/>
         <dsp:cNvSpPr/>
@@ -5311,18 +5281,6 @@
           <a:noFill/>
         </a:ln>
         <a:effectLst/>
-        <a:scene3d>
-          <a:camera prst="orthographicFront">
-            <a:rot lat="0" lon="0" rev="0"/>
-          </a:camera>
-          <a:lightRig rig="contrasting" dir="t">
-            <a:rot lat="0" lon="0" rev="1200000"/>
-          </a:lightRig>
-        </a:scene3d>
-        <a:sp3d z="-182000" contourW="19050" prstMaterial="metal">
-          <a:bevelT w="88900" h="203200"/>
-          <a:bevelB w="165100" h="254000"/>
-        </a:sp3d>
       </dsp:spPr>
       <dsp:style>
         <a:lnRef idx="0">
@@ -5364,7 +5322,7 @@
         <a:ext cx="245887" cy="246550"/>
       </dsp:txXfrm>
     </dsp:sp>
-    <dsp:sp modelId="{E1B631AD-BBC2-4EDF-B8AF-97B4C55E6634}">
+    <dsp:sp modelId="{BDC9D4F9-6BFA-4FBD-ABCD-1E6096C92643}">
       <dsp:nvSpPr>
         <dsp:cNvPr id="0" name=""/>
         <dsp:cNvSpPr/>
@@ -5387,31 +5345,29 @@
             <a:alphaOff val="0"/>
           </a:schemeClr>
         </a:solidFill>
-        <a:ln>
-          <a:noFill/>
+        <a:ln w="12700" cap="flat" cmpd="sng" algn="ctr">
+          <a:solidFill>
+            <a:schemeClr val="dk1">
+              <a:shade val="80000"/>
+              <a:hueOff val="0"/>
+              <a:satOff val="0"/>
+              <a:lumOff val="0"/>
+              <a:alphaOff val="0"/>
+            </a:schemeClr>
+          </a:solidFill>
+          <a:prstDash val="solid"/>
+          <a:miter lim="800000"/>
         </a:ln>
         <a:effectLst/>
-        <a:scene3d>
-          <a:camera prst="orthographicFront">
-            <a:rot lat="0" lon="0" rev="0"/>
-          </a:camera>
-          <a:lightRig rig="contrasting" dir="t">
-            <a:rot lat="0" lon="0" rev="1200000"/>
-          </a:lightRig>
-        </a:scene3d>
-        <a:sp3d contourW="19050" prstMaterial="metal">
-          <a:bevelT w="88900" h="203200"/>
-          <a:bevelB w="165100" h="254000"/>
-        </a:sp3d>
       </dsp:spPr>
       <dsp:style>
-        <a:lnRef idx="0">
+        <a:lnRef idx="2">
           <a:scrgbClr r="0" g="0" b="0"/>
         </a:lnRef>
         <a:fillRef idx="1">
           <a:scrgbClr r="0" g="0" b="0"/>
         </a:fillRef>
-        <a:effectRef idx="2">
+        <a:effectRef idx="0">
           <a:scrgbClr r="0" g="0" b="0"/>
         </a:effectRef>
         <a:fontRef idx="minor">
@@ -5452,7 +5408,7 @@
         <a:ext cx="1598684" cy="935916"/>
       </dsp:txXfrm>
     </dsp:sp>
-    <dsp:sp modelId="{AFA14F17-7D20-4997-B6B3-B68C9189D6AE}">
+    <dsp:sp modelId="{5EBDDE8C-1468-4CA2-9D2A-300F69E062E0}">
       <dsp:nvSpPr>
         <dsp:cNvPr id="0" name=""/>
         <dsp:cNvSpPr/>
@@ -5481,18 +5437,6 @@
           <a:noFill/>
         </a:ln>
         <a:effectLst/>
-        <a:scene3d>
-          <a:camera prst="orthographicFront">
-            <a:rot lat="0" lon="0" rev="0"/>
-          </a:camera>
-          <a:lightRig rig="contrasting" dir="t">
-            <a:rot lat="0" lon="0" rev="1200000"/>
-          </a:lightRig>
-        </a:scene3d>
-        <a:sp3d z="-182000" contourW="19050" prstMaterial="metal">
-          <a:bevelT w="88900" h="203200"/>
-          <a:bevelB w="165100" h="254000"/>
-        </a:sp3d>
       </dsp:spPr>
       <dsp:style>
         <a:lnRef idx="0">
@@ -5534,7 +5478,7 @@
         <a:ext cx="245887" cy="246550"/>
       </dsp:txXfrm>
     </dsp:sp>
-    <dsp:sp modelId="{698E58E8-AF14-4031-A07C-A81D1EE1B47E}">
+    <dsp:sp modelId="{C58AF20F-1669-42BD-9ACE-636E78C80D8D}">
       <dsp:nvSpPr>
         <dsp:cNvPr id="0" name=""/>
         <dsp:cNvSpPr/>
@@ -5557,31 +5501,29 @@
             <a:alphaOff val="0"/>
           </a:schemeClr>
         </a:solidFill>
-        <a:ln>
-          <a:noFill/>
+        <a:ln w="12700" cap="flat" cmpd="sng" algn="ctr">
+          <a:solidFill>
+            <a:schemeClr val="dk1">
+              <a:shade val="80000"/>
+              <a:hueOff val="0"/>
+              <a:satOff val="0"/>
+              <a:lumOff val="0"/>
+              <a:alphaOff val="0"/>
+            </a:schemeClr>
+          </a:solidFill>
+          <a:prstDash val="solid"/>
+          <a:miter lim="800000"/>
         </a:ln>
         <a:effectLst/>
-        <a:scene3d>
-          <a:camera prst="orthographicFront">
-            <a:rot lat="0" lon="0" rev="0"/>
-          </a:camera>
-          <a:lightRig rig="contrasting" dir="t">
-            <a:rot lat="0" lon="0" rev="1200000"/>
-          </a:lightRig>
-        </a:scene3d>
-        <a:sp3d contourW="19050" prstMaterial="metal">
-          <a:bevelT w="88900" h="203200"/>
-          <a:bevelB w="165100" h="254000"/>
-        </a:sp3d>
       </dsp:spPr>
       <dsp:style>
-        <a:lnRef idx="0">
+        <a:lnRef idx="2">
           <a:scrgbClr r="0" g="0" b="0"/>
         </a:lnRef>
         <a:fillRef idx="1">
           <a:scrgbClr r="0" g="0" b="0"/>
         </a:fillRef>
-        <a:effectRef idx="2">
+        <a:effectRef idx="0">
           <a:scrgbClr r="0" g="0" b="0"/>
         </a:effectRef>
         <a:fontRef idx="minor">
@@ -5617,7 +5559,7 @@
         <a:ext cx="1598684" cy="935916"/>
       </dsp:txXfrm>
     </dsp:sp>
-    <dsp:sp modelId="{4AAFA0DD-427F-4A02-AB70-3B417E712B3A}">
+    <dsp:sp modelId="{7557190D-BD84-403C-8960-28C9063E0A41}">
       <dsp:nvSpPr>
         <dsp:cNvPr id="0" name=""/>
         <dsp:cNvSpPr/>
@@ -5646,18 +5588,6 @@
           <a:noFill/>
         </a:ln>
         <a:effectLst/>
-        <a:scene3d>
-          <a:camera prst="orthographicFront">
-            <a:rot lat="0" lon="0" rev="0"/>
-          </a:camera>
-          <a:lightRig rig="contrasting" dir="t">
-            <a:rot lat="0" lon="0" rev="1200000"/>
-          </a:lightRig>
-        </a:scene3d>
-        <a:sp3d z="-182000" contourW="19050" prstMaterial="metal">
-          <a:bevelT w="88900" h="203200"/>
-          <a:bevelB w="165100" h="254000"/>
-        </a:sp3d>
       </dsp:spPr>
       <dsp:style>
         <a:lnRef idx="0">
@@ -5699,7 +5629,7 @@
         <a:ext cx="246550" cy="245887"/>
       </dsp:txXfrm>
     </dsp:sp>
-    <dsp:sp modelId="{392791E9-5F4B-4A5D-9FA8-CE02DFB0F3B7}">
+    <dsp:sp modelId="{CEA0BD65-F717-4769-8AAE-60686BDF38C6}">
       <dsp:nvSpPr>
         <dsp:cNvPr id="0" name=""/>
         <dsp:cNvSpPr/>
@@ -5722,31 +5652,29 @@
             <a:alphaOff val="0"/>
           </a:schemeClr>
         </a:solidFill>
-        <a:ln>
-          <a:noFill/>
+        <a:ln w="12700" cap="flat" cmpd="sng" algn="ctr">
+          <a:solidFill>
+            <a:schemeClr val="dk1">
+              <a:shade val="80000"/>
+              <a:hueOff val="0"/>
+              <a:satOff val="0"/>
+              <a:lumOff val="0"/>
+              <a:alphaOff val="0"/>
+            </a:schemeClr>
+          </a:solidFill>
+          <a:prstDash val="solid"/>
+          <a:miter lim="800000"/>
         </a:ln>
         <a:effectLst/>
-        <a:scene3d>
-          <a:camera prst="orthographicFront">
-            <a:rot lat="0" lon="0" rev="0"/>
-          </a:camera>
-          <a:lightRig rig="contrasting" dir="t">
-            <a:rot lat="0" lon="0" rev="1200000"/>
-          </a:lightRig>
-        </a:scene3d>
-        <a:sp3d contourW="19050" prstMaterial="metal">
-          <a:bevelT w="88900" h="203200"/>
-          <a:bevelB w="165100" h="254000"/>
-        </a:sp3d>
       </dsp:spPr>
       <dsp:style>
-        <a:lnRef idx="0">
+        <a:lnRef idx="2">
           <a:scrgbClr r="0" g="0" b="0"/>
         </a:lnRef>
         <a:fillRef idx="1">
           <a:scrgbClr r="0" g="0" b="0"/>
         </a:fillRef>
-        <a:effectRef idx="2">
+        <a:effectRef idx="0">
           <a:scrgbClr r="0" g="0" b="0"/>
         </a:effectRef>
         <a:fontRef idx="minor">
@@ -5782,7 +5710,7 @@
         <a:ext cx="1598684" cy="935916"/>
       </dsp:txXfrm>
     </dsp:sp>
-    <dsp:sp modelId="{CFEF9A24-ECDB-444A-AB45-0FBA21847897}">
+    <dsp:sp modelId="{410531A4-8815-4C70-A912-5F4BFF301227}">
       <dsp:nvSpPr>
         <dsp:cNvPr id="0" name=""/>
         <dsp:cNvSpPr/>
@@ -5811,18 +5739,6 @@
           <a:noFill/>
         </a:ln>
         <a:effectLst/>
-        <a:scene3d>
-          <a:camera prst="orthographicFront">
-            <a:rot lat="0" lon="0" rev="0"/>
-          </a:camera>
-          <a:lightRig rig="contrasting" dir="t">
-            <a:rot lat="0" lon="0" rev="1200000"/>
-          </a:lightRig>
-        </a:scene3d>
-        <a:sp3d z="-182000" contourW="19050" prstMaterial="metal">
-          <a:bevelT w="88900" h="203200"/>
-          <a:bevelB w="165100" h="254000"/>
-        </a:sp3d>
       </dsp:spPr>
       <dsp:style>
         <a:lnRef idx="0">
@@ -5864,7 +5780,7 @@
         <a:ext cx="245887" cy="246550"/>
       </dsp:txXfrm>
     </dsp:sp>
-    <dsp:sp modelId="{A8C86915-318E-4FAB-860D-17954FCE7779}">
+    <dsp:sp modelId="{341AA5BA-4B19-42C6-8956-FA95EC009B5C}">
       <dsp:nvSpPr>
         <dsp:cNvPr id="0" name=""/>
         <dsp:cNvSpPr/>
@@ -5887,31 +5803,29 @@
             <a:alphaOff val="0"/>
           </a:schemeClr>
         </a:solidFill>
-        <a:ln>
-          <a:noFill/>
+        <a:ln w="12700" cap="flat" cmpd="sng" algn="ctr">
+          <a:solidFill>
+            <a:schemeClr val="dk1">
+              <a:shade val="80000"/>
+              <a:hueOff val="0"/>
+              <a:satOff val="0"/>
+              <a:lumOff val="0"/>
+              <a:alphaOff val="0"/>
+            </a:schemeClr>
+          </a:solidFill>
+          <a:prstDash val="solid"/>
+          <a:miter lim="800000"/>
         </a:ln>
         <a:effectLst/>
-        <a:scene3d>
-          <a:camera prst="orthographicFront">
-            <a:rot lat="0" lon="0" rev="0"/>
-          </a:camera>
-          <a:lightRig rig="contrasting" dir="t">
-            <a:rot lat="0" lon="0" rev="1200000"/>
-          </a:lightRig>
-        </a:scene3d>
-        <a:sp3d contourW="19050" prstMaterial="metal">
-          <a:bevelT w="88900" h="203200"/>
-          <a:bevelB w="165100" h="254000"/>
-        </a:sp3d>
       </dsp:spPr>
       <dsp:style>
-        <a:lnRef idx="0">
+        <a:lnRef idx="2">
           <a:scrgbClr r="0" g="0" b="0"/>
         </a:lnRef>
         <a:fillRef idx="1">
           <a:scrgbClr r="0" g="0" b="0"/>
         </a:fillRef>
-        <a:effectRef idx="2">
+        <a:effectRef idx="0">
           <a:scrgbClr r="0" g="0" b="0"/>
         </a:effectRef>
         <a:fontRef idx="minor">
@@ -5947,7 +5861,7 @@
         <a:ext cx="1598684" cy="935916"/>
       </dsp:txXfrm>
     </dsp:sp>
-    <dsp:sp modelId="{FA5F4AB8-BF6B-4051-86D7-68585D786623}">
+    <dsp:sp modelId="{4B7269C3-4712-4AFA-A269-612EBE88A570}">
       <dsp:nvSpPr>
         <dsp:cNvPr id="0" name=""/>
         <dsp:cNvSpPr/>
@@ -5976,18 +5890,6 @@
           <a:noFill/>
         </a:ln>
         <a:effectLst/>
-        <a:scene3d>
-          <a:camera prst="orthographicFront">
-            <a:rot lat="0" lon="0" rev="0"/>
-          </a:camera>
-          <a:lightRig rig="contrasting" dir="t">
-            <a:rot lat="0" lon="0" rev="1200000"/>
-          </a:lightRig>
-        </a:scene3d>
-        <a:sp3d z="-182000" contourW="19050" prstMaterial="metal">
-          <a:bevelT w="88900" h="203200"/>
-          <a:bevelB w="165100" h="254000"/>
-        </a:sp3d>
       </dsp:spPr>
       <dsp:style>
         <a:lnRef idx="0">
@@ -6029,7 +5931,7 @@
         <a:ext cx="245887" cy="246550"/>
       </dsp:txXfrm>
     </dsp:sp>
-    <dsp:sp modelId="{950E5EBE-44BB-4C92-9EE4-BC22460A4EF9}">
+    <dsp:sp modelId="{17C43CC8-89E5-42D9-897A-A0E634920B88}">
       <dsp:nvSpPr>
         <dsp:cNvPr id="0" name=""/>
         <dsp:cNvSpPr/>
@@ -6052,31 +5954,29 @@
             <a:alphaOff val="0"/>
           </a:schemeClr>
         </a:solidFill>
-        <a:ln>
-          <a:noFill/>
+        <a:ln w="12700" cap="flat" cmpd="sng" algn="ctr">
+          <a:solidFill>
+            <a:schemeClr val="dk1">
+              <a:shade val="80000"/>
+              <a:hueOff val="0"/>
+              <a:satOff val="0"/>
+              <a:lumOff val="0"/>
+              <a:alphaOff val="0"/>
+            </a:schemeClr>
+          </a:solidFill>
+          <a:prstDash val="solid"/>
+          <a:miter lim="800000"/>
         </a:ln>
         <a:effectLst/>
-        <a:scene3d>
-          <a:camera prst="orthographicFront">
-            <a:rot lat="0" lon="0" rev="0"/>
-          </a:camera>
-          <a:lightRig rig="contrasting" dir="t">
-            <a:rot lat="0" lon="0" rev="1200000"/>
-          </a:lightRig>
-        </a:scene3d>
-        <a:sp3d contourW="19050" prstMaterial="metal">
-          <a:bevelT w="88900" h="203200"/>
-          <a:bevelB w="165100" h="254000"/>
-        </a:sp3d>
       </dsp:spPr>
       <dsp:style>
-        <a:lnRef idx="0">
+        <a:lnRef idx="2">
           <a:scrgbClr r="0" g="0" b="0"/>
         </a:lnRef>
         <a:fillRef idx="1">
           <a:scrgbClr r="0" g="0" b="0"/>
         </a:fillRef>
-        <a:effectRef idx="2">
+        <a:effectRef idx="0">
           <a:scrgbClr r="0" g="0" b="0"/>
         </a:effectRef>
         <a:fontRef idx="minor">
@@ -6112,7 +6012,7 @@
         <a:ext cx="1598684" cy="935916"/>
       </dsp:txXfrm>
     </dsp:sp>
-    <dsp:sp modelId="{46AA52BC-8B6D-46A3-A636-CF9997F06AA4}">
+    <dsp:sp modelId="{753DAADC-2DC2-4646-8545-1D7C89C91F5A}">
       <dsp:nvSpPr>
         <dsp:cNvPr id="0" name=""/>
         <dsp:cNvSpPr/>
@@ -6141,18 +6041,6 @@
           <a:noFill/>
         </a:ln>
         <a:effectLst/>
-        <a:scene3d>
-          <a:camera prst="orthographicFront">
-            <a:rot lat="0" lon="0" rev="0"/>
-          </a:camera>
-          <a:lightRig rig="contrasting" dir="t">
-            <a:rot lat="0" lon="0" rev="1200000"/>
-          </a:lightRig>
-        </a:scene3d>
-        <a:sp3d z="-182000" contourW="19050" prstMaterial="metal">
-          <a:bevelT w="88900" h="203200"/>
-          <a:bevelB w="165100" h="254000"/>
-        </a:sp3d>
       </dsp:spPr>
       <dsp:style>
         <a:lnRef idx="0">
@@ -6194,7 +6082,7 @@
         <a:ext cx="245887" cy="246550"/>
       </dsp:txXfrm>
     </dsp:sp>
-    <dsp:sp modelId="{49308249-96A5-498C-8AC7-09736140A2A8}">
+    <dsp:sp modelId="{2CA64BA6-F8FC-4DB6-8782-658549C2A2F5}">
       <dsp:nvSpPr>
         <dsp:cNvPr id="0" name=""/>
         <dsp:cNvSpPr/>
@@ -6217,31 +6105,29 @@
             <a:alphaOff val="0"/>
           </a:schemeClr>
         </a:solidFill>
-        <a:ln>
-          <a:noFill/>
+        <a:ln w="12700" cap="flat" cmpd="sng" algn="ctr">
+          <a:solidFill>
+            <a:schemeClr val="dk1">
+              <a:shade val="80000"/>
+              <a:hueOff val="0"/>
+              <a:satOff val="0"/>
+              <a:lumOff val="0"/>
+              <a:alphaOff val="0"/>
+            </a:schemeClr>
+          </a:solidFill>
+          <a:prstDash val="solid"/>
+          <a:miter lim="800000"/>
         </a:ln>
         <a:effectLst/>
-        <a:scene3d>
-          <a:camera prst="orthographicFront">
-            <a:rot lat="0" lon="0" rev="0"/>
-          </a:camera>
-          <a:lightRig rig="contrasting" dir="t">
-            <a:rot lat="0" lon="0" rev="1200000"/>
-          </a:lightRig>
-        </a:scene3d>
-        <a:sp3d contourW="19050" prstMaterial="metal">
-          <a:bevelT w="88900" h="203200"/>
-          <a:bevelB w="165100" h="254000"/>
-        </a:sp3d>
       </dsp:spPr>
       <dsp:style>
-        <a:lnRef idx="0">
+        <a:lnRef idx="2">
           <a:scrgbClr r="0" g="0" b="0"/>
         </a:lnRef>
         <a:fillRef idx="1">
           <a:scrgbClr r="0" g="0" b="0"/>
         </a:fillRef>
-        <a:effectRef idx="2">
+        <a:effectRef idx="0">
           <a:scrgbClr r="0" g="0" b="0"/>
         </a:effectRef>
         <a:fontRef idx="minor">
@@ -6277,7 +6163,7 @@
         <a:ext cx="1598684" cy="935916"/>
       </dsp:txXfrm>
     </dsp:sp>
-    <dsp:sp modelId="{7BF54FDC-96D6-4CEB-B263-D3B76D35F08D}">
+    <dsp:sp modelId="{C8DC4A97-B93F-49C9-A57A-6ED88871F429}">
       <dsp:nvSpPr>
         <dsp:cNvPr id="0" name=""/>
         <dsp:cNvSpPr/>
@@ -6306,18 +6192,6 @@
           <a:noFill/>
         </a:ln>
         <a:effectLst/>
-        <a:scene3d>
-          <a:camera prst="orthographicFront">
-            <a:rot lat="0" lon="0" rev="0"/>
-          </a:camera>
-          <a:lightRig rig="contrasting" dir="t">
-            <a:rot lat="0" lon="0" rev="1200000"/>
-          </a:lightRig>
-        </a:scene3d>
-        <a:sp3d z="-182000" contourW="19050" prstMaterial="metal">
-          <a:bevelT w="88900" h="203200"/>
-          <a:bevelB w="165100" h="254000"/>
-        </a:sp3d>
       </dsp:spPr>
       <dsp:style>
         <a:lnRef idx="0">
@@ -6359,7 +6233,7 @@
         <a:ext cx="245887" cy="246550"/>
       </dsp:txXfrm>
     </dsp:sp>
-    <dsp:sp modelId="{BC801E3C-457A-409A-B127-A8456892A3E7}">
+    <dsp:sp modelId="{7A916C5C-A383-4442-8ABE-0E566FAF7F88}">
       <dsp:nvSpPr>
         <dsp:cNvPr id="0" name=""/>
         <dsp:cNvSpPr/>
@@ -6382,31 +6256,29 @@
             <a:alphaOff val="0"/>
           </a:schemeClr>
         </a:solidFill>
-        <a:ln>
-          <a:noFill/>
+        <a:ln w="12700" cap="flat" cmpd="sng" algn="ctr">
+          <a:solidFill>
+            <a:schemeClr val="dk1">
+              <a:shade val="80000"/>
+              <a:hueOff val="0"/>
+              <a:satOff val="0"/>
+              <a:lumOff val="0"/>
+              <a:alphaOff val="0"/>
+            </a:schemeClr>
+          </a:solidFill>
+          <a:prstDash val="solid"/>
+          <a:miter lim="800000"/>
         </a:ln>
         <a:effectLst/>
-        <a:scene3d>
-          <a:camera prst="orthographicFront">
-            <a:rot lat="0" lon="0" rev="0"/>
-          </a:camera>
-          <a:lightRig rig="contrasting" dir="t">
-            <a:rot lat="0" lon="0" rev="1200000"/>
-          </a:lightRig>
-        </a:scene3d>
-        <a:sp3d contourW="19050" prstMaterial="metal">
-          <a:bevelT w="88900" h="203200"/>
-          <a:bevelB w="165100" h="254000"/>
-        </a:sp3d>
       </dsp:spPr>
       <dsp:style>
-        <a:lnRef idx="0">
+        <a:lnRef idx="2">
           <a:scrgbClr r="0" g="0" b="0"/>
         </a:lnRef>
         <a:fillRef idx="1">
           <a:scrgbClr r="0" g="0" b="0"/>
         </a:fillRef>
-        <a:effectRef idx="2">
+        <a:effectRef idx="0">
           <a:scrgbClr r="0" g="0" b="0"/>
         </a:effectRef>
         <a:fontRef idx="minor">
@@ -6442,7 +6314,7 @@
         <a:ext cx="1598684" cy="935916"/>
       </dsp:txXfrm>
     </dsp:sp>
-    <dsp:sp modelId="{4FFE8EC9-D9A2-40A7-A437-D999A4E561AD}">
+    <dsp:sp modelId="{F09400A7-1C09-4CAA-8CEC-B5CC4FCF0436}">
       <dsp:nvSpPr>
         <dsp:cNvPr id="0" name=""/>
         <dsp:cNvSpPr/>
@@ -6471,18 +6343,6 @@
           <a:noFill/>
         </a:ln>
         <a:effectLst/>
-        <a:scene3d>
-          <a:camera prst="orthographicFront">
-            <a:rot lat="0" lon="0" rev="0"/>
-          </a:camera>
-          <a:lightRig rig="contrasting" dir="t">
-            <a:rot lat="0" lon="0" rev="1200000"/>
-          </a:lightRig>
-        </a:scene3d>
-        <a:sp3d z="-182000" contourW="19050" prstMaterial="metal">
-          <a:bevelT w="88900" h="203200"/>
-          <a:bevelB w="165100" h="254000"/>
-        </a:sp3d>
       </dsp:spPr>
       <dsp:style>
         <a:lnRef idx="0">
@@ -6524,7 +6384,7 @@
         <a:ext cx="246550" cy="245887"/>
       </dsp:txXfrm>
     </dsp:sp>
-    <dsp:sp modelId="{9F885388-DD9F-4FC9-B8FD-7AEB89374FF2}">
+    <dsp:sp modelId="{3B377935-DD62-49ED-861C-ADAE53057C46}">
       <dsp:nvSpPr>
         <dsp:cNvPr id="0" name=""/>
         <dsp:cNvSpPr/>
@@ -6547,31 +6407,29 @@
             <a:alphaOff val="0"/>
           </a:schemeClr>
         </a:solidFill>
-        <a:ln>
-          <a:noFill/>
+        <a:ln w="12700" cap="flat" cmpd="sng" algn="ctr">
+          <a:solidFill>
+            <a:schemeClr val="dk1">
+              <a:shade val="80000"/>
+              <a:hueOff val="0"/>
+              <a:satOff val="0"/>
+              <a:lumOff val="0"/>
+              <a:alphaOff val="0"/>
+            </a:schemeClr>
+          </a:solidFill>
+          <a:prstDash val="solid"/>
+          <a:miter lim="800000"/>
         </a:ln>
         <a:effectLst/>
-        <a:scene3d>
-          <a:camera prst="orthographicFront">
-            <a:rot lat="0" lon="0" rev="0"/>
-          </a:camera>
-          <a:lightRig rig="contrasting" dir="t">
-            <a:rot lat="0" lon="0" rev="1200000"/>
-          </a:lightRig>
-        </a:scene3d>
-        <a:sp3d contourW="19050" prstMaterial="metal">
-          <a:bevelT w="88900" h="203200"/>
-          <a:bevelB w="165100" h="254000"/>
-        </a:sp3d>
       </dsp:spPr>
       <dsp:style>
-        <a:lnRef idx="0">
+        <a:lnRef idx="2">
           <a:scrgbClr r="0" g="0" b="0"/>
         </a:lnRef>
         <a:fillRef idx="1">
           <a:scrgbClr r="0" g="0" b="0"/>
         </a:fillRef>
-        <a:effectRef idx="2">
+        <a:effectRef idx="0">
           <a:scrgbClr r="0" g="0" b="0"/>
         </a:effectRef>
         <a:fontRef idx="minor">
@@ -6607,7 +6465,7 @@
         <a:ext cx="1598684" cy="935916"/>
       </dsp:txXfrm>
     </dsp:sp>
-    <dsp:sp modelId="{82A205C9-B43F-4750-8554-98B9F4070306}">
+    <dsp:sp modelId="{E0F896DA-1C5B-4BB5-9200-9DB6D15CD0F4}">
       <dsp:nvSpPr>
         <dsp:cNvPr id="0" name=""/>
         <dsp:cNvSpPr/>
@@ -6636,18 +6494,6 @@
           <a:noFill/>
         </a:ln>
         <a:effectLst/>
-        <a:scene3d>
-          <a:camera prst="orthographicFront">
-            <a:rot lat="0" lon="0" rev="0"/>
-          </a:camera>
-          <a:lightRig rig="contrasting" dir="t">
-            <a:rot lat="0" lon="0" rev="1200000"/>
-          </a:lightRig>
-        </a:scene3d>
-        <a:sp3d z="-182000" contourW="19050" prstMaterial="metal">
-          <a:bevelT w="88900" h="203200"/>
-          <a:bevelB w="165100" h="254000"/>
-        </a:sp3d>
       </dsp:spPr>
       <dsp:style>
         <a:lnRef idx="0">
@@ -6689,7 +6535,7 @@
         <a:ext cx="245887" cy="246550"/>
       </dsp:txXfrm>
     </dsp:sp>
-    <dsp:sp modelId="{FBCBAEE7-C221-48EF-A1A6-E811F960AB76}">
+    <dsp:sp modelId="{0D152BF3-CDA8-438C-9FBF-80B154BE6C02}">
       <dsp:nvSpPr>
         <dsp:cNvPr id="0" name=""/>
         <dsp:cNvSpPr/>
@@ -6712,31 +6558,29 @@
             <a:alphaOff val="0"/>
           </a:schemeClr>
         </a:solidFill>
-        <a:ln>
-          <a:noFill/>
+        <a:ln w="12700" cap="flat" cmpd="sng" algn="ctr">
+          <a:solidFill>
+            <a:schemeClr val="dk1">
+              <a:shade val="80000"/>
+              <a:hueOff val="0"/>
+              <a:satOff val="0"/>
+              <a:lumOff val="0"/>
+              <a:alphaOff val="0"/>
+            </a:schemeClr>
+          </a:solidFill>
+          <a:prstDash val="solid"/>
+          <a:miter lim="800000"/>
         </a:ln>
         <a:effectLst/>
-        <a:scene3d>
-          <a:camera prst="orthographicFront">
-            <a:rot lat="0" lon="0" rev="0"/>
-          </a:camera>
-          <a:lightRig rig="contrasting" dir="t">
-            <a:rot lat="0" lon="0" rev="1200000"/>
-          </a:lightRig>
-        </a:scene3d>
-        <a:sp3d contourW="19050" prstMaterial="metal">
-          <a:bevelT w="88900" h="203200"/>
-          <a:bevelB w="165100" h="254000"/>
-        </a:sp3d>
       </dsp:spPr>
       <dsp:style>
-        <a:lnRef idx="0">
+        <a:lnRef idx="2">
           <a:scrgbClr r="0" g="0" b="0"/>
         </a:lnRef>
         <a:fillRef idx="1">
           <a:scrgbClr r="0" g="0" b="0"/>
         </a:fillRef>
-        <a:effectRef idx="2">
+        <a:effectRef idx="0">
           <a:scrgbClr r="0" g="0" b="0"/>
         </a:effectRef>
         <a:fontRef idx="minor">
@@ -6777,7 +6621,7 @@
         <a:ext cx="1598684" cy="935916"/>
       </dsp:txXfrm>
     </dsp:sp>
-    <dsp:sp modelId="{61B62871-FB35-4F21-8737-103845057CBF}">
+    <dsp:sp modelId="{3C1633DE-B658-47F6-9062-D832C6035B5D}">
       <dsp:nvSpPr>
         <dsp:cNvPr id="0" name=""/>
         <dsp:cNvSpPr/>
@@ -6806,18 +6650,6 @@
           <a:noFill/>
         </a:ln>
         <a:effectLst/>
-        <a:scene3d>
-          <a:camera prst="orthographicFront">
-            <a:rot lat="0" lon="0" rev="0"/>
-          </a:camera>
-          <a:lightRig rig="contrasting" dir="t">
-            <a:rot lat="0" lon="0" rev="1200000"/>
-          </a:lightRig>
-        </a:scene3d>
-        <a:sp3d z="-182000" contourW="19050" prstMaterial="metal">
-          <a:bevelT w="88900" h="203200"/>
-          <a:bevelB w="165100" h="254000"/>
-        </a:sp3d>
       </dsp:spPr>
       <dsp:style>
         <a:lnRef idx="0">
@@ -6859,7 +6691,7 @@
         <a:ext cx="245887" cy="246550"/>
       </dsp:txXfrm>
     </dsp:sp>
-    <dsp:sp modelId="{F5037606-C157-4155-BED8-849633FCB3A8}">
+    <dsp:sp modelId="{92184039-C2F0-49BA-9552-41BCEBCC15D8}">
       <dsp:nvSpPr>
         <dsp:cNvPr id="0" name=""/>
         <dsp:cNvSpPr/>
@@ -6882,31 +6714,29 @@
             <a:alphaOff val="0"/>
           </a:schemeClr>
         </a:solidFill>
-        <a:ln>
-          <a:noFill/>
+        <a:ln w="12700" cap="flat" cmpd="sng" algn="ctr">
+          <a:solidFill>
+            <a:schemeClr val="dk1">
+              <a:shade val="80000"/>
+              <a:hueOff val="0"/>
+              <a:satOff val="0"/>
+              <a:lumOff val="0"/>
+              <a:alphaOff val="0"/>
+            </a:schemeClr>
+          </a:solidFill>
+          <a:prstDash val="solid"/>
+          <a:miter lim="800000"/>
         </a:ln>
         <a:effectLst/>
-        <a:scene3d>
-          <a:camera prst="orthographicFront">
-            <a:rot lat="0" lon="0" rev="0"/>
-          </a:camera>
-          <a:lightRig rig="contrasting" dir="t">
-            <a:rot lat="0" lon="0" rev="1200000"/>
-          </a:lightRig>
-        </a:scene3d>
-        <a:sp3d contourW="19050" prstMaterial="metal">
-          <a:bevelT w="88900" h="203200"/>
-          <a:bevelB w="165100" h="254000"/>
-        </a:sp3d>
       </dsp:spPr>
       <dsp:style>
-        <a:lnRef idx="0">
+        <a:lnRef idx="2">
           <a:scrgbClr r="0" g="0" b="0"/>
         </a:lnRef>
         <a:fillRef idx="1">
           <a:scrgbClr r="0" g="0" b="0"/>
         </a:fillRef>
-        <a:effectRef idx="2">
+        <a:effectRef idx="0">
           <a:scrgbClr r="0" g="0" b="0"/>
         </a:effectRef>
         <a:fontRef idx="minor">
@@ -6942,7 +6772,7 @@
         <a:ext cx="1598684" cy="935916"/>
       </dsp:txXfrm>
     </dsp:sp>
-    <dsp:sp modelId="{8E93EF29-2DA9-4450-A94E-E84C7B43096D}">
+    <dsp:sp modelId="{EF4EE57F-91C1-43A1-A371-A8AAD541BC2A}">
       <dsp:nvSpPr>
         <dsp:cNvPr id="0" name=""/>
         <dsp:cNvSpPr/>
@@ -6971,18 +6801,6 @@
           <a:noFill/>
         </a:ln>
         <a:effectLst/>
-        <a:scene3d>
-          <a:camera prst="orthographicFront">
-            <a:rot lat="0" lon="0" rev="0"/>
-          </a:camera>
-          <a:lightRig rig="contrasting" dir="t">
-            <a:rot lat="0" lon="0" rev="1200000"/>
-          </a:lightRig>
-        </a:scene3d>
-        <a:sp3d z="-182000" contourW="19050" prstMaterial="metal">
-          <a:bevelT w="88900" h="203200"/>
-          <a:bevelB w="165100" h="254000"/>
-        </a:sp3d>
       </dsp:spPr>
       <dsp:style>
         <a:lnRef idx="0">
@@ -7024,7 +6842,7 @@
         <a:ext cx="245887" cy="246550"/>
       </dsp:txXfrm>
     </dsp:sp>
-    <dsp:sp modelId="{AA2CF8B9-19B1-4347-9C12-2F0D171E7FED}">
+    <dsp:sp modelId="{12CE1CFD-B93F-4649-9E0B-098C55B343AE}">
       <dsp:nvSpPr>
         <dsp:cNvPr id="0" name=""/>
         <dsp:cNvSpPr/>
@@ -7047,31 +6865,29 @@
             <a:alphaOff val="0"/>
           </a:schemeClr>
         </a:solidFill>
-        <a:ln>
-          <a:noFill/>
+        <a:ln w="12700" cap="flat" cmpd="sng" algn="ctr">
+          <a:solidFill>
+            <a:schemeClr val="dk1">
+              <a:shade val="80000"/>
+              <a:hueOff val="0"/>
+              <a:satOff val="0"/>
+              <a:lumOff val="0"/>
+              <a:alphaOff val="0"/>
+            </a:schemeClr>
+          </a:solidFill>
+          <a:prstDash val="solid"/>
+          <a:miter lim="800000"/>
         </a:ln>
         <a:effectLst/>
-        <a:scene3d>
-          <a:camera prst="orthographicFront">
-            <a:rot lat="0" lon="0" rev="0"/>
-          </a:camera>
-          <a:lightRig rig="contrasting" dir="t">
-            <a:rot lat="0" lon="0" rev="1200000"/>
-          </a:lightRig>
-        </a:scene3d>
-        <a:sp3d contourW="19050" prstMaterial="metal">
-          <a:bevelT w="88900" h="203200"/>
-          <a:bevelB w="165100" h="254000"/>
-        </a:sp3d>
       </dsp:spPr>
       <dsp:style>
-        <a:lnRef idx="0">
+        <a:lnRef idx="2">
           <a:scrgbClr r="0" g="0" b="0"/>
         </a:lnRef>
         <a:fillRef idx="1">
           <a:scrgbClr r="0" g="0" b="0"/>
         </a:fillRef>
-        <a:effectRef idx="2">
+        <a:effectRef idx="0">
           <a:scrgbClr r="0" g="0" b="0"/>
         </a:effectRef>
         <a:fontRef idx="minor">
@@ -7107,7 +6923,7 @@
         <a:ext cx="1598684" cy="935916"/>
       </dsp:txXfrm>
     </dsp:sp>
-    <dsp:sp modelId="{2BE4EF29-79FD-4B6C-B4B7-7871815716AD}">
+    <dsp:sp modelId="{EBF866C1-118F-4269-9E20-52CB3BB6C7E7}">
       <dsp:nvSpPr>
         <dsp:cNvPr id="0" name=""/>
         <dsp:cNvSpPr/>
@@ -7136,18 +6952,6 @@
           <a:noFill/>
         </a:ln>
         <a:effectLst/>
-        <a:scene3d>
-          <a:camera prst="orthographicFront">
-            <a:rot lat="0" lon="0" rev="0"/>
-          </a:camera>
-          <a:lightRig rig="contrasting" dir="t">
-            <a:rot lat="0" lon="0" rev="1200000"/>
-          </a:lightRig>
-        </a:scene3d>
-        <a:sp3d z="-182000" contourW="19050" prstMaterial="metal">
-          <a:bevelT w="88900" h="203200"/>
-          <a:bevelB w="165100" h="254000"/>
-        </a:sp3d>
       </dsp:spPr>
       <dsp:style>
         <a:lnRef idx="0">
@@ -7189,7 +6993,7 @@
         <a:ext cx="245887" cy="246550"/>
       </dsp:txXfrm>
     </dsp:sp>
-    <dsp:sp modelId="{895B3D7B-4668-43EF-92F3-F16B71473439}">
+    <dsp:sp modelId="{B5F89BEC-1ADB-4A7C-9AC2-FA8321D875EE}">
       <dsp:nvSpPr>
         <dsp:cNvPr id="0" name=""/>
         <dsp:cNvSpPr/>
@@ -7212,31 +7016,29 @@
             <a:alphaOff val="0"/>
           </a:schemeClr>
         </a:solidFill>
-        <a:ln>
-          <a:noFill/>
+        <a:ln w="12700" cap="flat" cmpd="sng" algn="ctr">
+          <a:solidFill>
+            <a:schemeClr val="dk1">
+              <a:shade val="80000"/>
+              <a:hueOff val="0"/>
+              <a:satOff val="0"/>
+              <a:lumOff val="0"/>
+              <a:alphaOff val="0"/>
+            </a:schemeClr>
+          </a:solidFill>
+          <a:prstDash val="solid"/>
+          <a:miter lim="800000"/>
         </a:ln>
         <a:effectLst/>
-        <a:scene3d>
-          <a:camera prst="orthographicFront">
-            <a:rot lat="0" lon="0" rev="0"/>
-          </a:camera>
-          <a:lightRig rig="contrasting" dir="t">
-            <a:rot lat="0" lon="0" rev="1200000"/>
-          </a:lightRig>
-        </a:scene3d>
-        <a:sp3d contourW="19050" prstMaterial="metal">
-          <a:bevelT w="88900" h="203200"/>
-          <a:bevelB w="165100" h="254000"/>
-        </a:sp3d>
       </dsp:spPr>
       <dsp:style>
-        <a:lnRef idx="0">
+        <a:lnRef idx="2">
           <a:scrgbClr r="0" g="0" b="0"/>
         </a:lnRef>
         <a:fillRef idx="1">
           <a:scrgbClr r="0" g="0" b="0"/>
         </a:fillRef>
-        <a:effectRef idx="2">
+        <a:effectRef idx="0">
           <a:scrgbClr r="0" g="0" b="0"/>
         </a:effectRef>
         <a:fontRef idx="minor">
@@ -8949,11 +8751,11 @@
 </file>
 
 <file path=ppt/diagrams/quickStyle2.xml><?xml version="1.0" encoding="utf-8"?>
-<dgm:styleDef xmlns:dgm="http://schemas.openxmlformats.org/drawingml/2006/diagram" xmlns:a="http://schemas.openxmlformats.org/drawingml/2006/main" uniqueId="urn:microsoft.com/office/officeart/2005/8/quickstyle/3d3">
+<dgm:styleDef xmlns:dgm="http://schemas.openxmlformats.org/drawingml/2006/diagram" xmlns:a="http://schemas.openxmlformats.org/drawingml/2006/main" uniqueId="urn:microsoft.com/office/officeart/2005/8/quickstyle/simple1">
   <dgm:title val=""/>
   <dgm:desc val=""/>
   <dgm:catLst>
-    <dgm:cat type="3D" pri="11300"/>
+    <dgm:cat type="simple" pri="10100"/>
   </dgm:catLst>
   <dgm:scene3d>
     <a:camera prst="orthographicFront"/>
@@ -8961,26 +8763,19 @@
   </dgm:scene3d>
   <dgm:styleLbl name="node0">
     <dgm:scene3d>
-      <a:camera prst="orthographicFront">
-        <a:rot lat="0" lon="0" rev="0"/>
-      </a:camera>
-      <a:lightRig rig="contrasting" dir="t">
-        <a:rot lat="0" lon="0" rev="1200000"/>
-      </a:lightRig>
+      <a:camera prst="orthographicFront"/>
+      <a:lightRig rig="threePt" dir="t"/>
     </dgm:scene3d>
-    <dgm:sp3d contourW="19050" prstMaterial="metal">
-      <a:bevelT w="88900" h="203200"/>
-      <a:bevelB w="165100" h="254000"/>
-    </dgm:sp3d>
+    <dgm:sp3d/>
     <dgm:txPr/>
     <dgm:style>
-      <a:lnRef idx="0">
+      <a:lnRef idx="2">
         <a:scrgbClr r="0" g="0" b="0"/>
       </a:lnRef>
       <a:fillRef idx="1">
         <a:scrgbClr r="0" g="0" b="0"/>
       </a:fillRef>
-      <a:effectRef idx="1">
+      <a:effectRef idx="0">
         <a:scrgbClr r="0" g="0" b="0"/>
       </a:effectRef>
       <a:fontRef idx="minor">
@@ -8990,26 +8785,19 @@
   </dgm:styleLbl>
   <dgm:styleLbl name="lnNode1">
     <dgm:scene3d>
-      <a:camera prst="orthographicFront">
-        <a:rot lat="0" lon="0" rev="0"/>
-      </a:camera>
-      <a:lightRig rig="contrasting" dir="t">
-        <a:rot lat="0" lon="0" rev="1200000"/>
-      </a:lightRig>
+      <a:camera prst="orthographicFront"/>
+      <a:lightRig rig="threePt" dir="t"/>
     </dgm:scene3d>
-    <dgm:sp3d contourW="19050" prstMaterial="metal">
-      <a:bevelT w="88900" h="203200"/>
-      <a:bevelB w="165100" h="254000"/>
-    </dgm:sp3d>
+    <dgm:sp3d/>
     <dgm:txPr/>
     <dgm:style>
-      <a:lnRef idx="0">
+      <a:lnRef idx="2">
         <a:scrgbClr r="0" g="0" b="0"/>
       </a:lnRef>
       <a:fillRef idx="1">
         <a:scrgbClr r="0" g="0" b="0"/>
       </a:fillRef>
-      <a:effectRef idx="1">
+      <a:effectRef idx="0">
         <a:scrgbClr r="0" g="0" b="0"/>
       </a:effectRef>
       <a:fontRef idx="minor">
@@ -9019,20 +8807,13 @@
   </dgm:styleLbl>
   <dgm:styleLbl name="vennNode1">
     <dgm:scene3d>
-      <a:camera prst="orthographicFront">
-        <a:rot lat="0" lon="0" rev="0"/>
-      </a:camera>
-      <a:lightRig rig="contrasting" dir="t">
-        <a:rot lat="0" lon="0" rev="1200000"/>
-      </a:lightRig>
+      <a:camera prst="orthographicFront"/>
+      <a:lightRig rig="threePt" dir="t"/>
     </dgm:scene3d>
-    <dgm:sp3d contourW="12700" prstMaterial="clear">
-      <a:bevelT w="177800" h="254000"/>
-      <a:bevelB w="152400"/>
-    </dgm:sp3d>
+    <dgm:sp3d/>
     <dgm:txPr/>
     <dgm:style>
-      <a:lnRef idx="0">
+      <a:lnRef idx="2">
         <a:scrgbClr r="0" g="0" b="0"/>
       </a:lnRef>
       <a:fillRef idx="1">
@@ -9048,26 +8829,19 @@
   </dgm:styleLbl>
   <dgm:styleLbl name="alignNode1">
     <dgm:scene3d>
-      <a:camera prst="orthographicFront">
-        <a:rot lat="0" lon="0" rev="0"/>
-      </a:camera>
-      <a:lightRig rig="contrasting" dir="t">
-        <a:rot lat="0" lon="0" rev="1200000"/>
-      </a:lightRig>
+      <a:camera prst="orthographicFront"/>
+      <a:lightRig rig="threePt" dir="t"/>
     </dgm:scene3d>
-    <dgm:sp3d contourW="19050" prstMaterial="metal">
-      <a:bevelT w="88900" h="203200"/>
-      <a:bevelB w="165100" h="254000"/>
-    </dgm:sp3d>
+    <dgm:sp3d/>
     <dgm:txPr/>
     <dgm:style>
-      <a:lnRef idx="0">
+      <a:lnRef idx="2">
         <a:scrgbClr r="0" g="0" b="0"/>
       </a:lnRef>
       <a:fillRef idx="1">
         <a:scrgbClr r="0" g="0" b="0"/>
       </a:fillRef>
-      <a:effectRef idx="2">
+      <a:effectRef idx="0">
         <a:scrgbClr r="0" g="0" b="0"/>
       </a:effectRef>
       <a:fontRef idx="minor">
@@ -9077,26 +8851,19 @@
   </dgm:styleLbl>
   <dgm:styleLbl name="node1">
     <dgm:scene3d>
-      <a:camera prst="orthographicFront">
-        <a:rot lat="0" lon="0" rev="0"/>
-      </a:camera>
-      <a:lightRig rig="contrasting" dir="t">
-        <a:rot lat="0" lon="0" rev="1200000"/>
-      </a:lightRig>
+      <a:camera prst="orthographicFront"/>
+      <a:lightRig rig="threePt" dir="t"/>
     </dgm:scene3d>
-    <dgm:sp3d contourW="19050" prstMaterial="metal">
-      <a:bevelT w="88900" h="203200"/>
-      <a:bevelB w="165100" h="254000"/>
-    </dgm:sp3d>
+    <dgm:sp3d/>
     <dgm:txPr/>
     <dgm:style>
-      <a:lnRef idx="0">
+      <a:lnRef idx="2">
         <a:scrgbClr r="0" g="0" b="0"/>
       </a:lnRef>
       <a:fillRef idx="1">
         <a:scrgbClr r="0" g="0" b="0"/>
       </a:fillRef>
-      <a:effectRef idx="2">
+      <a:effectRef idx="0">
         <a:scrgbClr r="0" g="0" b="0"/>
       </a:effectRef>
       <a:fontRef idx="minor">
@@ -9106,26 +8873,19 @@
   </dgm:styleLbl>
   <dgm:styleLbl name="node2">
     <dgm:scene3d>
-      <a:camera prst="orthographicFront">
-        <a:rot lat="0" lon="0" rev="0"/>
-      </a:camera>
-      <a:lightRig rig="contrasting" dir="t">
-        <a:rot lat="0" lon="0" rev="1200000"/>
-      </a:lightRig>
+      <a:camera prst="orthographicFront"/>
+      <a:lightRig rig="threePt" dir="t"/>
     </dgm:scene3d>
-    <dgm:sp3d contourW="19050" prstMaterial="metal">
-      <a:bevelT w="88900" h="203200"/>
-      <a:bevelB w="165100" h="254000"/>
-    </dgm:sp3d>
+    <dgm:sp3d/>
     <dgm:txPr/>
     <dgm:style>
-      <a:lnRef idx="0">
+      <a:lnRef idx="2">
         <a:scrgbClr r="0" g="0" b="0"/>
       </a:lnRef>
       <a:fillRef idx="1">
         <a:scrgbClr r="0" g="0" b="0"/>
       </a:fillRef>
-      <a:effectRef idx="1">
+      <a:effectRef idx="0">
         <a:scrgbClr r="0" g="0" b="0"/>
       </a:effectRef>
       <a:fontRef idx="minor">
@@ -9135,26 +8895,19 @@
   </dgm:styleLbl>
   <dgm:styleLbl name="node3">
     <dgm:scene3d>
-      <a:camera prst="orthographicFront">
-        <a:rot lat="0" lon="0" rev="0"/>
-      </a:camera>
-      <a:lightRig rig="contrasting" dir="t">
-        <a:rot lat="0" lon="0" rev="1200000"/>
-      </a:lightRig>
+      <a:camera prst="orthographicFront"/>
+      <a:lightRig rig="threePt" dir="t"/>
     </dgm:scene3d>
-    <dgm:sp3d contourW="19050" prstMaterial="metal">
-      <a:bevelT w="88900" h="203200"/>
-      <a:bevelB w="165100" h="254000"/>
-    </dgm:sp3d>
+    <dgm:sp3d/>
     <dgm:txPr/>
     <dgm:style>
-      <a:lnRef idx="0">
+      <a:lnRef idx="2">
         <a:scrgbClr r="0" g="0" b="0"/>
       </a:lnRef>
       <a:fillRef idx="1">
         <a:scrgbClr r="0" g="0" b="0"/>
       </a:fillRef>
-      <a:effectRef idx="1">
+      <a:effectRef idx="0">
         <a:scrgbClr r="0" g="0" b="0"/>
       </a:effectRef>
       <a:fontRef idx="minor">
@@ -9164,26 +8917,19 @@
   </dgm:styleLbl>
   <dgm:styleLbl name="node4">
     <dgm:scene3d>
-      <a:camera prst="orthographicFront">
-        <a:rot lat="0" lon="0" rev="0"/>
-      </a:camera>
-      <a:lightRig rig="contrasting" dir="t">
-        <a:rot lat="0" lon="0" rev="1200000"/>
-      </a:lightRig>
+      <a:camera prst="orthographicFront"/>
+      <a:lightRig rig="threePt" dir="t"/>
     </dgm:scene3d>
-    <dgm:sp3d contourW="19050" prstMaterial="metal">
-      <a:bevelT w="88900" h="203200"/>
-      <a:bevelB w="165100" h="254000"/>
-    </dgm:sp3d>
+    <dgm:sp3d/>
     <dgm:txPr/>
     <dgm:style>
-      <a:lnRef idx="0">
+      <a:lnRef idx="2">
         <a:scrgbClr r="0" g="0" b="0"/>
       </a:lnRef>
       <a:fillRef idx="1">
         <a:scrgbClr r="0" g="0" b="0"/>
       </a:fillRef>
-      <a:effectRef idx="1">
+      <a:effectRef idx="0">
         <a:scrgbClr r="0" g="0" b="0"/>
       </a:effectRef>
       <a:fontRef idx="minor">
@@ -9193,26 +8939,19 @@
   </dgm:styleLbl>
   <dgm:styleLbl name="fgImgPlace1">
     <dgm:scene3d>
-      <a:camera prst="orthographicFront">
-        <a:rot lat="0" lon="0" rev="0"/>
-      </a:camera>
-      <a:lightRig rig="contrasting" dir="t">
-        <a:rot lat="0" lon="0" rev="1200000"/>
-      </a:lightRig>
+      <a:camera prst="orthographicFront"/>
+      <a:lightRig rig="threePt" dir="t"/>
     </dgm:scene3d>
-    <dgm:sp3d z="300000" contourW="19050" prstMaterial="metal">
-      <a:bevelT w="88900" h="203200"/>
-      <a:bevelB w="165100" h="254000"/>
-    </dgm:sp3d>
+    <dgm:sp3d/>
     <dgm:txPr/>
     <dgm:style>
-      <a:lnRef idx="0">
+      <a:lnRef idx="2">
         <a:scrgbClr r="0" g="0" b="0"/>
       </a:lnRef>
       <a:fillRef idx="1">
         <a:scrgbClr r="0" g="0" b="0"/>
       </a:fillRef>
-      <a:effectRef idx="1">
+      <a:effectRef idx="0">
         <a:scrgbClr r="0" g="0" b="0"/>
       </a:effectRef>
       <a:fontRef idx="minor"/>
@@ -9220,26 +8959,19 @@
   </dgm:styleLbl>
   <dgm:styleLbl name="alignImgPlace1">
     <dgm:scene3d>
-      <a:camera prst="orthographicFront">
-        <a:rot lat="0" lon="0" rev="0"/>
-      </a:camera>
-      <a:lightRig rig="contrasting" dir="t">
-        <a:rot lat="0" lon="0" rev="1200000"/>
-      </a:lightRig>
+      <a:camera prst="orthographicFront"/>
+      <a:lightRig rig="threePt" dir="t"/>
     </dgm:scene3d>
-    <dgm:sp3d contourW="12700" prstMaterial="flat">
-      <a:bevelT w="177800" h="254000"/>
-      <a:bevelB w="152400"/>
-    </dgm:sp3d>
+    <dgm:sp3d/>
     <dgm:txPr/>
     <dgm:style>
-      <a:lnRef idx="0">
+      <a:lnRef idx="2">
         <a:scrgbClr r="0" g="0" b="0"/>
       </a:lnRef>
       <a:fillRef idx="1">
         <a:scrgbClr r="0" g="0" b="0"/>
       </a:fillRef>
-      <a:effectRef idx="1">
+      <a:effectRef idx="0">
         <a:scrgbClr r="0" g="0" b="0"/>
       </a:effectRef>
       <a:fontRef idx="minor"/>
@@ -9247,26 +8979,19 @@
   </dgm:styleLbl>
   <dgm:styleLbl name="bgImgPlace1">
     <dgm:scene3d>
-      <a:camera prst="orthographicFront">
-        <a:rot lat="0" lon="0" rev="0"/>
-      </a:camera>
-      <a:lightRig rig="contrasting" dir="t">
-        <a:rot lat="0" lon="0" rev="1200000"/>
-      </a:lightRig>
+      <a:camera prst="orthographicFront"/>
+      <a:lightRig rig="threePt" dir="t"/>
     </dgm:scene3d>
-    <dgm:sp3d z="-300000" contourW="19050" prstMaterial="metal">
-      <a:bevelT w="88900" h="203200"/>
-      <a:bevelB w="165100" h="254000"/>
-    </dgm:sp3d>
+    <dgm:sp3d/>
     <dgm:txPr/>
     <dgm:style>
-      <a:lnRef idx="0">
+      <a:lnRef idx="2">
         <a:scrgbClr r="0" g="0" b="0"/>
       </a:lnRef>
       <a:fillRef idx="1">
         <a:scrgbClr r="0" g="0" b="0"/>
       </a:fillRef>
-      <a:effectRef idx="1">
+      <a:effectRef idx="0">
         <a:scrgbClr r="0" g="0" b="0"/>
       </a:effectRef>
       <a:fontRef idx="minor"/>
@@ -9274,17 +8999,10 @@
   </dgm:styleLbl>
   <dgm:styleLbl name="sibTrans2D1">
     <dgm:scene3d>
-      <a:camera prst="orthographicFront">
-        <a:rot lat="0" lon="0" rev="0"/>
-      </a:camera>
-      <a:lightRig rig="contrasting" dir="t">
-        <a:rot lat="0" lon="0" rev="1200000"/>
-      </a:lightRig>
+      <a:camera prst="orthographicFront"/>
+      <a:lightRig rig="threePt" dir="t"/>
     </dgm:scene3d>
-    <dgm:sp3d z="-182000" contourW="19050" prstMaterial="metal">
-      <a:bevelT w="88900" h="203200"/>
-      <a:bevelB w="165100" h="254000"/>
-    </dgm:sp3d>
+    <dgm:sp3d/>
     <dgm:txPr/>
     <dgm:style>
       <a:lnRef idx="0">
@@ -9303,17 +9021,10 @@
   </dgm:styleLbl>
   <dgm:styleLbl name="fgSibTrans2D1">
     <dgm:scene3d>
-      <a:camera prst="orthographicFront">
-        <a:rot lat="0" lon="0" rev="0"/>
-      </a:camera>
-      <a:lightRig rig="contrasting" dir="t">
-        <a:rot lat="0" lon="0" rev="1200000"/>
-      </a:lightRig>
+      <a:camera prst="orthographicFront"/>
+      <a:lightRig rig="threePt" dir="t"/>
     </dgm:scene3d>
-    <dgm:sp3d z="300000" contourW="19050" prstMaterial="metal">
-      <a:bevelT w="88900" h="203200"/>
-      <a:bevelB w="165100" h="254000"/>
-    </dgm:sp3d>
+    <dgm:sp3d/>
     <dgm:txPr/>
     <dgm:style>
       <a:lnRef idx="0">
@@ -9323,108 +9034,6 @@
         <a:scrgbClr r="0" g="0" b="0"/>
       </a:fillRef>
       <a:effectRef idx="0">
-        <a:scrgbClr r="0" g="0" b="0"/>
-      </a:effectRef>
-      <a:fontRef idx="minor"/>
-    </dgm:style>
-  </dgm:styleLbl>
-  <dgm:styleLbl name="bgSibTrans2D1">
-    <dgm:scene3d>
-      <a:camera prst="orthographicFront">
-        <a:rot lat="0" lon="0" rev="0"/>
-      </a:camera>
-      <a:lightRig rig="contrasting" dir="t">
-        <a:rot lat="0" lon="0" rev="1200000"/>
-      </a:lightRig>
-    </dgm:scene3d>
-    <dgm:sp3d z="-300000" contourW="19050" prstMaterial="metal">
-      <a:bevelT w="88900" h="203200"/>
-      <a:bevelB w="165100" h="254000"/>
-    </dgm:sp3d>
-    <dgm:txPr/>
-    <dgm:style>
-      <a:lnRef idx="0">
-        <a:scrgbClr r="0" g="0" b="0"/>
-      </a:lnRef>
-      <a:fillRef idx="1">
-        <a:scrgbClr r="0" g="0" b="0"/>
-      </a:fillRef>
-      <a:effectRef idx="0">
-        <a:scrgbClr r="0" g="0" b="0"/>
-      </a:effectRef>
-      <a:fontRef idx="minor"/>
-    </dgm:style>
-  </dgm:styleLbl>
-  <dgm:styleLbl name="sibTrans1D1">
-    <dgm:scene3d>
-      <a:camera prst="orthographicFront">
-        <a:rot lat="0" lon="0" rev="0"/>
-      </a:camera>
-      <a:lightRig rig="contrasting" dir="t">
-        <a:rot lat="0" lon="0" rev="1200000"/>
-      </a:lightRig>
-    </dgm:scene3d>
-    <dgm:sp3d z="-110000"/>
-    <dgm:txPr/>
-    <dgm:style>
-      <a:lnRef idx="1">
-        <a:scrgbClr r="0" g="0" b="0"/>
-      </a:lnRef>
-      <a:fillRef idx="0">
-        <a:scrgbClr r="0" g="0" b="0"/>
-      </a:fillRef>
-      <a:effectRef idx="0">
-        <a:scrgbClr r="0" g="0" b="0"/>
-      </a:effectRef>
-      <a:fontRef idx="minor"/>
-    </dgm:style>
-  </dgm:styleLbl>
-  <dgm:styleLbl name="callout">
-    <dgm:scene3d>
-      <a:camera prst="orthographicFront">
-        <a:rot lat="0" lon="0" rev="0"/>
-      </a:camera>
-      <a:lightRig rig="contrasting" dir="t">
-        <a:rot lat="0" lon="0" rev="1200000"/>
-      </a:lightRig>
-    </dgm:scene3d>
-    <dgm:sp3d z="10000"/>
-    <dgm:txPr/>
-    <dgm:style>
-      <a:lnRef idx="2">
-        <a:scrgbClr r="0" g="0" b="0"/>
-      </a:lnRef>
-      <a:fillRef idx="1">
-        <a:scrgbClr r="0" g="0" b="0"/>
-      </a:fillRef>
-      <a:effectRef idx="0">
-        <a:scrgbClr r="0" g="0" b="0"/>
-      </a:effectRef>
-      <a:fontRef idx="minor"/>
-    </dgm:style>
-  </dgm:styleLbl>
-  <dgm:styleLbl name="asst0">
-    <dgm:scene3d>
-      <a:camera prst="orthographicFront">
-        <a:rot lat="0" lon="0" rev="0"/>
-      </a:camera>
-      <a:lightRig rig="contrasting" dir="t">
-        <a:rot lat="0" lon="0" rev="1200000"/>
-      </a:lightRig>
-    </dgm:scene3d>
-    <dgm:sp3d contourW="19050" prstMaterial="metal">
-      <a:bevelT w="88900" h="203200"/>
-      <a:bevelB w="165100" h="254000"/>
-    </dgm:sp3d>
-    <dgm:txPr/>
-    <dgm:style>
-      <a:lnRef idx="0">
-        <a:scrgbClr r="0" g="0" b="0"/>
-      </a:lnRef>
-      <a:fillRef idx="1">
-        <a:scrgbClr r="0" g="0" b="0"/>
-      </a:fillRef>
-      <a:effectRef idx="1">
         <a:scrgbClr r="0" g="0" b="0"/>
       </a:effectRef>
       <a:fontRef idx="minor">
@@ -9432,19 +9041,12 @@
       </a:fontRef>
     </dgm:style>
   </dgm:styleLbl>
-  <dgm:styleLbl name="asst1">
+  <dgm:styleLbl name="bgSibTrans2D1">
     <dgm:scene3d>
-      <a:camera prst="orthographicFront">
-        <a:rot lat="0" lon="0" rev="0"/>
-      </a:camera>
-      <a:lightRig rig="contrasting" dir="t">
-        <a:rot lat="0" lon="0" rev="1200000"/>
-      </a:lightRig>
+      <a:camera prst="orthographicFront"/>
+      <a:lightRig rig="threePt" dir="t"/>
     </dgm:scene3d>
-    <dgm:sp3d contourW="19050" prstMaterial="metal">
-      <a:bevelT w="88900" h="203200"/>
-      <a:bevelB w="165100" h="254000"/>
-    </dgm:sp3d>
+    <dgm:sp3d/>
     <dgm:txPr/>
     <dgm:style>
       <a:lnRef idx="0">
@@ -9453,7 +9055,7 @@
       <a:fillRef idx="1">
         <a:scrgbClr r="0" g="0" b="0"/>
       </a:fillRef>
-      <a:effectRef idx="1">
+      <a:effectRef idx="0">
         <a:scrgbClr r="0" g="0" b="0"/>
       </a:effectRef>
       <a:fontRef idx="minor">
@@ -9461,28 +9063,61 @@
       </a:fontRef>
     </dgm:style>
   </dgm:styleLbl>
-  <dgm:styleLbl name="asst2">
+  <dgm:styleLbl name="sibTrans1D1">
     <dgm:scene3d>
-      <a:camera prst="orthographicFront">
-        <a:rot lat="0" lon="0" rev="0"/>
-      </a:camera>
-      <a:lightRig rig="contrasting" dir="t">
-        <a:rot lat="0" lon="0" rev="1200000"/>
-      </a:lightRig>
+      <a:camera prst="orthographicFront"/>
+      <a:lightRig rig="threePt" dir="t"/>
     </dgm:scene3d>
-    <dgm:sp3d contourW="19050" prstMaterial="metal">
-      <a:bevelT w="88900" h="203200"/>
-      <a:bevelB w="165100" h="254000"/>
-    </dgm:sp3d>
+    <dgm:sp3d/>
     <dgm:txPr/>
     <dgm:style>
-      <a:lnRef idx="0">
+      <a:lnRef idx="1">
+        <a:scrgbClr r="0" g="0" b="0"/>
+      </a:lnRef>
+      <a:fillRef idx="0">
+        <a:scrgbClr r="0" g="0" b="0"/>
+      </a:fillRef>
+      <a:effectRef idx="0">
+        <a:scrgbClr r="0" g="0" b="0"/>
+      </a:effectRef>
+      <a:fontRef idx="minor"/>
+    </dgm:style>
+  </dgm:styleLbl>
+  <dgm:styleLbl name="callout">
+    <dgm:scene3d>
+      <a:camera prst="orthographicFront"/>
+      <a:lightRig rig="threePt" dir="t"/>
+    </dgm:scene3d>
+    <dgm:sp3d/>
+    <dgm:txPr/>
+    <dgm:style>
+      <a:lnRef idx="2">
         <a:scrgbClr r="0" g="0" b="0"/>
       </a:lnRef>
       <a:fillRef idx="1">
         <a:scrgbClr r="0" g="0" b="0"/>
       </a:fillRef>
-      <a:effectRef idx="1">
+      <a:effectRef idx="0">
+        <a:scrgbClr r="0" g="0" b="0"/>
+      </a:effectRef>
+      <a:fontRef idx="minor"/>
+    </dgm:style>
+  </dgm:styleLbl>
+  <dgm:styleLbl name="asst0">
+    <dgm:scene3d>
+      <a:camera prst="orthographicFront"/>
+      <a:lightRig rig="threePt" dir="t"/>
+    </dgm:scene3d>
+    <dgm:sp3d/>
+    <dgm:txPr/>
+    <dgm:style>
+      <a:lnRef idx="2">
+        <a:scrgbClr r="0" g="0" b="0"/>
+      </a:lnRef>
+      <a:fillRef idx="1">
+        <a:scrgbClr r="0" g="0" b="0"/>
+      </a:fillRef>
+      <a:effectRef idx="0">
         <a:scrgbClr r="0" g="0" b="0"/>
       </a:effectRef>
       <a:fontRef idx="minor">
@@ -9490,28 +9125,21 @@
       </a:fontRef>
     </dgm:style>
   </dgm:styleLbl>
-  <dgm:styleLbl name="asst3">
+  <dgm:styleLbl name="asst1">
     <dgm:scene3d>
-      <a:camera prst="orthographicFront">
-        <a:rot lat="0" lon="0" rev="0"/>
-      </a:camera>
-      <a:lightRig rig="contrasting" dir="t">
-        <a:rot lat="0" lon="0" rev="1200000"/>
-      </a:lightRig>
+      <a:camera prst="orthographicFront"/>
+      <a:lightRig rig="threePt" dir="t"/>
     </dgm:scene3d>
-    <dgm:sp3d contourW="19050" prstMaterial="metal">
-      <a:bevelT w="88900" h="203200"/>
-      <a:bevelB w="165100" h="254000"/>
-    </dgm:sp3d>
+    <dgm:sp3d/>
     <dgm:txPr/>
     <dgm:style>
-      <a:lnRef idx="0">
+      <a:lnRef idx="2">
         <a:scrgbClr r="0" g="0" b="0"/>
       </a:lnRef>
       <a:fillRef idx="1">
         <a:scrgbClr r="0" g="0" b="0"/>
       </a:fillRef>
-      <a:effectRef idx="1">
+      <a:effectRef idx="0">
         <a:scrgbClr r="0" g="0" b="0"/>
       </a:effectRef>
       <a:fontRef idx="minor">
@@ -9519,24 +9147,65 @@
       </a:fontRef>
     </dgm:style>
   </dgm:styleLbl>
+  <dgm:styleLbl name="asst2">
+    <dgm:scene3d>
+      <a:camera prst="orthographicFront"/>
+      <a:lightRig rig="threePt" dir="t"/>
+    </dgm:scene3d>
+    <dgm:sp3d/>
+    <dgm:txPr/>
+    <dgm:style>
+      <a:lnRef idx="2">
+        <a:scrgbClr r="0" g="0" b="0"/>
+      </a:lnRef>
+      <a:fillRef idx="1">
+        <a:scrgbClr r="0" g="0" b="0"/>
+      </a:fillRef>
+      <a:effectRef idx="0">
+        <a:scrgbClr r="0" g="0" b="0"/>
+      </a:effectRef>
+      <a:fontRef idx="minor">
+        <a:schemeClr val="lt1"/>
+      </a:fontRef>
+    </dgm:style>
+  </dgm:styleLbl>
+  <dgm:styleLbl name="asst3">
+    <dgm:scene3d>
+      <a:camera prst="orthographicFront"/>
+      <a:lightRig rig="threePt" dir="t"/>
+    </dgm:scene3d>
+    <dgm:sp3d/>
+    <dgm:txPr/>
+    <dgm:style>
+      <a:lnRef idx="2">
+        <a:scrgbClr r="0" g="0" b="0"/>
+      </a:lnRef>
+      <a:fillRef idx="1">
+        <a:scrgbClr r="0" g="0" b="0"/>
+      </a:fillRef>
+      <a:effectRef idx="0">
+        <a:scrgbClr r="0" g="0" b="0"/>
+      </a:effectRef>
+      <a:fontRef idx="minor">
+        <a:schemeClr val="lt1"/>
+      </a:fontRef>
+    </dgm:style>
+  </dgm:styleLbl>
   <dgm:styleLbl name="asst4">
     <dgm:scene3d>
       <a:camera prst="orthographicFront"/>
       <a:lightRig rig="threePt" dir="t"/>
     </dgm:scene3d>
-    <dgm:sp3d contourW="19050" prstMaterial="metal">
-      <a:bevelT w="88900" h="203200"/>
-      <a:bevelB w="165100" h="254000"/>
-    </dgm:sp3d>
+    <dgm:sp3d/>
     <dgm:txPr/>
     <dgm:style>
-      <a:lnRef idx="0">
+      <a:lnRef idx="2">
         <a:scrgbClr r="0" g="0" b="0"/>
       </a:lnRef>
       <a:fillRef idx="1">
         <a:scrgbClr r="0" g="0" b="0"/>
       </a:fillRef>
-      <a:effectRef idx="1">
+      <a:effectRef idx="0">
         <a:scrgbClr r="0" g="0" b="0"/>
       </a:effectRef>
       <a:fontRef idx="minor">
@@ -9546,17 +9215,478 @@
   </dgm:styleLbl>
   <dgm:styleLbl name="parChTrans2D1">
     <dgm:scene3d>
-      <a:camera prst="orthographicFront">
-        <a:rot lat="0" lon="0" rev="0"/>
-      </a:camera>
-      <a:lightRig rig="contrasting" dir="t">
-        <a:rot lat="0" lon="0" rev="1200000"/>
-      </a:lightRig>
+      <a:camera prst="orthographicFront"/>
+      <a:lightRig rig="threePt" dir="t"/>
     </dgm:scene3d>
-    <dgm:sp3d contourW="19050" prstMaterial="metal">
-      <a:bevelT w="88900" h="203200"/>
-      <a:bevelB w="165100" h="254000"/>
-    </dgm:sp3d>
+    <dgm:sp3d/>
+    <dgm:txPr/>
+    <dgm:style>
+      <a:lnRef idx="2">
+        <a:scrgbClr r="0" g="0" b="0"/>
+      </a:lnRef>
+      <a:fillRef idx="1">
+        <a:scrgbClr r="0" g="0" b="0"/>
+      </a:fillRef>
+      <a:effectRef idx="0">
+        <a:scrgbClr r="0" g="0" b="0"/>
+      </a:effectRef>
+      <a:fontRef idx="minor">
+        <a:schemeClr val="lt1"/>
+      </a:fontRef>
+    </dgm:style>
+  </dgm:styleLbl>
+  <dgm:styleLbl name="parChTrans2D2">
+    <dgm:scene3d>
+      <a:camera prst="orthographicFront"/>
+      <a:lightRig rig="threePt" dir="t"/>
+    </dgm:scene3d>
+    <dgm:sp3d/>
+    <dgm:txPr/>
+    <dgm:style>
+      <a:lnRef idx="2">
+        <a:scrgbClr r="0" g="0" b="0"/>
+      </a:lnRef>
+      <a:fillRef idx="1">
+        <a:scrgbClr r="0" g="0" b="0"/>
+      </a:fillRef>
+      <a:effectRef idx="0">
+        <a:scrgbClr r="0" g="0" b="0"/>
+      </a:effectRef>
+      <a:fontRef idx="minor">
+        <a:schemeClr val="lt1"/>
+      </a:fontRef>
+    </dgm:style>
+  </dgm:styleLbl>
+  <dgm:styleLbl name="parChTrans2D3">
+    <dgm:scene3d>
+      <a:camera prst="orthographicFront"/>
+      <a:lightRig rig="threePt" dir="t"/>
+    </dgm:scene3d>
+    <dgm:sp3d/>
+    <dgm:txPr/>
+    <dgm:style>
+      <a:lnRef idx="2">
+        <a:scrgbClr r="0" g="0" b="0"/>
+      </a:lnRef>
+      <a:fillRef idx="1">
+        <a:scrgbClr r="0" g="0" b="0"/>
+      </a:fillRef>
+      <a:effectRef idx="0">
+        <a:scrgbClr r="0" g="0" b="0"/>
+      </a:effectRef>
+      <a:fontRef idx="minor">
+        <a:schemeClr val="lt1"/>
+      </a:fontRef>
+    </dgm:style>
+  </dgm:styleLbl>
+  <dgm:styleLbl name="parChTrans2D4">
+    <dgm:scene3d>
+      <a:camera prst="orthographicFront"/>
+      <a:lightRig rig="threePt" dir="t"/>
+    </dgm:scene3d>
+    <dgm:sp3d/>
+    <dgm:txPr/>
+    <dgm:style>
+      <a:lnRef idx="2">
+        <a:scrgbClr r="0" g="0" b="0"/>
+      </a:lnRef>
+      <a:fillRef idx="1">
+        <a:scrgbClr r="0" g="0" b="0"/>
+      </a:fillRef>
+      <a:effectRef idx="0">
+        <a:scrgbClr r="0" g="0" b="0"/>
+      </a:effectRef>
+      <a:fontRef idx="minor">
+        <a:schemeClr val="lt1"/>
+      </a:fontRef>
+    </dgm:style>
+  </dgm:styleLbl>
+  <dgm:styleLbl name="parChTrans1D1">
+    <dgm:scene3d>
+      <a:camera prst="orthographicFront"/>
+      <a:lightRig rig="threePt" dir="t"/>
+    </dgm:scene3d>
+    <dgm:sp3d/>
+    <dgm:txPr/>
+    <dgm:style>
+      <a:lnRef idx="2">
+        <a:scrgbClr r="0" g="0" b="0"/>
+      </a:lnRef>
+      <a:fillRef idx="0">
+        <a:scrgbClr r="0" g="0" b="0"/>
+      </a:fillRef>
+      <a:effectRef idx="0">
+        <a:scrgbClr r="0" g="0" b="0"/>
+      </a:effectRef>
+      <a:fontRef idx="minor"/>
+    </dgm:style>
+  </dgm:styleLbl>
+  <dgm:styleLbl name="parChTrans1D2">
+    <dgm:scene3d>
+      <a:camera prst="orthographicFront"/>
+      <a:lightRig rig="threePt" dir="t"/>
+    </dgm:scene3d>
+    <dgm:sp3d/>
+    <dgm:txPr/>
+    <dgm:style>
+      <a:lnRef idx="2">
+        <a:scrgbClr r="0" g="0" b="0"/>
+      </a:lnRef>
+      <a:fillRef idx="0">
+        <a:scrgbClr r="0" g="0" b="0"/>
+      </a:fillRef>
+      <a:effectRef idx="0">
+        <a:scrgbClr r="0" g="0" b="0"/>
+      </a:effectRef>
+      <a:fontRef idx="minor"/>
+    </dgm:style>
+  </dgm:styleLbl>
+  <dgm:styleLbl name="parChTrans1D3">
+    <dgm:scene3d>
+      <a:camera prst="orthographicFront"/>
+      <a:lightRig rig="threePt" dir="t"/>
+    </dgm:scene3d>
+    <dgm:sp3d/>
+    <dgm:txPr/>
+    <dgm:style>
+      <a:lnRef idx="2">
+        <a:scrgbClr r="0" g="0" b="0"/>
+      </a:lnRef>
+      <a:fillRef idx="0">
+        <a:scrgbClr r="0" g="0" b="0"/>
+      </a:fillRef>
+      <a:effectRef idx="0">
+        <a:scrgbClr r="0" g="0" b="0"/>
+      </a:effectRef>
+      <a:fontRef idx="minor"/>
+    </dgm:style>
+  </dgm:styleLbl>
+  <dgm:styleLbl name="parChTrans1D4">
+    <dgm:scene3d>
+      <a:camera prst="orthographicFront"/>
+      <a:lightRig rig="threePt" dir="t"/>
+    </dgm:scene3d>
+    <dgm:sp3d/>
+    <dgm:txPr/>
+    <dgm:style>
+      <a:lnRef idx="2">
+        <a:scrgbClr r="0" g="0" b="0"/>
+      </a:lnRef>
+      <a:fillRef idx="0">
+        <a:scrgbClr r="0" g="0" b="0"/>
+      </a:fillRef>
+      <a:effectRef idx="0">
+        <a:scrgbClr r="0" g="0" b="0"/>
+      </a:effectRef>
+      <a:fontRef idx="minor"/>
+    </dgm:style>
+  </dgm:styleLbl>
+  <dgm:styleLbl name="fgAcc1">
+    <dgm:scene3d>
+      <a:camera prst="orthographicFront"/>
+      <a:lightRig rig="threePt" dir="t"/>
+    </dgm:scene3d>
+    <dgm:sp3d/>
+    <dgm:txPr/>
+    <dgm:style>
+      <a:lnRef idx="2">
+        <a:scrgbClr r="0" g="0" b="0"/>
+      </a:lnRef>
+      <a:fillRef idx="1">
+        <a:scrgbClr r="0" g="0" b="0"/>
+      </a:fillRef>
+      <a:effectRef idx="0">
+        <a:scrgbClr r="0" g="0" b="0"/>
+      </a:effectRef>
+      <a:fontRef idx="minor"/>
+    </dgm:style>
+  </dgm:styleLbl>
+  <dgm:styleLbl name="conFgAcc1">
+    <dgm:scene3d>
+      <a:camera prst="orthographicFront"/>
+      <a:lightRig rig="threePt" dir="t"/>
+    </dgm:scene3d>
+    <dgm:sp3d/>
+    <dgm:txPr/>
+    <dgm:style>
+      <a:lnRef idx="2">
+        <a:scrgbClr r="0" g="0" b="0"/>
+      </a:lnRef>
+      <a:fillRef idx="1">
+        <a:scrgbClr r="0" g="0" b="0"/>
+      </a:fillRef>
+      <a:effectRef idx="0">
+        <a:scrgbClr r="0" g="0" b="0"/>
+      </a:effectRef>
+      <a:fontRef idx="minor"/>
+    </dgm:style>
+  </dgm:styleLbl>
+  <dgm:styleLbl name="alignAcc1">
+    <dgm:scene3d>
+      <a:camera prst="orthographicFront"/>
+      <a:lightRig rig="threePt" dir="t"/>
+    </dgm:scene3d>
+    <dgm:sp3d/>
+    <dgm:txPr/>
+    <dgm:style>
+      <a:lnRef idx="2">
+        <a:scrgbClr r="0" g="0" b="0"/>
+      </a:lnRef>
+      <a:fillRef idx="1">
+        <a:scrgbClr r="0" g="0" b="0"/>
+      </a:fillRef>
+      <a:effectRef idx="0">
+        <a:scrgbClr r="0" g="0" b="0"/>
+      </a:effectRef>
+      <a:fontRef idx="minor"/>
+    </dgm:style>
+  </dgm:styleLbl>
+  <dgm:styleLbl name="trAlignAcc1">
+    <dgm:scene3d>
+      <a:camera prst="orthographicFront"/>
+      <a:lightRig rig="threePt" dir="t"/>
+    </dgm:scene3d>
+    <dgm:sp3d/>
+    <dgm:txPr/>
+    <dgm:style>
+      <a:lnRef idx="1">
+        <a:scrgbClr r="0" g="0" b="0"/>
+      </a:lnRef>
+      <a:fillRef idx="1">
+        <a:scrgbClr r="0" g="0" b="0"/>
+      </a:fillRef>
+      <a:effectRef idx="0">
+        <a:scrgbClr r="0" g="0" b="0"/>
+      </a:effectRef>
+      <a:fontRef idx="minor"/>
+    </dgm:style>
+  </dgm:styleLbl>
+  <dgm:styleLbl name="bgAcc1">
+    <dgm:scene3d>
+      <a:camera prst="orthographicFront"/>
+      <a:lightRig rig="threePt" dir="t"/>
+    </dgm:scene3d>
+    <dgm:sp3d/>
+    <dgm:txPr/>
+    <dgm:style>
+      <a:lnRef idx="2">
+        <a:scrgbClr r="0" g="0" b="0"/>
+      </a:lnRef>
+      <a:fillRef idx="1">
+        <a:scrgbClr r="0" g="0" b="0"/>
+      </a:fillRef>
+      <a:effectRef idx="0">
+        <a:scrgbClr r="0" g="0" b="0"/>
+      </a:effectRef>
+      <a:fontRef idx="minor"/>
+    </dgm:style>
+  </dgm:styleLbl>
+  <dgm:styleLbl name="solidFgAcc1">
+    <dgm:scene3d>
+      <a:camera prst="orthographicFront"/>
+      <a:lightRig rig="threePt" dir="t"/>
+    </dgm:scene3d>
+    <dgm:sp3d/>
+    <dgm:txPr/>
+    <dgm:style>
+      <a:lnRef idx="2">
+        <a:scrgbClr r="0" g="0" b="0"/>
+      </a:lnRef>
+      <a:fillRef idx="1">
+        <a:scrgbClr r="0" g="0" b="0"/>
+      </a:fillRef>
+      <a:effectRef idx="0">
+        <a:scrgbClr r="0" g="0" b="0"/>
+      </a:effectRef>
+      <a:fontRef idx="minor"/>
+    </dgm:style>
+  </dgm:styleLbl>
+  <dgm:styleLbl name="solidAlignAcc1">
+    <dgm:scene3d>
+      <a:camera prst="orthographicFront"/>
+      <a:lightRig rig="threePt" dir="t"/>
+    </dgm:scene3d>
+    <dgm:sp3d/>
+    <dgm:txPr/>
+    <dgm:style>
+      <a:lnRef idx="2">
+        <a:scrgbClr r="0" g="0" b="0"/>
+      </a:lnRef>
+      <a:fillRef idx="1">
+        <a:scrgbClr r="0" g="0" b="0"/>
+      </a:fillRef>
+      <a:effectRef idx="0">
+        <a:scrgbClr r="0" g="0" b="0"/>
+      </a:effectRef>
+      <a:fontRef idx="minor"/>
+    </dgm:style>
+  </dgm:styleLbl>
+  <dgm:styleLbl name="solidBgAcc1">
+    <dgm:scene3d>
+      <a:camera prst="orthographicFront"/>
+      <a:lightRig rig="threePt" dir="t"/>
+    </dgm:scene3d>
+    <dgm:sp3d/>
+    <dgm:txPr/>
+    <dgm:style>
+      <a:lnRef idx="2">
+        <a:scrgbClr r="0" g="0" b="0"/>
+      </a:lnRef>
+      <a:fillRef idx="1">
+        <a:scrgbClr r="0" g="0" b="0"/>
+      </a:fillRef>
+      <a:effectRef idx="0">
+        <a:scrgbClr r="0" g="0" b="0"/>
+      </a:effectRef>
+      <a:fontRef idx="minor"/>
+    </dgm:style>
+  </dgm:styleLbl>
+  <dgm:styleLbl name="fgAccFollowNode1">
+    <dgm:scene3d>
+      <a:camera prst="orthographicFront"/>
+      <a:lightRig rig="threePt" dir="t"/>
+    </dgm:scene3d>
+    <dgm:sp3d/>
+    <dgm:txPr/>
+    <dgm:style>
+      <a:lnRef idx="2">
+        <a:scrgbClr r="0" g="0" b="0"/>
+      </a:lnRef>
+      <a:fillRef idx="1">
+        <a:scrgbClr r="0" g="0" b="0"/>
+      </a:fillRef>
+      <a:effectRef idx="0">
+        <a:scrgbClr r="0" g="0" b="0"/>
+      </a:effectRef>
+      <a:fontRef idx="minor"/>
+    </dgm:style>
+  </dgm:styleLbl>
+  <dgm:styleLbl name="alignAccFollowNode1">
+    <dgm:scene3d>
+      <a:camera prst="orthographicFront"/>
+      <a:lightRig rig="threePt" dir="t"/>
+    </dgm:scene3d>
+    <dgm:sp3d/>
+    <dgm:txPr/>
+    <dgm:style>
+      <a:lnRef idx="2">
+        <a:scrgbClr r="0" g="0" b="0"/>
+      </a:lnRef>
+      <a:fillRef idx="1">
+        <a:scrgbClr r="0" g="0" b="0"/>
+      </a:fillRef>
+      <a:effectRef idx="0">
+        <a:scrgbClr r="0" g="0" b="0"/>
+      </a:effectRef>
+      <a:fontRef idx="minor"/>
+    </dgm:style>
+  </dgm:styleLbl>
+  <dgm:styleLbl name="bgAccFollowNode1">
+    <dgm:scene3d>
+      <a:camera prst="orthographicFront"/>
+      <a:lightRig rig="threePt" dir="t"/>
+    </dgm:scene3d>
+    <dgm:sp3d/>
+    <dgm:txPr/>
+    <dgm:style>
+      <a:lnRef idx="2">
+        <a:scrgbClr r="0" g="0" b="0"/>
+      </a:lnRef>
+      <a:fillRef idx="1">
+        <a:scrgbClr r="0" g="0" b="0"/>
+      </a:fillRef>
+      <a:effectRef idx="0">
+        <a:scrgbClr r="0" g="0" b="0"/>
+      </a:effectRef>
+      <a:fontRef idx="minor"/>
+    </dgm:style>
+  </dgm:styleLbl>
+  <dgm:styleLbl name="fgAcc0">
+    <dgm:scene3d>
+      <a:camera prst="orthographicFront"/>
+      <a:lightRig rig="threePt" dir="t"/>
+    </dgm:scene3d>
+    <dgm:sp3d/>
+    <dgm:txPr/>
+    <dgm:style>
+      <a:lnRef idx="2">
+        <a:scrgbClr r="0" g="0" b="0"/>
+      </a:lnRef>
+      <a:fillRef idx="1">
+        <a:scrgbClr r="0" g="0" b="0"/>
+      </a:fillRef>
+      <a:effectRef idx="0">
+        <a:scrgbClr r="0" g="0" b="0"/>
+      </a:effectRef>
+      <a:fontRef idx="minor"/>
+    </dgm:style>
+  </dgm:styleLbl>
+  <dgm:styleLbl name="fgAcc2">
+    <dgm:scene3d>
+      <a:camera prst="orthographicFront"/>
+      <a:lightRig rig="threePt" dir="t"/>
+    </dgm:scene3d>
+    <dgm:sp3d/>
+    <dgm:txPr/>
+    <dgm:style>
+      <a:lnRef idx="2">
+        <a:scrgbClr r="0" g="0" b="0"/>
+      </a:lnRef>
+      <a:fillRef idx="1">
+        <a:scrgbClr r="0" g="0" b="0"/>
+      </a:fillRef>
+      <a:effectRef idx="0">
+        <a:scrgbClr r="0" g="0" b="0"/>
+      </a:effectRef>
+      <a:fontRef idx="minor"/>
+    </dgm:style>
+  </dgm:styleLbl>
+  <dgm:styleLbl name="fgAcc3">
+    <dgm:scene3d>
+      <a:camera prst="orthographicFront"/>
+      <a:lightRig rig="threePt" dir="t"/>
+    </dgm:scene3d>
+    <dgm:sp3d/>
+    <dgm:txPr/>
+    <dgm:style>
+      <a:lnRef idx="2">
+        <a:scrgbClr r="0" g="0" b="0"/>
+      </a:lnRef>
+      <a:fillRef idx="1">
+        <a:scrgbClr r="0" g="0" b="0"/>
+      </a:fillRef>
+      <a:effectRef idx="0">
+        <a:scrgbClr r="0" g="0" b="0"/>
+      </a:effectRef>
+      <a:fontRef idx="minor"/>
+    </dgm:style>
+  </dgm:styleLbl>
+  <dgm:styleLbl name="fgAcc4">
+    <dgm:scene3d>
+      <a:camera prst="orthographicFront"/>
+      <a:lightRig rig="threePt" dir="t"/>
+    </dgm:scene3d>
+    <dgm:sp3d/>
+    <dgm:txPr/>
+    <dgm:style>
+      <a:lnRef idx="2">
+        <a:scrgbClr r="0" g="0" b="0"/>
+      </a:lnRef>
+      <a:fillRef idx="1">
+        <a:scrgbClr r="0" g="0" b="0"/>
+      </a:fillRef>
+      <a:effectRef idx="0">
+        <a:scrgbClr r="0" g="0" b="0"/>
+      </a:effectRef>
+      <a:fontRef idx="minor"/>
+    </dgm:style>
+  </dgm:styleLbl>
+  <dgm:styleLbl name="bgShp">
+    <dgm:scene3d>
+      <a:camera prst="orthographicFront"/>
+      <a:lightRig rig="threePt" dir="t"/>
+    </dgm:scene3d>
+    <dgm:sp3d/>
     <dgm:txPr/>
     <dgm:style>
       <a:lnRef idx="0">
@@ -9571,19 +9701,12 @@
       <a:fontRef idx="minor"/>
     </dgm:style>
   </dgm:styleLbl>
-  <dgm:styleLbl name="parChTrans2D2">
+  <dgm:styleLbl name="dkBgShp">
     <dgm:scene3d>
-      <a:camera prst="orthographicFront">
-        <a:rot lat="0" lon="0" rev="0"/>
-      </a:camera>
-      <a:lightRig rig="contrasting" dir="t">
-        <a:rot lat="0" lon="0" rev="1200000"/>
-      </a:lightRig>
+      <a:camera prst="orthographicFront"/>
+      <a:lightRig rig="threePt" dir="t"/>
     </dgm:scene3d>
-    <dgm:sp3d contourW="19050" prstMaterial="metal">
-      <a:bevelT w="88900" h="203200"/>
-      <a:bevelB w="165100" h="254000"/>
-    </dgm:sp3d>
+    <dgm:sp3d/>
     <dgm:txPr/>
     <dgm:style>
       <a:lnRef idx="0">
@@ -9598,19 +9721,12 @@
       <a:fontRef idx="minor"/>
     </dgm:style>
   </dgm:styleLbl>
-  <dgm:styleLbl name="parChTrans2D3">
+  <dgm:styleLbl name="trBgShp">
     <dgm:scene3d>
-      <a:camera prst="orthographicFront">
-        <a:rot lat="0" lon="0" rev="0"/>
-      </a:camera>
-      <a:lightRig rig="contrasting" dir="t">
-        <a:rot lat="0" lon="0" rev="1200000"/>
-      </a:lightRig>
+      <a:camera prst="orthographicFront"/>
+      <a:lightRig rig="threePt" dir="t"/>
     </dgm:scene3d>
-    <dgm:sp3d contourW="19050" prstMaterial="metal">
-      <a:bevelT w="88900" h="203200"/>
-      <a:bevelB w="165100" h="254000"/>
-    </dgm:sp3d>
+    <dgm:sp3d/>
     <dgm:txPr/>
     <dgm:style>
       <a:lnRef idx="0">
@@ -9625,625 +9741,15 @@
       <a:fontRef idx="minor"/>
     </dgm:style>
   </dgm:styleLbl>
-  <dgm:styleLbl name="parChTrans2D4">
+  <dgm:styleLbl name="fgShp">
     <dgm:scene3d>
-      <a:camera prst="orthographicFront">
-        <a:rot lat="0" lon="0" rev="0"/>
-      </a:camera>
-      <a:lightRig rig="contrasting" dir="t">
-        <a:rot lat="0" lon="0" rev="1200000"/>
-      </a:lightRig>
+      <a:camera prst="orthographicFront"/>
+      <a:lightRig rig="threePt" dir="t"/>
     </dgm:scene3d>
-    <dgm:sp3d contourW="19050" prstMaterial="metal">
-      <a:bevelT w="88900" h="203200"/>
-      <a:bevelB w="165100" h="254000"/>
-    </dgm:sp3d>
-    <dgm:txPr/>
-    <dgm:style>
-      <a:lnRef idx="0">
-        <a:scrgbClr r="0" g="0" b="0"/>
-      </a:lnRef>
-      <a:fillRef idx="1">
-        <a:scrgbClr r="0" g="0" b="0"/>
-      </a:fillRef>
-      <a:effectRef idx="0">
-        <a:scrgbClr r="0" g="0" b="0"/>
-      </a:effectRef>
-      <a:fontRef idx="minor"/>
-    </dgm:style>
-  </dgm:styleLbl>
-  <dgm:styleLbl name="parChTrans1D1">
-    <dgm:scene3d>
-      <a:camera prst="orthographicFront">
-        <a:rot lat="0" lon="0" rev="0"/>
-      </a:camera>
-      <a:lightRig rig="contrasting" dir="t">
-        <a:rot lat="0" lon="0" rev="1200000"/>
-      </a:lightRig>
-    </dgm:scene3d>
-    <dgm:sp3d z="-110000"/>
+    <dgm:sp3d/>
     <dgm:txPr/>
     <dgm:style>
       <a:lnRef idx="2">
-        <a:scrgbClr r="0" g="0" b="0"/>
-      </a:lnRef>
-      <a:fillRef idx="0">
-        <a:scrgbClr r="0" g="0" b="0"/>
-      </a:fillRef>
-      <a:effectRef idx="0">
-        <a:scrgbClr r="0" g="0" b="0"/>
-      </a:effectRef>
-      <a:fontRef idx="minor"/>
-    </dgm:style>
-  </dgm:styleLbl>
-  <dgm:styleLbl name="parChTrans1D2">
-    <dgm:scene3d>
-      <a:camera prst="orthographicFront">
-        <a:rot lat="0" lon="0" rev="0"/>
-      </a:camera>
-      <a:lightRig rig="contrasting" dir="t">
-        <a:rot lat="0" lon="0" rev="1200000"/>
-      </a:lightRig>
-    </dgm:scene3d>
-    <dgm:sp3d z="-110000"/>
-    <dgm:txPr/>
-    <dgm:style>
-      <a:lnRef idx="2">
-        <a:scrgbClr r="0" g="0" b="0"/>
-      </a:lnRef>
-      <a:fillRef idx="0">
-        <a:scrgbClr r="0" g="0" b="0"/>
-      </a:fillRef>
-      <a:effectRef idx="0">
-        <a:scrgbClr r="0" g="0" b="0"/>
-      </a:effectRef>
-      <a:fontRef idx="minor"/>
-    </dgm:style>
-  </dgm:styleLbl>
-  <dgm:styleLbl name="parChTrans1D3">
-    <dgm:scene3d>
-      <a:camera prst="orthographicFront">
-        <a:rot lat="0" lon="0" rev="0"/>
-      </a:camera>
-      <a:lightRig rig="contrasting" dir="t">
-        <a:rot lat="0" lon="0" rev="1200000"/>
-      </a:lightRig>
-    </dgm:scene3d>
-    <dgm:sp3d z="-110000"/>
-    <dgm:txPr/>
-    <dgm:style>
-      <a:lnRef idx="2">
-        <a:scrgbClr r="0" g="0" b="0"/>
-      </a:lnRef>
-      <a:fillRef idx="0">
-        <a:scrgbClr r="0" g="0" b="0"/>
-      </a:fillRef>
-      <a:effectRef idx="0">
-        <a:scrgbClr r="0" g="0" b="0"/>
-      </a:effectRef>
-      <a:fontRef idx="minor"/>
-    </dgm:style>
-  </dgm:styleLbl>
-  <dgm:styleLbl name="parChTrans1D4">
-    <dgm:scene3d>
-      <a:camera prst="orthographicFront">
-        <a:rot lat="0" lon="0" rev="0"/>
-      </a:camera>
-      <a:lightRig rig="contrasting" dir="t">
-        <a:rot lat="0" lon="0" rev="1200000"/>
-      </a:lightRig>
-    </dgm:scene3d>
-    <dgm:sp3d z="-110000"/>
-    <dgm:txPr/>
-    <dgm:style>
-      <a:lnRef idx="2">
-        <a:scrgbClr r="0" g="0" b="0"/>
-      </a:lnRef>
-      <a:fillRef idx="0">
-        <a:scrgbClr r="0" g="0" b="0"/>
-      </a:fillRef>
-      <a:effectRef idx="0">
-        <a:scrgbClr r="0" g="0" b="0"/>
-      </a:effectRef>
-      <a:fontRef idx="minor"/>
-    </dgm:style>
-  </dgm:styleLbl>
-  <dgm:styleLbl name="fgAcc1">
-    <dgm:scene3d>
-      <a:camera prst="orthographicFront">
-        <a:rot lat="0" lon="0" rev="0"/>
-      </a:camera>
-      <a:lightRig rig="contrasting" dir="t">
-        <a:rot lat="0" lon="0" rev="1200000"/>
-      </a:lightRig>
-    </dgm:scene3d>
-    <dgm:sp3d z="300000" contourW="19050" prstMaterial="metal">
-      <a:bevelT w="88900" h="203200"/>
-      <a:bevelB w="165100" h="254000"/>
-    </dgm:sp3d>
-    <dgm:txPr/>
-    <dgm:style>
-      <a:lnRef idx="0">
-        <a:scrgbClr r="0" g="0" b="0"/>
-      </a:lnRef>
-      <a:fillRef idx="1">
-        <a:scrgbClr r="0" g="0" b="0"/>
-      </a:fillRef>
-      <a:effectRef idx="0">
-        <a:scrgbClr r="0" g="0" b="0"/>
-      </a:effectRef>
-      <a:fontRef idx="minor"/>
-    </dgm:style>
-  </dgm:styleLbl>
-  <dgm:styleLbl name="conFgAcc1">
-    <dgm:scene3d>
-      <a:camera prst="orthographicFront">
-        <a:rot lat="0" lon="0" rev="0"/>
-      </a:camera>
-      <a:lightRig rig="contrasting" dir="t">
-        <a:rot lat="0" lon="0" rev="1200000"/>
-      </a:lightRig>
-    </dgm:scene3d>
-    <dgm:sp3d z="300000" contourW="19050" prstMaterial="metal">
-      <a:bevelT w="88900" h="203200"/>
-      <a:bevelB w="165100" h="254000"/>
-    </dgm:sp3d>
-    <dgm:txPr/>
-    <dgm:style>
-      <a:lnRef idx="0">
-        <a:scrgbClr r="0" g="0" b="0"/>
-      </a:lnRef>
-      <a:fillRef idx="1">
-        <a:scrgbClr r="0" g="0" b="0"/>
-      </a:fillRef>
-      <a:effectRef idx="0">
-        <a:scrgbClr r="0" g="0" b="0"/>
-      </a:effectRef>
-      <a:fontRef idx="minor"/>
-    </dgm:style>
-  </dgm:styleLbl>
-  <dgm:styleLbl name="alignAcc1">
-    <dgm:scene3d>
-      <a:camera prst="orthographicFront">
-        <a:rot lat="0" lon="0" rev="0"/>
-      </a:camera>
-      <a:lightRig rig="contrasting" dir="t">
-        <a:rot lat="0" lon="0" rev="1200000"/>
-      </a:lightRig>
-    </dgm:scene3d>
-    <dgm:sp3d contourW="19050" prstMaterial="metal">
-      <a:bevelT w="88900" h="203200"/>
-      <a:bevelB w="165100" h="254000"/>
-    </dgm:sp3d>
-    <dgm:txPr/>
-    <dgm:style>
-      <a:lnRef idx="0">
-        <a:scrgbClr r="0" g="0" b="0"/>
-      </a:lnRef>
-      <a:fillRef idx="1">
-        <a:scrgbClr r="0" g="0" b="0"/>
-      </a:fillRef>
-      <a:effectRef idx="0">
-        <a:scrgbClr r="0" g="0" b="0"/>
-      </a:effectRef>
-      <a:fontRef idx="minor"/>
-    </dgm:style>
-  </dgm:styleLbl>
-  <dgm:styleLbl name="trAlignAcc1">
-    <dgm:scene3d>
-      <a:camera prst="orthographicFront">
-        <a:rot lat="0" lon="0" rev="0"/>
-      </a:camera>
-      <a:lightRig rig="contrasting" dir="t">
-        <a:rot lat="0" lon="0" rev="1200000"/>
-      </a:lightRig>
-    </dgm:scene3d>
-    <dgm:sp3d contourW="19050" prstMaterial="metal">
-      <a:bevelT w="88900" h="203200"/>
-      <a:bevelB w="165100" h="254000"/>
-    </dgm:sp3d>
-    <dgm:txPr/>
-    <dgm:style>
-      <a:lnRef idx="0">
-        <a:scrgbClr r="0" g="0" b="0"/>
-      </a:lnRef>
-      <a:fillRef idx="1">
-        <a:scrgbClr r="0" g="0" b="0"/>
-      </a:fillRef>
-      <a:effectRef idx="1">
-        <a:scrgbClr r="0" g="0" b="0"/>
-      </a:effectRef>
-      <a:fontRef idx="minor"/>
-    </dgm:style>
-  </dgm:styleLbl>
-  <dgm:styleLbl name="bgAcc1">
-    <dgm:scene3d>
-      <a:camera prst="orthographicFront">
-        <a:rot lat="0" lon="0" rev="0"/>
-      </a:camera>
-      <a:lightRig rig="contrasting" dir="t">
-        <a:rot lat="0" lon="0" rev="1200000"/>
-      </a:lightRig>
-    </dgm:scene3d>
-    <dgm:sp3d z="-300000" contourW="19050" prstMaterial="metal">
-      <a:bevelT w="88900" h="203200"/>
-      <a:bevelB w="165100" h="254000"/>
-    </dgm:sp3d>
-    <dgm:txPr/>
-    <dgm:style>
-      <a:lnRef idx="0">
-        <a:scrgbClr r="0" g="0" b="0"/>
-      </a:lnRef>
-      <a:fillRef idx="1">
-        <a:scrgbClr r="0" g="0" b="0"/>
-      </a:fillRef>
-      <a:effectRef idx="0">
-        <a:scrgbClr r="0" g="0" b="0"/>
-      </a:effectRef>
-      <a:fontRef idx="minor"/>
-    </dgm:style>
-  </dgm:styleLbl>
-  <dgm:styleLbl name="solidFgAcc1">
-    <dgm:scene3d>
-      <a:camera prst="orthographicFront">
-        <a:rot lat="0" lon="0" rev="0"/>
-      </a:camera>
-      <a:lightRig rig="contrasting" dir="t">
-        <a:rot lat="0" lon="0" rev="1200000"/>
-      </a:lightRig>
-    </dgm:scene3d>
-    <dgm:sp3d z="300000" contourW="12700" prstMaterial="flat">
-      <a:bevelT w="177800" h="254000"/>
-      <a:bevelB w="152400"/>
-    </dgm:sp3d>
-    <dgm:txPr/>
-    <dgm:style>
-      <a:lnRef idx="0">
-        <a:scrgbClr r="0" g="0" b="0"/>
-      </a:lnRef>
-      <a:fillRef idx="1">
-        <a:scrgbClr r="0" g="0" b="0"/>
-      </a:fillRef>
-      <a:effectRef idx="0">
-        <a:scrgbClr r="0" g="0" b="0"/>
-      </a:effectRef>
-      <a:fontRef idx="minor"/>
-    </dgm:style>
-  </dgm:styleLbl>
-  <dgm:styleLbl name="solidAlignAcc1">
-    <dgm:scene3d>
-      <a:camera prst="orthographicFront">
-        <a:rot lat="0" lon="0" rev="0"/>
-      </a:camera>
-      <a:lightRig rig="contrasting" dir="t">
-        <a:rot lat="0" lon="0" rev="1200000"/>
-      </a:lightRig>
-    </dgm:scene3d>
-    <dgm:sp3d contourW="19050" prstMaterial="metal">
-      <a:bevelT w="88900" h="203200"/>
-      <a:bevelB w="165100" h="254000"/>
-    </dgm:sp3d>
-    <dgm:txPr/>
-    <dgm:style>
-      <a:lnRef idx="0">
-        <a:scrgbClr r="0" g="0" b="0"/>
-      </a:lnRef>
-      <a:fillRef idx="1">
-        <a:scrgbClr r="0" g="0" b="0"/>
-      </a:fillRef>
-      <a:effectRef idx="0">
-        <a:scrgbClr r="0" g="0" b="0"/>
-      </a:effectRef>
-      <a:fontRef idx="minor"/>
-    </dgm:style>
-  </dgm:styleLbl>
-  <dgm:styleLbl name="solidBgAcc1">
-    <dgm:scene3d>
-      <a:camera prst="orthographicFront">
-        <a:rot lat="0" lon="0" rev="0"/>
-      </a:camera>
-      <a:lightRig rig="contrasting" dir="t">
-        <a:rot lat="0" lon="0" rev="1200000"/>
-      </a:lightRig>
-    </dgm:scene3d>
-    <dgm:sp3d z="-300000" contourW="19050" prstMaterial="metal">
-      <a:bevelT w="88900" h="203200"/>
-      <a:bevelB w="165100" h="254000"/>
-    </dgm:sp3d>
-    <dgm:txPr/>
-    <dgm:style>
-      <a:lnRef idx="0">
-        <a:scrgbClr r="0" g="0" b="0"/>
-      </a:lnRef>
-      <a:fillRef idx="1">
-        <a:scrgbClr r="0" g="0" b="0"/>
-      </a:fillRef>
-      <a:effectRef idx="0">
-        <a:scrgbClr r="0" g="0" b="0"/>
-      </a:effectRef>
-      <a:fontRef idx="minor"/>
-    </dgm:style>
-  </dgm:styleLbl>
-  <dgm:styleLbl name="fgAccFollowNode1">
-    <dgm:scene3d>
-      <a:camera prst="orthographicFront">
-        <a:rot lat="0" lon="0" rev="0"/>
-      </a:camera>
-      <a:lightRig rig="contrasting" dir="t">
-        <a:rot lat="0" lon="0" rev="1200000"/>
-      </a:lightRig>
-    </dgm:scene3d>
-    <dgm:sp3d z="300000" contourW="19050" prstMaterial="metal">
-      <a:bevelT w="88900" h="203200"/>
-      <a:bevelB w="165100" h="254000"/>
-    </dgm:sp3d>
-    <dgm:txPr/>
-    <dgm:style>
-      <a:lnRef idx="0">
-        <a:scrgbClr r="0" g="0" b="0"/>
-      </a:lnRef>
-      <a:fillRef idx="1">
-        <a:scrgbClr r="0" g="0" b="0"/>
-      </a:fillRef>
-      <a:effectRef idx="0">
-        <a:scrgbClr r="0" g="0" b="0"/>
-      </a:effectRef>
-      <a:fontRef idx="minor"/>
-    </dgm:style>
-  </dgm:styleLbl>
-  <dgm:styleLbl name="alignAccFollowNode1">
-    <dgm:scene3d>
-      <a:camera prst="orthographicFront">
-        <a:rot lat="0" lon="0" rev="0"/>
-      </a:camera>
-      <a:lightRig rig="contrasting" dir="t">
-        <a:rot lat="0" lon="0" rev="1200000"/>
-      </a:lightRig>
-    </dgm:scene3d>
-    <dgm:sp3d contourW="19050" prstMaterial="metal">
-      <a:bevelT w="88900" h="203200"/>
-      <a:bevelB w="165100" h="254000"/>
-    </dgm:sp3d>
-    <dgm:txPr/>
-    <dgm:style>
-      <a:lnRef idx="0">
-        <a:scrgbClr r="0" g="0" b="0"/>
-      </a:lnRef>
-      <a:fillRef idx="1">
-        <a:scrgbClr r="0" g="0" b="0"/>
-      </a:fillRef>
-      <a:effectRef idx="0">
-        <a:scrgbClr r="0" g="0" b="0"/>
-      </a:effectRef>
-      <a:fontRef idx="minor"/>
-    </dgm:style>
-  </dgm:styleLbl>
-  <dgm:styleLbl name="bgAccFollowNode1">
-    <dgm:scene3d>
-      <a:camera prst="orthographicFront">
-        <a:rot lat="0" lon="0" rev="0"/>
-      </a:camera>
-      <a:lightRig rig="contrasting" dir="t">
-        <a:rot lat="0" lon="0" rev="1200000"/>
-      </a:lightRig>
-    </dgm:scene3d>
-    <dgm:sp3d z="-300000" contourW="19050" prstMaterial="metal">
-      <a:bevelT w="88900" h="203200"/>
-      <a:bevelB w="165100" h="254000"/>
-    </dgm:sp3d>
-    <dgm:txPr/>
-    <dgm:style>
-      <a:lnRef idx="0">
-        <a:scrgbClr r="0" g="0" b="0"/>
-      </a:lnRef>
-      <a:fillRef idx="1">
-        <a:scrgbClr r="0" g="0" b="0"/>
-      </a:fillRef>
-      <a:effectRef idx="0">
-        <a:scrgbClr r="0" g="0" b="0"/>
-      </a:effectRef>
-      <a:fontRef idx="minor"/>
-    </dgm:style>
-  </dgm:styleLbl>
-  <dgm:styleLbl name="fgAcc0">
-    <dgm:scene3d>
-      <a:camera prst="orthographicFront">
-        <a:rot lat="0" lon="0" rev="0"/>
-      </a:camera>
-      <a:lightRig rig="contrasting" dir="t">
-        <a:rot lat="0" lon="0" rev="1200000"/>
-      </a:lightRig>
-    </dgm:scene3d>
-    <dgm:sp3d z="300000" contourW="19050" prstMaterial="metal">
-      <a:bevelT w="88900" h="203200"/>
-      <a:bevelB w="165100" h="254000"/>
-    </dgm:sp3d>
-    <dgm:txPr/>
-    <dgm:style>
-      <a:lnRef idx="0">
-        <a:scrgbClr r="0" g="0" b="0"/>
-      </a:lnRef>
-      <a:fillRef idx="1">
-        <a:scrgbClr r="0" g="0" b="0"/>
-      </a:fillRef>
-      <a:effectRef idx="0">
-        <a:scrgbClr r="0" g="0" b="0"/>
-      </a:effectRef>
-      <a:fontRef idx="minor"/>
-    </dgm:style>
-  </dgm:styleLbl>
-  <dgm:styleLbl name="fgAcc2">
-    <dgm:scene3d>
-      <a:camera prst="orthographicFront">
-        <a:rot lat="0" lon="0" rev="0"/>
-      </a:camera>
-      <a:lightRig rig="contrasting" dir="t">
-        <a:rot lat="0" lon="0" rev="1200000"/>
-      </a:lightRig>
-    </dgm:scene3d>
-    <dgm:sp3d z="300000" contourW="19050" prstMaterial="metal">
-      <a:bevelT w="88900" h="203200"/>
-      <a:bevelB w="165100" h="254000"/>
-    </dgm:sp3d>
-    <dgm:txPr/>
-    <dgm:style>
-      <a:lnRef idx="0">
-        <a:scrgbClr r="0" g="0" b="0"/>
-      </a:lnRef>
-      <a:fillRef idx="1">
-        <a:scrgbClr r="0" g="0" b="0"/>
-      </a:fillRef>
-      <a:effectRef idx="0">
-        <a:scrgbClr r="0" g="0" b="0"/>
-      </a:effectRef>
-      <a:fontRef idx="minor"/>
-    </dgm:style>
-  </dgm:styleLbl>
-  <dgm:styleLbl name="fgAcc3">
-    <dgm:scene3d>
-      <a:camera prst="orthographicFront">
-        <a:rot lat="0" lon="0" rev="0"/>
-      </a:camera>
-      <a:lightRig rig="contrasting" dir="t">
-        <a:rot lat="0" lon="0" rev="1200000"/>
-      </a:lightRig>
-    </dgm:scene3d>
-    <dgm:sp3d z="300000" contourW="19050" prstMaterial="metal">
-      <a:bevelT w="88900" h="203200"/>
-      <a:bevelB w="165100" h="254000"/>
-    </dgm:sp3d>
-    <dgm:txPr/>
-    <dgm:style>
-      <a:lnRef idx="0">
-        <a:scrgbClr r="0" g="0" b="0"/>
-      </a:lnRef>
-      <a:fillRef idx="1">
-        <a:scrgbClr r="0" g="0" b="0"/>
-      </a:fillRef>
-      <a:effectRef idx="0">
-        <a:scrgbClr r="0" g="0" b="0"/>
-      </a:effectRef>
-      <a:fontRef idx="minor"/>
-    </dgm:style>
-  </dgm:styleLbl>
-  <dgm:styleLbl name="fgAcc4">
-    <dgm:scene3d>
-      <a:camera prst="orthographicFront">
-        <a:rot lat="0" lon="0" rev="0"/>
-      </a:camera>
-      <a:lightRig rig="contrasting" dir="t">
-        <a:rot lat="0" lon="0" rev="1200000"/>
-      </a:lightRig>
-    </dgm:scene3d>
-    <dgm:sp3d z="300000" contourW="19050" prstMaterial="metal">
-      <a:bevelT w="88900" h="203200"/>
-      <a:bevelB w="165100" h="254000"/>
-    </dgm:sp3d>
-    <dgm:txPr/>
-    <dgm:style>
-      <a:lnRef idx="0">
-        <a:scrgbClr r="0" g="0" b="0"/>
-      </a:lnRef>
-      <a:fillRef idx="1">
-        <a:scrgbClr r="0" g="0" b="0"/>
-      </a:fillRef>
-      <a:effectRef idx="0">
-        <a:scrgbClr r="0" g="0" b="0"/>
-      </a:effectRef>
-      <a:fontRef idx="minor"/>
-    </dgm:style>
-  </dgm:styleLbl>
-  <dgm:styleLbl name="bgShp">
-    <dgm:scene3d>
-      <a:camera prst="orthographicFront">
-        <a:rot lat="0" lon="0" rev="0"/>
-      </a:camera>
-      <a:lightRig rig="contrasting" dir="t">
-        <a:rot lat="0" lon="0" rev="1200000"/>
-      </a:lightRig>
-    </dgm:scene3d>
-    <dgm:sp3d z="-300000" prstMaterial="plastic"/>
-    <dgm:txPr/>
-    <dgm:style>
-      <a:lnRef idx="1">
-        <a:scrgbClr r="0" g="0" b="0"/>
-      </a:lnRef>
-      <a:fillRef idx="1">
-        <a:scrgbClr r="0" g="0" b="0"/>
-      </a:fillRef>
-      <a:effectRef idx="0">
-        <a:scrgbClr r="0" g="0" b="0"/>
-      </a:effectRef>
-      <a:fontRef idx="minor"/>
-    </dgm:style>
-  </dgm:styleLbl>
-  <dgm:styleLbl name="dkBgShp">
-    <dgm:scene3d>
-      <a:camera prst="orthographicFront">
-        <a:rot lat="0" lon="0" rev="0"/>
-      </a:camera>
-      <a:lightRig rig="contrasting" dir="t">
-        <a:rot lat="0" lon="0" rev="1200000"/>
-      </a:lightRig>
-    </dgm:scene3d>
-    <dgm:sp3d contourW="12700" prstMaterial="flat">
-      <a:bevelT w="100800" h="154000"/>
-      <a:bevelB w="152400"/>
-    </dgm:sp3d>
-    <dgm:txPr/>
-    <dgm:style>
-      <a:lnRef idx="0">
-        <a:scrgbClr r="0" g="0" b="0"/>
-      </a:lnRef>
-      <a:fillRef idx="1">
-        <a:scrgbClr r="0" g="0" b="0"/>
-      </a:fillRef>
-      <a:effectRef idx="0">
-        <a:scrgbClr r="0" g="0" b="0"/>
-      </a:effectRef>
-      <a:fontRef idx="minor"/>
-    </dgm:style>
-  </dgm:styleLbl>
-  <dgm:styleLbl name="trBgShp">
-    <dgm:scene3d>
-      <a:camera prst="orthographicFront">
-        <a:rot lat="0" lon="0" rev="0"/>
-      </a:camera>
-      <a:lightRig rig="contrasting" dir="t">
-        <a:rot lat="0" lon="0" rev="1200000"/>
-      </a:lightRig>
-    </dgm:scene3d>
-    <dgm:sp3d z="-152400" prstMaterial="matte"/>
-    <dgm:txPr/>
-    <dgm:style>
-      <a:lnRef idx="1">
-        <a:scrgbClr r="0" g="0" b="0"/>
-      </a:lnRef>
-      <a:fillRef idx="1">
-        <a:scrgbClr r="0" g="0" b="0"/>
-      </a:fillRef>
-      <a:effectRef idx="0">
-        <a:scrgbClr r="0" g="0" b="0"/>
-      </a:effectRef>
-      <a:fontRef idx="minor"/>
-    </dgm:style>
-  </dgm:styleLbl>
-  <dgm:styleLbl name="fgShp">
-    <dgm:scene3d>
-      <a:camera prst="orthographicFront">
-        <a:rot lat="0" lon="0" rev="0"/>
-      </a:camera>
-      <a:lightRig rig="contrasting" dir="t">
-        <a:rot lat="0" lon="0" rev="1200000"/>
-      </a:lightRig>
-    </dgm:scene3d>
-    <dgm:sp3d z="300000" contourW="19050" prstMaterial="metal">
-      <a:bevelT w="88900" h="203200"/>
-      <a:bevelB w="165100" h="254000"/>
-    </dgm:sp3d>
-    <dgm:txPr/>
-    <dgm:style>
-      <a:lnRef idx="0">
         <a:scrgbClr r="0" g="0" b="0"/>
       </a:lnRef>
       <a:fillRef idx="1">
@@ -10263,7 +9769,7 @@
     <dgm:sp3d/>
     <dgm:txPr/>
     <dgm:style>
-      <a:lnRef idx="1">
+      <a:lnRef idx="0">
         <a:scrgbClr r="0" g="0" b="0"/>
       </a:lnRef>
       <a:fillRef idx="0">
@@ -10425,7 +9931,7 @@
           <a:p>
             <a:fld id="{1D6AAEF1-BB65-438A-947A-6BD8EC392D5A}" type="datetimeFigureOut">
               <a:rPr lang="en-US" smtClean="0"/>
-              <a:t>1/12/2021</a:t>
+              <a:t>1/16/2021</a:t>
             </a:fld>
             <a:endParaRPr lang="en-US"/>
           </a:p>
@@ -10623,7 +10129,7 @@
           <a:p>
             <a:fld id="{1D6AAEF1-BB65-438A-947A-6BD8EC392D5A}" type="datetimeFigureOut">
               <a:rPr lang="en-US" smtClean="0"/>
-              <a:t>1/12/2021</a:t>
+              <a:t>1/16/2021</a:t>
             </a:fld>
             <a:endParaRPr lang="en-US"/>
           </a:p>
@@ -10831,7 +10337,7 @@
           <a:p>
             <a:fld id="{1D6AAEF1-BB65-438A-947A-6BD8EC392D5A}" type="datetimeFigureOut">
               <a:rPr lang="en-US" smtClean="0"/>
-              <a:t>1/12/2021</a:t>
+              <a:t>1/16/2021</a:t>
             </a:fld>
             <a:endParaRPr lang="en-US"/>
           </a:p>
@@ -11029,7 +10535,7 @@
           <a:p>
             <a:fld id="{1D6AAEF1-BB65-438A-947A-6BD8EC392D5A}" type="datetimeFigureOut">
               <a:rPr lang="en-US" smtClean="0"/>
-              <a:t>1/12/2021</a:t>
+              <a:t>1/16/2021</a:t>
             </a:fld>
             <a:endParaRPr lang="en-US"/>
           </a:p>
@@ -11304,7 +10810,7 @@
           <a:p>
             <a:fld id="{1D6AAEF1-BB65-438A-947A-6BD8EC392D5A}" type="datetimeFigureOut">
               <a:rPr lang="en-US" smtClean="0"/>
-              <a:t>1/12/2021</a:t>
+              <a:t>1/16/2021</a:t>
             </a:fld>
             <a:endParaRPr lang="en-US"/>
           </a:p>
@@ -11569,7 +11075,7 @@
           <a:p>
             <a:fld id="{1D6AAEF1-BB65-438A-947A-6BD8EC392D5A}" type="datetimeFigureOut">
               <a:rPr lang="en-US" smtClean="0"/>
-              <a:t>1/12/2021</a:t>
+              <a:t>1/16/2021</a:t>
             </a:fld>
             <a:endParaRPr lang="en-US"/>
           </a:p>
@@ -11981,7 +11487,7 @@
           <a:p>
             <a:fld id="{1D6AAEF1-BB65-438A-947A-6BD8EC392D5A}" type="datetimeFigureOut">
               <a:rPr lang="en-US" smtClean="0"/>
-              <a:t>1/12/2021</a:t>
+              <a:t>1/16/2021</a:t>
             </a:fld>
             <a:endParaRPr lang="en-US"/>
           </a:p>
@@ -12122,7 +11628,7 @@
           <a:p>
             <a:fld id="{1D6AAEF1-BB65-438A-947A-6BD8EC392D5A}" type="datetimeFigureOut">
               <a:rPr lang="en-US" smtClean="0"/>
-              <a:t>1/12/2021</a:t>
+              <a:t>1/16/2021</a:t>
             </a:fld>
             <a:endParaRPr lang="en-US"/>
           </a:p>
@@ -12235,7 +11741,7 @@
           <a:p>
             <a:fld id="{1D6AAEF1-BB65-438A-947A-6BD8EC392D5A}" type="datetimeFigureOut">
               <a:rPr lang="en-US" smtClean="0"/>
-              <a:t>1/12/2021</a:t>
+              <a:t>1/16/2021</a:t>
             </a:fld>
             <a:endParaRPr lang="en-US"/>
           </a:p>
@@ -12546,7 +12052,7 @@
           <a:p>
             <a:fld id="{1D6AAEF1-BB65-438A-947A-6BD8EC392D5A}" type="datetimeFigureOut">
               <a:rPr lang="en-US" smtClean="0"/>
-              <a:t>1/12/2021</a:t>
+              <a:t>1/16/2021</a:t>
             </a:fld>
             <a:endParaRPr lang="en-US"/>
           </a:p>
@@ -12834,7 +12340,7 @@
           <a:p>
             <a:fld id="{1D6AAEF1-BB65-438A-947A-6BD8EC392D5A}" type="datetimeFigureOut">
               <a:rPr lang="en-US" smtClean="0"/>
-              <a:t>1/12/2021</a:t>
+              <a:t>1/16/2021</a:t>
             </a:fld>
             <a:endParaRPr lang="en-US"/>
           </a:p>
@@ -13075,7 +12581,7 @@
           <a:p>
             <a:fld id="{1D6AAEF1-BB65-438A-947A-6BD8EC392D5A}" type="datetimeFigureOut">
               <a:rPr lang="en-US" smtClean="0"/>
-              <a:t>1/12/2021</a:t>
+              <a:t>1/16/2021</a:t>
             </a:fld>
             <a:endParaRPr lang="en-US"/>
           </a:p>
@@ -15831,13 +15337,13 @@
             <p:ph idx="1"/>
             <p:extLst>
               <p:ext uri="{D42A27DB-BD31-4B8C-83A1-F6EECF244321}">
-                <p14:modId xmlns:p14="http://schemas.microsoft.com/office/powerpoint/2010/main" val="1098556327"/>
+                <p14:modId xmlns:p14="http://schemas.microsoft.com/office/powerpoint/2010/main" val="2102087313"/>
               </p:ext>
             </p:extLst>
           </p:nvPr>
         </p:nvGraphicFramePr>
         <p:xfrm>
-          <a:off x="511628" y="634482"/>
+          <a:off x="530289" y="709126"/>
           <a:ext cx="10946364" cy="5075951"/>
         </p:xfrm>
         <a:graphic>

</xml_diff>

<commit_message>
Introducing Adaptive Equalisation, experimenting with CD filtering
</commit_message>
<xml_diff>
--- a/Master's meetings presentation.pptx
+++ b/Master's meetings presentation.pptx
@@ -26,6 +26,14 @@
     <p:sldId id="275" r:id="rId21"/>
     <p:sldId id="276" r:id="rId22"/>
     <p:sldId id="278" r:id="rId23"/>
+    <p:sldId id="279" r:id="rId24"/>
+    <p:sldId id="256" r:id="rId25"/>
+    <p:sldId id="280" r:id="rId26"/>
+    <p:sldId id="281" r:id="rId27"/>
+    <p:sldId id="282" r:id="rId28"/>
+    <p:sldId id="283" r:id="rId29"/>
+    <p:sldId id="284" r:id="rId30"/>
+    <p:sldId id="285" r:id="rId31"/>
   </p:sldIdLst>
   <p:sldSz cx="12192000" cy="6858000"/>
   <p:notesSz cx="6858000" cy="9144000"/>
@@ -9813,7 +9821,7 @@
           <a:p>
             <a:fld id="{1D6AAEF1-BB65-438A-947A-6BD8EC392D5A}" type="datetimeFigureOut">
               <a:rPr lang="en-US" smtClean="0"/>
-              <a:t>2/10/2021</a:t>
+              <a:t>2/21/2021</a:t>
             </a:fld>
             <a:endParaRPr lang="en-US"/>
           </a:p>
@@ -10011,7 +10019,7 @@
           <a:p>
             <a:fld id="{1D6AAEF1-BB65-438A-947A-6BD8EC392D5A}" type="datetimeFigureOut">
               <a:rPr lang="en-US" smtClean="0"/>
-              <a:t>2/10/2021</a:t>
+              <a:t>2/21/2021</a:t>
             </a:fld>
             <a:endParaRPr lang="en-US"/>
           </a:p>
@@ -10219,7 +10227,7 @@
           <a:p>
             <a:fld id="{1D6AAEF1-BB65-438A-947A-6BD8EC392D5A}" type="datetimeFigureOut">
               <a:rPr lang="en-US" smtClean="0"/>
-              <a:t>2/10/2021</a:t>
+              <a:t>2/21/2021</a:t>
             </a:fld>
             <a:endParaRPr lang="en-US"/>
           </a:p>
@@ -10417,7 +10425,7 @@
           <a:p>
             <a:fld id="{1D6AAEF1-BB65-438A-947A-6BD8EC392D5A}" type="datetimeFigureOut">
               <a:rPr lang="en-US" smtClean="0"/>
-              <a:t>2/10/2021</a:t>
+              <a:t>2/21/2021</a:t>
             </a:fld>
             <a:endParaRPr lang="en-US"/>
           </a:p>
@@ -10692,7 +10700,7 @@
           <a:p>
             <a:fld id="{1D6AAEF1-BB65-438A-947A-6BD8EC392D5A}" type="datetimeFigureOut">
               <a:rPr lang="en-US" smtClean="0"/>
-              <a:t>2/10/2021</a:t>
+              <a:t>2/21/2021</a:t>
             </a:fld>
             <a:endParaRPr lang="en-US"/>
           </a:p>
@@ -10957,7 +10965,7 @@
           <a:p>
             <a:fld id="{1D6AAEF1-BB65-438A-947A-6BD8EC392D5A}" type="datetimeFigureOut">
               <a:rPr lang="en-US" smtClean="0"/>
-              <a:t>2/10/2021</a:t>
+              <a:t>2/21/2021</a:t>
             </a:fld>
             <a:endParaRPr lang="en-US"/>
           </a:p>
@@ -11369,7 +11377,7 @@
           <a:p>
             <a:fld id="{1D6AAEF1-BB65-438A-947A-6BD8EC392D5A}" type="datetimeFigureOut">
               <a:rPr lang="en-US" smtClean="0"/>
-              <a:t>2/10/2021</a:t>
+              <a:t>2/21/2021</a:t>
             </a:fld>
             <a:endParaRPr lang="en-US"/>
           </a:p>
@@ -11510,7 +11518,7 @@
           <a:p>
             <a:fld id="{1D6AAEF1-BB65-438A-947A-6BD8EC392D5A}" type="datetimeFigureOut">
               <a:rPr lang="en-US" smtClean="0"/>
-              <a:t>2/10/2021</a:t>
+              <a:t>2/21/2021</a:t>
             </a:fld>
             <a:endParaRPr lang="en-US"/>
           </a:p>
@@ -11623,7 +11631,7 @@
           <a:p>
             <a:fld id="{1D6AAEF1-BB65-438A-947A-6BD8EC392D5A}" type="datetimeFigureOut">
               <a:rPr lang="en-US" smtClean="0"/>
-              <a:t>2/10/2021</a:t>
+              <a:t>2/21/2021</a:t>
             </a:fld>
             <a:endParaRPr lang="en-US"/>
           </a:p>
@@ -11934,7 +11942,7 @@
           <a:p>
             <a:fld id="{1D6AAEF1-BB65-438A-947A-6BD8EC392D5A}" type="datetimeFigureOut">
               <a:rPr lang="en-US" smtClean="0"/>
-              <a:t>2/10/2021</a:t>
+              <a:t>2/21/2021</a:t>
             </a:fld>
             <a:endParaRPr lang="en-US"/>
           </a:p>
@@ -12222,7 +12230,7 @@
           <a:p>
             <a:fld id="{1D6AAEF1-BB65-438A-947A-6BD8EC392D5A}" type="datetimeFigureOut">
               <a:rPr lang="en-US" smtClean="0"/>
-              <a:t>2/10/2021</a:t>
+              <a:t>2/21/2021</a:t>
             </a:fld>
             <a:endParaRPr lang="en-US"/>
           </a:p>
@@ -12463,7 +12471,7 @@
           <a:p>
             <a:fld id="{1D6AAEF1-BB65-438A-947A-6BD8EC392D5A}" type="datetimeFigureOut">
               <a:rPr lang="en-US" smtClean="0"/>
-              <a:t>2/10/2021</a:t>
+              <a:t>2/21/2021</a:t>
             </a:fld>
             <a:endParaRPr lang="en-US"/>
           </a:p>
@@ -18266,6 +18274,1764 @@
 </p:sld>
 </file>
 
+<file path=ppt/slides/slide22.xml><?xml version="1.0" encoding="utf-8"?>
+<p:sld xmlns:a="http://schemas.openxmlformats.org/drawingml/2006/main" xmlns:r="http://schemas.openxmlformats.org/officeDocument/2006/relationships" xmlns:p="http://schemas.openxmlformats.org/presentationml/2006/main">
+  <p:cSld>
+    <p:spTree>
+      <p:nvGrpSpPr>
+        <p:cNvPr id="1" name=""/>
+        <p:cNvGrpSpPr/>
+        <p:nvPr/>
+      </p:nvGrpSpPr>
+      <p:grpSpPr>
+        <a:xfrm>
+          <a:off x="0" y="0"/>
+          <a:ext cx="0" cy="0"/>
+          <a:chOff x="0" y="0"/>
+          <a:chExt cx="0" cy="0"/>
+        </a:xfrm>
+      </p:grpSpPr>
+      <p:sp>
+        <p:nvSpPr>
+          <p:cNvPr id="2" name="Title 1">
+            <a:extLst>
+              <a:ext uri="{FF2B5EF4-FFF2-40B4-BE49-F238E27FC236}">
+                <a16:creationId xmlns:a16="http://schemas.microsoft.com/office/drawing/2014/main" id="{444665F1-CA25-4942-9D17-905F93542C11}"/>
+              </a:ext>
+            </a:extLst>
+          </p:cNvPr>
+          <p:cNvSpPr>
+            <a:spLocks noGrp="1"/>
+          </p:cNvSpPr>
+          <p:nvPr>
+            <p:ph type="title"/>
+          </p:nvPr>
+        </p:nvSpPr>
+        <p:spPr/>
+        <p:txBody>
+          <a:bodyPr>
+            <a:normAutofit fontScale="90000"/>
+          </a:bodyPr>
+          <a:lstStyle/>
+          <a:p>
+            <a:r>
+              <a:rPr lang="en-GB" b="1" dirty="0"/>
+              <a:t>Debugging Chromatic Dispersion: </a:t>
+            </a:r>
+            <a:br>
+              <a:rPr lang="en-GB" b="1" dirty="0"/>
+            </a:br>
+            <a:r>
+              <a:rPr lang="en-GB" dirty="0"/>
+              <a:t>Results for Chromatic Dispersion and the Filter applied correcting it</a:t>
+            </a:r>
+          </a:p>
+        </p:txBody>
+      </p:sp>
+      <p:sp>
+        <p:nvSpPr>
+          <p:cNvPr id="3" name="Content Placeholder 2">
+            <a:extLst>
+              <a:ext uri="{FF2B5EF4-FFF2-40B4-BE49-F238E27FC236}">
+                <a16:creationId xmlns:a16="http://schemas.microsoft.com/office/drawing/2014/main" id="{E8F5949A-B502-49A8-AD0B-8705DD45024D}"/>
+              </a:ext>
+            </a:extLst>
+          </p:cNvPr>
+          <p:cNvSpPr>
+            <a:spLocks noGrp="1"/>
+          </p:cNvSpPr>
+          <p:nvPr>
+            <p:ph idx="1"/>
+          </p:nvPr>
+        </p:nvSpPr>
+        <p:spPr>
+          <a:xfrm>
+            <a:off x="772885" y="2190490"/>
+            <a:ext cx="10515600" cy="3380857"/>
+          </a:xfrm>
+        </p:spPr>
+        <p:txBody>
+          <a:bodyPr>
+            <a:normAutofit fontScale="92500" lnSpcReduction="10000"/>
+          </a:bodyPr>
+          <a:lstStyle/>
+          <a:p>
+            <a:pPr>
+              <a:lnSpc>
+                <a:spcPct val="110000"/>
+              </a:lnSpc>
+            </a:pPr>
+            <a:r>
+              <a:rPr lang="en-GB" dirty="0"/>
+              <a:t>4 different modulation formats BPSK, QPSK, 16QAM and 64QAM. The signals were pulse-shaped with a raised-cosine filter with an </a:t>
+            </a:r>
+            <a:r>
+              <a:rPr lang="en-GB" dirty="0" err="1"/>
+              <a:t>upsampling</a:t>
+            </a:r>
+            <a:r>
+              <a:rPr lang="en-GB" dirty="0"/>
+              <a:t> of 2 samples per symbol. </a:t>
+            </a:r>
+          </a:p>
+          <a:p>
+            <a:pPr>
+              <a:lnSpc>
+                <a:spcPct val="110000"/>
+              </a:lnSpc>
+            </a:pPr>
+            <a:r>
+              <a:rPr lang="en-GB" dirty="0"/>
+              <a:t>A Chromatic Dispersion Model was applied to these samples. Scatter plots were made for each modulation between distances of 10 and 110 km.</a:t>
+            </a:r>
+          </a:p>
+          <a:p>
+            <a:pPr>
+              <a:lnSpc>
+                <a:spcPct val="110000"/>
+              </a:lnSpc>
+            </a:pPr>
+            <a:r>
+              <a:rPr lang="en-GB" dirty="0"/>
+              <a:t>A chromatic dispersion filter was applied immediately after CD was introduced and scatter plots were made for comparison.</a:t>
+            </a:r>
+          </a:p>
+          <a:p>
+            <a:pPr marL="0" indent="0">
+              <a:lnSpc>
+                <a:spcPct val="110000"/>
+              </a:lnSpc>
+              <a:buNone/>
+            </a:pPr>
+            <a:endParaRPr lang="en-GB" dirty="0"/>
+          </a:p>
+        </p:txBody>
+      </p:sp>
+      <p:sp>
+        <p:nvSpPr>
+          <p:cNvPr id="4" name="TextBox 3">
+            <a:extLst>
+              <a:ext uri="{FF2B5EF4-FFF2-40B4-BE49-F238E27FC236}">
+                <a16:creationId xmlns:a16="http://schemas.microsoft.com/office/drawing/2014/main" id="{352966B2-96B5-49AC-BA90-57FD117C3B7B}"/>
+              </a:ext>
+            </a:extLst>
+          </p:cNvPr>
+          <p:cNvSpPr txBox="1"/>
+          <p:nvPr/>
+        </p:nvSpPr>
+        <p:spPr>
+          <a:xfrm>
+            <a:off x="10988351" y="6488668"/>
+            <a:ext cx="1203649" cy="369332"/>
+          </a:xfrm>
+          <a:prstGeom prst="rect">
+            <a:avLst/>
+          </a:prstGeom>
+          <a:noFill/>
+        </p:spPr>
+        <p:txBody>
+          <a:bodyPr wrap="square" rtlCol="0">
+            <a:spAutoFit/>
+          </a:bodyPr>
+          <a:lstStyle/>
+          <a:p>
+            <a:r>
+              <a:rPr lang="en-GB" dirty="0"/>
+              <a:t>Weeks 3-4</a:t>
+            </a:r>
+          </a:p>
+        </p:txBody>
+      </p:sp>
+    </p:spTree>
+    <p:extLst>
+      <p:ext uri="{BB962C8B-B14F-4D97-AF65-F5344CB8AC3E}">
+        <p14:creationId xmlns:p14="http://schemas.microsoft.com/office/powerpoint/2010/main" val="705414405"/>
+      </p:ext>
+    </p:extLst>
+  </p:cSld>
+  <p:clrMapOvr>
+    <a:masterClrMapping/>
+  </p:clrMapOvr>
+</p:sld>
+</file>
+
+<file path=ppt/slides/slide23.xml><?xml version="1.0" encoding="utf-8"?>
+<p:sld xmlns:a="http://schemas.openxmlformats.org/drawingml/2006/main" xmlns:r="http://schemas.openxmlformats.org/officeDocument/2006/relationships" xmlns:p="http://schemas.openxmlformats.org/presentationml/2006/main">
+  <p:cSld>
+    <p:spTree>
+      <p:nvGrpSpPr>
+        <p:cNvPr id="1" name=""/>
+        <p:cNvGrpSpPr/>
+        <p:nvPr/>
+      </p:nvGrpSpPr>
+      <p:grpSpPr>
+        <a:xfrm>
+          <a:off x="0" y="0"/>
+          <a:ext cx="0" cy="0"/>
+          <a:chOff x="0" y="0"/>
+          <a:chExt cx="0" cy="0"/>
+        </a:xfrm>
+      </p:grpSpPr>
+      <p:sp>
+        <p:nvSpPr>
+          <p:cNvPr id="12" name="TextBox 11">
+            <a:extLst>
+              <a:ext uri="{FF2B5EF4-FFF2-40B4-BE49-F238E27FC236}">
+                <a16:creationId xmlns:a16="http://schemas.microsoft.com/office/drawing/2014/main" id="{F424DA2F-5E70-4288-A2ED-7ED05C5964A4}"/>
+              </a:ext>
+            </a:extLst>
+          </p:cNvPr>
+          <p:cNvSpPr txBox="1"/>
+          <p:nvPr/>
+        </p:nvSpPr>
+        <p:spPr>
+          <a:xfrm>
+            <a:off x="2853480" y="13785"/>
+            <a:ext cx="6497548" cy="769441"/>
+          </a:xfrm>
+          <a:prstGeom prst="rect">
+            <a:avLst/>
+          </a:prstGeom>
+          <a:noFill/>
+        </p:spPr>
+        <p:txBody>
+          <a:bodyPr wrap="none" rtlCol="0">
+            <a:spAutoFit/>
+          </a:bodyPr>
+          <a:lstStyle/>
+          <a:p>
+            <a:r>
+              <a:rPr lang="en-GB" sz="4400" b="1" dirty="0"/>
+              <a:t>BPSK Chromatic Dispersion</a:t>
+            </a:r>
+          </a:p>
+        </p:txBody>
+      </p:sp>
+      <p:pic>
+        <p:nvPicPr>
+          <p:cNvPr id="14" name="Picture 13" descr="Diagram&#10;&#10;Description automatically generated">
+            <a:extLst>
+              <a:ext uri="{FF2B5EF4-FFF2-40B4-BE49-F238E27FC236}">
+                <a16:creationId xmlns:a16="http://schemas.microsoft.com/office/drawing/2014/main" id="{9836CCB1-FD14-46AC-A106-F68D91EE0A68}"/>
+              </a:ext>
+            </a:extLst>
+          </p:cNvPr>
+          <p:cNvPicPr>
+            <a:picLocks noChangeAspect="1"/>
+          </p:cNvPicPr>
+          <p:nvPr/>
+        </p:nvPicPr>
+        <p:blipFill>
+          <a:blip r:embed="rId2">
+            <a:extLst>
+              <a:ext uri="{28A0092B-C50C-407E-A947-70E740481C1C}">
+                <a14:useLocalDpi xmlns:a14="http://schemas.microsoft.com/office/drawing/2010/main" val="0"/>
+              </a:ext>
+            </a:extLst>
+          </a:blip>
+          <a:stretch>
+            <a:fillRect/>
+          </a:stretch>
+        </p:blipFill>
+        <p:spPr>
+          <a:xfrm>
+            <a:off x="1633846" y="3617953"/>
+            <a:ext cx="3619652" cy="2713705"/>
+          </a:xfrm>
+          <a:prstGeom prst="rect">
+            <a:avLst/>
+          </a:prstGeom>
+        </p:spPr>
+      </p:pic>
+      <p:pic>
+        <p:nvPicPr>
+          <p:cNvPr id="17" name="Picture 16" descr="A picture containing chart&#10;&#10;Description automatically generated">
+            <a:extLst>
+              <a:ext uri="{FF2B5EF4-FFF2-40B4-BE49-F238E27FC236}">
+                <a16:creationId xmlns:a16="http://schemas.microsoft.com/office/drawing/2014/main" id="{0938EE0B-B717-4CFD-9826-6DDAD7BAD169}"/>
+              </a:ext>
+            </a:extLst>
+          </p:cNvPr>
+          <p:cNvPicPr>
+            <a:picLocks noChangeAspect="1"/>
+          </p:cNvPicPr>
+          <p:nvPr/>
+        </p:nvPicPr>
+        <p:blipFill>
+          <a:blip r:embed="rId3">
+            <a:extLst>
+              <a:ext uri="{28A0092B-C50C-407E-A947-70E740481C1C}">
+                <a14:useLocalDpi xmlns:a14="http://schemas.microsoft.com/office/drawing/2010/main" val="0"/>
+              </a:ext>
+            </a:extLst>
+          </a:blip>
+          <a:stretch>
+            <a:fillRect/>
+          </a:stretch>
+        </p:blipFill>
+        <p:spPr>
+          <a:xfrm>
+            <a:off x="7136119" y="3617953"/>
+            <a:ext cx="3663119" cy="2746293"/>
+          </a:xfrm>
+          <a:prstGeom prst="rect">
+            <a:avLst/>
+          </a:prstGeom>
+        </p:spPr>
+      </p:pic>
+      <p:pic>
+        <p:nvPicPr>
+          <p:cNvPr id="23" name="Picture 22" descr="Chart&#10;&#10;Description automatically generated">
+            <a:extLst>
+              <a:ext uri="{FF2B5EF4-FFF2-40B4-BE49-F238E27FC236}">
+                <a16:creationId xmlns:a16="http://schemas.microsoft.com/office/drawing/2014/main" id="{DD2C50AA-4A3B-41E1-A547-EFF796A4FA04}"/>
+              </a:ext>
+            </a:extLst>
+          </p:cNvPr>
+          <p:cNvPicPr>
+            <a:picLocks noChangeAspect="1"/>
+          </p:cNvPicPr>
+          <p:nvPr/>
+        </p:nvPicPr>
+        <p:blipFill>
+          <a:blip r:embed="rId4">
+            <a:extLst>
+              <a:ext uri="{28A0092B-C50C-407E-A947-70E740481C1C}">
+                <a14:useLocalDpi xmlns:a14="http://schemas.microsoft.com/office/drawing/2010/main" val="0"/>
+              </a:ext>
+            </a:extLst>
+          </a:blip>
+          <a:stretch>
+            <a:fillRect/>
+          </a:stretch>
+        </p:blipFill>
+        <p:spPr>
+          <a:xfrm>
+            <a:off x="1687656" y="597626"/>
+            <a:ext cx="3619646" cy="2713700"/>
+          </a:xfrm>
+          <a:prstGeom prst="rect">
+            <a:avLst/>
+          </a:prstGeom>
+        </p:spPr>
+      </p:pic>
+      <p:pic>
+        <p:nvPicPr>
+          <p:cNvPr id="26" name="Picture 25" descr="A picture containing diagram&#10;&#10;Description automatically generated">
+            <a:extLst>
+              <a:ext uri="{FF2B5EF4-FFF2-40B4-BE49-F238E27FC236}">
+                <a16:creationId xmlns:a16="http://schemas.microsoft.com/office/drawing/2014/main" id="{D13FCAA9-3443-484B-8908-715AE1CFD6B6}"/>
+              </a:ext>
+            </a:extLst>
+          </p:cNvPr>
+          <p:cNvPicPr>
+            <a:picLocks noChangeAspect="1"/>
+          </p:cNvPicPr>
+          <p:nvPr/>
+        </p:nvPicPr>
+        <p:blipFill>
+          <a:blip r:embed="rId5">
+            <a:extLst>
+              <a:ext uri="{28A0092B-C50C-407E-A947-70E740481C1C}">
+                <a14:useLocalDpi xmlns:a14="http://schemas.microsoft.com/office/drawing/2010/main" val="0"/>
+              </a:ext>
+            </a:extLst>
+          </a:blip>
+          <a:stretch>
+            <a:fillRect/>
+          </a:stretch>
+        </p:blipFill>
+        <p:spPr>
+          <a:xfrm>
+            <a:off x="7252935" y="668909"/>
+            <a:ext cx="3429486" cy="2571135"/>
+          </a:xfrm>
+          <a:prstGeom prst="rect">
+            <a:avLst/>
+          </a:prstGeom>
+        </p:spPr>
+      </p:pic>
+      <p:sp>
+        <p:nvSpPr>
+          <p:cNvPr id="10" name="TextBox 9">
+            <a:extLst>
+              <a:ext uri="{FF2B5EF4-FFF2-40B4-BE49-F238E27FC236}">
+                <a16:creationId xmlns:a16="http://schemas.microsoft.com/office/drawing/2014/main" id="{5AE22D2B-EFA7-47A6-B48F-EBD54570DA76}"/>
+              </a:ext>
+            </a:extLst>
+          </p:cNvPr>
+          <p:cNvSpPr txBox="1"/>
+          <p:nvPr/>
+        </p:nvSpPr>
+        <p:spPr>
+          <a:xfrm>
+            <a:off x="10988351" y="6488668"/>
+            <a:ext cx="1203649" cy="369332"/>
+          </a:xfrm>
+          <a:prstGeom prst="rect">
+            <a:avLst/>
+          </a:prstGeom>
+          <a:noFill/>
+        </p:spPr>
+        <p:txBody>
+          <a:bodyPr wrap="square" rtlCol="0">
+            <a:spAutoFit/>
+          </a:bodyPr>
+          <a:lstStyle/>
+          <a:p>
+            <a:r>
+              <a:rPr lang="en-GB" dirty="0"/>
+              <a:t>Weeks 3-4</a:t>
+            </a:r>
+          </a:p>
+        </p:txBody>
+      </p:sp>
+    </p:spTree>
+    <p:extLst>
+      <p:ext uri="{BB962C8B-B14F-4D97-AF65-F5344CB8AC3E}">
+        <p14:creationId xmlns:p14="http://schemas.microsoft.com/office/powerpoint/2010/main" val="258503146"/>
+      </p:ext>
+    </p:extLst>
+  </p:cSld>
+  <p:clrMapOvr>
+    <a:masterClrMapping/>
+  </p:clrMapOvr>
+</p:sld>
+</file>
+
+<file path=ppt/slides/slide24.xml><?xml version="1.0" encoding="utf-8"?>
+<p:sld xmlns:a="http://schemas.openxmlformats.org/drawingml/2006/main" xmlns:r="http://schemas.openxmlformats.org/officeDocument/2006/relationships" xmlns:p="http://schemas.openxmlformats.org/presentationml/2006/main">
+  <p:cSld>
+    <p:spTree>
+      <p:nvGrpSpPr>
+        <p:cNvPr id="1" name=""/>
+        <p:cNvGrpSpPr/>
+        <p:nvPr/>
+      </p:nvGrpSpPr>
+      <p:grpSpPr>
+        <a:xfrm>
+          <a:off x="0" y="0"/>
+          <a:ext cx="0" cy="0"/>
+          <a:chOff x="0" y="0"/>
+          <a:chExt cx="0" cy="0"/>
+        </a:xfrm>
+      </p:grpSpPr>
+      <p:pic>
+        <p:nvPicPr>
+          <p:cNvPr id="5" name="Picture 4" descr="Chart, scatter chart&#10;&#10;Description automatically generated">
+            <a:extLst>
+              <a:ext uri="{FF2B5EF4-FFF2-40B4-BE49-F238E27FC236}">
+                <a16:creationId xmlns:a16="http://schemas.microsoft.com/office/drawing/2014/main" id="{614BCDAC-93BD-4553-AB4A-C561C6CBC1C8}"/>
+              </a:ext>
+            </a:extLst>
+          </p:cNvPr>
+          <p:cNvPicPr>
+            <a:picLocks noChangeAspect="1"/>
+          </p:cNvPicPr>
+          <p:nvPr/>
+        </p:nvPicPr>
+        <p:blipFill>
+          <a:blip r:embed="rId2">
+            <a:extLst>
+              <a:ext uri="{28A0092B-C50C-407E-A947-70E740481C1C}">
+                <a14:useLocalDpi xmlns:a14="http://schemas.microsoft.com/office/drawing/2010/main" val="0"/>
+              </a:ext>
+            </a:extLst>
+          </a:blip>
+          <a:stretch>
+            <a:fillRect/>
+          </a:stretch>
+        </p:blipFill>
+        <p:spPr>
+          <a:xfrm>
+            <a:off x="7002715" y="3672638"/>
+            <a:ext cx="3392248" cy="2543217"/>
+          </a:xfrm>
+          <a:prstGeom prst="rect">
+            <a:avLst/>
+          </a:prstGeom>
+        </p:spPr>
+      </p:pic>
+      <p:pic>
+        <p:nvPicPr>
+          <p:cNvPr id="9" name="Picture 8" descr="Chart, scatter chart&#10;&#10;Description automatically generated">
+            <a:extLst>
+              <a:ext uri="{FF2B5EF4-FFF2-40B4-BE49-F238E27FC236}">
+                <a16:creationId xmlns:a16="http://schemas.microsoft.com/office/drawing/2014/main" id="{5FA35BF6-9488-4604-AADC-4EA4BEF93841}"/>
+              </a:ext>
+            </a:extLst>
+          </p:cNvPr>
+          <p:cNvPicPr>
+            <a:picLocks noChangeAspect="1"/>
+          </p:cNvPicPr>
+          <p:nvPr/>
+        </p:nvPicPr>
+        <p:blipFill>
+          <a:blip r:embed="rId3">
+            <a:extLst>
+              <a:ext uri="{28A0092B-C50C-407E-A947-70E740481C1C}">
+                <a14:useLocalDpi xmlns:a14="http://schemas.microsoft.com/office/drawing/2010/main" val="0"/>
+              </a:ext>
+            </a:extLst>
+          </a:blip>
+          <a:stretch>
+            <a:fillRect/>
+          </a:stretch>
+        </p:blipFill>
+        <p:spPr>
+          <a:xfrm>
+            <a:off x="6999187" y="642145"/>
+            <a:ext cx="3395776" cy="2545862"/>
+          </a:xfrm>
+          <a:prstGeom prst="rect">
+            <a:avLst/>
+          </a:prstGeom>
+        </p:spPr>
+      </p:pic>
+      <p:pic>
+        <p:nvPicPr>
+          <p:cNvPr id="19" name="Picture 18" descr="Chart&#10;&#10;Description automatically generated">
+            <a:extLst>
+              <a:ext uri="{FF2B5EF4-FFF2-40B4-BE49-F238E27FC236}">
+                <a16:creationId xmlns:a16="http://schemas.microsoft.com/office/drawing/2014/main" id="{903EE10F-E769-4C2B-82A3-A7BAB9B871A6}"/>
+              </a:ext>
+            </a:extLst>
+          </p:cNvPr>
+          <p:cNvPicPr>
+            <a:picLocks noChangeAspect="1"/>
+          </p:cNvPicPr>
+          <p:nvPr/>
+        </p:nvPicPr>
+        <p:blipFill>
+          <a:blip r:embed="rId4">
+            <a:extLst>
+              <a:ext uri="{28A0092B-C50C-407E-A947-70E740481C1C}">
+                <a14:useLocalDpi xmlns:a14="http://schemas.microsoft.com/office/drawing/2010/main" val="0"/>
+              </a:ext>
+            </a:extLst>
+          </a:blip>
+          <a:stretch>
+            <a:fillRect/>
+          </a:stretch>
+        </p:blipFill>
+        <p:spPr>
+          <a:xfrm>
+            <a:off x="1763743" y="642145"/>
+            <a:ext cx="3405922" cy="2553469"/>
+          </a:xfrm>
+          <a:prstGeom prst="rect">
+            <a:avLst/>
+          </a:prstGeom>
+        </p:spPr>
+      </p:pic>
+      <p:pic>
+        <p:nvPicPr>
+          <p:cNvPr id="21" name="Picture 20" descr="Chart&#10;&#10;Description automatically generated">
+            <a:extLst>
+              <a:ext uri="{FF2B5EF4-FFF2-40B4-BE49-F238E27FC236}">
+                <a16:creationId xmlns:a16="http://schemas.microsoft.com/office/drawing/2014/main" id="{7CB0854F-4193-4430-AD8F-21CAFADAEC2A}"/>
+              </a:ext>
+            </a:extLst>
+          </p:cNvPr>
+          <p:cNvPicPr>
+            <a:picLocks noChangeAspect="1"/>
+          </p:cNvPicPr>
+          <p:nvPr/>
+        </p:nvPicPr>
+        <p:blipFill>
+          <a:blip r:embed="rId5">
+            <a:extLst>
+              <a:ext uri="{28A0092B-C50C-407E-A947-70E740481C1C}">
+                <a14:useLocalDpi xmlns:a14="http://schemas.microsoft.com/office/drawing/2010/main" val="0"/>
+              </a:ext>
+            </a:extLst>
+          </a:blip>
+          <a:stretch>
+            <a:fillRect/>
+          </a:stretch>
+        </p:blipFill>
+        <p:spPr>
+          <a:xfrm>
+            <a:off x="1777417" y="3690772"/>
+            <a:ext cx="3392248" cy="2543217"/>
+          </a:xfrm>
+          <a:prstGeom prst="rect">
+            <a:avLst/>
+          </a:prstGeom>
+        </p:spPr>
+      </p:pic>
+      <p:sp>
+        <p:nvSpPr>
+          <p:cNvPr id="12" name="TextBox 11">
+            <a:extLst>
+              <a:ext uri="{FF2B5EF4-FFF2-40B4-BE49-F238E27FC236}">
+                <a16:creationId xmlns:a16="http://schemas.microsoft.com/office/drawing/2014/main" id="{F424DA2F-5E70-4288-A2ED-7ED05C5964A4}"/>
+              </a:ext>
+            </a:extLst>
+          </p:cNvPr>
+          <p:cNvSpPr txBox="1"/>
+          <p:nvPr/>
+        </p:nvSpPr>
+        <p:spPr>
+          <a:xfrm>
+            <a:off x="3129506" y="9846"/>
+            <a:ext cx="6227089" cy="769441"/>
+          </a:xfrm>
+          <a:prstGeom prst="rect">
+            <a:avLst/>
+          </a:prstGeom>
+          <a:noFill/>
+        </p:spPr>
+        <p:txBody>
+          <a:bodyPr wrap="none" rtlCol="0">
+            <a:spAutoFit/>
+          </a:bodyPr>
+          <a:lstStyle/>
+          <a:p>
+            <a:r>
+              <a:rPr lang="en-GB" sz="4400" b="1" dirty="0"/>
+              <a:t>BPSK Compensation Filter</a:t>
+            </a:r>
+          </a:p>
+        </p:txBody>
+      </p:sp>
+      <p:sp>
+        <p:nvSpPr>
+          <p:cNvPr id="7" name="TextBox 6">
+            <a:extLst>
+              <a:ext uri="{FF2B5EF4-FFF2-40B4-BE49-F238E27FC236}">
+                <a16:creationId xmlns:a16="http://schemas.microsoft.com/office/drawing/2014/main" id="{B23D6BFC-0139-4E32-935C-17CE7A700BB0}"/>
+              </a:ext>
+            </a:extLst>
+          </p:cNvPr>
+          <p:cNvSpPr txBox="1"/>
+          <p:nvPr/>
+        </p:nvSpPr>
+        <p:spPr>
+          <a:xfrm>
+            <a:off x="10988351" y="6488668"/>
+            <a:ext cx="1203649" cy="369332"/>
+          </a:xfrm>
+          <a:prstGeom prst="rect">
+            <a:avLst/>
+          </a:prstGeom>
+          <a:noFill/>
+        </p:spPr>
+        <p:txBody>
+          <a:bodyPr wrap="square" rtlCol="0">
+            <a:spAutoFit/>
+          </a:bodyPr>
+          <a:lstStyle/>
+          <a:p>
+            <a:r>
+              <a:rPr lang="en-GB" dirty="0"/>
+              <a:t>Weeks 3-4</a:t>
+            </a:r>
+          </a:p>
+        </p:txBody>
+      </p:sp>
+    </p:spTree>
+    <p:extLst>
+      <p:ext uri="{BB962C8B-B14F-4D97-AF65-F5344CB8AC3E}">
+        <p14:creationId xmlns:p14="http://schemas.microsoft.com/office/powerpoint/2010/main" val="1052468837"/>
+      </p:ext>
+    </p:extLst>
+  </p:cSld>
+  <p:clrMapOvr>
+    <a:masterClrMapping/>
+  </p:clrMapOvr>
+</p:sld>
+</file>
+
+<file path=ppt/slides/slide25.xml><?xml version="1.0" encoding="utf-8"?>
+<p:sld xmlns:a="http://schemas.openxmlformats.org/drawingml/2006/main" xmlns:r="http://schemas.openxmlformats.org/officeDocument/2006/relationships" xmlns:p="http://schemas.openxmlformats.org/presentationml/2006/main">
+  <p:cSld>
+    <p:spTree>
+      <p:nvGrpSpPr>
+        <p:cNvPr id="1" name=""/>
+        <p:cNvGrpSpPr/>
+        <p:nvPr/>
+      </p:nvGrpSpPr>
+      <p:grpSpPr>
+        <a:xfrm>
+          <a:off x="0" y="0"/>
+          <a:ext cx="0" cy="0"/>
+          <a:chOff x="0" y="0"/>
+          <a:chExt cx="0" cy="0"/>
+        </a:xfrm>
+      </p:grpSpPr>
+      <p:sp>
+        <p:nvSpPr>
+          <p:cNvPr id="2" name="Title 1">
+            <a:extLst>
+              <a:ext uri="{FF2B5EF4-FFF2-40B4-BE49-F238E27FC236}">
+                <a16:creationId xmlns:a16="http://schemas.microsoft.com/office/drawing/2014/main" id="{1BB0F7EE-FAE7-4F19-B558-2FCF4C2E3C8B}"/>
+              </a:ext>
+            </a:extLst>
+          </p:cNvPr>
+          <p:cNvSpPr>
+            <a:spLocks noGrp="1"/>
+          </p:cNvSpPr>
+          <p:nvPr>
+            <p:ph type="title"/>
+          </p:nvPr>
+        </p:nvSpPr>
+        <p:spPr/>
+        <p:txBody>
+          <a:bodyPr/>
+          <a:lstStyle/>
+          <a:p>
+            <a:r>
+              <a:rPr lang="en-GB" dirty="0"/>
+              <a:t>Notes on CD</a:t>
+            </a:r>
+          </a:p>
+        </p:txBody>
+      </p:sp>
+      <p:sp>
+        <p:nvSpPr>
+          <p:cNvPr id="3" name="Content Placeholder 2">
+            <a:extLst>
+              <a:ext uri="{FF2B5EF4-FFF2-40B4-BE49-F238E27FC236}">
+                <a16:creationId xmlns:a16="http://schemas.microsoft.com/office/drawing/2014/main" id="{9BF9EF71-72F3-4AC0-87E6-DA4028331C7D}"/>
+              </a:ext>
+            </a:extLst>
+          </p:cNvPr>
+          <p:cNvSpPr>
+            <a:spLocks noGrp="1"/>
+          </p:cNvSpPr>
+          <p:nvPr>
+            <p:ph idx="1"/>
+          </p:nvPr>
+        </p:nvSpPr>
+        <p:spPr>
+          <a:xfrm>
+            <a:off x="784998" y="2670790"/>
+            <a:ext cx="10980174" cy="4351338"/>
+          </a:xfrm>
+        </p:spPr>
+        <p:txBody>
+          <a:bodyPr/>
+          <a:lstStyle/>
+          <a:p>
+            <a:r>
+              <a:rPr lang="en-GB" dirty="0"/>
+              <a:t>All other modulation schemes (QPSK, 16,64QAM) show a pattern similar to AWGN noise with only discernible difference being greater deviations in amplitudes of symbols as distance increased.</a:t>
+            </a:r>
+          </a:p>
+          <a:p>
+            <a:r>
+              <a:rPr lang="en-GB" dirty="0"/>
+              <a:t>The CD filter effects BPSK symbols at small distances but otherwise does not practically reverse the effects of CD at any distance for higher modulation formats</a:t>
+            </a:r>
+          </a:p>
+        </p:txBody>
+      </p:sp>
+      <p:pic>
+        <p:nvPicPr>
+          <p:cNvPr id="5" name="Picture 4" descr="Chart, bubble chart&#10;&#10;Description automatically generated">
+            <a:extLst>
+              <a:ext uri="{FF2B5EF4-FFF2-40B4-BE49-F238E27FC236}">
+                <a16:creationId xmlns:a16="http://schemas.microsoft.com/office/drawing/2014/main" id="{481E6865-F7F3-48EC-8BBE-C7F20429F6C4}"/>
+              </a:ext>
+            </a:extLst>
+          </p:cNvPr>
+          <p:cNvPicPr>
+            <a:picLocks noChangeAspect="1"/>
+          </p:cNvPicPr>
+          <p:nvPr/>
+        </p:nvPicPr>
+        <p:blipFill>
+          <a:blip r:embed="rId2">
+            <a:extLst>
+              <a:ext uri="{28A0092B-C50C-407E-A947-70E740481C1C}">
+                <a14:useLocalDpi xmlns:a14="http://schemas.microsoft.com/office/drawing/2010/main" val="0"/>
+              </a:ext>
+            </a:extLst>
+          </a:blip>
+          <a:stretch>
+            <a:fillRect/>
+          </a:stretch>
+        </p:blipFill>
+        <p:spPr>
+          <a:xfrm>
+            <a:off x="9350477" y="365125"/>
+            <a:ext cx="2702181" cy="2025864"/>
+          </a:xfrm>
+          <a:prstGeom prst="rect">
+            <a:avLst/>
+          </a:prstGeom>
+        </p:spPr>
+      </p:pic>
+      <p:pic>
+        <p:nvPicPr>
+          <p:cNvPr id="7" name="Picture 6" descr="Chart&#10;&#10;Description automatically generated">
+            <a:extLst>
+              <a:ext uri="{FF2B5EF4-FFF2-40B4-BE49-F238E27FC236}">
+                <a16:creationId xmlns:a16="http://schemas.microsoft.com/office/drawing/2014/main" id="{E5694907-5133-4DF2-AFE3-0A2B60ADDDA5}"/>
+              </a:ext>
+            </a:extLst>
+          </p:cNvPr>
+          <p:cNvPicPr>
+            <a:picLocks noChangeAspect="1"/>
+          </p:cNvPicPr>
+          <p:nvPr/>
+        </p:nvPicPr>
+        <p:blipFill>
+          <a:blip r:embed="rId3">
+            <a:extLst>
+              <a:ext uri="{28A0092B-C50C-407E-A947-70E740481C1C}">
+                <a14:useLocalDpi xmlns:a14="http://schemas.microsoft.com/office/drawing/2010/main" val="0"/>
+              </a:ext>
+            </a:extLst>
+          </a:blip>
+          <a:stretch>
+            <a:fillRect/>
+          </a:stretch>
+        </p:blipFill>
+        <p:spPr>
+          <a:xfrm>
+            <a:off x="6275085" y="225224"/>
+            <a:ext cx="3075392" cy="2305665"/>
+          </a:xfrm>
+          <a:prstGeom prst="rect">
+            <a:avLst/>
+          </a:prstGeom>
+        </p:spPr>
+      </p:pic>
+      <p:sp>
+        <p:nvSpPr>
+          <p:cNvPr id="8" name="TextBox 7">
+            <a:extLst>
+              <a:ext uri="{FF2B5EF4-FFF2-40B4-BE49-F238E27FC236}">
+                <a16:creationId xmlns:a16="http://schemas.microsoft.com/office/drawing/2014/main" id="{E3763C6F-5A1E-4FCF-8360-484498507689}"/>
+              </a:ext>
+            </a:extLst>
+          </p:cNvPr>
+          <p:cNvSpPr txBox="1"/>
+          <p:nvPr/>
+        </p:nvSpPr>
+        <p:spPr>
+          <a:xfrm>
+            <a:off x="4473677" y="1032064"/>
+            <a:ext cx="1307867" cy="646331"/>
+          </a:xfrm>
+          <a:prstGeom prst="rect">
+            <a:avLst/>
+          </a:prstGeom>
+          <a:noFill/>
+        </p:spPr>
+        <p:txBody>
+          <a:bodyPr wrap="square" rtlCol="0">
+            <a:spAutoFit/>
+          </a:bodyPr>
+          <a:lstStyle/>
+          <a:p>
+            <a:r>
+              <a:rPr lang="en-GB" dirty="0"/>
+              <a:t>Samples of applied CD</a:t>
+            </a:r>
+          </a:p>
+        </p:txBody>
+      </p:sp>
+      <p:pic>
+        <p:nvPicPr>
+          <p:cNvPr id="10" name="Picture 9" descr="Chart&#10;&#10;Description automatically generated">
+            <a:extLst>
+              <a:ext uri="{FF2B5EF4-FFF2-40B4-BE49-F238E27FC236}">
+                <a16:creationId xmlns:a16="http://schemas.microsoft.com/office/drawing/2014/main" id="{65283203-BE5B-466C-BF68-82307DD61F2C}"/>
+              </a:ext>
+            </a:extLst>
+          </p:cNvPr>
+          <p:cNvPicPr>
+            <a:picLocks noChangeAspect="1"/>
+          </p:cNvPicPr>
+          <p:nvPr/>
+        </p:nvPicPr>
+        <p:blipFill>
+          <a:blip r:embed="rId4">
+            <a:extLst>
+              <a:ext uri="{28A0092B-C50C-407E-A947-70E740481C1C}">
+                <a14:useLocalDpi xmlns:a14="http://schemas.microsoft.com/office/drawing/2010/main" val="0"/>
+              </a:ext>
+            </a:extLst>
+          </a:blip>
+          <a:stretch>
+            <a:fillRect/>
+          </a:stretch>
+        </p:blipFill>
+        <p:spPr>
+          <a:xfrm>
+            <a:off x="9242321" y="4832136"/>
+            <a:ext cx="2702181" cy="2025864"/>
+          </a:xfrm>
+          <a:prstGeom prst="rect">
+            <a:avLst/>
+          </a:prstGeom>
+        </p:spPr>
+      </p:pic>
+      <p:pic>
+        <p:nvPicPr>
+          <p:cNvPr id="14" name="Picture 13" descr="Chart&#10;&#10;Description automatically generated">
+            <a:extLst>
+              <a:ext uri="{FF2B5EF4-FFF2-40B4-BE49-F238E27FC236}">
+                <a16:creationId xmlns:a16="http://schemas.microsoft.com/office/drawing/2014/main" id="{BF9ECB0D-9C08-4285-B374-2DF144C2DCFB}"/>
+              </a:ext>
+            </a:extLst>
+          </p:cNvPr>
+          <p:cNvPicPr>
+            <a:picLocks noChangeAspect="1"/>
+          </p:cNvPicPr>
+          <p:nvPr/>
+        </p:nvPicPr>
+        <p:blipFill>
+          <a:blip r:embed="rId5">
+            <a:extLst>
+              <a:ext uri="{28A0092B-C50C-407E-A947-70E740481C1C}">
+                <a14:useLocalDpi xmlns:a14="http://schemas.microsoft.com/office/drawing/2010/main" val="0"/>
+              </a:ext>
+            </a:extLst>
+          </a:blip>
+          <a:stretch>
+            <a:fillRect/>
+          </a:stretch>
+        </p:blipFill>
+        <p:spPr>
+          <a:xfrm>
+            <a:off x="6275085" y="4832135"/>
+            <a:ext cx="2702183" cy="2025865"/>
+          </a:xfrm>
+          <a:prstGeom prst="rect">
+            <a:avLst/>
+          </a:prstGeom>
+        </p:spPr>
+      </p:pic>
+      <p:sp>
+        <p:nvSpPr>
+          <p:cNvPr id="15" name="TextBox 14">
+            <a:extLst>
+              <a:ext uri="{FF2B5EF4-FFF2-40B4-BE49-F238E27FC236}">
+                <a16:creationId xmlns:a16="http://schemas.microsoft.com/office/drawing/2014/main" id="{5585D2CB-1B5F-4AB7-833E-97427231ECA1}"/>
+              </a:ext>
+            </a:extLst>
+          </p:cNvPr>
+          <p:cNvSpPr txBox="1"/>
+          <p:nvPr/>
+        </p:nvSpPr>
+        <p:spPr>
+          <a:xfrm>
+            <a:off x="3775941" y="5660401"/>
+            <a:ext cx="2216997" cy="369332"/>
+          </a:xfrm>
+          <a:prstGeom prst="rect">
+            <a:avLst/>
+          </a:prstGeom>
+          <a:noFill/>
+        </p:spPr>
+        <p:txBody>
+          <a:bodyPr wrap="square" rtlCol="0">
+            <a:spAutoFit/>
+          </a:bodyPr>
+          <a:lstStyle/>
+          <a:p>
+            <a:r>
+              <a:rPr lang="en-GB" dirty="0"/>
+              <a:t>Compensation of CD</a:t>
+            </a:r>
+          </a:p>
+        </p:txBody>
+      </p:sp>
+      <p:sp>
+        <p:nvSpPr>
+          <p:cNvPr id="11" name="TextBox 10">
+            <a:extLst>
+              <a:ext uri="{FF2B5EF4-FFF2-40B4-BE49-F238E27FC236}">
+                <a16:creationId xmlns:a16="http://schemas.microsoft.com/office/drawing/2014/main" id="{C58C2710-3E3B-4B7A-9027-D140C1265C95}"/>
+              </a:ext>
+            </a:extLst>
+          </p:cNvPr>
+          <p:cNvSpPr txBox="1"/>
+          <p:nvPr/>
+        </p:nvSpPr>
+        <p:spPr>
+          <a:xfrm>
+            <a:off x="0" y="6492875"/>
+            <a:ext cx="1203649" cy="369332"/>
+          </a:xfrm>
+          <a:prstGeom prst="rect">
+            <a:avLst/>
+          </a:prstGeom>
+          <a:noFill/>
+        </p:spPr>
+        <p:txBody>
+          <a:bodyPr wrap="square" rtlCol="0">
+            <a:spAutoFit/>
+          </a:bodyPr>
+          <a:lstStyle/>
+          <a:p>
+            <a:r>
+              <a:rPr lang="en-GB" dirty="0"/>
+              <a:t>Weeks 3-4</a:t>
+            </a:r>
+          </a:p>
+        </p:txBody>
+      </p:sp>
+    </p:spTree>
+    <p:extLst>
+      <p:ext uri="{BB962C8B-B14F-4D97-AF65-F5344CB8AC3E}">
+        <p14:creationId xmlns:p14="http://schemas.microsoft.com/office/powerpoint/2010/main" val="3697586576"/>
+      </p:ext>
+    </p:extLst>
+  </p:cSld>
+  <p:clrMapOvr>
+    <a:masterClrMapping/>
+  </p:clrMapOvr>
+</p:sld>
+</file>
+
+<file path=ppt/slides/slide26.xml><?xml version="1.0" encoding="utf-8"?>
+<p:sld xmlns:a="http://schemas.openxmlformats.org/drawingml/2006/main" xmlns:r="http://schemas.openxmlformats.org/officeDocument/2006/relationships" xmlns:p="http://schemas.openxmlformats.org/presentationml/2006/main">
+  <p:cSld>
+    <p:spTree>
+      <p:nvGrpSpPr>
+        <p:cNvPr id="1" name=""/>
+        <p:cNvGrpSpPr/>
+        <p:nvPr/>
+      </p:nvGrpSpPr>
+      <p:grpSpPr>
+        <a:xfrm>
+          <a:off x="0" y="0"/>
+          <a:ext cx="0" cy="0"/>
+          <a:chOff x="0" y="0"/>
+          <a:chExt cx="0" cy="0"/>
+        </a:xfrm>
+      </p:grpSpPr>
+      <p:sp>
+        <p:nvSpPr>
+          <p:cNvPr id="2" name="Title 1">
+            <a:extLst>
+              <a:ext uri="{FF2B5EF4-FFF2-40B4-BE49-F238E27FC236}">
+                <a16:creationId xmlns:a16="http://schemas.microsoft.com/office/drawing/2014/main" id="{06F14B68-65B1-4FA1-8A97-692B742991C7}"/>
+              </a:ext>
+            </a:extLst>
+          </p:cNvPr>
+          <p:cNvSpPr>
+            <a:spLocks noGrp="1"/>
+          </p:cNvSpPr>
+          <p:nvPr>
+            <p:ph type="title"/>
+          </p:nvPr>
+        </p:nvSpPr>
+        <p:spPr/>
+        <p:txBody>
+          <a:bodyPr/>
+          <a:lstStyle/>
+          <a:p>
+            <a:r>
+              <a:rPr lang="en-GB" dirty="0"/>
+              <a:t>Notes on effects of BPSK		</a:t>
+            </a:r>
+          </a:p>
+        </p:txBody>
+      </p:sp>
+      <p:sp>
+        <p:nvSpPr>
+          <p:cNvPr id="3" name="Content Placeholder 2">
+            <a:extLst>
+              <a:ext uri="{FF2B5EF4-FFF2-40B4-BE49-F238E27FC236}">
+                <a16:creationId xmlns:a16="http://schemas.microsoft.com/office/drawing/2014/main" id="{7FB3BAC2-3B71-481E-86B7-EC780176DA17}"/>
+              </a:ext>
+            </a:extLst>
+          </p:cNvPr>
+          <p:cNvSpPr>
+            <a:spLocks noGrp="1"/>
+          </p:cNvSpPr>
+          <p:nvPr>
+            <p:ph idx="1"/>
+          </p:nvPr>
+        </p:nvSpPr>
+        <p:spPr>
+          <a:xfrm>
+            <a:off x="912845" y="2805339"/>
+            <a:ext cx="10515600" cy="4351338"/>
+          </a:xfrm>
+        </p:spPr>
+        <p:txBody>
+          <a:bodyPr vert="horz" lIns="91440" tIns="45720" rIns="91440" bIns="45720" rtlCol="0" anchor="t">
+            <a:normAutofit/>
+          </a:bodyPr>
+          <a:lstStyle/>
+          <a:p>
+            <a:r>
+              <a:rPr lang="en-GB" dirty="0"/>
+              <a:t>Both the CD model and the filter create a third ‘symbol’ around 0</a:t>
+            </a:r>
+          </a:p>
+          <a:p>
+            <a:pPr marL="0" indent="0">
+              <a:buNone/>
+            </a:pPr>
+            <a:r>
+              <a:rPr lang="en-GB" dirty="0"/>
+              <a:t> </a:t>
+            </a:r>
+          </a:p>
+          <a:p>
+            <a:r>
+              <a:rPr lang="en-GB" dirty="0"/>
+              <a:t>Above 10km the CD filter does not account for amplitude deviations anymore but manages to split symbols into three regions around points -1, 0, and 1</a:t>
+            </a:r>
+          </a:p>
+          <a:p>
+            <a:endParaRPr lang="en-GB" dirty="0">
+              <a:cs typeface="Calibri" panose="020F0502020204030204"/>
+            </a:endParaRPr>
+          </a:p>
+          <a:p>
+            <a:r>
+              <a:rPr lang="en-GB" dirty="0">
+                <a:cs typeface="Calibri" panose="020F0502020204030204"/>
+              </a:rPr>
+              <a:t>With high SNRs, it is still decodable</a:t>
+            </a:r>
+          </a:p>
+        </p:txBody>
+      </p:sp>
+      <p:sp>
+        <p:nvSpPr>
+          <p:cNvPr id="4" name="TextBox 3">
+            <a:extLst>
+              <a:ext uri="{FF2B5EF4-FFF2-40B4-BE49-F238E27FC236}">
+                <a16:creationId xmlns:a16="http://schemas.microsoft.com/office/drawing/2014/main" id="{54308167-1998-4F64-8E6D-611240CA1470}"/>
+              </a:ext>
+            </a:extLst>
+          </p:cNvPr>
+          <p:cNvSpPr txBox="1"/>
+          <p:nvPr/>
+        </p:nvSpPr>
+        <p:spPr>
+          <a:xfrm>
+            <a:off x="10988351" y="6497999"/>
+            <a:ext cx="1203649" cy="369332"/>
+          </a:xfrm>
+          <a:prstGeom prst="rect">
+            <a:avLst/>
+          </a:prstGeom>
+          <a:noFill/>
+        </p:spPr>
+        <p:txBody>
+          <a:bodyPr wrap="square" rtlCol="0">
+            <a:spAutoFit/>
+          </a:bodyPr>
+          <a:lstStyle/>
+          <a:p>
+            <a:r>
+              <a:rPr lang="en-GB" dirty="0"/>
+              <a:t>Weeks 3-4</a:t>
+            </a:r>
+          </a:p>
+        </p:txBody>
+      </p:sp>
+    </p:spTree>
+    <p:extLst>
+      <p:ext uri="{BB962C8B-B14F-4D97-AF65-F5344CB8AC3E}">
+        <p14:creationId xmlns:p14="http://schemas.microsoft.com/office/powerpoint/2010/main" val="4281351763"/>
+      </p:ext>
+    </p:extLst>
+  </p:cSld>
+  <p:clrMapOvr>
+    <a:masterClrMapping/>
+  </p:clrMapOvr>
+</p:sld>
+</file>
+
+<file path=ppt/slides/slide27.xml><?xml version="1.0" encoding="utf-8"?>
+<p:sld xmlns:a="http://schemas.openxmlformats.org/drawingml/2006/main" xmlns:r="http://schemas.openxmlformats.org/officeDocument/2006/relationships" xmlns:p="http://schemas.openxmlformats.org/presentationml/2006/main">
+  <p:cSld>
+    <p:spTree>
+      <p:nvGrpSpPr>
+        <p:cNvPr id="1" name=""/>
+        <p:cNvGrpSpPr/>
+        <p:nvPr/>
+      </p:nvGrpSpPr>
+      <p:grpSpPr>
+        <a:xfrm>
+          <a:off x="0" y="0"/>
+          <a:ext cx="0" cy="0"/>
+          <a:chOff x="0" y="0"/>
+          <a:chExt cx="0" cy="0"/>
+        </a:xfrm>
+      </p:grpSpPr>
+      <p:sp>
+        <p:nvSpPr>
+          <p:cNvPr id="2" name="Title 1">
+            <a:extLst>
+              <a:ext uri="{FF2B5EF4-FFF2-40B4-BE49-F238E27FC236}">
+                <a16:creationId xmlns:a16="http://schemas.microsoft.com/office/drawing/2014/main" id="{F9DBFBD1-78A3-42B2-86AB-72458F42BC7C}"/>
+              </a:ext>
+            </a:extLst>
+          </p:cNvPr>
+          <p:cNvSpPr>
+            <a:spLocks noGrp="1"/>
+          </p:cNvSpPr>
+          <p:nvPr>
+            <p:ph type="title"/>
+          </p:nvPr>
+        </p:nvSpPr>
+        <p:spPr/>
+        <p:txBody>
+          <a:bodyPr/>
+          <a:lstStyle/>
+          <a:p>
+            <a:r>
+              <a:rPr lang="en-GB" dirty="0"/>
+              <a:t>Parameters Used:</a:t>
+            </a:r>
+          </a:p>
+        </p:txBody>
+      </p:sp>
+      <p:sp>
+        <p:nvSpPr>
+          <p:cNvPr id="3" name="Content Placeholder 2">
+            <a:extLst>
+              <a:ext uri="{FF2B5EF4-FFF2-40B4-BE49-F238E27FC236}">
+                <a16:creationId xmlns:a16="http://schemas.microsoft.com/office/drawing/2014/main" id="{CA05CCFC-C3E2-4A3D-B1B5-E1E058BEFBD2}"/>
+              </a:ext>
+            </a:extLst>
+          </p:cNvPr>
+          <p:cNvSpPr>
+            <a:spLocks noGrp="1"/>
+          </p:cNvSpPr>
+          <p:nvPr>
+            <p:ph idx="1"/>
+          </p:nvPr>
+        </p:nvSpPr>
+        <p:spPr/>
+        <p:txBody>
+          <a:bodyPr vert="horz" lIns="91440" tIns="45720" rIns="91440" bIns="45720" rtlCol="0" anchor="t">
+            <a:normAutofit fontScale="92500" lnSpcReduction="10000"/>
+          </a:bodyPr>
+          <a:lstStyle/>
+          <a:p>
+            <a:pPr algn="l"/>
+            <a:r>
+              <a:rPr lang="en-GB" b="0" i="0" dirty="0">
+                <a:effectLst/>
+                <a:latin typeface="Segoe UI" panose="020B0502040204020203" pitchFamily="34" charset="0"/>
+              </a:rPr>
+              <a:t>Symbols: 32768</a:t>
+            </a:r>
+          </a:p>
+          <a:p>
+            <a:pPr algn="l"/>
+            <a:r>
+              <a:rPr lang="en-GB" b="0" i="0" dirty="0" err="1">
+                <a:effectLst/>
+                <a:latin typeface="Segoe UI" panose="020B0502040204020203" pitchFamily="34" charset="0"/>
+              </a:rPr>
+              <a:t>Upsampling</a:t>
+            </a:r>
+            <a:r>
+              <a:rPr lang="en-GB" b="0" i="0" dirty="0">
+                <a:effectLst/>
+                <a:latin typeface="Segoe UI" panose="020B0502040204020203" pitchFamily="34" charset="0"/>
+              </a:rPr>
+              <a:t>: 2</a:t>
+            </a:r>
+          </a:p>
+          <a:p>
+            <a:pPr algn="l"/>
+            <a:r>
+              <a:rPr lang="en-GB" b="0" i="0" dirty="0">
+                <a:effectLst/>
+                <a:latin typeface="Segoe UI" panose="020B0502040204020203" pitchFamily="34" charset="0"/>
+              </a:rPr>
+              <a:t>Samples: 65536</a:t>
+            </a:r>
+          </a:p>
+          <a:p>
+            <a:pPr algn="l"/>
+            <a:r>
+              <a:rPr lang="en-GB" b="0" i="0" dirty="0">
+                <a:effectLst/>
+                <a:latin typeface="Segoe UI" panose="020B0502040204020203" pitchFamily="34" charset="0"/>
+              </a:rPr>
+              <a:t>Sample Rate: 64e9</a:t>
+            </a:r>
+          </a:p>
+          <a:p>
+            <a:pPr algn="l"/>
+            <a:r>
+              <a:rPr lang="en-GB" b="0" i="0" dirty="0">
+                <a:effectLst/>
+                <a:latin typeface="Segoe UI" panose="020B0502040204020203" pitchFamily="34" charset="0"/>
+              </a:rPr>
+              <a:t>T = sample rate^-1</a:t>
+            </a:r>
+          </a:p>
+          <a:p>
+            <a:pPr algn="l"/>
+            <a:r>
+              <a:rPr lang="en-GB" b="0" i="0" dirty="0">
+                <a:effectLst/>
+                <a:latin typeface="Segoe UI" panose="020B0502040204020203" pitchFamily="34" charset="0"/>
+              </a:rPr>
+              <a:t>Distances z: Between 10km to 110km in steps of 10km</a:t>
+            </a:r>
+          </a:p>
+          <a:p>
+            <a:pPr algn="l"/>
+            <a:r>
+              <a:rPr lang="en-GB" b="0" i="0" dirty="0">
+                <a:effectLst/>
+                <a:latin typeface="Segoe UI" panose="020B0502040204020203" pitchFamily="34" charset="0"/>
+              </a:rPr>
+              <a:t>lambda = 1550e-9</a:t>
+            </a:r>
+          </a:p>
+          <a:p>
+            <a:pPr algn="l"/>
+            <a:r>
+              <a:rPr lang="en-GB" b="0" i="0" dirty="0">
+                <a:effectLst/>
+                <a:latin typeface="Segoe UI" panose="020B0502040204020203" pitchFamily="34" charset="0"/>
+              </a:rPr>
+              <a:t>D = 16e-6 (s/m/m) == 16 </a:t>
+            </a:r>
+            <a:r>
+              <a:rPr lang="en-GB" b="0" i="0" dirty="0" err="1">
+                <a:effectLst/>
+                <a:latin typeface="Segoe UI" panose="020B0502040204020203" pitchFamily="34" charset="0"/>
+              </a:rPr>
+              <a:t>ps</a:t>
+            </a:r>
+            <a:r>
+              <a:rPr lang="en-GB" b="0" i="0" dirty="0">
+                <a:effectLst/>
+                <a:latin typeface="Segoe UI" panose="020B0502040204020203" pitchFamily="34" charset="0"/>
+              </a:rPr>
+              <a:t>/nm/km</a:t>
+            </a:r>
+          </a:p>
+          <a:p>
+            <a:pPr algn="l"/>
+            <a:r>
+              <a:rPr lang="en-GB" b="0" i="0" dirty="0">
+                <a:effectLst/>
+                <a:latin typeface="Segoe UI"/>
+                <a:cs typeface="Segoe UI"/>
+              </a:rPr>
+              <a:t>If z is too small, M as defined in Lecture 5 becomes 0 due to the floor function. Therefore</a:t>
+            </a:r>
+            <a:r>
+              <a:rPr lang="en-GB" dirty="0">
+                <a:latin typeface="Segoe UI"/>
+                <a:cs typeface="Segoe UI"/>
+              </a:rPr>
+              <a:t>,</a:t>
+            </a:r>
+            <a:r>
+              <a:rPr lang="en-GB" b="0" i="0" dirty="0">
+                <a:effectLst/>
+                <a:latin typeface="Segoe UI"/>
+                <a:cs typeface="Segoe UI"/>
+              </a:rPr>
+              <a:t> I set the filter to 1 tap if that is the case.</a:t>
+            </a:r>
+          </a:p>
+        </p:txBody>
+      </p:sp>
+      <p:sp>
+        <p:nvSpPr>
+          <p:cNvPr id="4" name="TextBox 3">
+            <a:extLst>
+              <a:ext uri="{FF2B5EF4-FFF2-40B4-BE49-F238E27FC236}">
+                <a16:creationId xmlns:a16="http://schemas.microsoft.com/office/drawing/2014/main" id="{B19215F9-1CD8-4D31-98C6-93BA1101D7FE}"/>
+              </a:ext>
+            </a:extLst>
+          </p:cNvPr>
+          <p:cNvSpPr txBox="1"/>
+          <p:nvPr/>
+        </p:nvSpPr>
+        <p:spPr>
+          <a:xfrm>
+            <a:off x="10988351" y="6488668"/>
+            <a:ext cx="1203649" cy="369332"/>
+          </a:xfrm>
+          <a:prstGeom prst="rect">
+            <a:avLst/>
+          </a:prstGeom>
+          <a:noFill/>
+        </p:spPr>
+        <p:txBody>
+          <a:bodyPr wrap="square" rtlCol="0">
+            <a:spAutoFit/>
+          </a:bodyPr>
+          <a:lstStyle/>
+          <a:p>
+            <a:r>
+              <a:rPr lang="en-GB" dirty="0"/>
+              <a:t>Weeks 3-4</a:t>
+            </a:r>
+          </a:p>
+        </p:txBody>
+      </p:sp>
+    </p:spTree>
+    <p:extLst>
+      <p:ext uri="{BB962C8B-B14F-4D97-AF65-F5344CB8AC3E}">
+        <p14:creationId xmlns:p14="http://schemas.microsoft.com/office/powerpoint/2010/main" val="3247527639"/>
+      </p:ext>
+    </p:extLst>
+  </p:cSld>
+  <p:clrMapOvr>
+    <a:masterClrMapping/>
+  </p:clrMapOvr>
+</p:sld>
+</file>
+
+<file path=ppt/slides/slide28.xml><?xml version="1.0" encoding="utf-8"?>
+<p:sld xmlns:a="http://schemas.openxmlformats.org/drawingml/2006/main" xmlns:r="http://schemas.openxmlformats.org/officeDocument/2006/relationships" xmlns:p="http://schemas.openxmlformats.org/presentationml/2006/main">
+  <p:cSld>
+    <p:spTree>
+      <p:nvGrpSpPr>
+        <p:cNvPr id="1" name=""/>
+        <p:cNvGrpSpPr/>
+        <p:nvPr/>
+      </p:nvGrpSpPr>
+      <p:grpSpPr>
+        <a:xfrm>
+          <a:off x="0" y="0"/>
+          <a:ext cx="0" cy="0"/>
+          <a:chOff x="0" y="0"/>
+          <a:chExt cx="0" cy="0"/>
+        </a:xfrm>
+      </p:grpSpPr>
+      <p:pic>
+        <p:nvPicPr>
+          <p:cNvPr id="3" name="Picture 3" descr="Chart&#10;&#10;Description automatically generated">
+            <a:extLst>
+              <a:ext uri="{FF2B5EF4-FFF2-40B4-BE49-F238E27FC236}">
+                <a16:creationId xmlns:a16="http://schemas.microsoft.com/office/drawing/2014/main" id="{F7C8E4BE-AB1C-4585-BE92-CC3E389C7983}"/>
+              </a:ext>
+            </a:extLst>
+          </p:cNvPr>
+          <p:cNvPicPr>
+            <a:picLocks noChangeAspect="1"/>
+          </p:cNvPicPr>
+          <p:nvPr/>
+        </p:nvPicPr>
+        <p:blipFill>
+          <a:blip r:embed="rId2"/>
+          <a:stretch>
+            <a:fillRect/>
+          </a:stretch>
+        </p:blipFill>
+        <p:spPr>
+          <a:xfrm>
+            <a:off x="174906" y="1362821"/>
+            <a:ext cx="5873843" cy="4379166"/>
+          </a:xfrm>
+          <a:prstGeom prst="rect">
+            <a:avLst/>
+          </a:prstGeom>
+        </p:spPr>
+      </p:pic>
+      <p:pic>
+        <p:nvPicPr>
+          <p:cNvPr id="4" name="Picture 4" descr="Chart&#10;&#10;Description automatically generated">
+            <a:extLst>
+              <a:ext uri="{FF2B5EF4-FFF2-40B4-BE49-F238E27FC236}">
+                <a16:creationId xmlns:a16="http://schemas.microsoft.com/office/drawing/2014/main" id="{91D662CD-7A65-426B-84FB-8829763829F2}"/>
+              </a:ext>
+            </a:extLst>
+          </p:cNvPr>
+          <p:cNvPicPr>
+            <a:picLocks noChangeAspect="1"/>
+          </p:cNvPicPr>
+          <p:nvPr/>
+        </p:nvPicPr>
+        <p:blipFill>
+          <a:blip r:embed="rId3"/>
+          <a:stretch>
+            <a:fillRect/>
+          </a:stretch>
+        </p:blipFill>
+        <p:spPr>
+          <a:xfrm>
+            <a:off x="6091614" y="1372720"/>
+            <a:ext cx="5857127" cy="4350217"/>
+          </a:xfrm>
+          <a:prstGeom prst="rect">
+            <a:avLst/>
+          </a:prstGeom>
+        </p:spPr>
+      </p:pic>
+      <p:sp>
+        <p:nvSpPr>
+          <p:cNvPr id="2" name="Title 1">
+            <a:extLst>
+              <a:ext uri="{FF2B5EF4-FFF2-40B4-BE49-F238E27FC236}">
+                <a16:creationId xmlns:a16="http://schemas.microsoft.com/office/drawing/2014/main" id="{063C0985-D257-4482-AA17-CC412978029A}"/>
+              </a:ext>
+            </a:extLst>
+          </p:cNvPr>
+          <p:cNvSpPr>
+            <a:spLocks noGrp="1"/>
+          </p:cNvSpPr>
+          <p:nvPr>
+            <p:ph type="title"/>
+          </p:nvPr>
+        </p:nvSpPr>
+        <p:spPr>
+          <a:xfrm>
+            <a:off x="479612" y="-196195"/>
+            <a:ext cx="11580159" cy="1517088"/>
+          </a:xfrm>
+        </p:spPr>
+        <p:txBody>
+          <a:bodyPr anchor="ctr">
+            <a:normAutofit/>
+          </a:bodyPr>
+          <a:lstStyle/>
+          <a:p>
+            <a:r>
+              <a:rPr lang="en-GB" sz="3200" dirty="0">
+                <a:cs typeface="Calibri Light"/>
+              </a:rPr>
+              <a:t>SNR vs BER graphs after applying CD and then filtering it with the compensating filter</a:t>
+            </a:r>
+          </a:p>
+        </p:txBody>
+      </p:sp>
+      <p:sp>
+        <p:nvSpPr>
+          <p:cNvPr id="6" name="TextBox 5">
+            <a:extLst>
+              <a:ext uri="{FF2B5EF4-FFF2-40B4-BE49-F238E27FC236}">
+                <a16:creationId xmlns:a16="http://schemas.microsoft.com/office/drawing/2014/main" id="{B29D2AF1-4C02-4308-B76F-3328CA18268D}"/>
+              </a:ext>
+            </a:extLst>
+          </p:cNvPr>
+          <p:cNvSpPr txBox="1"/>
+          <p:nvPr/>
+        </p:nvSpPr>
+        <p:spPr>
+          <a:xfrm>
+            <a:off x="10988351" y="6488668"/>
+            <a:ext cx="1203649" cy="369332"/>
+          </a:xfrm>
+          <a:prstGeom prst="rect">
+            <a:avLst/>
+          </a:prstGeom>
+          <a:noFill/>
+        </p:spPr>
+        <p:txBody>
+          <a:bodyPr wrap="square" rtlCol="0">
+            <a:spAutoFit/>
+          </a:bodyPr>
+          <a:lstStyle/>
+          <a:p>
+            <a:r>
+              <a:rPr lang="en-GB" dirty="0"/>
+              <a:t>Weeks 3-4</a:t>
+            </a:r>
+          </a:p>
+        </p:txBody>
+      </p:sp>
+    </p:spTree>
+    <p:extLst>
+      <p:ext uri="{BB962C8B-B14F-4D97-AF65-F5344CB8AC3E}">
+        <p14:creationId xmlns:p14="http://schemas.microsoft.com/office/powerpoint/2010/main" val="3206834519"/>
+      </p:ext>
+    </p:extLst>
+  </p:cSld>
+  <p:clrMapOvr>
+    <a:masterClrMapping/>
+  </p:clrMapOvr>
+</p:sld>
+</file>
+
+<file path=ppt/slides/slide29.xml><?xml version="1.0" encoding="utf-8"?>
+<p:sld xmlns:a="http://schemas.openxmlformats.org/drawingml/2006/main" xmlns:r="http://schemas.openxmlformats.org/officeDocument/2006/relationships" xmlns:p="http://schemas.openxmlformats.org/presentationml/2006/main">
+  <p:cSld>
+    <p:spTree>
+      <p:nvGrpSpPr>
+        <p:cNvPr id="1" name=""/>
+        <p:cNvGrpSpPr/>
+        <p:nvPr/>
+      </p:nvGrpSpPr>
+      <p:grpSpPr>
+        <a:xfrm>
+          <a:off x="0" y="0"/>
+          <a:ext cx="0" cy="0"/>
+          <a:chOff x="0" y="0"/>
+          <a:chExt cx="0" cy="0"/>
+        </a:xfrm>
+      </p:grpSpPr>
+      <p:pic>
+        <p:nvPicPr>
+          <p:cNvPr id="6" name="Picture 6" descr="Chart, line chart&#10;&#10;Description automatically generated">
+            <a:extLst>
+              <a:ext uri="{FF2B5EF4-FFF2-40B4-BE49-F238E27FC236}">
+                <a16:creationId xmlns:a16="http://schemas.microsoft.com/office/drawing/2014/main" id="{A2EEED30-1164-4701-B5DD-424414A27CC0}"/>
+              </a:ext>
+            </a:extLst>
+          </p:cNvPr>
+          <p:cNvPicPr>
+            <a:picLocks noChangeAspect="1"/>
+          </p:cNvPicPr>
+          <p:nvPr/>
+        </p:nvPicPr>
+        <p:blipFill>
+          <a:blip r:embed="rId2"/>
+          <a:stretch>
+            <a:fillRect/>
+          </a:stretch>
+        </p:blipFill>
+        <p:spPr>
+          <a:xfrm>
+            <a:off x="5981461" y="1400048"/>
+            <a:ext cx="6050012" cy="4489376"/>
+          </a:xfrm>
+          <a:prstGeom prst="rect">
+            <a:avLst/>
+          </a:prstGeom>
+        </p:spPr>
+      </p:pic>
+      <p:pic>
+        <p:nvPicPr>
+          <p:cNvPr id="5" name="Picture 5" descr="Chart&#10;&#10;Description automatically generated">
+            <a:extLst>
+              <a:ext uri="{FF2B5EF4-FFF2-40B4-BE49-F238E27FC236}">
+                <a16:creationId xmlns:a16="http://schemas.microsoft.com/office/drawing/2014/main" id="{8CCE7596-E4B4-4CDF-B887-CCBBB13E3D55}"/>
+              </a:ext>
+            </a:extLst>
+          </p:cNvPr>
+          <p:cNvPicPr>
+            <a:picLocks noChangeAspect="1"/>
+          </p:cNvPicPr>
+          <p:nvPr/>
+        </p:nvPicPr>
+        <p:blipFill>
+          <a:blip r:embed="rId3"/>
+          <a:stretch>
+            <a:fillRect/>
+          </a:stretch>
+        </p:blipFill>
+        <p:spPr>
+          <a:xfrm>
+            <a:off x="51837" y="1568136"/>
+            <a:ext cx="5807951" cy="4265258"/>
+          </a:xfrm>
+          <a:prstGeom prst="rect">
+            <a:avLst/>
+          </a:prstGeom>
+        </p:spPr>
+      </p:pic>
+      <p:sp>
+        <p:nvSpPr>
+          <p:cNvPr id="9" name="Title 1">
+            <a:extLst>
+              <a:ext uri="{FF2B5EF4-FFF2-40B4-BE49-F238E27FC236}">
+                <a16:creationId xmlns:a16="http://schemas.microsoft.com/office/drawing/2014/main" id="{2F1A9218-6E95-424E-9CA9-B4240921C4B8}"/>
+              </a:ext>
+            </a:extLst>
+          </p:cNvPr>
+          <p:cNvSpPr txBox="1">
+            <a:spLocks/>
+          </p:cNvSpPr>
+          <p:nvPr/>
+        </p:nvSpPr>
+        <p:spPr>
+          <a:xfrm>
+            <a:off x="479612" y="-196195"/>
+            <a:ext cx="11580159" cy="1517088"/>
+          </a:xfrm>
+          <a:prstGeom prst="rect">
+            <a:avLst/>
+          </a:prstGeom>
+        </p:spPr>
+        <p:txBody>
+          <a:bodyPr vert="horz" lIns="91440" tIns="45720" rIns="91440" bIns="45720" rtlCol="0" anchor="ctr">
+            <a:normAutofit/>
+          </a:bodyPr>
+          <a:lstStyle>
+            <a:lvl1pPr algn="l" defTabSz="914400" rtl="0" eaLnBrk="1" latinLnBrk="0" hangingPunct="1">
+              <a:lnSpc>
+                <a:spcPct val="90000"/>
+              </a:lnSpc>
+              <a:spcBef>
+                <a:spcPct val="0"/>
+              </a:spcBef>
+              <a:buNone/>
+              <a:defRPr sz="4400" kern="1200">
+                <a:solidFill>
+                  <a:schemeClr val="tx1"/>
+                </a:solidFill>
+                <a:latin typeface="+mj-lt"/>
+                <a:ea typeface="+mj-ea"/>
+                <a:cs typeface="+mj-cs"/>
+              </a:defRPr>
+            </a:lvl1pPr>
+          </a:lstStyle>
+          <a:p>
+            <a:r>
+              <a:rPr lang="en-GB" sz="3200" dirty="0">
+                <a:cs typeface="Calibri Light"/>
+              </a:rPr>
+              <a:t>SNR vs BER graphs after applying CD and then filtering it with the compensating filter</a:t>
+            </a:r>
+          </a:p>
+        </p:txBody>
+      </p:sp>
+      <p:sp>
+        <p:nvSpPr>
+          <p:cNvPr id="7" name="TextBox 6">
+            <a:extLst>
+              <a:ext uri="{FF2B5EF4-FFF2-40B4-BE49-F238E27FC236}">
+                <a16:creationId xmlns:a16="http://schemas.microsoft.com/office/drawing/2014/main" id="{9A98AED8-7918-4C09-ABC7-27204ED3C34A}"/>
+              </a:ext>
+            </a:extLst>
+          </p:cNvPr>
+          <p:cNvSpPr txBox="1"/>
+          <p:nvPr/>
+        </p:nvSpPr>
+        <p:spPr>
+          <a:xfrm>
+            <a:off x="10988351" y="6497999"/>
+            <a:ext cx="1203649" cy="369332"/>
+          </a:xfrm>
+          <a:prstGeom prst="rect">
+            <a:avLst/>
+          </a:prstGeom>
+          <a:noFill/>
+        </p:spPr>
+        <p:txBody>
+          <a:bodyPr wrap="square" rtlCol="0">
+            <a:spAutoFit/>
+          </a:bodyPr>
+          <a:lstStyle/>
+          <a:p>
+            <a:r>
+              <a:rPr lang="en-GB" dirty="0"/>
+              <a:t>Weeks 3-4</a:t>
+            </a:r>
+          </a:p>
+        </p:txBody>
+      </p:sp>
+    </p:spTree>
+    <p:extLst>
+      <p:ext uri="{BB962C8B-B14F-4D97-AF65-F5344CB8AC3E}">
+        <p14:creationId xmlns:p14="http://schemas.microsoft.com/office/powerpoint/2010/main" val="4238448665"/>
+      </p:ext>
+    </p:extLst>
+  </p:cSld>
+  <p:clrMapOvr>
+    <a:masterClrMapping/>
+  </p:clrMapOvr>
+</p:sld>
+</file>
+
 <file path=ppt/slides/slide3.xml><?xml version="1.0" encoding="utf-8"?>
 <p:sld xmlns:a="http://schemas.openxmlformats.org/drawingml/2006/main" xmlns:r="http://schemas.openxmlformats.org/officeDocument/2006/relationships" xmlns:p="http://schemas.openxmlformats.org/presentationml/2006/main">
   <p:cSld>

</xml_diff>

<commit_message>
Implemented CMA Algorithm for Adaptive Equalisation, need to intergrate with main design
</commit_message>
<xml_diff>
--- a/Master's meetings presentation.pptx
+++ b/Master's meetings presentation.pptx
@@ -34,6 +34,8 @@
     <p:sldId id="283" r:id="rId29"/>
     <p:sldId id="284" r:id="rId30"/>
     <p:sldId id="285" r:id="rId31"/>
+    <p:sldId id="286" r:id="rId32"/>
+    <p:sldId id="287" r:id="rId33"/>
   </p:sldIdLst>
   <p:sldSz cx="12192000" cy="6858000"/>
   <p:notesSz cx="6858000" cy="9144000"/>
@@ -9821,7 +9823,7 @@
           <a:p>
             <a:fld id="{1D6AAEF1-BB65-438A-947A-6BD8EC392D5A}" type="datetimeFigureOut">
               <a:rPr lang="en-US" smtClean="0"/>
-              <a:t>2/21/2021</a:t>
+              <a:t>2/27/2021</a:t>
             </a:fld>
             <a:endParaRPr lang="en-US"/>
           </a:p>
@@ -10019,7 +10021,7 @@
           <a:p>
             <a:fld id="{1D6AAEF1-BB65-438A-947A-6BD8EC392D5A}" type="datetimeFigureOut">
               <a:rPr lang="en-US" smtClean="0"/>
-              <a:t>2/21/2021</a:t>
+              <a:t>2/27/2021</a:t>
             </a:fld>
             <a:endParaRPr lang="en-US"/>
           </a:p>
@@ -10227,7 +10229,7 @@
           <a:p>
             <a:fld id="{1D6AAEF1-BB65-438A-947A-6BD8EC392D5A}" type="datetimeFigureOut">
               <a:rPr lang="en-US" smtClean="0"/>
-              <a:t>2/21/2021</a:t>
+              <a:t>2/27/2021</a:t>
             </a:fld>
             <a:endParaRPr lang="en-US"/>
           </a:p>
@@ -10425,7 +10427,7 @@
           <a:p>
             <a:fld id="{1D6AAEF1-BB65-438A-947A-6BD8EC392D5A}" type="datetimeFigureOut">
               <a:rPr lang="en-US" smtClean="0"/>
-              <a:t>2/21/2021</a:t>
+              <a:t>2/27/2021</a:t>
             </a:fld>
             <a:endParaRPr lang="en-US"/>
           </a:p>
@@ -10700,7 +10702,7 @@
           <a:p>
             <a:fld id="{1D6AAEF1-BB65-438A-947A-6BD8EC392D5A}" type="datetimeFigureOut">
               <a:rPr lang="en-US" smtClean="0"/>
-              <a:t>2/21/2021</a:t>
+              <a:t>2/27/2021</a:t>
             </a:fld>
             <a:endParaRPr lang="en-US"/>
           </a:p>
@@ -10965,7 +10967,7 @@
           <a:p>
             <a:fld id="{1D6AAEF1-BB65-438A-947A-6BD8EC392D5A}" type="datetimeFigureOut">
               <a:rPr lang="en-US" smtClean="0"/>
-              <a:t>2/21/2021</a:t>
+              <a:t>2/27/2021</a:t>
             </a:fld>
             <a:endParaRPr lang="en-US"/>
           </a:p>
@@ -11377,7 +11379,7 @@
           <a:p>
             <a:fld id="{1D6AAEF1-BB65-438A-947A-6BD8EC392D5A}" type="datetimeFigureOut">
               <a:rPr lang="en-US" smtClean="0"/>
-              <a:t>2/21/2021</a:t>
+              <a:t>2/27/2021</a:t>
             </a:fld>
             <a:endParaRPr lang="en-US"/>
           </a:p>
@@ -11518,7 +11520,7 @@
           <a:p>
             <a:fld id="{1D6AAEF1-BB65-438A-947A-6BD8EC392D5A}" type="datetimeFigureOut">
               <a:rPr lang="en-US" smtClean="0"/>
-              <a:t>2/21/2021</a:t>
+              <a:t>2/27/2021</a:t>
             </a:fld>
             <a:endParaRPr lang="en-US"/>
           </a:p>
@@ -11631,7 +11633,7 @@
           <a:p>
             <a:fld id="{1D6AAEF1-BB65-438A-947A-6BD8EC392D5A}" type="datetimeFigureOut">
               <a:rPr lang="en-US" smtClean="0"/>
-              <a:t>2/21/2021</a:t>
+              <a:t>2/27/2021</a:t>
             </a:fld>
             <a:endParaRPr lang="en-US"/>
           </a:p>
@@ -11942,7 +11944,7 @@
           <a:p>
             <a:fld id="{1D6AAEF1-BB65-438A-947A-6BD8EC392D5A}" type="datetimeFigureOut">
               <a:rPr lang="en-US" smtClean="0"/>
-              <a:t>2/21/2021</a:t>
+              <a:t>2/27/2021</a:t>
             </a:fld>
             <a:endParaRPr lang="en-US"/>
           </a:p>
@@ -12230,7 +12232,7 @@
           <a:p>
             <a:fld id="{1D6AAEF1-BB65-438A-947A-6BD8EC392D5A}" type="datetimeFigureOut">
               <a:rPr lang="en-US" smtClean="0"/>
-              <a:t>2/21/2021</a:t>
+              <a:t>2/27/2021</a:t>
             </a:fld>
             <a:endParaRPr lang="en-US"/>
           </a:p>
@@ -12471,7 +12473,7 @@
           <a:p>
             <a:fld id="{1D6AAEF1-BB65-438A-947A-6BD8EC392D5A}" type="datetimeFigureOut">
               <a:rPr lang="en-US" smtClean="0"/>
-              <a:t>2/21/2021</a:t>
+              <a:t>2/27/2021</a:t>
             </a:fld>
             <a:endParaRPr lang="en-US"/>
           </a:p>
@@ -20190,6 +20192,4025 @@
 </p:sld>
 </file>
 
+<file path=ppt/slides/slide30.xml><?xml version="1.0" encoding="utf-8"?>
+<p:sld xmlns:a="http://schemas.openxmlformats.org/drawingml/2006/main" xmlns:r="http://schemas.openxmlformats.org/officeDocument/2006/relationships" xmlns:p="http://schemas.openxmlformats.org/presentationml/2006/main">
+  <p:cSld>
+    <p:spTree>
+      <p:nvGrpSpPr>
+        <p:cNvPr id="1" name=""/>
+        <p:cNvGrpSpPr/>
+        <p:nvPr/>
+      </p:nvGrpSpPr>
+      <p:grpSpPr>
+        <a:xfrm>
+          <a:off x="0" y="0"/>
+          <a:ext cx="0" cy="0"/>
+          <a:chOff x="0" y="0"/>
+          <a:chExt cx="0" cy="0"/>
+        </a:xfrm>
+      </p:grpSpPr>
+      <p:sp>
+        <p:nvSpPr>
+          <p:cNvPr id="2" name="Title 1">
+            <a:extLst>
+              <a:ext uri="{FF2B5EF4-FFF2-40B4-BE49-F238E27FC236}">
+                <a16:creationId xmlns:a16="http://schemas.microsoft.com/office/drawing/2014/main" id="{FD64DF1C-87C5-43D7-80AA-2335EF4D7FC3}"/>
+              </a:ext>
+            </a:extLst>
+          </p:cNvPr>
+          <p:cNvSpPr>
+            <a:spLocks noGrp="1"/>
+          </p:cNvSpPr>
+          <p:nvPr>
+            <p:ph type="title"/>
+          </p:nvPr>
+        </p:nvSpPr>
+        <p:spPr>
+          <a:xfrm>
+            <a:off x="3309337" y="-9467"/>
+            <a:ext cx="10515600" cy="1325563"/>
+          </a:xfrm>
+        </p:spPr>
+        <p:txBody>
+          <a:bodyPr>
+            <a:normAutofit/>
+          </a:bodyPr>
+          <a:lstStyle/>
+          <a:p>
+            <a:r>
+              <a:rPr lang="en-GB" sz="3600" dirty="0"/>
+              <a:t>Reconfiguration of Model</a:t>
+            </a:r>
+          </a:p>
+        </p:txBody>
+      </p:sp>
+      <p:sp>
+        <p:nvSpPr>
+          <p:cNvPr id="72" name="Rectangle 71">
+            <a:extLst>
+              <a:ext uri="{FF2B5EF4-FFF2-40B4-BE49-F238E27FC236}">
+                <a16:creationId xmlns:a16="http://schemas.microsoft.com/office/drawing/2014/main" id="{D80DB572-9F74-4DE2-8AA6-2FEFBEDBD99F}"/>
+              </a:ext>
+            </a:extLst>
+          </p:cNvPr>
+          <p:cNvSpPr/>
+          <p:nvPr/>
+        </p:nvSpPr>
+        <p:spPr>
+          <a:xfrm>
+            <a:off x="1549270" y="4085958"/>
+            <a:ext cx="8274713" cy="2216744"/>
+          </a:xfrm>
+          <a:prstGeom prst="rect">
+            <a:avLst/>
+          </a:prstGeom>
+          <a:gradFill flip="none" rotWithShape="1">
+            <a:gsLst>
+              <a:gs pos="0">
+                <a:schemeClr val="accent3">
+                  <a:lumMod val="5000"/>
+                  <a:lumOff val="95000"/>
+                </a:schemeClr>
+              </a:gs>
+              <a:gs pos="74000">
+                <a:schemeClr val="accent3">
+                  <a:lumMod val="45000"/>
+                  <a:lumOff val="55000"/>
+                </a:schemeClr>
+              </a:gs>
+              <a:gs pos="83000">
+                <a:schemeClr val="accent3">
+                  <a:lumMod val="45000"/>
+                  <a:lumOff val="55000"/>
+                </a:schemeClr>
+              </a:gs>
+              <a:gs pos="100000">
+                <a:schemeClr val="accent3">
+                  <a:lumMod val="30000"/>
+                  <a:lumOff val="70000"/>
+                </a:schemeClr>
+              </a:gs>
+            </a:gsLst>
+            <a:lin ang="5400000" scaled="1"/>
+            <a:tileRect/>
+          </a:gradFill>
+          <a:ln w="15875">
+            <a:solidFill>
+              <a:schemeClr val="dk1">
+                <a:alpha val="26000"/>
+              </a:schemeClr>
+            </a:solidFill>
+            <a:prstDash val="sysDash"/>
+          </a:ln>
+        </p:spPr>
+        <p:style>
+          <a:lnRef idx="2">
+            <a:schemeClr val="dk1"/>
+          </a:lnRef>
+          <a:fillRef idx="1">
+            <a:schemeClr val="lt1"/>
+          </a:fillRef>
+          <a:effectRef idx="0">
+            <a:schemeClr val="dk1"/>
+          </a:effectRef>
+          <a:fontRef idx="minor">
+            <a:schemeClr val="dk1"/>
+          </a:fontRef>
+        </p:style>
+        <p:txBody>
+          <a:bodyPr rtlCol="0" anchor="ctr"/>
+          <a:lstStyle/>
+          <a:p>
+            <a:pPr algn="ctr"/>
+            <a:endParaRPr lang="en-US" sz="1400" dirty="0"/>
+          </a:p>
+        </p:txBody>
+      </p:sp>
+      <p:sp>
+        <p:nvSpPr>
+          <p:cNvPr id="73" name="Rectangle 72">
+            <a:extLst>
+              <a:ext uri="{FF2B5EF4-FFF2-40B4-BE49-F238E27FC236}">
+                <a16:creationId xmlns:a16="http://schemas.microsoft.com/office/drawing/2014/main" id="{F96BDE1E-B6F3-49BA-B1FE-0D6496BD6E18}"/>
+              </a:ext>
+            </a:extLst>
+          </p:cNvPr>
+          <p:cNvSpPr/>
+          <p:nvPr/>
+        </p:nvSpPr>
+        <p:spPr>
+          <a:xfrm>
+            <a:off x="2444303" y="2718644"/>
+            <a:ext cx="6122834" cy="1243944"/>
+          </a:xfrm>
+          <a:prstGeom prst="rect">
+            <a:avLst/>
+          </a:prstGeom>
+          <a:gradFill flip="none" rotWithShape="1">
+            <a:gsLst>
+              <a:gs pos="0">
+                <a:schemeClr val="accent5">
+                  <a:lumMod val="5000"/>
+                  <a:lumOff val="95000"/>
+                </a:schemeClr>
+              </a:gs>
+              <a:gs pos="74000">
+                <a:schemeClr val="accent5">
+                  <a:lumMod val="45000"/>
+                  <a:lumOff val="55000"/>
+                </a:schemeClr>
+              </a:gs>
+              <a:gs pos="83000">
+                <a:schemeClr val="accent5">
+                  <a:lumMod val="45000"/>
+                  <a:lumOff val="55000"/>
+                </a:schemeClr>
+              </a:gs>
+              <a:gs pos="100000">
+                <a:schemeClr val="accent5">
+                  <a:lumMod val="30000"/>
+                  <a:lumOff val="70000"/>
+                </a:schemeClr>
+              </a:gs>
+            </a:gsLst>
+            <a:lin ang="5400000" scaled="1"/>
+            <a:tileRect/>
+          </a:gradFill>
+          <a:ln w="15875">
+            <a:solidFill>
+              <a:schemeClr val="accent1">
+                <a:alpha val="26000"/>
+              </a:schemeClr>
+            </a:solidFill>
+            <a:prstDash val="sysDash"/>
+          </a:ln>
+        </p:spPr>
+        <p:style>
+          <a:lnRef idx="2">
+            <a:schemeClr val="dk1"/>
+          </a:lnRef>
+          <a:fillRef idx="1">
+            <a:schemeClr val="lt1"/>
+          </a:fillRef>
+          <a:effectRef idx="0">
+            <a:schemeClr val="dk1"/>
+          </a:effectRef>
+          <a:fontRef idx="minor">
+            <a:schemeClr val="dk1"/>
+          </a:fontRef>
+        </p:style>
+        <p:txBody>
+          <a:bodyPr rtlCol="0" anchor="ctr"/>
+          <a:lstStyle/>
+          <a:p>
+            <a:pPr algn="ctr"/>
+            <a:endParaRPr lang="en-US" sz="1400" dirty="0"/>
+          </a:p>
+        </p:txBody>
+      </p:sp>
+      <p:sp>
+        <p:nvSpPr>
+          <p:cNvPr id="74" name="Rectangle 73">
+            <a:extLst>
+              <a:ext uri="{FF2B5EF4-FFF2-40B4-BE49-F238E27FC236}">
+                <a16:creationId xmlns:a16="http://schemas.microsoft.com/office/drawing/2014/main" id="{A2BF6B5E-98A5-4B40-982C-63E780D275D5}"/>
+              </a:ext>
+            </a:extLst>
+          </p:cNvPr>
+          <p:cNvSpPr/>
+          <p:nvPr/>
+        </p:nvSpPr>
+        <p:spPr>
+          <a:xfrm>
+            <a:off x="2968466" y="1397542"/>
+            <a:ext cx="5173325" cy="1243944"/>
+          </a:xfrm>
+          <a:prstGeom prst="rect">
+            <a:avLst/>
+          </a:prstGeom>
+          <a:gradFill flip="none" rotWithShape="1">
+            <a:gsLst>
+              <a:gs pos="0">
+                <a:schemeClr val="accent3">
+                  <a:lumMod val="5000"/>
+                  <a:lumOff val="95000"/>
+                </a:schemeClr>
+              </a:gs>
+              <a:gs pos="74000">
+                <a:schemeClr val="accent3">
+                  <a:lumMod val="45000"/>
+                  <a:lumOff val="55000"/>
+                </a:schemeClr>
+              </a:gs>
+              <a:gs pos="83000">
+                <a:schemeClr val="accent3">
+                  <a:lumMod val="45000"/>
+                  <a:lumOff val="55000"/>
+                </a:schemeClr>
+              </a:gs>
+              <a:gs pos="100000">
+                <a:schemeClr val="accent3">
+                  <a:lumMod val="30000"/>
+                  <a:lumOff val="70000"/>
+                </a:schemeClr>
+              </a:gs>
+            </a:gsLst>
+            <a:lin ang="5400000" scaled="1"/>
+            <a:tileRect/>
+          </a:gradFill>
+          <a:ln w="15875">
+            <a:solidFill>
+              <a:schemeClr val="dk1">
+                <a:alpha val="26000"/>
+              </a:schemeClr>
+            </a:solidFill>
+            <a:prstDash val="sysDash"/>
+          </a:ln>
+        </p:spPr>
+        <p:style>
+          <a:lnRef idx="2">
+            <a:schemeClr val="dk1"/>
+          </a:lnRef>
+          <a:fillRef idx="1">
+            <a:schemeClr val="lt1"/>
+          </a:fillRef>
+          <a:effectRef idx="0">
+            <a:schemeClr val="dk1"/>
+          </a:effectRef>
+          <a:fontRef idx="minor">
+            <a:schemeClr val="dk1"/>
+          </a:fontRef>
+        </p:style>
+        <p:txBody>
+          <a:bodyPr rtlCol="0" anchor="ctr"/>
+          <a:lstStyle/>
+          <a:p>
+            <a:pPr algn="ctr"/>
+            <a:endParaRPr lang="en-US" sz="1400" dirty="0"/>
+          </a:p>
+        </p:txBody>
+      </p:sp>
+      <p:grpSp>
+        <p:nvGrpSpPr>
+          <p:cNvPr id="75" name="Group 74">
+            <a:extLst>
+              <a:ext uri="{FF2B5EF4-FFF2-40B4-BE49-F238E27FC236}">
+                <a16:creationId xmlns:a16="http://schemas.microsoft.com/office/drawing/2014/main" id="{070EEA4E-56AB-4B4B-A5ED-A4A783E824C2}"/>
+              </a:ext>
+            </a:extLst>
+          </p:cNvPr>
+          <p:cNvGrpSpPr/>
+          <p:nvPr/>
+        </p:nvGrpSpPr>
+        <p:grpSpPr>
+          <a:xfrm>
+            <a:off x="2994937" y="1699410"/>
+            <a:ext cx="1215000" cy="742500"/>
+            <a:chOff x="5344" y="383979"/>
+            <a:chExt cx="1656920" cy="994152"/>
+          </a:xfrm>
+        </p:grpSpPr>
+        <p:sp>
+          <p:nvSpPr>
+            <p:cNvPr id="76" name="Rectangle: Rounded Corners 75">
+              <a:extLst>
+                <a:ext uri="{FF2B5EF4-FFF2-40B4-BE49-F238E27FC236}">
+                  <a16:creationId xmlns:a16="http://schemas.microsoft.com/office/drawing/2014/main" id="{E1D98830-9014-4CF2-AD1E-75B58EF40348}"/>
+                </a:ext>
+              </a:extLst>
+            </p:cNvPr>
+            <p:cNvSpPr/>
+            <p:nvPr/>
+          </p:nvSpPr>
+          <p:spPr>
+            <a:xfrm>
+              <a:off x="5344" y="383979"/>
+              <a:ext cx="1656920" cy="994152"/>
+            </a:xfrm>
+            <a:prstGeom prst="roundRect">
+              <a:avLst>
+                <a:gd name="adj" fmla="val 10000"/>
+              </a:avLst>
+            </a:prstGeom>
+          </p:spPr>
+          <p:style>
+            <a:lnRef idx="2">
+              <a:schemeClr val="dk1">
+                <a:shade val="80000"/>
+                <a:hueOff val="0"/>
+                <a:satOff val="0"/>
+                <a:lumOff val="0"/>
+                <a:alphaOff val="0"/>
+              </a:schemeClr>
+            </a:lnRef>
+            <a:fillRef idx="1">
+              <a:schemeClr val="lt1">
+                <a:hueOff val="0"/>
+                <a:satOff val="0"/>
+                <a:lumOff val="0"/>
+                <a:alphaOff val="0"/>
+              </a:schemeClr>
+            </a:fillRef>
+            <a:effectRef idx="0">
+              <a:schemeClr val="lt1">
+                <a:hueOff val="0"/>
+                <a:satOff val="0"/>
+                <a:lumOff val="0"/>
+                <a:alphaOff val="0"/>
+              </a:schemeClr>
+            </a:effectRef>
+            <a:fontRef idx="minor">
+              <a:schemeClr val="dk1">
+                <a:hueOff val="0"/>
+                <a:satOff val="0"/>
+                <a:lumOff val="0"/>
+                <a:alphaOff val="0"/>
+              </a:schemeClr>
+            </a:fontRef>
+          </p:style>
+        </p:sp>
+        <p:sp>
+          <p:nvSpPr>
+            <p:cNvPr id="77" name="Rectangle: Rounded Corners 4">
+              <a:extLst>
+                <a:ext uri="{FF2B5EF4-FFF2-40B4-BE49-F238E27FC236}">
+                  <a16:creationId xmlns:a16="http://schemas.microsoft.com/office/drawing/2014/main" id="{188DBDC2-5833-42C9-ADAC-1A61E1625BA6}"/>
+                </a:ext>
+              </a:extLst>
+            </p:cNvPr>
+            <p:cNvSpPr txBox="1"/>
+            <p:nvPr/>
+          </p:nvSpPr>
+          <p:spPr>
+            <a:xfrm>
+              <a:off x="34462" y="413097"/>
+              <a:ext cx="1598684" cy="903775"/>
+            </a:xfrm>
+            <a:prstGeom prst="rect">
+              <a:avLst/>
+            </a:prstGeom>
+          </p:spPr>
+          <p:style>
+            <a:lnRef idx="0">
+              <a:scrgbClr r="0" g="0" b="0"/>
+            </a:lnRef>
+            <a:fillRef idx="0">
+              <a:scrgbClr r="0" g="0" b="0"/>
+            </a:fillRef>
+            <a:effectRef idx="0">
+              <a:scrgbClr r="0" g="0" b="0"/>
+            </a:effectRef>
+            <a:fontRef idx="minor">
+              <a:schemeClr val="dk1">
+                <a:hueOff val="0"/>
+                <a:satOff val="0"/>
+                <a:lumOff val="0"/>
+                <a:alphaOff val="0"/>
+              </a:schemeClr>
+            </a:fontRef>
+          </p:style>
+          <p:txBody>
+            <a:bodyPr spcFirstLastPara="0" vert="horz" wrap="square" lIns="68580" tIns="68580" rIns="68580" bIns="68580" numCol="1" spcCol="1270" anchor="ctr" anchorCtr="0">
+              <a:noAutofit/>
+            </a:bodyPr>
+            <a:lstStyle/>
+            <a:p>
+              <a:pPr marL="0" lvl="0" indent="0" algn="ctr" defTabSz="800100">
+                <a:lnSpc>
+                  <a:spcPct val="90000"/>
+                </a:lnSpc>
+                <a:spcBef>
+                  <a:spcPct val="0"/>
+                </a:spcBef>
+                <a:spcAft>
+                  <a:spcPct val="35000"/>
+                </a:spcAft>
+                <a:buNone/>
+              </a:pPr>
+              <a:r>
+                <a:rPr lang="en-GB" sz="1400" dirty="0"/>
+                <a:t>Pseudorandom Data Symbols</a:t>
+              </a:r>
+              <a:endParaRPr lang="en-US" sz="1400" kern="1200" dirty="0"/>
+            </a:p>
+          </p:txBody>
+        </p:sp>
+      </p:grpSp>
+      <p:cxnSp>
+        <p:nvCxnSpPr>
+          <p:cNvPr id="78" name="Straight Arrow Connector 77">
+            <a:extLst>
+              <a:ext uri="{FF2B5EF4-FFF2-40B4-BE49-F238E27FC236}">
+                <a16:creationId xmlns:a16="http://schemas.microsoft.com/office/drawing/2014/main" id="{BD5DC881-553C-48AD-9C5A-B78A2C24DED8}"/>
+              </a:ext>
+            </a:extLst>
+          </p:cNvPr>
+          <p:cNvCxnSpPr>
+            <a:cxnSpLocks/>
+            <a:stCxn id="76" idx="3"/>
+            <a:endCxn id="80" idx="1"/>
+          </p:cNvCxnSpPr>
+          <p:nvPr/>
+        </p:nvCxnSpPr>
+        <p:spPr>
+          <a:xfrm flipV="1">
+            <a:off x="4209937" y="2062908"/>
+            <a:ext cx="454514" cy="7752"/>
+          </a:xfrm>
+          <a:prstGeom prst="straightConnector1">
+            <a:avLst/>
+          </a:prstGeom>
+          <a:ln>
+            <a:tailEnd type="triangle"/>
+          </a:ln>
+        </p:spPr>
+        <p:style>
+          <a:lnRef idx="1">
+            <a:schemeClr val="dk1"/>
+          </a:lnRef>
+          <a:fillRef idx="0">
+            <a:schemeClr val="dk1"/>
+          </a:fillRef>
+          <a:effectRef idx="0">
+            <a:schemeClr val="dk1"/>
+          </a:effectRef>
+          <a:fontRef idx="minor">
+            <a:schemeClr val="tx1"/>
+          </a:fontRef>
+        </p:style>
+      </p:cxnSp>
+      <p:grpSp>
+        <p:nvGrpSpPr>
+          <p:cNvPr id="79" name="Group 78">
+            <a:extLst>
+              <a:ext uri="{FF2B5EF4-FFF2-40B4-BE49-F238E27FC236}">
+                <a16:creationId xmlns:a16="http://schemas.microsoft.com/office/drawing/2014/main" id="{6776876F-0EE2-4A96-B752-413CA4AE61CA}"/>
+              </a:ext>
+            </a:extLst>
+          </p:cNvPr>
+          <p:cNvGrpSpPr/>
+          <p:nvPr/>
+        </p:nvGrpSpPr>
+        <p:grpSpPr>
+          <a:xfrm>
+            <a:off x="4664451" y="1691658"/>
+            <a:ext cx="1620000" cy="742500"/>
+            <a:chOff x="2325033" y="383979"/>
+            <a:chExt cx="1656920" cy="994152"/>
+          </a:xfrm>
+        </p:grpSpPr>
+        <p:sp>
+          <p:nvSpPr>
+            <p:cNvPr id="80" name="Rectangle: Rounded Corners 79">
+              <a:extLst>
+                <a:ext uri="{FF2B5EF4-FFF2-40B4-BE49-F238E27FC236}">
+                  <a16:creationId xmlns:a16="http://schemas.microsoft.com/office/drawing/2014/main" id="{E5D116C0-A216-4F30-913F-80D3A53B788F}"/>
+                </a:ext>
+              </a:extLst>
+            </p:cNvPr>
+            <p:cNvSpPr/>
+            <p:nvPr/>
+          </p:nvSpPr>
+          <p:spPr>
+            <a:xfrm>
+              <a:off x="2325033" y="383979"/>
+              <a:ext cx="1656920" cy="994152"/>
+            </a:xfrm>
+            <a:prstGeom prst="roundRect">
+              <a:avLst>
+                <a:gd name="adj" fmla="val 10000"/>
+              </a:avLst>
+            </a:prstGeom>
+          </p:spPr>
+          <p:style>
+            <a:lnRef idx="2">
+              <a:schemeClr val="dk1">
+                <a:shade val="80000"/>
+                <a:hueOff val="0"/>
+                <a:satOff val="0"/>
+                <a:lumOff val="0"/>
+                <a:alphaOff val="0"/>
+              </a:schemeClr>
+            </a:lnRef>
+            <a:fillRef idx="1">
+              <a:schemeClr val="lt1">
+                <a:hueOff val="0"/>
+                <a:satOff val="0"/>
+                <a:lumOff val="0"/>
+                <a:alphaOff val="0"/>
+              </a:schemeClr>
+            </a:fillRef>
+            <a:effectRef idx="0">
+              <a:schemeClr val="lt1">
+                <a:hueOff val="0"/>
+                <a:satOff val="0"/>
+                <a:lumOff val="0"/>
+                <a:alphaOff val="0"/>
+              </a:schemeClr>
+            </a:effectRef>
+            <a:fontRef idx="minor">
+              <a:schemeClr val="dk1">
+                <a:hueOff val="0"/>
+                <a:satOff val="0"/>
+                <a:lumOff val="0"/>
+                <a:alphaOff val="0"/>
+              </a:schemeClr>
+            </a:fontRef>
+          </p:style>
+        </p:sp>
+        <p:sp>
+          <p:nvSpPr>
+            <p:cNvPr id="81" name="Rectangle: Rounded Corners 4">
+              <a:extLst>
+                <a:ext uri="{FF2B5EF4-FFF2-40B4-BE49-F238E27FC236}">
+                  <a16:creationId xmlns:a16="http://schemas.microsoft.com/office/drawing/2014/main" id="{067D1012-3A7A-4E3A-AB00-5A9A967AAC03}"/>
+                </a:ext>
+              </a:extLst>
+            </p:cNvPr>
+            <p:cNvSpPr txBox="1"/>
+            <p:nvPr/>
+          </p:nvSpPr>
+          <p:spPr>
+            <a:xfrm>
+              <a:off x="2354151" y="413097"/>
+              <a:ext cx="1598684" cy="935916"/>
+            </a:xfrm>
+            <a:prstGeom prst="rect">
+              <a:avLst/>
+            </a:prstGeom>
+          </p:spPr>
+          <p:style>
+            <a:lnRef idx="0">
+              <a:scrgbClr r="0" g="0" b="0"/>
+            </a:lnRef>
+            <a:fillRef idx="0">
+              <a:scrgbClr r="0" g="0" b="0"/>
+            </a:fillRef>
+            <a:effectRef idx="0">
+              <a:scrgbClr r="0" g="0" b="0"/>
+            </a:effectRef>
+            <a:fontRef idx="minor">
+              <a:schemeClr val="dk1">
+                <a:hueOff val="0"/>
+                <a:satOff val="0"/>
+                <a:lumOff val="0"/>
+                <a:alphaOff val="0"/>
+              </a:schemeClr>
+            </a:fontRef>
+          </p:style>
+          <p:txBody>
+            <a:bodyPr spcFirstLastPara="0" vert="horz" wrap="square" lIns="68580" tIns="68580" rIns="68580" bIns="68580" numCol="1" spcCol="1270" anchor="ctr" anchorCtr="0">
+              <a:noAutofit/>
+            </a:bodyPr>
+            <a:lstStyle/>
+            <a:p>
+              <a:pPr marL="0" lvl="0" indent="0" algn="ctr" defTabSz="800100">
+                <a:lnSpc>
+                  <a:spcPct val="90000"/>
+                </a:lnSpc>
+                <a:spcBef>
+                  <a:spcPct val="0"/>
+                </a:spcBef>
+                <a:spcAft>
+                  <a:spcPct val="35000"/>
+                </a:spcAft>
+                <a:buNone/>
+              </a:pPr>
+              <a:r>
+                <a:rPr lang="en-US" sz="1400" kern="1200" dirty="0"/>
+                <a:t>Forward Error Correction Encoding</a:t>
+              </a:r>
+            </a:p>
+          </p:txBody>
+        </p:sp>
+      </p:grpSp>
+      <p:grpSp>
+        <p:nvGrpSpPr>
+          <p:cNvPr id="82" name="Group 81">
+            <a:extLst>
+              <a:ext uri="{FF2B5EF4-FFF2-40B4-BE49-F238E27FC236}">
+                <a16:creationId xmlns:a16="http://schemas.microsoft.com/office/drawing/2014/main" id="{85D344F4-0269-42E4-94DE-69019C6F2492}"/>
+              </a:ext>
+            </a:extLst>
+          </p:cNvPr>
+          <p:cNvGrpSpPr/>
+          <p:nvPr/>
+        </p:nvGrpSpPr>
+        <p:grpSpPr>
+          <a:xfrm>
+            <a:off x="6820821" y="1681560"/>
+            <a:ext cx="1215000" cy="742500"/>
+            <a:chOff x="4644721" y="383979"/>
+            <a:chExt cx="1656920" cy="994152"/>
+          </a:xfrm>
+        </p:grpSpPr>
+        <p:sp>
+          <p:nvSpPr>
+            <p:cNvPr id="83" name="Rectangle: Rounded Corners 82">
+              <a:extLst>
+                <a:ext uri="{FF2B5EF4-FFF2-40B4-BE49-F238E27FC236}">
+                  <a16:creationId xmlns:a16="http://schemas.microsoft.com/office/drawing/2014/main" id="{D85265BE-691D-4964-955C-E2A4A95C7CF9}"/>
+                </a:ext>
+              </a:extLst>
+            </p:cNvPr>
+            <p:cNvSpPr/>
+            <p:nvPr/>
+          </p:nvSpPr>
+          <p:spPr>
+            <a:xfrm>
+              <a:off x="4644721" y="383979"/>
+              <a:ext cx="1656920" cy="994152"/>
+            </a:xfrm>
+            <a:prstGeom prst="roundRect">
+              <a:avLst>
+                <a:gd name="adj" fmla="val 10000"/>
+              </a:avLst>
+            </a:prstGeom>
+          </p:spPr>
+          <p:style>
+            <a:lnRef idx="2">
+              <a:schemeClr val="dk1">
+                <a:shade val="80000"/>
+                <a:hueOff val="0"/>
+                <a:satOff val="0"/>
+                <a:lumOff val="0"/>
+                <a:alphaOff val="0"/>
+              </a:schemeClr>
+            </a:lnRef>
+            <a:fillRef idx="1">
+              <a:schemeClr val="lt1">
+                <a:hueOff val="0"/>
+                <a:satOff val="0"/>
+                <a:lumOff val="0"/>
+                <a:alphaOff val="0"/>
+              </a:schemeClr>
+            </a:fillRef>
+            <a:effectRef idx="0">
+              <a:schemeClr val="lt1">
+                <a:hueOff val="0"/>
+                <a:satOff val="0"/>
+                <a:lumOff val="0"/>
+                <a:alphaOff val="0"/>
+              </a:schemeClr>
+            </a:effectRef>
+            <a:fontRef idx="minor">
+              <a:schemeClr val="dk1">
+                <a:hueOff val="0"/>
+                <a:satOff val="0"/>
+                <a:lumOff val="0"/>
+                <a:alphaOff val="0"/>
+              </a:schemeClr>
+            </a:fontRef>
+          </p:style>
+        </p:sp>
+        <p:sp>
+          <p:nvSpPr>
+            <p:cNvPr id="84" name="Rectangle: Rounded Corners 4">
+              <a:extLst>
+                <a:ext uri="{FF2B5EF4-FFF2-40B4-BE49-F238E27FC236}">
+                  <a16:creationId xmlns:a16="http://schemas.microsoft.com/office/drawing/2014/main" id="{07F72F52-367A-4739-B9C7-10074B2DC711}"/>
+                </a:ext>
+              </a:extLst>
+            </p:cNvPr>
+            <p:cNvSpPr txBox="1"/>
+            <p:nvPr/>
+          </p:nvSpPr>
+          <p:spPr>
+            <a:xfrm>
+              <a:off x="4685062" y="398977"/>
+              <a:ext cx="1598684" cy="935916"/>
+            </a:xfrm>
+            <a:prstGeom prst="rect">
+              <a:avLst/>
+            </a:prstGeom>
+          </p:spPr>
+          <p:style>
+            <a:lnRef idx="0">
+              <a:scrgbClr r="0" g="0" b="0"/>
+            </a:lnRef>
+            <a:fillRef idx="0">
+              <a:scrgbClr r="0" g="0" b="0"/>
+            </a:fillRef>
+            <a:effectRef idx="0">
+              <a:scrgbClr r="0" g="0" b="0"/>
+            </a:effectRef>
+            <a:fontRef idx="minor">
+              <a:schemeClr val="dk1">
+                <a:hueOff val="0"/>
+                <a:satOff val="0"/>
+                <a:lumOff val="0"/>
+                <a:alphaOff val="0"/>
+              </a:schemeClr>
+            </a:fontRef>
+          </p:style>
+          <p:txBody>
+            <a:bodyPr spcFirstLastPara="0" vert="horz" wrap="square" lIns="45720" tIns="45720" rIns="45720" bIns="45720" numCol="1" spcCol="1270" anchor="ctr" anchorCtr="0">
+              <a:noAutofit/>
+            </a:bodyPr>
+            <a:lstStyle/>
+            <a:p>
+              <a:pPr marL="0" lvl="0" indent="0" algn="ctr" defTabSz="533400">
+                <a:lnSpc>
+                  <a:spcPct val="90000"/>
+                </a:lnSpc>
+                <a:spcBef>
+                  <a:spcPct val="0"/>
+                </a:spcBef>
+                <a:spcAft>
+                  <a:spcPct val="35000"/>
+                </a:spcAft>
+                <a:buNone/>
+              </a:pPr>
+              <a:r>
+                <a:rPr lang="en-US" sz="1400" kern="1200" dirty="0"/>
+                <a:t>Modulation</a:t>
+              </a:r>
+            </a:p>
+          </p:txBody>
+        </p:sp>
+      </p:grpSp>
+      <p:cxnSp>
+        <p:nvCxnSpPr>
+          <p:cNvPr id="85" name="Straight Arrow Connector 84">
+            <a:extLst>
+              <a:ext uri="{FF2B5EF4-FFF2-40B4-BE49-F238E27FC236}">
+                <a16:creationId xmlns:a16="http://schemas.microsoft.com/office/drawing/2014/main" id="{69563D02-2544-4856-8823-3EF83FBCA201}"/>
+              </a:ext>
+            </a:extLst>
+          </p:cNvPr>
+          <p:cNvCxnSpPr>
+            <a:cxnSpLocks/>
+            <a:stCxn id="80" idx="3"/>
+            <a:endCxn id="83" idx="1"/>
+          </p:cNvCxnSpPr>
+          <p:nvPr/>
+        </p:nvCxnSpPr>
+        <p:spPr>
+          <a:xfrm flipV="1">
+            <a:off x="6284451" y="2052810"/>
+            <a:ext cx="536370" cy="10098"/>
+          </a:xfrm>
+          <a:prstGeom prst="straightConnector1">
+            <a:avLst/>
+          </a:prstGeom>
+          <a:ln>
+            <a:tailEnd type="triangle"/>
+          </a:ln>
+        </p:spPr>
+        <p:style>
+          <a:lnRef idx="1">
+            <a:schemeClr val="dk1"/>
+          </a:lnRef>
+          <a:fillRef idx="0">
+            <a:schemeClr val="dk1"/>
+          </a:fillRef>
+          <a:effectRef idx="0">
+            <a:schemeClr val="dk1"/>
+          </a:effectRef>
+          <a:fontRef idx="minor">
+            <a:schemeClr val="tx1"/>
+          </a:fontRef>
+        </p:style>
+      </p:cxnSp>
+      <p:grpSp>
+        <p:nvGrpSpPr>
+          <p:cNvPr id="86" name="Group 85">
+            <a:extLst>
+              <a:ext uri="{FF2B5EF4-FFF2-40B4-BE49-F238E27FC236}">
+                <a16:creationId xmlns:a16="http://schemas.microsoft.com/office/drawing/2014/main" id="{9CA00CAC-3499-4E30-B471-2A5DF96F43B0}"/>
+              </a:ext>
+            </a:extLst>
+          </p:cNvPr>
+          <p:cNvGrpSpPr/>
+          <p:nvPr/>
+        </p:nvGrpSpPr>
+        <p:grpSpPr>
+          <a:xfrm>
+            <a:off x="7226741" y="2941235"/>
+            <a:ext cx="1215000" cy="742500"/>
+            <a:chOff x="6964410" y="383979"/>
+            <a:chExt cx="1656920" cy="994152"/>
+          </a:xfrm>
+        </p:grpSpPr>
+        <p:sp>
+          <p:nvSpPr>
+            <p:cNvPr id="87" name="Rectangle: Rounded Corners 86">
+              <a:extLst>
+                <a:ext uri="{FF2B5EF4-FFF2-40B4-BE49-F238E27FC236}">
+                  <a16:creationId xmlns:a16="http://schemas.microsoft.com/office/drawing/2014/main" id="{19347242-BDBA-4585-A1A1-99D7523A647D}"/>
+                </a:ext>
+              </a:extLst>
+            </p:cNvPr>
+            <p:cNvSpPr/>
+            <p:nvPr/>
+          </p:nvSpPr>
+          <p:spPr>
+            <a:xfrm>
+              <a:off x="6964410" y="383979"/>
+              <a:ext cx="1656920" cy="994152"/>
+            </a:xfrm>
+            <a:prstGeom prst="roundRect">
+              <a:avLst>
+                <a:gd name="adj" fmla="val 10000"/>
+              </a:avLst>
+            </a:prstGeom>
+          </p:spPr>
+          <p:style>
+            <a:lnRef idx="2">
+              <a:schemeClr val="dk1">
+                <a:shade val="80000"/>
+                <a:hueOff val="0"/>
+                <a:satOff val="0"/>
+                <a:lumOff val="0"/>
+                <a:alphaOff val="0"/>
+              </a:schemeClr>
+            </a:lnRef>
+            <a:fillRef idx="1">
+              <a:schemeClr val="lt1">
+                <a:hueOff val="0"/>
+                <a:satOff val="0"/>
+                <a:lumOff val="0"/>
+                <a:alphaOff val="0"/>
+              </a:schemeClr>
+            </a:fillRef>
+            <a:effectRef idx="0">
+              <a:schemeClr val="lt1">
+                <a:hueOff val="0"/>
+                <a:satOff val="0"/>
+                <a:lumOff val="0"/>
+                <a:alphaOff val="0"/>
+              </a:schemeClr>
+            </a:effectRef>
+            <a:fontRef idx="minor">
+              <a:schemeClr val="dk1">
+                <a:hueOff val="0"/>
+                <a:satOff val="0"/>
+                <a:lumOff val="0"/>
+                <a:alphaOff val="0"/>
+              </a:schemeClr>
+            </a:fontRef>
+          </p:style>
+        </p:sp>
+        <p:sp>
+          <p:nvSpPr>
+            <p:cNvPr id="88" name="Rectangle: Rounded Corners 4">
+              <a:extLst>
+                <a:ext uri="{FF2B5EF4-FFF2-40B4-BE49-F238E27FC236}">
+                  <a16:creationId xmlns:a16="http://schemas.microsoft.com/office/drawing/2014/main" id="{D50877AC-C574-4C04-A648-F26CD289522A}"/>
+                </a:ext>
+              </a:extLst>
+            </p:cNvPr>
+            <p:cNvSpPr txBox="1"/>
+            <p:nvPr/>
+          </p:nvSpPr>
+          <p:spPr>
+            <a:xfrm>
+              <a:off x="6993528" y="413097"/>
+              <a:ext cx="1598684" cy="935916"/>
+            </a:xfrm>
+            <a:prstGeom prst="rect">
+              <a:avLst/>
+            </a:prstGeom>
+          </p:spPr>
+          <p:style>
+            <a:lnRef idx="0">
+              <a:scrgbClr r="0" g="0" b="0"/>
+            </a:lnRef>
+            <a:fillRef idx="0">
+              <a:scrgbClr r="0" g="0" b="0"/>
+            </a:fillRef>
+            <a:effectRef idx="0">
+              <a:scrgbClr r="0" g="0" b="0"/>
+            </a:effectRef>
+            <a:fontRef idx="minor">
+              <a:schemeClr val="dk1">
+                <a:hueOff val="0"/>
+                <a:satOff val="0"/>
+                <a:lumOff val="0"/>
+                <a:alphaOff val="0"/>
+              </a:schemeClr>
+            </a:fontRef>
+          </p:style>
+          <p:txBody>
+            <a:bodyPr spcFirstLastPara="0" vert="horz" wrap="square" lIns="76200" tIns="76200" rIns="76200" bIns="76200" numCol="1" spcCol="1270" anchor="ctr" anchorCtr="0">
+              <a:noAutofit/>
+            </a:bodyPr>
+            <a:lstStyle/>
+            <a:p>
+              <a:pPr marL="0" lvl="0" indent="0" algn="ctr" defTabSz="889000">
+                <a:lnSpc>
+                  <a:spcPct val="90000"/>
+                </a:lnSpc>
+                <a:spcBef>
+                  <a:spcPct val="0"/>
+                </a:spcBef>
+                <a:spcAft>
+                  <a:spcPct val="35000"/>
+                </a:spcAft>
+                <a:buNone/>
+              </a:pPr>
+              <a:r>
+                <a:rPr lang="en-US" sz="1400" kern="1200" dirty="0"/>
+                <a:t>Pulse Shape Filtering – Upsampling</a:t>
+              </a:r>
+            </a:p>
+          </p:txBody>
+        </p:sp>
+      </p:grpSp>
+      <p:grpSp>
+        <p:nvGrpSpPr>
+          <p:cNvPr id="89" name="Group 88">
+            <a:extLst>
+              <a:ext uri="{FF2B5EF4-FFF2-40B4-BE49-F238E27FC236}">
+                <a16:creationId xmlns:a16="http://schemas.microsoft.com/office/drawing/2014/main" id="{3C7ACBAD-8023-486B-940F-33A7B3F34C68}"/>
+              </a:ext>
+            </a:extLst>
+          </p:cNvPr>
+          <p:cNvGrpSpPr/>
+          <p:nvPr/>
+        </p:nvGrpSpPr>
+        <p:grpSpPr>
+          <a:xfrm>
+            <a:off x="5686627" y="2938430"/>
+            <a:ext cx="1242693" cy="745614"/>
+            <a:chOff x="9284098" y="383979"/>
+            <a:chExt cx="1656920" cy="994152"/>
+          </a:xfrm>
+        </p:grpSpPr>
+        <p:sp>
+          <p:nvSpPr>
+            <p:cNvPr id="90" name="Rectangle: Rounded Corners 89">
+              <a:extLst>
+                <a:ext uri="{FF2B5EF4-FFF2-40B4-BE49-F238E27FC236}">
+                  <a16:creationId xmlns:a16="http://schemas.microsoft.com/office/drawing/2014/main" id="{85F5F68F-5F28-4DBD-9F54-C9E2287ADD47}"/>
+                </a:ext>
+              </a:extLst>
+            </p:cNvPr>
+            <p:cNvSpPr/>
+            <p:nvPr/>
+          </p:nvSpPr>
+          <p:spPr>
+            <a:xfrm>
+              <a:off x="9284098" y="383979"/>
+              <a:ext cx="1656920" cy="994152"/>
+            </a:xfrm>
+            <a:prstGeom prst="roundRect">
+              <a:avLst>
+                <a:gd name="adj" fmla="val 10000"/>
+              </a:avLst>
+            </a:prstGeom>
+          </p:spPr>
+          <p:style>
+            <a:lnRef idx="2">
+              <a:schemeClr val="dk1">
+                <a:shade val="80000"/>
+                <a:hueOff val="0"/>
+                <a:satOff val="0"/>
+                <a:lumOff val="0"/>
+                <a:alphaOff val="0"/>
+              </a:schemeClr>
+            </a:lnRef>
+            <a:fillRef idx="1">
+              <a:schemeClr val="lt1">
+                <a:hueOff val="0"/>
+                <a:satOff val="0"/>
+                <a:lumOff val="0"/>
+                <a:alphaOff val="0"/>
+              </a:schemeClr>
+            </a:fillRef>
+            <a:effectRef idx="0">
+              <a:schemeClr val="lt1">
+                <a:hueOff val="0"/>
+                <a:satOff val="0"/>
+                <a:lumOff val="0"/>
+                <a:alphaOff val="0"/>
+              </a:schemeClr>
+            </a:effectRef>
+            <a:fontRef idx="minor">
+              <a:schemeClr val="dk1">
+                <a:hueOff val="0"/>
+                <a:satOff val="0"/>
+                <a:lumOff val="0"/>
+                <a:alphaOff val="0"/>
+              </a:schemeClr>
+            </a:fontRef>
+          </p:style>
+        </p:sp>
+        <p:sp>
+          <p:nvSpPr>
+            <p:cNvPr id="91" name="Rectangle: Rounded Corners 4">
+              <a:extLst>
+                <a:ext uri="{FF2B5EF4-FFF2-40B4-BE49-F238E27FC236}">
+                  <a16:creationId xmlns:a16="http://schemas.microsoft.com/office/drawing/2014/main" id="{A5540A38-B274-4A81-A7BC-3FA4C06C94F9}"/>
+                </a:ext>
+              </a:extLst>
+            </p:cNvPr>
+            <p:cNvSpPr txBox="1"/>
+            <p:nvPr/>
+          </p:nvSpPr>
+          <p:spPr>
+            <a:xfrm>
+              <a:off x="9313217" y="413098"/>
+              <a:ext cx="1598684" cy="935916"/>
+            </a:xfrm>
+            <a:prstGeom prst="rect">
+              <a:avLst/>
+            </a:prstGeom>
+          </p:spPr>
+          <p:style>
+            <a:lnRef idx="0">
+              <a:scrgbClr r="0" g="0" b="0"/>
+            </a:lnRef>
+            <a:fillRef idx="0">
+              <a:scrgbClr r="0" g="0" b="0"/>
+            </a:fillRef>
+            <a:effectRef idx="0">
+              <a:scrgbClr r="0" g="0" b="0"/>
+            </a:effectRef>
+            <a:fontRef idx="minor">
+              <a:schemeClr val="dk1">
+                <a:hueOff val="0"/>
+                <a:satOff val="0"/>
+                <a:lumOff val="0"/>
+                <a:alphaOff val="0"/>
+              </a:schemeClr>
+            </a:fontRef>
+          </p:style>
+          <p:txBody>
+            <a:bodyPr spcFirstLastPara="0" vert="horz" wrap="square" lIns="76200" tIns="76200" rIns="76200" bIns="76200" numCol="1" spcCol="1270" anchor="ctr" anchorCtr="0">
+              <a:noAutofit/>
+            </a:bodyPr>
+            <a:lstStyle/>
+            <a:p>
+              <a:pPr marL="0" lvl="0" indent="0" algn="ctr" defTabSz="889000">
+                <a:lnSpc>
+                  <a:spcPct val="90000"/>
+                </a:lnSpc>
+                <a:spcBef>
+                  <a:spcPct val="0"/>
+                </a:spcBef>
+                <a:spcAft>
+                  <a:spcPct val="35000"/>
+                </a:spcAft>
+                <a:buNone/>
+              </a:pPr>
+              <a:r>
+                <a:rPr lang="en-US" sz="1400" kern="1200" dirty="0"/>
+                <a:t>Add Chromatic Dispersion</a:t>
+              </a:r>
+            </a:p>
+          </p:txBody>
+        </p:sp>
+      </p:grpSp>
+      <p:sp>
+        <p:nvSpPr>
+          <p:cNvPr id="92" name="TextBox 91">
+            <a:extLst>
+              <a:ext uri="{FF2B5EF4-FFF2-40B4-BE49-F238E27FC236}">
+                <a16:creationId xmlns:a16="http://schemas.microsoft.com/office/drawing/2014/main" id="{359C21CC-8E99-477E-AAE5-DAFD8055199F}"/>
+              </a:ext>
+            </a:extLst>
+          </p:cNvPr>
+          <p:cNvSpPr txBox="1"/>
+          <p:nvPr/>
+        </p:nvSpPr>
+        <p:spPr>
+          <a:xfrm>
+            <a:off x="4269439" y="1403039"/>
+            <a:ext cx="2913625" cy="307777"/>
+          </a:xfrm>
+          <a:prstGeom prst="rect">
+            <a:avLst/>
+          </a:prstGeom>
+          <a:noFill/>
+        </p:spPr>
+        <p:txBody>
+          <a:bodyPr wrap="square" rtlCol="0">
+            <a:spAutoFit/>
+          </a:bodyPr>
+          <a:lstStyle/>
+          <a:p>
+            <a:r>
+              <a:rPr lang="en-US" sz="1400" b="1" dirty="0"/>
+              <a:t>Electrical Domain  -  Transmitter</a:t>
+            </a:r>
+          </a:p>
+        </p:txBody>
+      </p:sp>
+      <p:grpSp>
+        <p:nvGrpSpPr>
+          <p:cNvPr id="93" name="Group 92">
+            <a:extLst>
+              <a:ext uri="{FF2B5EF4-FFF2-40B4-BE49-F238E27FC236}">
+                <a16:creationId xmlns:a16="http://schemas.microsoft.com/office/drawing/2014/main" id="{56811278-D55A-43FE-9DB8-7F1DF47B1B0E}"/>
+              </a:ext>
+            </a:extLst>
+          </p:cNvPr>
+          <p:cNvGrpSpPr/>
+          <p:nvPr/>
+        </p:nvGrpSpPr>
+        <p:grpSpPr>
+          <a:xfrm>
+            <a:off x="4129479" y="2939956"/>
+            <a:ext cx="1242693" cy="745614"/>
+            <a:chOff x="9284098" y="383979"/>
+            <a:chExt cx="1656920" cy="994152"/>
+          </a:xfrm>
+        </p:grpSpPr>
+        <p:sp>
+          <p:nvSpPr>
+            <p:cNvPr id="94" name="Rectangle: Rounded Corners 93">
+              <a:extLst>
+                <a:ext uri="{FF2B5EF4-FFF2-40B4-BE49-F238E27FC236}">
+                  <a16:creationId xmlns:a16="http://schemas.microsoft.com/office/drawing/2014/main" id="{470B8877-77AF-4ABC-AFDB-09FC3D39C7EB}"/>
+                </a:ext>
+              </a:extLst>
+            </p:cNvPr>
+            <p:cNvSpPr/>
+            <p:nvPr/>
+          </p:nvSpPr>
+          <p:spPr>
+            <a:xfrm>
+              <a:off x="9284098" y="383979"/>
+              <a:ext cx="1656920" cy="994152"/>
+            </a:xfrm>
+            <a:prstGeom prst="roundRect">
+              <a:avLst>
+                <a:gd name="adj" fmla="val 10000"/>
+              </a:avLst>
+            </a:prstGeom>
+          </p:spPr>
+          <p:style>
+            <a:lnRef idx="2">
+              <a:schemeClr val="dk1">
+                <a:shade val="80000"/>
+                <a:hueOff val="0"/>
+                <a:satOff val="0"/>
+                <a:lumOff val="0"/>
+                <a:alphaOff val="0"/>
+              </a:schemeClr>
+            </a:lnRef>
+            <a:fillRef idx="1">
+              <a:schemeClr val="lt1">
+                <a:hueOff val="0"/>
+                <a:satOff val="0"/>
+                <a:lumOff val="0"/>
+                <a:alphaOff val="0"/>
+              </a:schemeClr>
+            </a:fillRef>
+            <a:effectRef idx="0">
+              <a:schemeClr val="lt1">
+                <a:hueOff val="0"/>
+                <a:satOff val="0"/>
+                <a:lumOff val="0"/>
+                <a:alphaOff val="0"/>
+              </a:schemeClr>
+            </a:effectRef>
+            <a:fontRef idx="minor">
+              <a:schemeClr val="dk1">
+                <a:hueOff val="0"/>
+                <a:satOff val="0"/>
+                <a:lumOff val="0"/>
+                <a:alphaOff val="0"/>
+              </a:schemeClr>
+            </a:fontRef>
+          </p:style>
+        </p:sp>
+        <p:sp>
+          <p:nvSpPr>
+            <p:cNvPr id="95" name="Rectangle: Rounded Corners 4">
+              <a:extLst>
+                <a:ext uri="{FF2B5EF4-FFF2-40B4-BE49-F238E27FC236}">
+                  <a16:creationId xmlns:a16="http://schemas.microsoft.com/office/drawing/2014/main" id="{059F6CCF-201A-4B5A-8978-04F1FD9F137E}"/>
+                </a:ext>
+              </a:extLst>
+            </p:cNvPr>
+            <p:cNvSpPr txBox="1"/>
+            <p:nvPr/>
+          </p:nvSpPr>
+          <p:spPr>
+            <a:xfrm>
+              <a:off x="9313216" y="413097"/>
+              <a:ext cx="1598684" cy="935916"/>
+            </a:xfrm>
+            <a:prstGeom prst="rect">
+              <a:avLst/>
+            </a:prstGeom>
+          </p:spPr>
+          <p:style>
+            <a:lnRef idx="0">
+              <a:scrgbClr r="0" g="0" b="0"/>
+            </a:lnRef>
+            <a:fillRef idx="0">
+              <a:scrgbClr r="0" g="0" b="0"/>
+            </a:fillRef>
+            <a:effectRef idx="0">
+              <a:scrgbClr r="0" g="0" b="0"/>
+            </a:effectRef>
+            <a:fontRef idx="minor">
+              <a:schemeClr val="dk1">
+                <a:hueOff val="0"/>
+                <a:satOff val="0"/>
+                <a:lumOff val="0"/>
+                <a:alphaOff val="0"/>
+              </a:schemeClr>
+            </a:fontRef>
+          </p:style>
+          <p:txBody>
+            <a:bodyPr spcFirstLastPara="0" vert="horz" wrap="square" lIns="76200" tIns="76200" rIns="76200" bIns="76200" numCol="1" spcCol="1270" anchor="ctr" anchorCtr="0">
+              <a:noAutofit/>
+            </a:bodyPr>
+            <a:lstStyle/>
+            <a:p>
+              <a:pPr marL="0" lvl="0" indent="0" algn="ctr" defTabSz="889000">
+                <a:lnSpc>
+                  <a:spcPct val="90000"/>
+                </a:lnSpc>
+                <a:spcBef>
+                  <a:spcPct val="0"/>
+                </a:spcBef>
+                <a:spcAft>
+                  <a:spcPct val="35000"/>
+                </a:spcAft>
+                <a:buNone/>
+              </a:pPr>
+              <a:r>
+                <a:rPr lang="en-US" sz="1400" kern="1200" dirty="0"/>
+                <a:t>Add AWGN</a:t>
+              </a:r>
+            </a:p>
+          </p:txBody>
+        </p:sp>
+      </p:grpSp>
+      <p:grpSp>
+        <p:nvGrpSpPr>
+          <p:cNvPr id="96" name="Group 95">
+            <a:extLst>
+              <a:ext uri="{FF2B5EF4-FFF2-40B4-BE49-F238E27FC236}">
+                <a16:creationId xmlns:a16="http://schemas.microsoft.com/office/drawing/2014/main" id="{020F4A22-A997-4B28-853B-3139D8595A77}"/>
+              </a:ext>
+            </a:extLst>
+          </p:cNvPr>
+          <p:cNvGrpSpPr/>
+          <p:nvPr/>
+        </p:nvGrpSpPr>
+        <p:grpSpPr>
+          <a:xfrm>
+            <a:off x="2577593" y="2939128"/>
+            <a:ext cx="1242693" cy="745614"/>
+            <a:chOff x="9284098" y="383979"/>
+            <a:chExt cx="1656920" cy="994152"/>
+          </a:xfrm>
+        </p:grpSpPr>
+        <p:sp>
+          <p:nvSpPr>
+            <p:cNvPr id="97" name="Rectangle: Rounded Corners 96">
+              <a:extLst>
+                <a:ext uri="{FF2B5EF4-FFF2-40B4-BE49-F238E27FC236}">
+                  <a16:creationId xmlns:a16="http://schemas.microsoft.com/office/drawing/2014/main" id="{2C52DE6C-B594-4CB6-9ED5-187CB4EAB49A}"/>
+                </a:ext>
+              </a:extLst>
+            </p:cNvPr>
+            <p:cNvSpPr/>
+            <p:nvPr/>
+          </p:nvSpPr>
+          <p:spPr>
+            <a:xfrm>
+              <a:off x="9284098" y="383979"/>
+              <a:ext cx="1656920" cy="994152"/>
+            </a:xfrm>
+            <a:prstGeom prst="roundRect">
+              <a:avLst>
+                <a:gd name="adj" fmla="val 10000"/>
+              </a:avLst>
+            </a:prstGeom>
+          </p:spPr>
+          <p:style>
+            <a:lnRef idx="2">
+              <a:schemeClr val="dk1">
+                <a:shade val="80000"/>
+                <a:hueOff val="0"/>
+                <a:satOff val="0"/>
+                <a:lumOff val="0"/>
+                <a:alphaOff val="0"/>
+              </a:schemeClr>
+            </a:lnRef>
+            <a:fillRef idx="1">
+              <a:schemeClr val="lt1">
+                <a:hueOff val="0"/>
+                <a:satOff val="0"/>
+                <a:lumOff val="0"/>
+                <a:alphaOff val="0"/>
+              </a:schemeClr>
+            </a:fillRef>
+            <a:effectRef idx="0">
+              <a:schemeClr val="lt1">
+                <a:hueOff val="0"/>
+                <a:satOff val="0"/>
+                <a:lumOff val="0"/>
+                <a:alphaOff val="0"/>
+              </a:schemeClr>
+            </a:effectRef>
+            <a:fontRef idx="minor">
+              <a:schemeClr val="dk1">
+                <a:hueOff val="0"/>
+                <a:satOff val="0"/>
+                <a:lumOff val="0"/>
+                <a:alphaOff val="0"/>
+              </a:schemeClr>
+            </a:fontRef>
+          </p:style>
+        </p:sp>
+        <p:sp>
+          <p:nvSpPr>
+            <p:cNvPr id="98" name="Rectangle: Rounded Corners 4">
+              <a:extLst>
+                <a:ext uri="{FF2B5EF4-FFF2-40B4-BE49-F238E27FC236}">
+                  <a16:creationId xmlns:a16="http://schemas.microsoft.com/office/drawing/2014/main" id="{38E653A7-1C11-4F6E-88F1-0353981A05C7}"/>
+                </a:ext>
+              </a:extLst>
+            </p:cNvPr>
+            <p:cNvSpPr txBox="1"/>
+            <p:nvPr/>
+          </p:nvSpPr>
+          <p:spPr>
+            <a:xfrm>
+              <a:off x="9313216" y="413097"/>
+              <a:ext cx="1598684" cy="935916"/>
+            </a:xfrm>
+            <a:prstGeom prst="rect">
+              <a:avLst/>
+            </a:prstGeom>
+          </p:spPr>
+          <p:style>
+            <a:lnRef idx="0">
+              <a:scrgbClr r="0" g="0" b="0"/>
+            </a:lnRef>
+            <a:fillRef idx="0">
+              <a:scrgbClr r="0" g="0" b="0"/>
+            </a:fillRef>
+            <a:effectRef idx="0">
+              <a:scrgbClr r="0" g="0" b="0"/>
+            </a:effectRef>
+            <a:fontRef idx="minor">
+              <a:schemeClr val="dk1">
+                <a:hueOff val="0"/>
+                <a:satOff val="0"/>
+                <a:lumOff val="0"/>
+                <a:alphaOff val="0"/>
+              </a:schemeClr>
+            </a:fontRef>
+          </p:style>
+          <p:txBody>
+            <a:bodyPr spcFirstLastPara="0" vert="horz" wrap="square" lIns="76200" tIns="76200" rIns="76200" bIns="76200" numCol="1" spcCol="1270" anchor="ctr" anchorCtr="0">
+              <a:noAutofit/>
+            </a:bodyPr>
+            <a:lstStyle/>
+            <a:p>
+              <a:pPr marL="0" lvl="0" indent="0" algn="ctr" defTabSz="889000">
+                <a:lnSpc>
+                  <a:spcPct val="90000"/>
+                </a:lnSpc>
+                <a:spcBef>
+                  <a:spcPct val="0"/>
+                </a:spcBef>
+                <a:spcAft>
+                  <a:spcPct val="35000"/>
+                </a:spcAft>
+                <a:buNone/>
+              </a:pPr>
+              <a:r>
+                <a:rPr lang="en-US" sz="1400" kern="1200" dirty="0"/>
+                <a:t>Add Phase Noise</a:t>
+              </a:r>
+            </a:p>
+          </p:txBody>
+        </p:sp>
+      </p:grpSp>
+      <p:cxnSp>
+        <p:nvCxnSpPr>
+          <p:cNvPr id="99" name="Straight Arrow Connector 98">
+            <a:extLst>
+              <a:ext uri="{FF2B5EF4-FFF2-40B4-BE49-F238E27FC236}">
+                <a16:creationId xmlns:a16="http://schemas.microsoft.com/office/drawing/2014/main" id="{018DD4C9-EDDB-4260-A91A-58FD421F4665}"/>
+              </a:ext>
+            </a:extLst>
+          </p:cNvPr>
+          <p:cNvCxnSpPr>
+            <a:cxnSpLocks/>
+            <a:stCxn id="87" idx="1"/>
+            <a:endCxn id="90" idx="3"/>
+          </p:cNvCxnSpPr>
+          <p:nvPr/>
+        </p:nvCxnSpPr>
+        <p:spPr>
+          <a:xfrm flipH="1" flipV="1">
+            <a:off x="6929320" y="3311237"/>
+            <a:ext cx="297421" cy="1248"/>
+          </a:xfrm>
+          <a:prstGeom prst="straightConnector1">
+            <a:avLst/>
+          </a:prstGeom>
+          <a:ln>
+            <a:tailEnd type="triangle"/>
+          </a:ln>
+        </p:spPr>
+        <p:style>
+          <a:lnRef idx="1">
+            <a:schemeClr val="dk1"/>
+          </a:lnRef>
+          <a:fillRef idx="0">
+            <a:schemeClr val="dk1"/>
+          </a:fillRef>
+          <a:effectRef idx="0">
+            <a:schemeClr val="dk1"/>
+          </a:effectRef>
+          <a:fontRef idx="minor">
+            <a:schemeClr val="tx1"/>
+          </a:fontRef>
+        </p:style>
+      </p:cxnSp>
+      <p:cxnSp>
+        <p:nvCxnSpPr>
+          <p:cNvPr id="100" name="Straight Arrow Connector 99">
+            <a:extLst>
+              <a:ext uri="{FF2B5EF4-FFF2-40B4-BE49-F238E27FC236}">
+                <a16:creationId xmlns:a16="http://schemas.microsoft.com/office/drawing/2014/main" id="{94B43F19-27FD-4FD8-9200-E4887A0AA977}"/>
+              </a:ext>
+            </a:extLst>
+          </p:cNvPr>
+          <p:cNvCxnSpPr>
+            <a:cxnSpLocks/>
+            <a:stCxn id="94" idx="1"/>
+            <a:endCxn id="97" idx="3"/>
+          </p:cNvCxnSpPr>
+          <p:nvPr/>
+        </p:nvCxnSpPr>
+        <p:spPr>
+          <a:xfrm flipH="1" flipV="1">
+            <a:off x="3820286" y="3311935"/>
+            <a:ext cx="309193" cy="828"/>
+          </a:xfrm>
+          <a:prstGeom prst="straightConnector1">
+            <a:avLst/>
+          </a:prstGeom>
+          <a:ln>
+            <a:tailEnd type="triangle"/>
+          </a:ln>
+        </p:spPr>
+        <p:style>
+          <a:lnRef idx="1">
+            <a:schemeClr val="dk1"/>
+          </a:lnRef>
+          <a:fillRef idx="0">
+            <a:schemeClr val="dk1"/>
+          </a:fillRef>
+          <a:effectRef idx="0">
+            <a:schemeClr val="dk1"/>
+          </a:effectRef>
+          <a:fontRef idx="minor">
+            <a:schemeClr val="tx1"/>
+          </a:fontRef>
+        </p:style>
+      </p:cxnSp>
+      <p:grpSp>
+        <p:nvGrpSpPr>
+          <p:cNvPr id="101" name="Group 100">
+            <a:extLst>
+              <a:ext uri="{FF2B5EF4-FFF2-40B4-BE49-F238E27FC236}">
+                <a16:creationId xmlns:a16="http://schemas.microsoft.com/office/drawing/2014/main" id="{AFE1345E-1EA3-40D1-BA12-0CACD7F88FD7}"/>
+              </a:ext>
+            </a:extLst>
+          </p:cNvPr>
+          <p:cNvGrpSpPr/>
+          <p:nvPr/>
+        </p:nvGrpSpPr>
+        <p:grpSpPr>
+          <a:xfrm>
+            <a:off x="6831034" y="4487313"/>
+            <a:ext cx="1242693" cy="745614"/>
+            <a:chOff x="2325033" y="2040899"/>
+            <a:chExt cx="1656920" cy="994152"/>
+          </a:xfrm>
+        </p:grpSpPr>
+        <p:sp>
+          <p:nvSpPr>
+            <p:cNvPr id="102" name="Rectangle: Rounded Corners 101">
+              <a:extLst>
+                <a:ext uri="{FF2B5EF4-FFF2-40B4-BE49-F238E27FC236}">
+                  <a16:creationId xmlns:a16="http://schemas.microsoft.com/office/drawing/2014/main" id="{726197FE-76DE-49A4-A291-710727FB588B}"/>
+                </a:ext>
+              </a:extLst>
+            </p:cNvPr>
+            <p:cNvSpPr/>
+            <p:nvPr/>
+          </p:nvSpPr>
+          <p:spPr>
+            <a:xfrm>
+              <a:off x="2325033" y="2040899"/>
+              <a:ext cx="1656920" cy="994152"/>
+            </a:xfrm>
+            <a:prstGeom prst="roundRect">
+              <a:avLst>
+                <a:gd name="adj" fmla="val 10000"/>
+              </a:avLst>
+            </a:prstGeom>
+          </p:spPr>
+          <p:style>
+            <a:lnRef idx="2">
+              <a:schemeClr val="dk1">
+                <a:shade val="80000"/>
+                <a:hueOff val="0"/>
+                <a:satOff val="0"/>
+                <a:lumOff val="0"/>
+                <a:alphaOff val="0"/>
+              </a:schemeClr>
+            </a:lnRef>
+            <a:fillRef idx="1">
+              <a:schemeClr val="lt1">
+                <a:hueOff val="0"/>
+                <a:satOff val="0"/>
+                <a:lumOff val="0"/>
+                <a:alphaOff val="0"/>
+              </a:schemeClr>
+            </a:fillRef>
+            <a:effectRef idx="0">
+              <a:schemeClr val="lt1">
+                <a:hueOff val="0"/>
+                <a:satOff val="0"/>
+                <a:lumOff val="0"/>
+                <a:alphaOff val="0"/>
+              </a:schemeClr>
+            </a:effectRef>
+            <a:fontRef idx="minor">
+              <a:schemeClr val="dk1">
+                <a:hueOff val="0"/>
+                <a:satOff val="0"/>
+                <a:lumOff val="0"/>
+                <a:alphaOff val="0"/>
+              </a:schemeClr>
+            </a:fontRef>
+          </p:style>
+        </p:sp>
+        <p:sp>
+          <p:nvSpPr>
+            <p:cNvPr id="103" name="Rectangle: Rounded Corners 4">
+              <a:extLst>
+                <a:ext uri="{FF2B5EF4-FFF2-40B4-BE49-F238E27FC236}">
+                  <a16:creationId xmlns:a16="http://schemas.microsoft.com/office/drawing/2014/main" id="{D16D5513-538F-4616-807E-A5B57306923A}"/>
+                </a:ext>
+              </a:extLst>
+            </p:cNvPr>
+            <p:cNvSpPr txBox="1"/>
+            <p:nvPr/>
+          </p:nvSpPr>
+          <p:spPr>
+            <a:xfrm>
+              <a:off x="2354151" y="2070017"/>
+              <a:ext cx="1598684" cy="935916"/>
+            </a:xfrm>
+            <a:prstGeom prst="rect">
+              <a:avLst/>
+            </a:prstGeom>
+          </p:spPr>
+          <p:style>
+            <a:lnRef idx="0">
+              <a:scrgbClr r="0" g="0" b="0"/>
+            </a:lnRef>
+            <a:fillRef idx="0">
+              <a:scrgbClr r="0" g="0" b="0"/>
+            </a:fillRef>
+            <a:effectRef idx="0">
+              <a:scrgbClr r="0" g="0" b="0"/>
+            </a:effectRef>
+            <a:fontRef idx="minor">
+              <a:schemeClr val="dk1">
+                <a:hueOff val="0"/>
+                <a:satOff val="0"/>
+                <a:lumOff val="0"/>
+                <a:alphaOff val="0"/>
+              </a:schemeClr>
+            </a:fontRef>
+          </p:style>
+          <p:txBody>
+            <a:bodyPr spcFirstLastPara="0" vert="horz" wrap="square" lIns="60960" tIns="60960" rIns="60960" bIns="60960" numCol="1" spcCol="1270" anchor="ctr" anchorCtr="0">
+              <a:noAutofit/>
+            </a:bodyPr>
+            <a:lstStyle/>
+            <a:p>
+              <a:pPr marL="0" lvl="0" indent="0" algn="ctr" defTabSz="711200">
+                <a:lnSpc>
+                  <a:spcPct val="90000"/>
+                </a:lnSpc>
+                <a:spcBef>
+                  <a:spcPct val="0"/>
+                </a:spcBef>
+                <a:spcAft>
+                  <a:spcPct val="35000"/>
+                </a:spcAft>
+                <a:buNone/>
+              </a:pPr>
+              <a:r>
+                <a:rPr lang="en-US" sz="1400" kern="1200" dirty="0"/>
+                <a:t>Carrier Down-sampling Selection</a:t>
+              </a:r>
+            </a:p>
+          </p:txBody>
+        </p:sp>
+      </p:grpSp>
+      <p:grpSp>
+        <p:nvGrpSpPr>
+          <p:cNvPr id="104" name="Group 103">
+            <a:extLst>
+              <a:ext uri="{FF2B5EF4-FFF2-40B4-BE49-F238E27FC236}">
+                <a16:creationId xmlns:a16="http://schemas.microsoft.com/office/drawing/2014/main" id="{CC901026-4C49-4237-997E-237A432144EF}"/>
+              </a:ext>
+            </a:extLst>
+          </p:cNvPr>
+          <p:cNvGrpSpPr/>
+          <p:nvPr/>
+        </p:nvGrpSpPr>
+        <p:grpSpPr>
+          <a:xfrm>
+            <a:off x="3359231" y="4479802"/>
+            <a:ext cx="1372283" cy="745614"/>
+            <a:chOff x="4644721" y="2040899"/>
+            <a:chExt cx="1656920" cy="994152"/>
+          </a:xfrm>
+        </p:grpSpPr>
+        <p:sp>
+          <p:nvSpPr>
+            <p:cNvPr id="105" name="Rectangle: Rounded Corners 104">
+              <a:extLst>
+                <a:ext uri="{FF2B5EF4-FFF2-40B4-BE49-F238E27FC236}">
+                  <a16:creationId xmlns:a16="http://schemas.microsoft.com/office/drawing/2014/main" id="{0C35B2C1-C34A-4C48-A8F0-895FBF726507}"/>
+                </a:ext>
+              </a:extLst>
+            </p:cNvPr>
+            <p:cNvSpPr/>
+            <p:nvPr/>
+          </p:nvSpPr>
+          <p:spPr>
+            <a:xfrm>
+              <a:off x="4644721" y="2040899"/>
+              <a:ext cx="1656920" cy="994152"/>
+            </a:xfrm>
+            <a:prstGeom prst="roundRect">
+              <a:avLst>
+                <a:gd name="adj" fmla="val 10000"/>
+              </a:avLst>
+            </a:prstGeom>
+          </p:spPr>
+          <p:style>
+            <a:lnRef idx="2">
+              <a:schemeClr val="dk1">
+                <a:shade val="80000"/>
+                <a:hueOff val="0"/>
+                <a:satOff val="0"/>
+                <a:lumOff val="0"/>
+                <a:alphaOff val="0"/>
+              </a:schemeClr>
+            </a:lnRef>
+            <a:fillRef idx="1">
+              <a:schemeClr val="lt1">
+                <a:hueOff val="0"/>
+                <a:satOff val="0"/>
+                <a:lumOff val="0"/>
+                <a:alphaOff val="0"/>
+              </a:schemeClr>
+            </a:fillRef>
+            <a:effectRef idx="0">
+              <a:schemeClr val="lt1">
+                <a:hueOff val="0"/>
+                <a:satOff val="0"/>
+                <a:lumOff val="0"/>
+                <a:alphaOff val="0"/>
+              </a:schemeClr>
+            </a:effectRef>
+            <a:fontRef idx="minor">
+              <a:schemeClr val="dk1">
+                <a:hueOff val="0"/>
+                <a:satOff val="0"/>
+                <a:lumOff val="0"/>
+                <a:alphaOff val="0"/>
+              </a:schemeClr>
+            </a:fontRef>
+          </p:style>
+        </p:sp>
+        <p:sp>
+          <p:nvSpPr>
+            <p:cNvPr id="106" name="Rectangle: Rounded Corners 4">
+              <a:extLst>
+                <a:ext uri="{FF2B5EF4-FFF2-40B4-BE49-F238E27FC236}">
+                  <a16:creationId xmlns:a16="http://schemas.microsoft.com/office/drawing/2014/main" id="{40F05F3B-37CE-4036-98F8-26414698C0FC}"/>
+                </a:ext>
+              </a:extLst>
+            </p:cNvPr>
+            <p:cNvSpPr txBox="1"/>
+            <p:nvPr/>
+          </p:nvSpPr>
+          <p:spPr>
+            <a:xfrm>
+              <a:off x="4673839" y="2070017"/>
+              <a:ext cx="1598684" cy="935916"/>
+            </a:xfrm>
+            <a:prstGeom prst="rect">
+              <a:avLst/>
+            </a:prstGeom>
+          </p:spPr>
+          <p:style>
+            <a:lnRef idx="0">
+              <a:scrgbClr r="0" g="0" b="0"/>
+            </a:lnRef>
+            <a:fillRef idx="0">
+              <a:scrgbClr r="0" g="0" b="0"/>
+            </a:fillRef>
+            <a:effectRef idx="0">
+              <a:scrgbClr r="0" g="0" b="0"/>
+            </a:effectRef>
+            <a:fontRef idx="minor">
+              <a:schemeClr val="dk1">
+                <a:hueOff val="0"/>
+                <a:satOff val="0"/>
+                <a:lumOff val="0"/>
+                <a:alphaOff val="0"/>
+              </a:schemeClr>
+            </a:fontRef>
+          </p:style>
+          <p:txBody>
+            <a:bodyPr spcFirstLastPara="0" vert="horz" wrap="square" lIns="60960" tIns="60960" rIns="60960" bIns="60960" numCol="1" spcCol="1270" anchor="ctr" anchorCtr="0">
+              <a:noAutofit/>
+            </a:bodyPr>
+            <a:lstStyle/>
+            <a:p>
+              <a:pPr algn="ctr"/>
+              <a:r>
+                <a:rPr lang="en-US" sz="1400" kern="1200" dirty="0">
+                  <a:solidFill>
+                    <a:srgbClr val="000000"/>
+                  </a:solidFill>
+                  <a:effectLst/>
+                  <a:latin typeface="Calibri" panose="020F0502020204030204" pitchFamily="34" charset="0"/>
+                  <a:ea typeface="+mn-ea"/>
+                  <a:cs typeface="+mn-cs"/>
+                </a:rPr>
+                <a:t>Downconverting to 2 samples per symbols</a:t>
+              </a:r>
+              <a:endParaRPr lang="en-GB" sz="1400" dirty="0"/>
+            </a:p>
+          </p:txBody>
+        </p:sp>
+      </p:grpSp>
+      <p:grpSp>
+        <p:nvGrpSpPr>
+          <p:cNvPr id="107" name="Group 106">
+            <a:extLst>
+              <a:ext uri="{FF2B5EF4-FFF2-40B4-BE49-F238E27FC236}">
+                <a16:creationId xmlns:a16="http://schemas.microsoft.com/office/drawing/2014/main" id="{6334A0E0-4E62-44D4-9A4D-58ABEC6AC278}"/>
+              </a:ext>
+            </a:extLst>
+          </p:cNvPr>
+          <p:cNvGrpSpPr/>
+          <p:nvPr/>
+        </p:nvGrpSpPr>
+        <p:grpSpPr>
+          <a:xfrm>
+            <a:off x="5095132" y="4485073"/>
+            <a:ext cx="1372284" cy="745614"/>
+            <a:chOff x="2325033" y="3697819"/>
+            <a:chExt cx="1656920" cy="994152"/>
+          </a:xfrm>
+        </p:grpSpPr>
+        <p:sp>
+          <p:nvSpPr>
+            <p:cNvPr id="108" name="Rectangle: Rounded Corners 107">
+              <a:extLst>
+                <a:ext uri="{FF2B5EF4-FFF2-40B4-BE49-F238E27FC236}">
+                  <a16:creationId xmlns:a16="http://schemas.microsoft.com/office/drawing/2014/main" id="{19FAAC74-ED45-4858-B092-F7D93194BD8D}"/>
+                </a:ext>
+              </a:extLst>
+            </p:cNvPr>
+            <p:cNvSpPr/>
+            <p:nvPr/>
+          </p:nvSpPr>
+          <p:spPr>
+            <a:xfrm>
+              <a:off x="2325033" y="3697819"/>
+              <a:ext cx="1656920" cy="994152"/>
+            </a:xfrm>
+            <a:prstGeom prst="roundRect">
+              <a:avLst>
+                <a:gd name="adj" fmla="val 10000"/>
+              </a:avLst>
+            </a:prstGeom>
+          </p:spPr>
+          <p:style>
+            <a:lnRef idx="2">
+              <a:schemeClr val="dk1">
+                <a:shade val="80000"/>
+                <a:hueOff val="0"/>
+                <a:satOff val="0"/>
+                <a:lumOff val="0"/>
+                <a:alphaOff val="0"/>
+              </a:schemeClr>
+            </a:lnRef>
+            <a:fillRef idx="1">
+              <a:schemeClr val="lt1">
+                <a:hueOff val="0"/>
+                <a:satOff val="0"/>
+                <a:lumOff val="0"/>
+                <a:alphaOff val="0"/>
+              </a:schemeClr>
+            </a:fillRef>
+            <a:effectRef idx="0">
+              <a:schemeClr val="lt1">
+                <a:hueOff val="0"/>
+                <a:satOff val="0"/>
+                <a:lumOff val="0"/>
+                <a:alphaOff val="0"/>
+              </a:schemeClr>
+            </a:effectRef>
+            <a:fontRef idx="minor">
+              <a:schemeClr val="dk1">
+                <a:hueOff val="0"/>
+                <a:satOff val="0"/>
+                <a:lumOff val="0"/>
+                <a:alphaOff val="0"/>
+              </a:schemeClr>
+            </a:fontRef>
+          </p:style>
+        </p:sp>
+        <p:sp>
+          <p:nvSpPr>
+            <p:cNvPr id="109" name="Rectangle: Rounded Corners 4">
+              <a:extLst>
+                <a:ext uri="{FF2B5EF4-FFF2-40B4-BE49-F238E27FC236}">
+                  <a16:creationId xmlns:a16="http://schemas.microsoft.com/office/drawing/2014/main" id="{7960AAB1-A6FA-4940-AC91-92065B8740D5}"/>
+                </a:ext>
+              </a:extLst>
+            </p:cNvPr>
+            <p:cNvSpPr txBox="1"/>
+            <p:nvPr/>
+          </p:nvSpPr>
+          <p:spPr>
+            <a:xfrm>
+              <a:off x="2354151" y="3726937"/>
+              <a:ext cx="1598684" cy="935916"/>
+            </a:xfrm>
+            <a:prstGeom prst="rect">
+              <a:avLst/>
+            </a:prstGeom>
+          </p:spPr>
+          <p:style>
+            <a:lnRef idx="0">
+              <a:scrgbClr r="0" g="0" b="0"/>
+            </a:lnRef>
+            <a:fillRef idx="0">
+              <a:scrgbClr r="0" g="0" b="0"/>
+            </a:fillRef>
+            <a:effectRef idx="0">
+              <a:scrgbClr r="0" g="0" b="0"/>
+            </a:effectRef>
+            <a:fontRef idx="minor">
+              <a:schemeClr val="dk1">
+                <a:hueOff val="0"/>
+                <a:satOff val="0"/>
+                <a:lumOff val="0"/>
+                <a:alphaOff val="0"/>
+              </a:schemeClr>
+            </a:fontRef>
+          </p:style>
+          <p:txBody>
+            <a:bodyPr spcFirstLastPara="0" vert="horz" wrap="square" lIns="68580" tIns="68580" rIns="68580" bIns="68580" numCol="1" spcCol="1270" anchor="ctr" anchorCtr="0">
+              <a:noAutofit/>
+            </a:bodyPr>
+            <a:lstStyle/>
+            <a:p>
+              <a:pPr marL="0" lvl="0" indent="0" algn="ctr" defTabSz="711200">
+                <a:lnSpc>
+                  <a:spcPct val="90000"/>
+                </a:lnSpc>
+                <a:spcBef>
+                  <a:spcPct val="0"/>
+                </a:spcBef>
+                <a:spcAft>
+                  <a:spcPct val="35000"/>
+                </a:spcAft>
+                <a:buNone/>
+              </a:pPr>
+              <a:r>
+                <a:rPr lang="en-US" sz="1400" kern="1200" dirty="0"/>
+                <a:t>Chromatic Dispersion Compensation</a:t>
+              </a:r>
+            </a:p>
+          </p:txBody>
+        </p:sp>
+      </p:grpSp>
+      <p:grpSp>
+        <p:nvGrpSpPr>
+          <p:cNvPr id="110" name="Group 109">
+            <a:extLst>
+              <a:ext uri="{FF2B5EF4-FFF2-40B4-BE49-F238E27FC236}">
+                <a16:creationId xmlns:a16="http://schemas.microsoft.com/office/drawing/2014/main" id="{2E0B5C66-B5A6-453A-BC03-BF4F0E98EACA}"/>
+              </a:ext>
+            </a:extLst>
+          </p:cNvPr>
+          <p:cNvGrpSpPr/>
+          <p:nvPr/>
+        </p:nvGrpSpPr>
+        <p:grpSpPr>
+          <a:xfrm>
+            <a:off x="8432823" y="5363019"/>
+            <a:ext cx="1242693" cy="745614"/>
+            <a:chOff x="2325033" y="3697819"/>
+            <a:chExt cx="1656920" cy="994152"/>
+          </a:xfrm>
+        </p:grpSpPr>
+        <p:sp>
+          <p:nvSpPr>
+            <p:cNvPr id="111" name="Rectangle: Rounded Corners 110">
+              <a:extLst>
+                <a:ext uri="{FF2B5EF4-FFF2-40B4-BE49-F238E27FC236}">
+                  <a16:creationId xmlns:a16="http://schemas.microsoft.com/office/drawing/2014/main" id="{62AB6899-FD79-4C1B-82AF-D6393F9EF967}"/>
+                </a:ext>
+              </a:extLst>
+            </p:cNvPr>
+            <p:cNvSpPr/>
+            <p:nvPr/>
+          </p:nvSpPr>
+          <p:spPr>
+            <a:xfrm>
+              <a:off x="2325033" y="3697819"/>
+              <a:ext cx="1656920" cy="994152"/>
+            </a:xfrm>
+            <a:prstGeom prst="roundRect">
+              <a:avLst>
+                <a:gd name="adj" fmla="val 10000"/>
+              </a:avLst>
+            </a:prstGeom>
+          </p:spPr>
+          <p:style>
+            <a:lnRef idx="2">
+              <a:schemeClr val="dk1">
+                <a:shade val="80000"/>
+                <a:hueOff val="0"/>
+                <a:satOff val="0"/>
+                <a:lumOff val="0"/>
+                <a:alphaOff val="0"/>
+              </a:schemeClr>
+            </a:lnRef>
+            <a:fillRef idx="1">
+              <a:schemeClr val="lt1">
+                <a:hueOff val="0"/>
+                <a:satOff val="0"/>
+                <a:lumOff val="0"/>
+                <a:alphaOff val="0"/>
+              </a:schemeClr>
+            </a:fillRef>
+            <a:effectRef idx="0">
+              <a:schemeClr val="lt1">
+                <a:hueOff val="0"/>
+                <a:satOff val="0"/>
+                <a:lumOff val="0"/>
+                <a:alphaOff val="0"/>
+              </a:schemeClr>
+            </a:effectRef>
+            <a:fontRef idx="minor">
+              <a:schemeClr val="dk1">
+                <a:hueOff val="0"/>
+                <a:satOff val="0"/>
+                <a:lumOff val="0"/>
+                <a:alphaOff val="0"/>
+              </a:schemeClr>
+            </a:fontRef>
+          </p:style>
+        </p:sp>
+        <p:sp>
+          <p:nvSpPr>
+            <p:cNvPr id="112" name="Rectangle: Rounded Corners 4">
+              <a:extLst>
+                <a:ext uri="{FF2B5EF4-FFF2-40B4-BE49-F238E27FC236}">
+                  <a16:creationId xmlns:a16="http://schemas.microsoft.com/office/drawing/2014/main" id="{B1266537-B3C1-4482-A3B7-D03E3A991A28}"/>
+                </a:ext>
+              </a:extLst>
+            </p:cNvPr>
+            <p:cNvSpPr txBox="1"/>
+            <p:nvPr/>
+          </p:nvSpPr>
+          <p:spPr>
+            <a:xfrm>
+              <a:off x="2354151" y="3726937"/>
+              <a:ext cx="1598684" cy="935916"/>
+            </a:xfrm>
+            <a:prstGeom prst="rect">
+              <a:avLst/>
+            </a:prstGeom>
+          </p:spPr>
+          <p:style>
+            <a:lnRef idx="0">
+              <a:scrgbClr r="0" g="0" b="0"/>
+            </a:lnRef>
+            <a:fillRef idx="0">
+              <a:scrgbClr r="0" g="0" b="0"/>
+            </a:fillRef>
+            <a:effectRef idx="0">
+              <a:scrgbClr r="0" g="0" b="0"/>
+            </a:effectRef>
+            <a:fontRef idx="minor">
+              <a:schemeClr val="dk1">
+                <a:hueOff val="0"/>
+                <a:satOff val="0"/>
+                <a:lumOff val="0"/>
+                <a:alphaOff val="0"/>
+              </a:schemeClr>
+            </a:fontRef>
+          </p:style>
+          <p:txBody>
+            <a:bodyPr spcFirstLastPara="0" vert="horz" wrap="square" lIns="68580" tIns="68580" rIns="68580" bIns="68580" numCol="1" spcCol="1270" anchor="ctr" anchorCtr="0">
+              <a:noAutofit/>
+            </a:bodyPr>
+            <a:lstStyle/>
+            <a:p>
+              <a:pPr marL="0" lvl="0" indent="0" algn="ctr" defTabSz="800100">
+                <a:lnSpc>
+                  <a:spcPct val="90000"/>
+                </a:lnSpc>
+                <a:spcBef>
+                  <a:spcPct val="0"/>
+                </a:spcBef>
+                <a:spcAft>
+                  <a:spcPct val="35000"/>
+                </a:spcAft>
+                <a:buNone/>
+              </a:pPr>
+              <a:r>
+                <a:rPr lang="en-US" sz="1400" kern="1200" dirty="0"/>
+                <a:t>Alignment of Signals</a:t>
+              </a:r>
+            </a:p>
+          </p:txBody>
+        </p:sp>
+      </p:grpSp>
+      <p:grpSp>
+        <p:nvGrpSpPr>
+          <p:cNvPr id="113" name="Group 112">
+            <a:extLst>
+              <a:ext uri="{FF2B5EF4-FFF2-40B4-BE49-F238E27FC236}">
+                <a16:creationId xmlns:a16="http://schemas.microsoft.com/office/drawing/2014/main" id="{BE7B750D-3ACA-4DBA-8CA8-062BC7C1FB15}"/>
+              </a:ext>
+            </a:extLst>
+          </p:cNvPr>
+          <p:cNvGrpSpPr/>
+          <p:nvPr/>
+        </p:nvGrpSpPr>
+        <p:grpSpPr>
+          <a:xfrm>
+            <a:off x="6831034" y="5370362"/>
+            <a:ext cx="1242693" cy="745614"/>
+            <a:chOff x="4644721" y="3697819"/>
+            <a:chExt cx="1656920" cy="994152"/>
+          </a:xfrm>
+        </p:grpSpPr>
+        <p:sp>
+          <p:nvSpPr>
+            <p:cNvPr id="114" name="Rectangle: Rounded Corners 113">
+              <a:extLst>
+                <a:ext uri="{FF2B5EF4-FFF2-40B4-BE49-F238E27FC236}">
+                  <a16:creationId xmlns:a16="http://schemas.microsoft.com/office/drawing/2014/main" id="{2CB819DA-2DFD-49CD-AA59-5FD501E3E6DC}"/>
+                </a:ext>
+              </a:extLst>
+            </p:cNvPr>
+            <p:cNvSpPr/>
+            <p:nvPr/>
+          </p:nvSpPr>
+          <p:spPr>
+            <a:xfrm>
+              <a:off x="4644721" y="3697819"/>
+              <a:ext cx="1656920" cy="994152"/>
+            </a:xfrm>
+            <a:prstGeom prst="roundRect">
+              <a:avLst>
+                <a:gd name="adj" fmla="val 10000"/>
+              </a:avLst>
+            </a:prstGeom>
+          </p:spPr>
+          <p:style>
+            <a:lnRef idx="2">
+              <a:schemeClr val="dk1">
+                <a:shade val="80000"/>
+                <a:hueOff val="0"/>
+                <a:satOff val="0"/>
+                <a:lumOff val="0"/>
+                <a:alphaOff val="0"/>
+              </a:schemeClr>
+            </a:lnRef>
+            <a:fillRef idx="1">
+              <a:schemeClr val="lt1">
+                <a:hueOff val="0"/>
+                <a:satOff val="0"/>
+                <a:lumOff val="0"/>
+                <a:alphaOff val="0"/>
+              </a:schemeClr>
+            </a:fillRef>
+            <a:effectRef idx="0">
+              <a:schemeClr val="lt1">
+                <a:hueOff val="0"/>
+                <a:satOff val="0"/>
+                <a:lumOff val="0"/>
+                <a:alphaOff val="0"/>
+              </a:schemeClr>
+            </a:effectRef>
+            <a:fontRef idx="minor">
+              <a:schemeClr val="dk1">
+                <a:hueOff val="0"/>
+                <a:satOff val="0"/>
+                <a:lumOff val="0"/>
+                <a:alphaOff val="0"/>
+              </a:schemeClr>
+            </a:fontRef>
+          </p:style>
+        </p:sp>
+        <p:sp>
+          <p:nvSpPr>
+            <p:cNvPr id="115" name="Rectangle: Rounded Corners 4">
+              <a:extLst>
+                <a:ext uri="{FF2B5EF4-FFF2-40B4-BE49-F238E27FC236}">
+                  <a16:creationId xmlns:a16="http://schemas.microsoft.com/office/drawing/2014/main" id="{82EC0300-0D2F-4C7F-A8A4-F8D2C55DBDFC}"/>
+                </a:ext>
+              </a:extLst>
+            </p:cNvPr>
+            <p:cNvSpPr txBox="1"/>
+            <p:nvPr/>
+          </p:nvSpPr>
+          <p:spPr>
+            <a:xfrm>
+              <a:off x="4673839" y="3726937"/>
+              <a:ext cx="1598684" cy="935916"/>
+            </a:xfrm>
+            <a:prstGeom prst="rect">
+              <a:avLst/>
+            </a:prstGeom>
+          </p:spPr>
+          <p:style>
+            <a:lnRef idx="0">
+              <a:scrgbClr r="0" g="0" b="0"/>
+            </a:lnRef>
+            <a:fillRef idx="0">
+              <a:scrgbClr r="0" g="0" b="0"/>
+            </a:fillRef>
+            <a:effectRef idx="0">
+              <a:scrgbClr r="0" g="0" b="0"/>
+            </a:effectRef>
+            <a:fontRef idx="minor">
+              <a:schemeClr val="dk1">
+                <a:hueOff val="0"/>
+                <a:satOff val="0"/>
+                <a:lumOff val="0"/>
+                <a:alphaOff val="0"/>
+              </a:schemeClr>
+            </a:fontRef>
+          </p:style>
+          <p:txBody>
+            <a:bodyPr spcFirstLastPara="0" vert="horz" wrap="square" lIns="64770" tIns="64770" rIns="64770" bIns="64770" numCol="1" spcCol="1270" anchor="ctr" anchorCtr="0">
+              <a:noAutofit/>
+            </a:bodyPr>
+            <a:lstStyle/>
+            <a:p>
+              <a:pPr marL="0" lvl="0" indent="0" algn="ctr" defTabSz="755650">
+                <a:lnSpc>
+                  <a:spcPct val="90000"/>
+                </a:lnSpc>
+                <a:spcBef>
+                  <a:spcPct val="0"/>
+                </a:spcBef>
+                <a:spcAft>
+                  <a:spcPct val="35000"/>
+                </a:spcAft>
+                <a:buNone/>
+              </a:pPr>
+              <a:r>
+                <a:rPr lang="en-US" sz="1400" kern="1200" dirty="0"/>
+                <a:t>Demodulation</a:t>
+              </a:r>
+            </a:p>
+          </p:txBody>
+        </p:sp>
+      </p:grpSp>
+      <p:grpSp>
+        <p:nvGrpSpPr>
+          <p:cNvPr id="116" name="Group 115">
+            <a:extLst>
+              <a:ext uri="{FF2B5EF4-FFF2-40B4-BE49-F238E27FC236}">
+                <a16:creationId xmlns:a16="http://schemas.microsoft.com/office/drawing/2014/main" id="{70124CF8-D21D-49AC-B26B-372EC683E4E8}"/>
+              </a:ext>
+            </a:extLst>
+          </p:cNvPr>
+          <p:cNvGrpSpPr/>
+          <p:nvPr/>
+        </p:nvGrpSpPr>
+        <p:grpSpPr>
+          <a:xfrm>
+            <a:off x="5229075" y="5384451"/>
+            <a:ext cx="1242693" cy="745614"/>
+            <a:chOff x="6964410" y="3697819"/>
+            <a:chExt cx="1656920" cy="994152"/>
+          </a:xfrm>
+        </p:grpSpPr>
+        <p:sp>
+          <p:nvSpPr>
+            <p:cNvPr id="117" name="Rectangle: Rounded Corners 116">
+              <a:extLst>
+                <a:ext uri="{FF2B5EF4-FFF2-40B4-BE49-F238E27FC236}">
+                  <a16:creationId xmlns:a16="http://schemas.microsoft.com/office/drawing/2014/main" id="{E723BB17-C35A-47EA-A9A9-42DDB7597674}"/>
+                </a:ext>
+              </a:extLst>
+            </p:cNvPr>
+            <p:cNvSpPr/>
+            <p:nvPr/>
+          </p:nvSpPr>
+          <p:spPr>
+            <a:xfrm>
+              <a:off x="6964410" y="3697819"/>
+              <a:ext cx="1656920" cy="994152"/>
+            </a:xfrm>
+            <a:prstGeom prst="roundRect">
+              <a:avLst>
+                <a:gd name="adj" fmla="val 10000"/>
+              </a:avLst>
+            </a:prstGeom>
+          </p:spPr>
+          <p:style>
+            <a:lnRef idx="2">
+              <a:schemeClr val="dk1">
+                <a:shade val="80000"/>
+                <a:hueOff val="0"/>
+                <a:satOff val="0"/>
+                <a:lumOff val="0"/>
+                <a:alphaOff val="0"/>
+              </a:schemeClr>
+            </a:lnRef>
+            <a:fillRef idx="1">
+              <a:schemeClr val="lt1">
+                <a:hueOff val="0"/>
+                <a:satOff val="0"/>
+                <a:lumOff val="0"/>
+                <a:alphaOff val="0"/>
+              </a:schemeClr>
+            </a:fillRef>
+            <a:effectRef idx="0">
+              <a:schemeClr val="lt1">
+                <a:hueOff val="0"/>
+                <a:satOff val="0"/>
+                <a:lumOff val="0"/>
+                <a:alphaOff val="0"/>
+              </a:schemeClr>
+            </a:effectRef>
+            <a:fontRef idx="minor">
+              <a:schemeClr val="dk1">
+                <a:hueOff val="0"/>
+                <a:satOff val="0"/>
+                <a:lumOff val="0"/>
+                <a:alphaOff val="0"/>
+              </a:schemeClr>
+            </a:fontRef>
+          </p:style>
+        </p:sp>
+        <p:sp>
+          <p:nvSpPr>
+            <p:cNvPr id="118" name="Rectangle: Rounded Corners 4">
+              <a:extLst>
+                <a:ext uri="{FF2B5EF4-FFF2-40B4-BE49-F238E27FC236}">
+                  <a16:creationId xmlns:a16="http://schemas.microsoft.com/office/drawing/2014/main" id="{84A407E1-92B2-4B59-9B0D-86CB41EA4B75}"/>
+                </a:ext>
+              </a:extLst>
+            </p:cNvPr>
+            <p:cNvSpPr txBox="1"/>
+            <p:nvPr/>
+          </p:nvSpPr>
+          <p:spPr>
+            <a:xfrm>
+              <a:off x="6993528" y="3726937"/>
+              <a:ext cx="1598684" cy="935916"/>
+            </a:xfrm>
+            <a:prstGeom prst="rect">
+              <a:avLst/>
+            </a:prstGeom>
+          </p:spPr>
+          <p:style>
+            <a:lnRef idx="0">
+              <a:scrgbClr r="0" g="0" b="0"/>
+            </a:lnRef>
+            <a:fillRef idx="0">
+              <a:scrgbClr r="0" g="0" b="0"/>
+            </a:fillRef>
+            <a:effectRef idx="0">
+              <a:scrgbClr r="0" g="0" b="0"/>
+            </a:effectRef>
+            <a:fontRef idx="minor">
+              <a:schemeClr val="dk1">
+                <a:hueOff val="0"/>
+                <a:satOff val="0"/>
+                <a:lumOff val="0"/>
+                <a:alphaOff val="0"/>
+              </a:schemeClr>
+            </a:fontRef>
+          </p:style>
+          <p:txBody>
+            <a:bodyPr spcFirstLastPara="0" vert="horz" wrap="square" lIns="64770" tIns="64770" rIns="64770" bIns="64770" numCol="1" spcCol="1270" anchor="ctr" anchorCtr="0">
+              <a:noAutofit/>
+            </a:bodyPr>
+            <a:lstStyle/>
+            <a:p>
+              <a:pPr marL="0" lvl="0" indent="0" algn="ctr" defTabSz="755650">
+                <a:lnSpc>
+                  <a:spcPct val="90000"/>
+                </a:lnSpc>
+                <a:spcBef>
+                  <a:spcPct val="0"/>
+                </a:spcBef>
+                <a:spcAft>
+                  <a:spcPct val="35000"/>
+                </a:spcAft>
+                <a:buNone/>
+              </a:pPr>
+              <a:r>
+                <a:rPr lang="en-US" sz="1400" kern="1200" dirty="0"/>
+                <a:t>Decoding of FEC/PS</a:t>
+              </a:r>
+            </a:p>
+          </p:txBody>
+        </p:sp>
+      </p:grpSp>
+      <p:grpSp>
+        <p:nvGrpSpPr>
+          <p:cNvPr id="119" name="Group 118">
+            <a:extLst>
+              <a:ext uri="{FF2B5EF4-FFF2-40B4-BE49-F238E27FC236}">
+                <a16:creationId xmlns:a16="http://schemas.microsoft.com/office/drawing/2014/main" id="{1B9D792A-5F76-4BA6-9028-6F3262DCA428}"/>
+              </a:ext>
+            </a:extLst>
+          </p:cNvPr>
+          <p:cNvGrpSpPr/>
+          <p:nvPr/>
+        </p:nvGrpSpPr>
+        <p:grpSpPr>
+          <a:xfrm>
+            <a:off x="8432823" y="4487959"/>
+            <a:ext cx="1242693" cy="745614"/>
+            <a:chOff x="5344" y="2040899"/>
+            <a:chExt cx="1656920" cy="994152"/>
+          </a:xfrm>
+        </p:grpSpPr>
+        <p:sp>
+          <p:nvSpPr>
+            <p:cNvPr id="120" name="Rectangle: Rounded Corners 119">
+              <a:extLst>
+                <a:ext uri="{FF2B5EF4-FFF2-40B4-BE49-F238E27FC236}">
+                  <a16:creationId xmlns:a16="http://schemas.microsoft.com/office/drawing/2014/main" id="{512E2984-EAF8-4E50-9842-1FD389F4EE6D}"/>
+                </a:ext>
+              </a:extLst>
+            </p:cNvPr>
+            <p:cNvSpPr/>
+            <p:nvPr/>
+          </p:nvSpPr>
+          <p:spPr>
+            <a:xfrm>
+              <a:off x="5344" y="2040899"/>
+              <a:ext cx="1656920" cy="994152"/>
+            </a:xfrm>
+            <a:prstGeom prst="roundRect">
+              <a:avLst>
+                <a:gd name="adj" fmla="val 10000"/>
+              </a:avLst>
+            </a:prstGeom>
+          </p:spPr>
+          <p:style>
+            <a:lnRef idx="2">
+              <a:schemeClr val="dk1">
+                <a:shade val="80000"/>
+                <a:hueOff val="0"/>
+                <a:satOff val="0"/>
+                <a:lumOff val="0"/>
+                <a:alphaOff val="0"/>
+              </a:schemeClr>
+            </a:lnRef>
+            <a:fillRef idx="1">
+              <a:schemeClr val="lt1">
+                <a:hueOff val="0"/>
+                <a:satOff val="0"/>
+                <a:lumOff val="0"/>
+                <a:alphaOff val="0"/>
+              </a:schemeClr>
+            </a:fillRef>
+            <a:effectRef idx="0">
+              <a:schemeClr val="lt1">
+                <a:hueOff val="0"/>
+                <a:satOff val="0"/>
+                <a:lumOff val="0"/>
+                <a:alphaOff val="0"/>
+              </a:schemeClr>
+            </a:effectRef>
+            <a:fontRef idx="minor">
+              <a:schemeClr val="dk1">
+                <a:hueOff val="0"/>
+                <a:satOff val="0"/>
+                <a:lumOff val="0"/>
+                <a:alphaOff val="0"/>
+              </a:schemeClr>
+            </a:fontRef>
+          </p:style>
+        </p:sp>
+        <p:sp>
+          <p:nvSpPr>
+            <p:cNvPr id="121" name="Rectangle: Rounded Corners 4">
+              <a:extLst>
+                <a:ext uri="{FF2B5EF4-FFF2-40B4-BE49-F238E27FC236}">
+                  <a16:creationId xmlns:a16="http://schemas.microsoft.com/office/drawing/2014/main" id="{F68DDE1A-F18B-4720-A787-4E8584E6E507}"/>
+                </a:ext>
+              </a:extLst>
+            </p:cNvPr>
+            <p:cNvSpPr txBox="1"/>
+            <p:nvPr/>
+          </p:nvSpPr>
+          <p:spPr>
+            <a:xfrm>
+              <a:off x="34462" y="2070017"/>
+              <a:ext cx="1598684" cy="935916"/>
+            </a:xfrm>
+            <a:prstGeom prst="rect">
+              <a:avLst/>
+            </a:prstGeom>
+          </p:spPr>
+          <p:style>
+            <a:lnRef idx="0">
+              <a:scrgbClr r="0" g="0" b="0"/>
+            </a:lnRef>
+            <a:fillRef idx="0">
+              <a:scrgbClr r="0" g="0" b="0"/>
+            </a:fillRef>
+            <a:effectRef idx="0">
+              <a:scrgbClr r="0" g="0" b="0"/>
+            </a:effectRef>
+            <a:fontRef idx="minor">
+              <a:schemeClr val="dk1">
+                <a:hueOff val="0"/>
+                <a:satOff val="0"/>
+                <a:lumOff val="0"/>
+                <a:alphaOff val="0"/>
+              </a:schemeClr>
+            </a:fontRef>
+          </p:style>
+          <p:txBody>
+            <a:bodyPr spcFirstLastPara="0" vert="horz" wrap="square" lIns="60960" tIns="60960" rIns="60960" bIns="60960" numCol="1" spcCol="1270" anchor="ctr" anchorCtr="0">
+              <a:noAutofit/>
+            </a:bodyPr>
+            <a:lstStyle/>
+            <a:p>
+              <a:pPr marL="0" lvl="0" indent="0" algn="ctr" defTabSz="711200">
+                <a:lnSpc>
+                  <a:spcPct val="90000"/>
+                </a:lnSpc>
+                <a:spcBef>
+                  <a:spcPct val="0"/>
+                </a:spcBef>
+                <a:spcAft>
+                  <a:spcPct val="35000"/>
+                </a:spcAft>
+                <a:buNone/>
+              </a:pPr>
+              <a:r>
+                <a:rPr lang="en-US" sz="1400" kern="1200" dirty="0"/>
+                <a:t>Carrier Equalisation</a:t>
+              </a:r>
+            </a:p>
+          </p:txBody>
+        </p:sp>
+      </p:grpSp>
+      <p:grpSp>
+        <p:nvGrpSpPr>
+          <p:cNvPr id="122" name="Group 121">
+            <a:extLst>
+              <a:ext uri="{FF2B5EF4-FFF2-40B4-BE49-F238E27FC236}">
+                <a16:creationId xmlns:a16="http://schemas.microsoft.com/office/drawing/2014/main" id="{8978EF0E-1EE1-410A-84E4-8AD1C60C6957}"/>
+              </a:ext>
+            </a:extLst>
+          </p:cNvPr>
+          <p:cNvGrpSpPr/>
+          <p:nvPr/>
+        </p:nvGrpSpPr>
+        <p:grpSpPr>
+          <a:xfrm>
+            <a:off x="3627116" y="5381373"/>
+            <a:ext cx="1242693" cy="745614"/>
+            <a:chOff x="9284098" y="3697819"/>
+            <a:chExt cx="1656920" cy="994152"/>
+          </a:xfrm>
+        </p:grpSpPr>
+        <p:sp>
+          <p:nvSpPr>
+            <p:cNvPr id="123" name="Rectangle: Rounded Corners 122">
+              <a:extLst>
+                <a:ext uri="{FF2B5EF4-FFF2-40B4-BE49-F238E27FC236}">
+                  <a16:creationId xmlns:a16="http://schemas.microsoft.com/office/drawing/2014/main" id="{0EF48142-4064-4B13-9367-5C9B73BE1AE1}"/>
+                </a:ext>
+              </a:extLst>
+            </p:cNvPr>
+            <p:cNvSpPr/>
+            <p:nvPr/>
+          </p:nvSpPr>
+          <p:spPr>
+            <a:xfrm>
+              <a:off x="9284098" y="3697819"/>
+              <a:ext cx="1656920" cy="994152"/>
+            </a:xfrm>
+            <a:prstGeom prst="roundRect">
+              <a:avLst>
+                <a:gd name="adj" fmla="val 10000"/>
+              </a:avLst>
+            </a:prstGeom>
+          </p:spPr>
+          <p:style>
+            <a:lnRef idx="2">
+              <a:schemeClr val="dk1">
+                <a:shade val="80000"/>
+                <a:hueOff val="0"/>
+                <a:satOff val="0"/>
+                <a:lumOff val="0"/>
+                <a:alphaOff val="0"/>
+              </a:schemeClr>
+            </a:lnRef>
+            <a:fillRef idx="1">
+              <a:schemeClr val="lt1">
+                <a:hueOff val="0"/>
+                <a:satOff val="0"/>
+                <a:lumOff val="0"/>
+                <a:alphaOff val="0"/>
+              </a:schemeClr>
+            </a:fillRef>
+            <a:effectRef idx="0">
+              <a:schemeClr val="lt1">
+                <a:hueOff val="0"/>
+                <a:satOff val="0"/>
+                <a:lumOff val="0"/>
+                <a:alphaOff val="0"/>
+              </a:schemeClr>
+            </a:effectRef>
+            <a:fontRef idx="minor">
+              <a:schemeClr val="dk1">
+                <a:hueOff val="0"/>
+                <a:satOff val="0"/>
+                <a:lumOff val="0"/>
+                <a:alphaOff val="0"/>
+              </a:schemeClr>
+            </a:fontRef>
+          </p:style>
+        </p:sp>
+        <p:sp>
+          <p:nvSpPr>
+            <p:cNvPr id="124" name="Rectangle: Rounded Corners 4">
+              <a:extLst>
+                <a:ext uri="{FF2B5EF4-FFF2-40B4-BE49-F238E27FC236}">
+                  <a16:creationId xmlns:a16="http://schemas.microsoft.com/office/drawing/2014/main" id="{4351910C-B995-485B-BCA9-4178A2F12325}"/>
+                </a:ext>
+              </a:extLst>
+            </p:cNvPr>
+            <p:cNvSpPr txBox="1"/>
+            <p:nvPr/>
+          </p:nvSpPr>
+          <p:spPr>
+            <a:xfrm>
+              <a:off x="9313216" y="3726937"/>
+              <a:ext cx="1598684" cy="935916"/>
+            </a:xfrm>
+            <a:prstGeom prst="rect">
+              <a:avLst/>
+            </a:prstGeom>
+          </p:spPr>
+          <p:style>
+            <a:lnRef idx="0">
+              <a:scrgbClr r="0" g="0" b="0"/>
+            </a:lnRef>
+            <a:fillRef idx="0">
+              <a:scrgbClr r="0" g="0" b="0"/>
+            </a:fillRef>
+            <a:effectRef idx="0">
+              <a:scrgbClr r="0" g="0" b="0"/>
+            </a:effectRef>
+            <a:fontRef idx="minor">
+              <a:schemeClr val="dk1">
+                <a:hueOff val="0"/>
+                <a:satOff val="0"/>
+                <a:lumOff val="0"/>
+                <a:alphaOff val="0"/>
+              </a:schemeClr>
+            </a:fontRef>
+          </p:style>
+          <p:txBody>
+            <a:bodyPr spcFirstLastPara="0" vert="horz" wrap="square" lIns="64770" tIns="64770" rIns="64770" bIns="64770" numCol="1" spcCol="1270" anchor="ctr" anchorCtr="0">
+              <a:noAutofit/>
+            </a:bodyPr>
+            <a:lstStyle/>
+            <a:p>
+              <a:pPr marL="0" lvl="0" indent="0" algn="ctr" defTabSz="755650">
+                <a:lnSpc>
+                  <a:spcPct val="90000"/>
+                </a:lnSpc>
+                <a:spcBef>
+                  <a:spcPct val="0"/>
+                </a:spcBef>
+                <a:spcAft>
+                  <a:spcPct val="35000"/>
+                </a:spcAft>
+                <a:buNone/>
+              </a:pPr>
+              <a:r>
+                <a:rPr lang="en-US" sz="1400" kern="1200" dirty="0"/>
+                <a:t>Estimate BER, SNR and plot spectra</a:t>
+              </a:r>
+            </a:p>
+          </p:txBody>
+        </p:sp>
+      </p:grpSp>
+      <p:cxnSp>
+        <p:nvCxnSpPr>
+          <p:cNvPr id="125" name="Connector: Elbow 124">
+            <a:extLst>
+              <a:ext uri="{FF2B5EF4-FFF2-40B4-BE49-F238E27FC236}">
+                <a16:creationId xmlns:a16="http://schemas.microsoft.com/office/drawing/2014/main" id="{4405547C-AE4E-4BC3-991B-2C03DB0AB4B4}"/>
+              </a:ext>
+            </a:extLst>
+          </p:cNvPr>
+          <p:cNvCxnSpPr>
+            <a:cxnSpLocks/>
+            <a:stCxn id="97" idx="1"/>
+            <a:endCxn id="135" idx="1"/>
+          </p:cNvCxnSpPr>
+          <p:nvPr/>
+        </p:nvCxnSpPr>
+        <p:spPr>
+          <a:xfrm rot="10800000" flipV="1">
+            <a:off x="1750745" y="3311934"/>
+            <a:ext cx="826848" cy="1531341"/>
+          </a:xfrm>
+          <a:prstGeom prst="bentConnector3">
+            <a:avLst>
+              <a:gd name="adj1" fmla="val 152619"/>
+            </a:avLst>
+          </a:prstGeom>
+          <a:ln>
+            <a:tailEnd type="triangle"/>
+          </a:ln>
+        </p:spPr>
+        <p:style>
+          <a:lnRef idx="1">
+            <a:schemeClr val="dk1"/>
+          </a:lnRef>
+          <a:fillRef idx="0">
+            <a:schemeClr val="dk1"/>
+          </a:fillRef>
+          <a:effectRef idx="0">
+            <a:schemeClr val="dk1"/>
+          </a:effectRef>
+          <a:fontRef idx="minor">
+            <a:schemeClr val="tx1"/>
+          </a:fontRef>
+        </p:style>
+      </p:cxnSp>
+      <p:cxnSp>
+        <p:nvCxnSpPr>
+          <p:cNvPr id="126" name="Straight Arrow Connector 125">
+            <a:extLst>
+              <a:ext uri="{FF2B5EF4-FFF2-40B4-BE49-F238E27FC236}">
+                <a16:creationId xmlns:a16="http://schemas.microsoft.com/office/drawing/2014/main" id="{678E2104-2630-40FA-A964-C6729D69C7C8}"/>
+              </a:ext>
+            </a:extLst>
+          </p:cNvPr>
+          <p:cNvCxnSpPr>
+            <a:cxnSpLocks/>
+            <a:stCxn id="108" idx="3"/>
+            <a:endCxn id="102" idx="1"/>
+          </p:cNvCxnSpPr>
+          <p:nvPr/>
+        </p:nvCxnSpPr>
+        <p:spPr>
+          <a:xfrm>
+            <a:off x="6467416" y="4857880"/>
+            <a:ext cx="363618" cy="2240"/>
+          </a:xfrm>
+          <a:prstGeom prst="straightConnector1">
+            <a:avLst/>
+          </a:prstGeom>
+          <a:ln>
+            <a:tailEnd type="triangle"/>
+          </a:ln>
+        </p:spPr>
+        <p:style>
+          <a:lnRef idx="1">
+            <a:schemeClr val="dk1"/>
+          </a:lnRef>
+          <a:fillRef idx="0">
+            <a:schemeClr val="dk1"/>
+          </a:fillRef>
+          <a:effectRef idx="0">
+            <a:schemeClr val="dk1"/>
+          </a:effectRef>
+          <a:fontRef idx="minor">
+            <a:schemeClr val="tx1"/>
+          </a:fontRef>
+        </p:style>
+      </p:cxnSp>
+      <p:cxnSp>
+        <p:nvCxnSpPr>
+          <p:cNvPr id="127" name="Straight Arrow Connector 126">
+            <a:extLst>
+              <a:ext uri="{FF2B5EF4-FFF2-40B4-BE49-F238E27FC236}">
+                <a16:creationId xmlns:a16="http://schemas.microsoft.com/office/drawing/2014/main" id="{D65D74C4-DB0A-48FA-84C5-CDAA87EAE466}"/>
+              </a:ext>
+            </a:extLst>
+          </p:cNvPr>
+          <p:cNvCxnSpPr>
+            <a:cxnSpLocks/>
+            <a:stCxn id="102" idx="3"/>
+            <a:endCxn id="120" idx="1"/>
+          </p:cNvCxnSpPr>
+          <p:nvPr/>
+        </p:nvCxnSpPr>
+        <p:spPr>
+          <a:xfrm>
+            <a:off x="8073727" y="4860120"/>
+            <a:ext cx="359096" cy="646"/>
+          </a:xfrm>
+          <a:prstGeom prst="straightConnector1">
+            <a:avLst/>
+          </a:prstGeom>
+          <a:ln>
+            <a:tailEnd type="triangle"/>
+          </a:ln>
+        </p:spPr>
+        <p:style>
+          <a:lnRef idx="1">
+            <a:schemeClr val="dk1"/>
+          </a:lnRef>
+          <a:fillRef idx="0">
+            <a:schemeClr val="dk1"/>
+          </a:fillRef>
+          <a:effectRef idx="0">
+            <a:schemeClr val="dk1"/>
+          </a:effectRef>
+          <a:fontRef idx="minor">
+            <a:schemeClr val="tx1"/>
+          </a:fontRef>
+        </p:style>
+      </p:cxnSp>
+      <p:cxnSp>
+        <p:nvCxnSpPr>
+          <p:cNvPr id="128" name="Connector: Elbow 127">
+            <a:extLst>
+              <a:ext uri="{FF2B5EF4-FFF2-40B4-BE49-F238E27FC236}">
+                <a16:creationId xmlns:a16="http://schemas.microsoft.com/office/drawing/2014/main" id="{53C14D82-94CA-4D99-8420-5210990B4DCF}"/>
+              </a:ext>
+            </a:extLst>
+          </p:cNvPr>
+          <p:cNvCxnSpPr>
+            <a:cxnSpLocks/>
+            <a:stCxn id="120" idx="3"/>
+            <a:endCxn id="111" idx="3"/>
+          </p:cNvCxnSpPr>
+          <p:nvPr/>
+        </p:nvCxnSpPr>
+        <p:spPr>
+          <a:xfrm>
+            <a:off x="9675516" y="4860766"/>
+            <a:ext cx="12700" cy="875060"/>
+          </a:xfrm>
+          <a:prstGeom prst="bentConnector3">
+            <a:avLst>
+              <a:gd name="adj1" fmla="val 3116126"/>
+            </a:avLst>
+          </a:prstGeom>
+          <a:ln>
+            <a:tailEnd type="triangle"/>
+          </a:ln>
+        </p:spPr>
+        <p:style>
+          <a:lnRef idx="1">
+            <a:schemeClr val="dk1"/>
+          </a:lnRef>
+          <a:fillRef idx="0">
+            <a:schemeClr val="dk1"/>
+          </a:fillRef>
+          <a:effectRef idx="0">
+            <a:schemeClr val="dk1"/>
+          </a:effectRef>
+          <a:fontRef idx="minor">
+            <a:schemeClr val="tx1"/>
+          </a:fontRef>
+        </p:style>
+      </p:cxnSp>
+      <p:cxnSp>
+        <p:nvCxnSpPr>
+          <p:cNvPr id="129" name="Straight Arrow Connector 128">
+            <a:extLst>
+              <a:ext uri="{FF2B5EF4-FFF2-40B4-BE49-F238E27FC236}">
+                <a16:creationId xmlns:a16="http://schemas.microsoft.com/office/drawing/2014/main" id="{B7A39BC5-23F2-46D8-8392-4A2D50674021}"/>
+              </a:ext>
+            </a:extLst>
+          </p:cNvPr>
+          <p:cNvCxnSpPr>
+            <a:cxnSpLocks/>
+            <a:stCxn id="114" idx="1"/>
+            <a:endCxn id="117" idx="3"/>
+          </p:cNvCxnSpPr>
+          <p:nvPr/>
+        </p:nvCxnSpPr>
+        <p:spPr>
+          <a:xfrm flipH="1">
+            <a:off x="6471768" y="5743169"/>
+            <a:ext cx="359266" cy="14089"/>
+          </a:xfrm>
+          <a:prstGeom prst="straightConnector1">
+            <a:avLst/>
+          </a:prstGeom>
+          <a:ln>
+            <a:tailEnd type="triangle"/>
+          </a:ln>
+        </p:spPr>
+        <p:style>
+          <a:lnRef idx="1">
+            <a:schemeClr val="dk1"/>
+          </a:lnRef>
+          <a:fillRef idx="0">
+            <a:schemeClr val="dk1"/>
+          </a:fillRef>
+          <a:effectRef idx="0">
+            <a:schemeClr val="dk1"/>
+          </a:effectRef>
+          <a:fontRef idx="minor">
+            <a:schemeClr val="tx1"/>
+          </a:fontRef>
+        </p:style>
+      </p:cxnSp>
+      <p:cxnSp>
+        <p:nvCxnSpPr>
+          <p:cNvPr id="130" name="Straight Arrow Connector 129">
+            <a:extLst>
+              <a:ext uri="{FF2B5EF4-FFF2-40B4-BE49-F238E27FC236}">
+                <a16:creationId xmlns:a16="http://schemas.microsoft.com/office/drawing/2014/main" id="{92BC6D04-FBA3-4DBE-9B9B-3F9824F9A745}"/>
+              </a:ext>
+            </a:extLst>
+          </p:cNvPr>
+          <p:cNvCxnSpPr>
+            <a:cxnSpLocks/>
+            <a:stCxn id="111" idx="1"/>
+            <a:endCxn id="114" idx="3"/>
+          </p:cNvCxnSpPr>
+          <p:nvPr/>
+        </p:nvCxnSpPr>
+        <p:spPr>
+          <a:xfrm flipH="1">
+            <a:off x="8073727" y="5735826"/>
+            <a:ext cx="359096" cy="7343"/>
+          </a:xfrm>
+          <a:prstGeom prst="straightConnector1">
+            <a:avLst/>
+          </a:prstGeom>
+          <a:ln>
+            <a:tailEnd type="triangle"/>
+          </a:ln>
+        </p:spPr>
+        <p:style>
+          <a:lnRef idx="1">
+            <a:schemeClr val="dk1"/>
+          </a:lnRef>
+          <a:fillRef idx="0">
+            <a:schemeClr val="dk1"/>
+          </a:fillRef>
+          <a:effectRef idx="0">
+            <a:schemeClr val="dk1"/>
+          </a:effectRef>
+          <a:fontRef idx="minor">
+            <a:schemeClr val="tx1"/>
+          </a:fontRef>
+        </p:style>
+      </p:cxnSp>
+      <p:cxnSp>
+        <p:nvCxnSpPr>
+          <p:cNvPr id="131" name="Straight Arrow Connector 130">
+            <a:extLst>
+              <a:ext uri="{FF2B5EF4-FFF2-40B4-BE49-F238E27FC236}">
+                <a16:creationId xmlns:a16="http://schemas.microsoft.com/office/drawing/2014/main" id="{3F3F14BC-B19D-44AB-A5FA-D6F802355C38}"/>
+              </a:ext>
+            </a:extLst>
+          </p:cNvPr>
+          <p:cNvCxnSpPr>
+            <a:cxnSpLocks/>
+            <a:stCxn id="117" idx="1"/>
+            <a:endCxn id="123" idx="3"/>
+          </p:cNvCxnSpPr>
+          <p:nvPr/>
+        </p:nvCxnSpPr>
+        <p:spPr>
+          <a:xfrm flipH="1" flipV="1">
+            <a:off x="4869809" y="5754180"/>
+            <a:ext cx="359266" cy="3078"/>
+          </a:xfrm>
+          <a:prstGeom prst="straightConnector1">
+            <a:avLst/>
+          </a:prstGeom>
+          <a:ln>
+            <a:tailEnd type="triangle"/>
+          </a:ln>
+        </p:spPr>
+        <p:style>
+          <a:lnRef idx="1">
+            <a:schemeClr val="dk1"/>
+          </a:lnRef>
+          <a:fillRef idx="0">
+            <a:schemeClr val="dk1"/>
+          </a:fillRef>
+          <a:effectRef idx="0">
+            <a:schemeClr val="dk1"/>
+          </a:effectRef>
+          <a:fontRef idx="minor">
+            <a:schemeClr val="tx1"/>
+          </a:fontRef>
+        </p:style>
+      </p:cxnSp>
+      <p:sp>
+        <p:nvSpPr>
+          <p:cNvPr id="132" name="TextBox 131">
+            <a:extLst>
+              <a:ext uri="{FF2B5EF4-FFF2-40B4-BE49-F238E27FC236}">
+                <a16:creationId xmlns:a16="http://schemas.microsoft.com/office/drawing/2014/main" id="{AC9C74E8-05F5-4C37-A5FD-B9D120BF07C7}"/>
+              </a:ext>
+            </a:extLst>
+          </p:cNvPr>
+          <p:cNvSpPr txBox="1"/>
+          <p:nvPr/>
+        </p:nvSpPr>
+        <p:spPr>
+          <a:xfrm>
+            <a:off x="4350222" y="2669215"/>
+            <a:ext cx="2169296" cy="307777"/>
+          </a:xfrm>
+          <a:prstGeom prst="rect">
+            <a:avLst/>
+          </a:prstGeom>
+          <a:noFill/>
+        </p:spPr>
+        <p:txBody>
+          <a:bodyPr wrap="square" rtlCol="0">
+            <a:spAutoFit/>
+          </a:bodyPr>
+          <a:lstStyle/>
+          <a:p>
+            <a:r>
+              <a:rPr lang="en-US" sz="1400" b="1" dirty="0"/>
+              <a:t>Optical Domain  -  Channel</a:t>
+            </a:r>
+          </a:p>
+        </p:txBody>
+      </p:sp>
+      <p:cxnSp>
+        <p:nvCxnSpPr>
+          <p:cNvPr id="133" name="Straight Arrow Connector 132">
+            <a:extLst>
+              <a:ext uri="{FF2B5EF4-FFF2-40B4-BE49-F238E27FC236}">
+                <a16:creationId xmlns:a16="http://schemas.microsoft.com/office/drawing/2014/main" id="{D1BDEEF6-3D05-4977-9ECA-B8061DC20BDE}"/>
+              </a:ext>
+            </a:extLst>
+          </p:cNvPr>
+          <p:cNvCxnSpPr>
+            <a:cxnSpLocks/>
+            <a:stCxn id="90" idx="1"/>
+            <a:endCxn id="94" idx="3"/>
+          </p:cNvCxnSpPr>
+          <p:nvPr/>
+        </p:nvCxnSpPr>
+        <p:spPr>
+          <a:xfrm flipH="1">
+            <a:off x="5372172" y="3311237"/>
+            <a:ext cx="314455" cy="1526"/>
+          </a:xfrm>
+          <a:prstGeom prst="straightConnector1">
+            <a:avLst/>
+          </a:prstGeom>
+          <a:ln>
+            <a:tailEnd type="triangle"/>
+          </a:ln>
+        </p:spPr>
+        <p:style>
+          <a:lnRef idx="1">
+            <a:schemeClr val="dk1"/>
+          </a:lnRef>
+          <a:fillRef idx="0">
+            <a:schemeClr val="dk1"/>
+          </a:fillRef>
+          <a:effectRef idx="0">
+            <a:schemeClr val="dk1"/>
+          </a:effectRef>
+          <a:fontRef idx="minor">
+            <a:schemeClr val="tx1"/>
+          </a:fontRef>
+        </p:style>
+      </p:cxnSp>
+      <p:grpSp>
+        <p:nvGrpSpPr>
+          <p:cNvPr id="134" name="Group 133">
+            <a:extLst>
+              <a:ext uri="{FF2B5EF4-FFF2-40B4-BE49-F238E27FC236}">
+                <a16:creationId xmlns:a16="http://schemas.microsoft.com/office/drawing/2014/main" id="{570C4665-60C5-4417-9725-B4A6029665B3}"/>
+              </a:ext>
+            </a:extLst>
+          </p:cNvPr>
+          <p:cNvGrpSpPr/>
+          <p:nvPr/>
+        </p:nvGrpSpPr>
+        <p:grpSpPr>
+          <a:xfrm>
+            <a:off x="1750745" y="4470469"/>
+            <a:ext cx="1242693" cy="745614"/>
+            <a:chOff x="4644721" y="2040899"/>
+            <a:chExt cx="1656920" cy="994152"/>
+          </a:xfrm>
+        </p:grpSpPr>
+        <p:sp>
+          <p:nvSpPr>
+            <p:cNvPr id="135" name="Rectangle: Rounded Corners 134">
+              <a:extLst>
+                <a:ext uri="{FF2B5EF4-FFF2-40B4-BE49-F238E27FC236}">
+                  <a16:creationId xmlns:a16="http://schemas.microsoft.com/office/drawing/2014/main" id="{26973657-0892-41CA-8E40-48EB2C52A6D6}"/>
+                </a:ext>
+              </a:extLst>
+            </p:cNvPr>
+            <p:cNvSpPr/>
+            <p:nvPr/>
+          </p:nvSpPr>
+          <p:spPr>
+            <a:xfrm>
+              <a:off x="4644721" y="2040899"/>
+              <a:ext cx="1656920" cy="994152"/>
+            </a:xfrm>
+            <a:prstGeom prst="roundRect">
+              <a:avLst>
+                <a:gd name="adj" fmla="val 10000"/>
+              </a:avLst>
+            </a:prstGeom>
+          </p:spPr>
+          <p:style>
+            <a:lnRef idx="2">
+              <a:schemeClr val="dk1">
+                <a:shade val="80000"/>
+                <a:hueOff val="0"/>
+                <a:satOff val="0"/>
+                <a:lumOff val="0"/>
+                <a:alphaOff val="0"/>
+              </a:schemeClr>
+            </a:lnRef>
+            <a:fillRef idx="1">
+              <a:schemeClr val="lt1">
+                <a:hueOff val="0"/>
+                <a:satOff val="0"/>
+                <a:lumOff val="0"/>
+                <a:alphaOff val="0"/>
+              </a:schemeClr>
+            </a:fillRef>
+            <a:effectRef idx="0">
+              <a:schemeClr val="lt1">
+                <a:hueOff val="0"/>
+                <a:satOff val="0"/>
+                <a:lumOff val="0"/>
+                <a:alphaOff val="0"/>
+              </a:schemeClr>
+            </a:effectRef>
+            <a:fontRef idx="minor">
+              <a:schemeClr val="dk1">
+                <a:hueOff val="0"/>
+                <a:satOff val="0"/>
+                <a:lumOff val="0"/>
+                <a:alphaOff val="0"/>
+              </a:schemeClr>
+            </a:fontRef>
+          </p:style>
+        </p:sp>
+        <p:sp>
+          <p:nvSpPr>
+            <p:cNvPr id="136" name="Rectangle: Rounded Corners 4">
+              <a:extLst>
+                <a:ext uri="{FF2B5EF4-FFF2-40B4-BE49-F238E27FC236}">
+                  <a16:creationId xmlns:a16="http://schemas.microsoft.com/office/drawing/2014/main" id="{EE78159D-9F86-42B9-B926-E614D79F3056}"/>
+                </a:ext>
+              </a:extLst>
+            </p:cNvPr>
+            <p:cNvSpPr txBox="1"/>
+            <p:nvPr/>
+          </p:nvSpPr>
+          <p:spPr>
+            <a:xfrm>
+              <a:off x="4673839" y="2070017"/>
+              <a:ext cx="1598684" cy="935916"/>
+            </a:xfrm>
+            <a:prstGeom prst="rect">
+              <a:avLst/>
+            </a:prstGeom>
+          </p:spPr>
+          <p:style>
+            <a:lnRef idx="0">
+              <a:scrgbClr r="0" g="0" b="0"/>
+            </a:lnRef>
+            <a:fillRef idx="0">
+              <a:scrgbClr r="0" g="0" b="0"/>
+            </a:fillRef>
+            <a:effectRef idx="0">
+              <a:scrgbClr r="0" g="0" b="0"/>
+            </a:effectRef>
+            <a:fontRef idx="minor">
+              <a:schemeClr val="dk1">
+                <a:hueOff val="0"/>
+                <a:satOff val="0"/>
+                <a:lumOff val="0"/>
+                <a:alphaOff val="0"/>
+              </a:schemeClr>
+            </a:fontRef>
+          </p:style>
+          <p:txBody>
+            <a:bodyPr spcFirstLastPara="0" vert="horz" wrap="square" lIns="60960" tIns="60960" rIns="60960" bIns="60960" numCol="1" spcCol="1270" anchor="ctr" anchorCtr="0">
+              <a:noAutofit/>
+            </a:bodyPr>
+            <a:lstStyle/>
+            <a:p>
+              <a:pPr marL="0" lvl="0" indent="0" algn="ctr" defTabSz="711200">
+                <a:lnSpc>
+                  <a:spcPct val="90000"/>
+                </a:lnSpc>
+                <a:spcBef>
+                  <a:spcPct val="0"/>
+                </a:spcBef>
+                <a:spcAft>
+                  <a:spcPct val="35000"/>
+                </a:spcAft>
+                <a:buNone/>
+              </a:pPr>
+              <a:r>
+                <a:rPr lang="en-US" sz="1400" kern="1200" dirty="0"/>
+                <a:t>Matched Filtering</a:t>
+              </a:r>
+            </a:p>
+          </p:txBody>
+        </p:sp>
+      </p:grpSp>
+      <p:cxnSp>
+        <p:nvCxnSpPr>
+          <p:cNvPr id="137" name="Connector: Elbow 136">
+            <a:extLst>
+              <a:ext uri="{FF2B5EF4-FFF2-40B4-BE49-F238E27FC236}">
+                <a16:creationId xmlns:a16="http://schemas.microsoft.com/office/drawing/2014/main" id="{EEC95EAE-6B87-4A7D-80D1-6501202EADC7}"/>
+              </a:ext>
+            </a:extLst>
+          </p:cNvPr>
+          <p:cNvCxnSpPr>
+            <a:cxnSpLocks/>
+            <a:stCxn id="83" idx="3"/>
+            <a:endCxn id="87" idx="3"/>
+          </p:cNvCxnSpPr>
+          <p:nvPr/>
+        </p:nvCxnSpPr>
+        <p:spPr>
+          <a:xfrm>
+            <a:off x="8035821" y="2052810"/>
+            <a:ext cx="405920" cy="1259675"/>
+          </a:xfrm>
+          <a:prstGeom prst="bentConnector3">
+            <a:avLst>
+              <a:gd name="adj1" fmla="val 156317"/>
+            </a:avLst>
+          </a:prstGeom>
+          <a:ln>
+            <a:tailEnd type="triangle"/>
+          </a:ln>
+        </p:spPr>
+        <p:style>
+          <a:lnRef idx="1">
+            <a:schemeClr val="dk1"/>
+          </a:lnRef>
+          <a:fillRef idx="0">
+            <a:schemeClr val="dk1"/>
+          </a:fillRef>
+          <a:effectRef idx="0">
+            <a:schemeClr val="dk1"/>
+          </a:effectRef>
+          <a:fontRef idx="minor">
+            <a:schemeClr val="tx1"/>
+          </a:fontRef>
+        </p:style>
+      </p:cxnSp>
+      <p:cxnSp>
+        <p:nvCxnSpPr>
+          <p:cNvPr id="138" name="Straight Arrow Connector 137">
+            <a:extLst>
+              <a:ext uri="{FF2B5EF4-FFF2-40B4-BE49-F238E27FC236}">
+                <a16:creationId xmlns:a16="http://schemas.microsoft.com/office/drawing/2014/main" id="{7CFFEC7F-1052-4CE0-A24A-C904AA898758}"/>
+              </a:ext>
+            </a:extLst>
+          </p:cNvPr>
+          <p:cNvCxnSpPr>
+            <a:cxnSpLocks/>
+            <a:stCxn id="135" idx="3"/>
+            <a:endCxn id="105" idx="1"/>
+          </p:cNvCxnSpPr>
+          <p:nvPr/>
+        </p:nvCxnSpPr>
+        <p:spPr>
+          <a:xfrm>
+            <a:off x="2993438" y="4843276"/>
+            <a:ext cx="365793" cy="9333"/>
+          </a:xfrm>
+          <a:prstGeom prst="straightConnector1">
+            <a:avLst/>
+          </a:prstGeom>
+          <a:ln>
+            <a:tailEnd type="triangle"/>
+          </a:ln>
+        </p:spPr>
+        <p:style>
+          <a:lnRef idx="1">
+            <a:schemeClr val="dk1"/>
+          </a:lnRef>
+          <a:fillRef idx="0">
+            <a:schemeClr val="dk1"/>
+          </a:fillRef>
+          <a:effectRef idx="0">
+            <a:schemeClr val="dk1"/>
+          </a:effectRef>
+          <a:fontRef idx="minor">
+            <a:schemeClr val="tx1"/>
+          </a:fontRef>
+        </p:style>
+      </p:cxnSp>
+      <p:cxnSp>
+        <p:nvCxnSpPr>
+          <p:cNvPr id="139" name="Straight Arrow Connector 138">
+            <a:extLst>
+              <a:ext uri="{FF2B5EF4-FFF2-40B4-BE49-F238E27FC236}">
+                <a16:creationId xmlns:a16="http://schemas.microsoft.com/office/drawing/2014/main" id="{392E7A93-1FAF-45DC-87F2-8C028F0D3E4F}"/>
+              </a:ext>
+            </a:extLst>
+          </p:cNvPr>
+          <p:cNvCxnSpPr>
+            <a:cxnSpLocks/>
+            <a:stCxn id="105" idx="3"/>
+            <a:endCxn id="108" idx="1"/>
+          </p:cNvCxnSpPr>
+          <p:nvPr/>
+        </p:nvCxnSpPr>
+        <p:spPr>
+          <a:xfrm>
+            <a:off x="4731514" y="4852609"/>
+            <a:ext cx="363618" cy="5271"/>
+          </a:xfrm>
+          <a:prstGeom prst="straightConnector1">
+            <a:avLst/>
+          </a:prstGeom>
+          <a:ln>
+            <a:tailEnd type="triangle"/>
+          </a:ln>
+        </p:spPr>
+        <p:style>
+          <a:lnRef idx="1">
+            <a:schemeClr val="dk1"/>
+          </a:lnRef>
+          <a:fillRef idx="0">
+            <a:schemeClr val="dk1"/>
+          </a:fillRef>
+          <a:effectRef idx="0">
+            <a:schemeClr val="dk1"/>
+          </a:effectRef>
+          <a:fontRef idx="minor">
+            <a:schemeClr val="tx1"/>
+          </a:fontRef>
+        </p:style>
+      </p:cxnSp>
+      <p:sp>
+        <p:nvSpPr>
+          <p:cNvPr id="140" name="TextBox 139">
+            <a:extLst>
+              <a:ext uri="{FF2B5EF4-FFF2-40B4-BE49-F238E27FC236}">
+                <a16:creationId xmlns:a16="http://schemas.microsoft.com/office/drawing/2014/main" id="{BCCCF9DB-9703-4591-83F8-248B9F6F42C2}"/>
+              </a:ext>
+            </a:extLst>
+          </p:cNvPr>
+          <p:cNvSpPr txBox="1"/>
+          <p:nvPr/>
+        </p:nvSpPr>
+        <p:spPr>
+          <a:xfrm>
+            <a:off x="4333347" y="4077287"/>
+            <a:ext cx="2344745" cy="307777"/>
+          </a:xfrm>
+          <a:prstGeom prst="rect">
+            <a:avLst/>
+          </a:prstGeom>
+          <a:noFill/>
+        </p:spPr>
+        <p:txBody>
+          <a:bodyPr wrap="square" rtlCol="0">
+            <a:spAutoFit/>
+          </a:bodyPr>
+          <a:lstStyle/>
+          <a:p>
+            <a:r>
+              <a:rPr lang="en-US" sz="1400" b="1" dirty="0"/>
+              <a:t>Electrical Domain  -  Receiver</a:t>
+            </a:r>
+          </a:p>
+        </p:txBody>
+      </p:sp>
+      <p:sp>
+        <p:nvSpPr>
+          <p:cNvPr id="151" name="TextBox 150">
+            <a:extLst>
+              <a:ext uri="{FF2B5EF4-FFF2-40B4-BE49-F238E27FC236}">
+                <a16:creationId xmlns:a16="http://schemas.microsoft.com/office/drawing/2014/main" id="{007F68B5-1949-49C8-9E70-BE9E516436D4}"/>
+              </a:ext>
+            </a:extLst>
+          </p:cNvPr>
+          <p:cNvSpPr txBox="1"/>
+          <p:nvPr/>
+        </p:nvSpPr>
+        <p:spPr>
+          <a:xfrm>
+            <a:off x="11342312" y="6488668"/>
+            <a:ext cx="1203649" cy="369332"/>
+          </a:xfrm>
+          <a:prstGeom prst="rect">
+            <a:avLst/>
+          </a:prstGeom>
+          <a:noFill/>
+        </p:spPr>
+        <p:txBody>
+          <a:bodyPr wrap="square" rtlCol="0">
+            <a:spAutoFit/>
+          </a:bodyPr>
+          <a:lstStyle/>
+          <a:p>
+            <a:r>
+              <a:rPr lang="en-GB" dirty="0"/>
+              <a:t>Week 5</a:t>
+            </a:r>
+          </a:p>
+        </p:txBody>
+      </p:sp>
+    </p:spTree>
+    <p:extLst>
+      <p:ext uri="{BB962C8B-B14F-4D97-AF65-F5344CB8AC3E}">
+        <p14:creationId xmlns:p14="http://schemas.microsoft.com/office/powerpoint/2010/main" val="849575169"/>
+      </p:ext>
+    </p:extLst>
+  </p:cSld>
+  <p:clrMapOvr>
+    <a:masterClrMapping/>
+  </p:clrMapOvr>
+</p:sld>
+</file>
+
+<file path=ppt/slides/slide31.xml><?xml version="1.0" encoding="utf-8"?>
+<p:sld xmlns:a="http://schemas.openxmlformats.org/drawingml/2006/main" xmlns:r="http://schemas.openxmlformats.org/officeDocument/2006/relationships" xmlns:p="http://schemas.openxmlformats.org/presentationml/2006/main">
+  <p:cSld>
+    <p:spTree>
+      <p:nvGrpSpPr>
+        <p:cNvPr id="1" name=""/>
+        <p:cNvGrpSpPr/>
+        <p:nvPr/>
+      </p:nvGrpSpPr>
+      <p:grpSpPr>
+        <a:xfrm>
+          <a:off x="0" y="0"/>
+          <a:ext cx="0" cy="0"/>
+          <a:chOff x="0" y="0"/>
+          <a:chExt cx="0" cy="0"/>
+        </a:xfrm>
+      </p:grpSpPr>
+      <p:sp>
+        <p:nvSpPr>
+          <p:cNvPr id="2" name="Title 1">
+            <a:extLst>
+              <a:ext uri="{FF2B5EF4-FFF2-40B4-BE49-F238E27FC236}">
+                <a16:creationId xmlns:a16="http://schemas.microsoft.com/office/drawing/2014/main" id="{DD5AAE86-44C7-46C4-AD9A-8F61F8D9A5A0}"/>
+              </a:ext>
+            </a:extLst>
+          </p:cNvPr>
+          <p:cNvSpPr>
+            <a:spLocks noGrp="1"/>
+          </p:cNvSpPr>
+          <p:nvPr>
+            <p:ph type="title"/>
+          </p:nvPr>
+        </p:nvSpPr>
+        <p:spPr/>
+        <p:txBody>
+          <a:bodyPr/>
+          <a:lstStyle/>
+          <a:p>
+            <a:r>
+              <a:rPr lang="en-GB" dirty="0"/>
+              <a:t>Adaptive Equalisation</a:t>
+            </a:r>
+          </a:p>
+        </p:txBody>
+      </p:sp>
+      <p:sp>
+        <p:nvSpPr>
+          <p:cNvPr id="4" name="TextBox 3">
+            <a:extLst>
+              <a:ext uri="{FF2B5EF4-FFF2-40B4-BE49-F238E27FC236}">
+                <a16:creationId xmlns:a16="http://schemas.microsoft.com/office/drawing/2014/main" id="{49C99F9B-DD36-4E7A-8EE6-9B0FFB2D9E1F}"/>
+              </a:ext>
+            </a:extLst>
+          </p:cNvPr>
+          <p:cNvSpPr txBox="1"/>
+          <p:nvPr/>
+        </p:nvSpPr>
+        <p:spPr>
+          <a:xfrm>
+            <a:off x="11208774" y="6492875"/>
+            <a:ext cx="983226" cy="369332"/>
+          </a:xfrm>
+          <a:prstGeom prst="rect">
+            <a:avLst/>
+          </a:prstGeom>
+          <a:noFill/>
+        </p:spPr>
+        <p:txBody>
+          <a:bodyPr wrap="square">
+            <a:spAutoFit/>
+          </a:bodyPr>
+          <a:lstStyle/>
+          <a:p>
+            <a:r>
+              <a:rPr lang="en-GB" dirty="0"/>
+              <a:t>Week 5</a:t>
+            </a:r>
+          </a:p>
+        </p:txBody>
+      </p:sp>
+      <p:pic>
+        <p:nvPicPr>
+          <p:cNvPr id="1025" name="Picture 1">
+            <a:extLst>
+              <a:ext uri="{FF2B5EF4-FFF2-40B4-BE49-F238E27FC236}">
+                <a16:creationId xmlns:a16="http://schemas.microsoft.com/office/drawing/2014/main" id="{E3B5084A-A4A4-498A-BA0F-77B0DCA14232}"/>
+              </a:ext>
+            </a:extLst>
+          </p:cNvPr>
+          <p:cNvPicPr>
+            <a:picLocks noChangeAspect="1" noChangeArrowheads="1"/>
+          </p:cNvPicPr>
+          <p:nvPr/>
+        </p:nvPicPr>
+        <p:blipFill>
+          <a:blip r:embed="rId2">
+            <a:extLst>
+              <a:ext uri="{28A0092B-C50C-407E-A947-70E740481C1C}">
+                <a14:useLocalDpi xmlns:a14="http://schemas.microsoft.com/office/drawing/2010/main" val="0"/>
+              </a:ext>
+            </a:extLst>
+          </a:blip>
+          <a:srcRect/>
+          <a:stretch>
+            <a:fillRect/>
+          </a:stretch>
+        </p:blipFill>
+        <p:spPr bwMode="auto">
+          <a:xfrm>
+            <a:off x="137652" y="1691095"/>
+            <a:ext cx="4041058" cy="3030794"/>
+          </a:xfrm>
+          <a:prstGeom prst="rect">
+            <a:avLst/>
+          </a:prstGeom>
+          <a:noFill/>
+          <a:extLst>
+            <a:ext uri="{909E8E84-426E-40DD-AFC4-6F175D3DCCD1}">
+              <a14:hiddenFill xmlns:a14="http://schemas.microsoft.com/office/drawing/2010/main">
+                <a:solidFill>
+                  <a:srgbClr val="FFFFFF"/>
+                </a:solidFill>
+              </a14:hiddenFill>
+            </a:ext>
+          </a:extLst>
+        </p:spPr>
+      </p:pic>
+      <p:pic>
+        <p:nvPicPr>
+          <p:cNvPr id="1027" name="Picture 3">
+            <a:extLst>
+              <a:ext uri="{FF2B5EF4-FFF2-40B4-BE49-F238E27FC236}">
+                <a16:creationId xmlns:a16="http://schemas.microsoft.com/office/drawing/2014/main" id="{18339728-6B23-4D8D-882D-A0AFCF849810}"/>
+              </a:ext>
+            </a:extLst>
+          </p:cNvPr>
+          <p:cNvPicPr>
+            <a:picLocks noChangeAspect="1" noChangeArrowheads="1"/>
+          </p:cNvPicPr>
+          <p:nvPr/>
+        </p:nvPicPr>
+        <p:blipFill>
+          <a:blip r:embed="rId3">
+            <a:extLst>
+              <a:ext uri="{28A0092B-C50C-407E-A947-70E740481C1C}">
+                <a14:useLocalDpi xmlns:a14="http://schemas.microsoft.com/office/drawing/2010/main" val="0"/>
+              </a:ext>
+            </a:extLst>
+          </a:blip>
+          <a:srcRect/>
+          <a:stretch>
+            <a:fillRect/>
+          </a:stretch>
+        </p:blipFill>
+        <p:spPr bwMode="auto">
+          <a:xfrm>
+            <a:off x="4178710" y="1690689"/>
+            <a:ext cx="4041600" cy="3031200"/>
+          </a:xfrm>
+          <a:prstGeom prst="rect">
+            <a:avLst/>
+          </a:prstGeom>
+          <a:noFill/>
+          <a:extLst>
+            <a:ext uri="{909E8E84-426E-40DD-AFC4-6F175D3DCCD1}">
+              <a14:hiddenFill xmlns:a14="http://schemas.microsoft.com/office/drawing/2010/main">
+                <a:solidFill>
+                  <a:srgbClr val="FFFFFF"/>
+                </a:solidFill>
+              </a14:hiddenFill>
+            </a:ext>
+          </a:extLst>
+        </p:spPr>
+      </p:pic>
+      <p:pic>
+        <p:nvPicPr>
+          <p:cNvPr id="1028" name="Picture 4">
+            <a:extLst>
+              <a:ext uri="{FF2B5EF4-FFF2-40B4-BE49-F238E27FC236}">
+                <a16:creationId xmlns:a16="http://schemas.microsoft.com/office/drawing/2014/main" id="{FBAC5455-91DA-44DD-B913-D52317680E28}"/>
+              </a:ext>
+            </a:extLst>
+          </p:cNvPr>
+          <p:cNvPicPr>
+            <a:picLocks noChangeAspect="1" noChangeArrowheads="1"/>
+          </p:cNvPicPr>
+          <p:nvPr/>
+        </p:nvPicPr>
+        <p:blipFill>
+          <a:blip r:embed="rId4">
+            <a:extLst>
+              <a:ext uri="{28A0092B-C50C-407E-A947-70E740481C1C}">
+                <a14:useLocalDpi xmlns:a14="http://schemas.microsoft.com/office/drawing/2010/main" val="0"/>
+              </a:ext>
+            </a:extLst>
+          </a:blip>
+          <a:srcRect/>
+          <a:stretch>
+            <a:fillRect/>
+          </a:stretch>
+        </p:blipFill>
+        <p:spPr bwMode="auto">
+          <a:xfrm>
+            <a:off x="7934090" y="1690688"/>
+            <a:ext cx="4041600" cy="3031201"/>
+          </a:xfrm>
+          <a:prstGeom prst="rect">
+            <a:avLst/>
+          </a:prstGeom>
+          <a:noFill/>
+          <a:extLst>
+            <a:ext uri="{909E8E84-426E-40DD-AFC4-6F175D3DCCD1}">
+              <a14:hiddenFill xmlns:a14="http://schemas.microsoft.com/office/drawing/2010/main">
+                <a:solidFill>
+                  <a:srgbClr val="FFFFFF"/>
+                </a:solidFill>
+              </a14:hiddenFill>
+            </a:ext>
+          </a:extLst>
+        </p:spPr>
+      </p:pic>
+      <p:sp>
+        <p:nvSpPr>
+          <p:cNvPr id="5" name="TextBox 4">
+            <a:extLst>
+              <a:ext uri="{FF2B5EF4-FFF2-40B4-BE49-F238E27FC236}">
+                <a16:creationId xmlns:a16="http://schemas.microsoft.com/office/drawing/2014/main" id="{AD4A61BC-2904-4522-B941-00CD6C125821}"/>
+              </a:ext>
+            </a:extLst>
+          </p:cNvPr>
+          <p:cNvSpPr txBox="1"/>
+          <p:nvPr/>
+        </p:nvSpPr>
+        <p:spPr>
+          <a:xfrm>
+            <a:off x="511779" y="4982239"/>
+            <a:ext cx="2746265" cy="2031325"/>
+          </a:xfrm>
+          <a:prstGeom prst="rect">
+            <a:avLst/>
+          </a:prstGeom>
+          <a:noFill/>
+        </p:spPr>
+        <p:txBody>
+          <a:bodyPr wrap="none" rtlCol="0">
+            <a:spAutoFit/>
+          </a:bodyPr>
+          <a:lstStyle/>
+          <a:p>
+            <a:r>
+              <a:rPr lang="en-GB" dirty="0"/>
+              <a:t>Parameters:</a:t>
+            </a:r>
+          </a:p>
+          <a:p>
+            <a:r>
+              <a:rPr lang="en-GB" b="0" i="0" dirty="0">
+                <a:solidFill>
+                  <a:srgbClr val="000000"/>
+                </a:solidFill>
+                <a:effectLst/>
+                <a:latin typeface="Menlo"/>
+              </a:rPr>
+              <a:t>symbol_rate = 32e9;</a:t>
+            </a:r>
+          </a:p>
+          <a:p>
+            <a:r>
+              <a:rPr lang="en-GB" dirty="0" err="1">
+                <a:solidFill>
+                  <a:srgbClr val="000000"/>
+                </a:solidFill>
+                <a:latin typeface="Consolas Courier"/>
+              </a:rPr>
+              <a:t>u</a:t>
+            </a:r>
+            <a:r>
+              <a:rPr lang="en-GB" sz="1800" b="0" i="0" u="none" strike="noStrike" baseline="0" dirty="0" err="1">
+                <a:solidFill>
+                  <a:srgbClr val="000000"/>
+                </a:solidFill>
+                <a:latin typeface="Consolas Courier"/>
+              </a:rPr>
+              <a:t>psampling_factor</a:t>
+            </a:r>
+            <a:r>
+              <a:rPr lang="en-GB" sz="1800" b="0" i="0" u="none" strike="noStrike" baseline="0" dirty="0">
+                <a:solidFill>
+                  <a:srgbClr val="000000"/>
+                </a:solidFill>
+                <a:latin typeface="Consolas Courier"/>
+              </a:rPr>
+              <a:t> = 2;</a:t>
+            </a:r>
+            <a:endParaRPr lang="en-GB" dirty="0"/>
+          </a:p>
+          <a:p>
+            <a:r>
+              <a:rPr lang="pt-BR" b="0" i="0" dirty="0">
+                <a:solidFill>
+                  <a:srgbClr val="000000"/>
+                </a:solidFill>
+                <a:effectLst/>
+                <a:latin typeface="Menlo"/>
+              </a:rPr>
+              <a:t>z = 1000e3; </a:t>
+            </a:r>
+            <a:r>
+              <a:rPr lang="pt-BR" b="0" i="0" u="none" strike="noStrike" dirty="0">
+                <a:solidFill>
+                  <a:srgbClr val="228B22"/>
+                </a:solidFill>
+                <a:effectLst/>
+                <a:latin typeface="Menlo"/>
+              </a:rPr>
+              <a:t>% m</a:t>
+            </a:r>
+            <a:endParaRPr lang="pt-BR" b="0" i="0" dirty="0">
+              <a:solidFill>
+                <a:srgbClr val="000000"/>
+              </a:solidFill>
+              <a:effectLst/>
+              <a:latin typeface="Menlo"/>
+            </a:endParaRPr>
+          </a:p>
+          <a:p>
+            <a:r>
+              <a:rPr lang="pt-BR" b="0" i="0" dirty="0">
+                <a:solidFill>
+                  <a:srgbClr val="000000"/>
+                </a:solidFill>
+                <a:effectLst/>
+                <a:latin typeface="Menlo"/>
+              </a:rPr>
+              <a:t>D = 16*10^-6; </a:t>
+            </a:r>
+            <a:r>
+              <a:rPr lang="pt-BR" b="0" i="0" u="none" strike="noStrike" dirty="0">
+                <a:solidFill>
+                  <a:srgbClr val="228B22"/>
+                </a:solidFill>
+                <a:effectLst/>
+                <a:latin typeface="Menlo"/>
+              </a:rPr>
+              <a:t>% s/m/m</a:t>
+            </a:r>
+            <a:endParaRPr lang="pt-BR" b="0" i="0" dirty="0">
+              <a:solidFill>
+                <a:srgbClr val="000000"/>
+              </a:solidFill>
+              <a:effectLst/>
+              <a:latin typeface="Menlo"/>
+            </a:endParaRPr>
+          </a:p>
+          <a:p>
+            <a:r>
+              <a:rPr lang="pt-BR" b="0" i="0" dirty="0">
+                <a:solidFill>
+                  <a:srgbClr val="000000"/>
+                </a:solidFill>
+                <a:effectLst/>
+                <a:latin typeface="Menlo"/>
+              </a:rPr>
+              <a:t>lambda = 1550*10^-9; </a:t>
+            </a:r>
+            <a:r>
+              <a:rPr lang="pt-BR" b="0" i="0" u="none" strike="noStrike" dirty="0">
+                <a:solidFill>
+                  <a:srgbClr val="228B22"/>
+                </a:solidFill>
+                <a:effectLst/>
+                <a:latin typeface="Menlo"/>
+              </a:rPr>
+              <a:t>% m</a:t>
+            </a:r>
+            <a:endParaRPr lang="pt-BR" b="0" i="0" dirty="0">
+              <a:solidFill>
+                <a:srgbClr val="000000"/>
+              </a:solidFill>
+              <a:effectLst/>
+              <a:latin typeface="Menlo"/>
+            </a:endParaRPr>
+          </a:p>
+          <a:p>
+            <a:endParaRPr lang="en-GB" dirty="0"/>
+          </a:p>
+        </p:txBody>
+      </p:sp>
+      <p:sp>
+        <p:nvSpPr>
+          <p:cNvPr id="10" name="TextBox 9">
+            <a:extLst>
+              <a:ext uri="{FF2B5EF4-FFF2-40B4-BE49-F238E27FC236}">
+                <a16:creationId xmlns:a16="http://schemas.microsoft.com/office/drawing/2014/main" id="{7EBB5B2F-A3FE-49EF-88CF-CED7BF878005}"/>
+              </a:ext>
+            </a:extLst>
+          </p:cNvPr>
+          <p:cNvSpPr txBox="1"/>
+          <p:nvPr/>
+        </p:nvSpPr>
+        <p:spPr>
+          <a:xfrm>
+            <a:off x="4178710" y="4982239"/>
+            <a:ext cx="2293256" cy="1754326"/>
+          </a:xfrm>
+          <a:prstGeom prst="rect">
+            <a:avLst/>
+          </a:prstGeom>
+          <a:noFill/>
+        </p:spPr>
+        <p:txBody>
+          <a:bodyPr wrap="none" rtlCol="0">
+            <a:spAutoFit/>
+          </a:bodyPr>
+          <a:lstStyle/>
+          <a:p>
+            <a:r>
+              <a:rPr lang="en-GB" dirty="0"/>
+              <a:t>CMA Algorithm:</a:t>
+            </a:r>
+          </a:p>
+          <a:p>
+            <a:r>
+              <a:rPr lang="en-GB" dirty="0" err="1"/>
+              <a:t>num_symbols</a:t>
+            </a:r>
+            <a:r>
+              <a:rPr lang="en-GB" dirty="0"/>
+              <a:t> = 8192;</a:t>
+            </a:r>
+          </a:p>
+          <a:p>
+            <a:r>
+              <a:rPr lang="en-GB" sz="1800" b="0" i="0" u="none" strike="noStrike" baseline="0" dirty="0" err="1">
+                <a:solidFill>
+                  <a:srgbClr val="000000"/>
+                </a:solidFill>
+                <a:latin typeface="Consolas Courier"/>
+              </a:rPr>
+              <a:t>h_taps</a:t>
+            </a:r>
+            <a:r>
+              <a:rPr lang="en-GB" sz="1800" b="0" i="0" u="none" strike="noStrike" baseline="0" dirty="0">
+                <a:solidFill>
+                  <a:srgbClr val="000000"/>
+                </a:solidFill>
+                <a:latin typeface="Consolas Courier"/>
+              </a:rPr>
+              <a:t> = 17; </a:t>
+            </a:r>
+            <a:endParaRPr lang="en-GB" sz="1800" b="0" i="0" u="none" strike="noStrike" baseline="0" dirty="0">
+              <a:solidFill>
+                <a:srgbClr val="228B22"/>
+              </a:solidFill>
+              <a:latin typeface="Consolas Courier"/>
+            </a:endParaRPr>
+          </a:p>
+          <a:p>
+            <a:r>
+              <a:rPr lang="en-GB" b="0" i="0" dirty="0">
+                <a:solidFill>
+                  <a:srgbClr val="000000"/>
+                </a:solidFill>
+                <a:effectLst/>
+                <a:latin typeface="Menlo"/>
+              </a:rPr>
+              <a:t>h(9) = 1; </a:t>
+            </a:r>
+          </a:p>
+          <a:p>
+            <a:r>
+              <a:rPr lang="en-GB" b="0" i="0" dirty="0" err="1">
+                <a:solidFill>
+                  <a:srgbClr val="000000"/>
+                </a:solidFill>
+                <a:effectLst/>
+                <a:latin typeface="Menlo"/>
+              </a:rPr>
+              <a:t>training_size</a:t>
+            </a:r>
+            <a:r>
+              <a:rPr lang="en-GB" b="0" i="0" dirty="0">
+                <a:solidFill>
+                  <a:srgbClr val="000000"/>
+                </a:solidFill>
+                <a:effectLst/>
+                <a:latin typeface="Menlo"/>
+              </a:rPr>
+              <a:t> = 2000;</a:t>
+            </a:r>
+          </a:p>
+          <a:p>
+            <a:r>
+              <a:rPr lang="en-GB" b="0" i="0" dirty="0">
+                <a:solidFill>
+                  <a:srgbClr val="000000"/>
+                </a:solidFill>
+                <a:effectLst/>
+                <a:latin typeface="Menlo"/>
+              </a:rPr>
+              <a:t>mu = 0.002;</a:t>
+            </a:r>
+          </a:p>
+        </p:txBody>
+      </p:sp>
+      <p:sp>
+        <p:nvSpPr>
+          <p:cNvPr id="12" name="TextBox 11">
+            <a:extLst>
+              <a:ext uri="{FF2B5EF4-FFF2-40B4-BE49-F238E27FC236}">
+                <a16:creationId xmlns:a16="http://schemas.microsoft.com/office/drawing/2014/main" id="{17230C1F-D129-4A9B-B49F-6458E8DB2DB8}"/>
+              </a:ext>
+            </a:extLst>
+          </p:cNvPr>
+          <p:cNvSpPr txBox="1"/>
+          <p:nvPr/>
+        </p:nvSpPr>
+        <p:spPr>
+          <a:xfrm>
+            <a:off x="7531751" y="4982239"/>
+            <a:ext cx="1714885" cy="923330"/>
+          </a:xfrm>
+          <a:prstGeom prst="rect">
+            <a:avLst/>
+          </a:prstGeom>
+          <a:noFill/>
+        </p:spPr>
+        <p:txBody>
+          <a:bodyPr wrap="square">
+            <a:spAutoFit/>
+          </a:bodyPr>
+          <a:lstStyle/>
+          <a:p>
+            <a:r>
+              <a:rPr lang="en-GB" b="0" i="0" dirty="0">
+                <a:solidFill>
+                  <a:srgbClr val="000000"/>
+                </a:solidFill>
+                <a:effectLst/>
+                <a:latin typeface="Menlo"/>
+              </a:rPr>
+              <a:t>Demodulation:</a:t>
+            </a:r>
+          </a:p>
+          <a:p>
+            <a:r>
+              <a:rPr lang="en-GB" b="0" i="0" dirty="0">
+                <a:solidFill>
+                  <a:srgbClr val="000000"/>
+                </a:solidFill>
+                <a:effectLst/>
+                <a:latin typeface="Menlo"/>
+              </a:rPr>
+              <a:t>errors = 0</a:t>
+            </a:r>
+          </a:p>
+          <a:p>
+            <a:r>
+              <a:rPr lang="en-GB">
+                <a:solidFill>
+                  <a:srgbClr val="000000"/>
+                </a:solidFill>
+                <a:latin typeface="Menlo"/>
+              </a:rPr>
+              <a:t>BER </a:t>
+            </a:r>
+            <a:r>
+              <a:rPr lang="en-GB" dirty="0">
+                <a:solidFill>
+                  <a:srgbClr val="000000"/>
+                </a:solidFill>
+                <a:latin typeface="Menlo"/>
+              </a:rPr>
+              <a:t>= 0</a:t>
+            </a:r>
+            <a:endParaRPr lang="en-GB" b="0" i="0" dirty="0">
+              <a:solidFill>
+                <a:srgbClr val="000000"/>
+              </a:solidFill>
+              <a:effectLst/>
+              <a:latin typeface="Menlo"/>
+            </a:endParaRPr>
+          </a:p>
+        </p:txBody>
+      </p:sp>
+    </p:spTree>
+    <p:extLst>
+      <p:ext uri="{BB962C8B-B14F-4D97-AF65-F5344CB8AC3E}">
+        <p14:creationId xmlns:p14="http://schemas.microsoft.com/office/powerpoint/2010/main" val="1060708322"/>
+      </p:ext>
+    </p:extLst>
+  </p:cSld>
+  <p:clrMapOvr>
+    <a:masterClrMapping/>
+  </p:clrMapOvr>
+</p:sld>
+</file>
+
 <file path=ppt/slides/slide4.xml><?xml version="1.0" encoding="utf-8"?>
 <p:sld xmlns:a="http://schemas.openxmlformats.org/drawingml/2006/main" xmlns:r="http://schemas.openxmlformats.org/officeDocument/2006/relationships" xmlns:p="http://schemas.openxmlformats.org/presentationml/2006/main">
   <p:cSld>

</xml_diff>

<commit_message>
CMA Adaptive Equalisation implemented in the full diagram
</commit_message>
<xml_diff>
--- a/Master's meetings presentation.pptx
+++ b/Master's meetings presentation.pptx
@@ -36,6 +36,8 @@
     <p:sldId id="285" r:id="rId31"/>
     <p:sldId id="286" r:id="rId32"/>
     <p:sldId id="287" r:id="rId33"/>
+    <p:sldId id="288" r:id="rId34"/>
+    <p:sldId id="289" r:id="rId35"/>
   </p:sldIdLst>
   <p:sldSz cx="12192000" cy="6858000"/>
   <p:notesSz cx="6858000" cy="9144000"/>
@@ -9823,7 +9825,7 @@
           <a:p>
             <a:fld id="{1D6AAEF1-BB65-438A-947A-6BD8EC392D5A}" type="datetimeFigureOut">
               <a:rPr lang="en-US" smtClean="0"/>
-              <a:t>2/27/2021</a:t>
+              <a:t>3/1/2021</a:t>
             </a:fld>
             <a:endParaRPr lang="en-US"/>
           </a:p>
@@ -10021,7 +10023,7 @@
           <a:p>
             <a:fld id="{1D6AAEF1-BB65-438A-947A-6BD8EC392D5A}" type="datetimeFigureOut">
               <a:rPr lang="en-US" smtClean="0"/>
-              <a:t>2/27/2021</a:t>
+              <a:t>3/1/2021</a:t>
             </a:fld>
             <a:endParaRPr lang="en-US"/>
           </a:p>
@@ -10229,7 +10231,7 @@
           <a:p>
             <a:fld id="{1D6AAEF1-BB65-438A-947A-6BD8EC392D5A}" type="datetimeFigureOut">
               <a:rPr lang="en-US" smtClean="0"/>
-              <a:t>2/27/2021</a:t>
+              <a:t>3/1/2021</a:t>
             </a:fld>
             <a:endParaRPr lang="en-US"/>
           </a:p>
@@ -10427,7 +10429,7 @@
           <a:p>
             <a:fld id="{1D6AAEF1-BB65-438A-947A-6BD8EC392D5A}" type="datetimeFigureOut">
               <a:rPr lang="en-US" smtClean="0"/>
-              <a:t>2/27/2021</a:t>
+              <a:t>3/1/2021</a:t>
             </a:fld>
             <a:endParaRPr lang="en-US"/>
           </a:p>
@@ -10702,7 +10704,7 @@
           <a:p>
             <a:fld id="{1D6AAEF1-BB65-438A-947A-6BD8EC392D5A}" type="datetimeFigureOut">
               <a:rPr lang="en-US" smtClean="0"/>
-              <a:t>2/27/2021</a:t>
+              <a:t>3/1/2021</a:t>
             </a:fld>
             <a:endParaRPr lang="en-US"/>
           </a:p>
@@ -10967,7 +10969,7 @@
           <a:p>
             <a:fld id="{1D6AAEF1-BB65-438A-947A-6BD8EC392D5A}" type="datetimeFigureOut">
               <a:rPr lang="en-US" smtClean="0"/>
-              <a:t>2/27/2021</a:t>
+              <a:t>3/1/2021</a:t>
             </a:fld>
             <a:endParaRPr lang="en-US"/>
           </a:p>
@@ -11379,7 +11381,7 @@
           <a:p>
             <a:fld id="{1D6AAEF1-BB65-438A-947A-6BD8EC392D5A}" type="datetimeFigureOut">
               <a:rPr lang="en-US" smtClean="0"/>
-              <a:t>2/27/2021</a:t>
+              <a:t>3/1/2021</a:t>
             </a:fld>
             <a:endParaRPr lang="en-US"/>
           </a:p>
@@ -11520,7 +11522,7 @@
           <a:p>
             <a:fld id="{1D6AAEF1-BB65-438A-947A-6BD8EC392D5A}" type="datetimeFigureOut">
               <a:rPr lang="en-US" smtClean="0"/>
-              <a:t>2/27/2021</a:t>
+              <a:t>3/1/2021</a:t>
             </a:fld>
             <a:endParaRPr lang="en-US"/>
           </a:p>
@@ -11633,7 +11635,7 @@
           <a:p>
             <a:fld id="{1D6AAEF1-BB65-438A-947A-6BD8EC392D5A}" type="datetimeFigureOut">
               <a:rPr lang="en-US" smtClean="0"/>
-              <a:t>2/27/2021</a:t>
+              <a:t>3/1/2021</a:t>
             </a:fld>
             <a:endParaRPr lang="en-US"/>
           </a:p>
@@ -11944,7 +11946,7 @@
           <a:p>
             <a:fld id="{1D6AAEF1-BB65-438A-947A-6BD8EC392D5A}" type="datetimeFigureOut">
               <a:rPr lang="en-US" smtClean="0"/>
-              <a:t>2/27/2021</a:t>
+              <a:t>3/1/2021</a:t>
             </a:fld>
             <a:endParaRPr lang="en-US"/>
           </a:p>
@@ -12232,7 +12234,7 @@
           <a:p>
             <a:fld id="{1D6AAEF1-BB65-438A-947A-6BD8EC392D5A}" type="datetimeFigureOut">
               <a:rPr lang="en-US" smtClean="0"/>
-              <a:t>2/27/2021</a:t>
+              <a:t>3/1/2021</a:t>
             </a:fld>
             <a:endParaRPr lang="en-US"/>
           </a:p>
@@ -12473,7 +12475,7 @@
           <a:p>
             <a:fld id="{1D6AAEF1-BB65-438A-947A-6BD8EC392D5A}" type="datetimeFigureOut">
               <a:rPr lang="en-US" smtClean="0"/>
-              <a:t>2/27/2021</a:t>
+              <a:t>3/1/2021</a:t>
             </a:fld>
             <a:endParaRPr lang="en-US"/>
           </a:p>
@@ -23653,7 +23655,7 @@
           <a:p>
             <a:r>
               <a:rPr lang="en-GB" dirty="0"/>
-              <a:t>Adaptive Equalisation</a:t>
+              <a:t>Adaptive Equalisation (No Noise)</a:t>
             </a:r>
           </a:p>
         </p:txBody>
@@ -23848,8 +23850,8 @@
         </p:nvSpPr>
         <p:spPr>
           <a:xfrm>
-            <a:off x="511779" y="4982239"/>
-            <a:ext cx="2746265" cy="2031325"/>
+            <a:off x="511779" y="5000592"/>
+            <a:ext cx="2337628" cy="1200329"/>
           </a:xfrm>
           <a:prstGeom prst="rect">
             <a:avLst/>
@@ -23910,93 +23912,6 @@
             <a:endParaRPr lang="en-GB" dirty="0"/>
           </a:p>
           <a:p>
-            <a:r>
-              <a:rPr lang="pt-BR" b="0" i="0" dirty="0">
-                <a:solidFill>
-                  <a:srgbClr val="000000"/>
-                </a:solidFill>
-                <a:effectLst/>
-                <a:latin typeface="Menlo"/>
-              </a:rPr>
-              <a:t>z = 1000e3; </a:t>
-            </a:r>
-            <a:r>
-              <a:rPr lang="pt-BR" b="0" i="0" u="none" strike="noStrike" dirty="0">
-                <a:solidFill>
-                  <a:srgbClr val="228B22"/>
-                </a:solidFill>
-                <a:effectLst/>
-                <a:latin typeface="Menlo"/>
-              </a:rPr>
-              <a:t>% m</a:t>
-            </a:r>
-            <a:endParaRPr lang="pt-BR" b="0" i="0" dirty="0">
-              <a:solidFill>
-                <a:srgbClr val="000000"/>
-              </a:solidFill>
-              <a:effectLst/>
-              <a:latin typeface="Menlo"/>
-            </a:endParaRPr>
-          </a:p>
-          <a:p>
-            <a:r>
-              <a:rPr lang="pt-BR" b="0" i="0" dirty="0">
-                <a:solidFill>
-                  <a:srgbClr val="000000"/>
-                </a:solidFill>
-                <a:effectLst/>
-                <a:latin typeface="Menlo"/>
-              </a:rPr>
-              <a:t>D = 16*10^-6; </a:t>
-            </a:r>
-            <a:r>
-              <a:rPr lang="pt-BR" b="0" i="0" u="none" strike="noStrike" dirty="0">
-                <a:solidFill>
-                  <a:srgbClr val="228B22"/>
-                </a:solidFill>
-                <a:effectLst/>
-                <a:latin typeface="Menlo"/>
-              </a:rPr>
-              <a:t>% s/m/m</a:t>
-            </a:r>
-            <a:endParaRPr lang="pt-BR" b="0" i="0" dirty="0">
-              <a:solidFill>
-                <a:srgbClr val="000000"/>
-              </a:solidFill>
-              <a:effectLst/>
-              <a:latin typeface="Menlo"/>
-            </a:endParaRPr>
-          </a:p>
-          <a:p>
-            <a:r>
-              <a:rPr lang="pt-BR" b="0" i="0" dirty="0">
-                <a:solidFill>
-                  <a:srgbClr val="000000"/>
-                </a:solidFill>
-                <a:effectLst/>
-                <a:latin typeface="Menlo"/>
-              </a:rPr>
-              <a:t>lambda = 1550*10^-9; </a:t>
-            </a:r>
-            <a:r>
-              <a:rPr lang="pt-BR" b="0" i="0" u="none" strike="noStrike" dirty="0">
-                <a:solidFill>
-                  <a:srgbClr val="228B22"/>
-                </a:solidFill>
-                <a:effectLst/>
-                <a:latin typeface="Menlo"/>
-              </a:rPr>
-              <a:t>% m</a:t>
-            </a:r>
-            <a:endParaRPr lang="pt-BR" b="0" i="0" dirty="0">
-              <a:solidFill>
-                <a:srgbClr val="000000"/>
-              </a:solidFill>
-              <a:effectLst/>
-              <a:latin typeface="Menlo"/>
-            </a:endParaRPr>
-          </a:p>
-          <a:p>
             <a:endParaRPr lang="en-GB" dirty="0"/>
           </a:p>
         </p:txBody>
@@ -24015,7 +23930,7 @@
         </p:nvSpPr>
         <p:spPr>
           <a:xfrm>
-            <a:off x="4178710" y="4982239"/>
+            <a:off x="4398078" y="4923215"/>
             <a:ext cx="2293256" cy="1754326"/>
           </a:xfrm>
           <a:prstGeom prst="rect">
@@ -24132,7 +24047,7 @@
         </p:nvSpPr>
         <p:spPr>
           <a:xfrm>
-            <a:off x="7531751" y="4982239"/>
+            <a:off x="8240005" y="5000592"/>
             <a:ext cx="1714885" cy="923330"/>
           </a:xfrm>
           <a:prstGeom prst="rect">
@@ -24171,22 +24086,13 @@
           </a:p>
           <a:p>
             <a:r>
-              <a:rPr lang="en-GB">
-                <a:solidFill>
-                  <a:srgbClr val="000000"/>
-                </a:solidFill>
-                <a:latin typeface="Menlo"/>
-              </a:rPr>
-              <a:t>BER </a:t>
-            </a:r>
-            <a:r>
               <a:rPr lang="en-GB" dirty="0">
                 <a:solidFill>
                   <a:srgbClr val="000000"/>
                 </a:solidFill>
                 <a:latin typeface="Menlo"/>
               </a:rPr>
-              <a:t>= 0</a:t>
+              <a:t>BER = 0</a:t>
             </a:r>
             <a:endParaRPr lang="en-GB" b="0" i="0" dirty="0">
               <a:solidFill>
@@ -24202,6 +24108,1054 @@
     <p:extLst>
       <p:ext uri="{BB962C8B-B14F-4D97-AF65-F5344CB8AC3E}">
         <p14:creationId xmlns:p14="http://schemas.microsoft.com/office/powerpoint/2010/main" val="1060708322"/>
+      </p:ext>
+    </p:extLst>
+  </p:cSld>
+  <p:clrMapOvr>
+    <a:masterClrMapping/>
+  </p:clrMapOvr>
+</p:sld>
+</file>
+
+<file path=ppt/slides/slide32.xml><?xml version="1.0" encoding="utf-8"?>
+<p:sld xmlns:a="http://schemas.openxmlformats.org/drawingml/2006/main" xmlns:r="http://schemas.openxmlformats.org/officeDocument/2006/relationships" xmlns:p="http://schemas.openxmlformats.org/presentationml/2006/main">
+  <p:cSld>
+    <p:spTree>
+      <p:nvGrpSpPr>
+        <p:cNvPr id="1" name=""/>
+        <p:cNvGrpSpPr/>
+        <p:nvPr/>
+      </p:nvGrpSpPr>
+      <p:grpSpPr>
+        <a:xfrm>
+          <a:off x="0" y="0"/>
+          <a:ext cx="0" cy="0"/>
+          <a:chOff x="0" y="0"/>
+          <a:chExt cx="0" cy="0"/>
+        </a:xfrm>
+      </p:grpSpPr>
+      <p:sp>
+        <p:nvSpPr>
+          <p:cNvPr id="2" name="Title 1">
+            <a:extLst>
+              <a:ext uri="{FF2B5EF4-FFF2-40B4-BE49-F238E27FC236}">
+                <a16:creationId xmlns:a16="http://schemas.microsoft.com/office/drawing/2014/main" id="{DD5AAE86-44C7-46C4-AD9A-8F61F8D9A5A0}"/>
+              </a:ext>
+            </a:extLst>
+          </p:cNvPr>
+          <p:cNvSpPr>
+            <a:spLocks noGrp="1"/>
+          </p:cNvSpPr>
+          <p:nvPr>
+            <p:ph type="title"/>
+          </p:nvPr>
+        </p:nvSpPr>
+        <p:spPr/>
+        <p:txBody>
+          <a:bodyPr/>
+          <a:lstStyle/>
+          <a:p>
+            <a:r>
+              <a:rPr lang="en-GB" dirty="0"/>
+              <a:t>Adaptive Equalisation </a:t>
+            </a:r>
+          </a:p>
+        </p:txBody>
+      </p:sp>
+      <p:sp>
+        <p:nvSpPr>
+          <p:cNvPr id="4" name="TextBox 3">
+            <a:extLst>
+              <a:ext uri="{FF2B5EF4-FFF2-40B4-BE49-F238E27FC236}">
+                <a16:creationId xmlns:a16="http://schemas.microsoft.com/office/drawing/2014/main" id="{49C99F9B-DD36-4E7A-8EE6-9B0FFB2D9E1F}"/>
+              </a:ext>
+            </a:extLst>
+          </p:cNvPr>
+          <p:cNvSpPr txBox="1"/>
+          <p:nvPr/>
+        </p:nvSpPr>
+        <p:spPr>
+          <a:xfrm>
+            <a:off x="11208774" y="6492875"/>
+            <a:ext cx="983226" cy="369332"/>
+          </a:xfrm>
+          <a:prstGeom prst="rect">
+            <a:avLst/>
+          </a:prstGeom>
+          <a:noFill/>
+        </p:spPr>
+        <p:txBody>
+          <a:bodyPr wrap="square">
+            <a:spAutoFit/>
+          </a:bodyPr>
+          <a:lstStyle/>
+          <a:p>
+            <a:r>
+              <a:rPr lang="en-GB" dirty="0"/>
+              <a:t>Week 6</a:t>
+            </a:r>
+          </a:p>
+        </p:txBody>
+      </p:sp>
+      <p:sp>
+        <p:nvSpPr>
+          <p:cNvPr id="5" name="TextBox 4">
+            <a:extLst>
+              <a:ext uri="{FF2B5EF4-FFF2-40B4-BE49-F238E27FC236}">
+                <a16:creationId xmlns:a16="http://schemas.microsoft.com/office/drawing/2014/main" id="{AD4A61BC-2904-4522-B941-00CD6C125821}"/>
+              </a:ext>
+            </a:extLst>
+          </p:cNvPr>
+          <p:cNvSpPr txBox="1"/>
+          <p:nvPr/>
+        </p:nvSpPr>
+        <p:spPr>
+          <a:xfrm>
+            <a:off x="527137" y="4832950"/>
+            <a:ext cx="2746265" cy="2585323"/>
+          </a:xfrm>
+          <a:prstGeom prst="rect">
+            <a:avLst/>
+          </a:prstGeom>
+          <a:noFill/>
+        </p:spPr>
+        <p:txBody>
+          <a:bodyPr wrap="none" rtlCol="0">
+            <a:spAutoFit/>
+          </a:bodyPr>
+          <a:lstStyle/>
+          <a:p>
+            <a:r>
+              <a:rPr lang="en-GB" dirty="0"/>
+              <a:t>Parameters:</a:t>
+            </a:r>
+          </a:p>
+          <a:p>
+            <a:r>
+              <a:rPr lang="en-GB" dirty="0"/>
+              <a:t>AGWN SNR = 20;</a:t>
+            </a:r>
+          </a:p>
+          <a:p>
+            <a:r>
+              <a:rPr lang="en-GB" b="0" i="0" dirty="0">
+                <a:solidFill>
+                  <a:srgbClr val="000000"/>
+                </a:solidFill>
+                <a:effectLst/>
+                <a:latin typeface="Menlo"/>
+              </a:rPr>
+              <a:t>symbol_rate = </a:t>
+            </a:r>
+            <a:r>
+              <a:rPr lang="en-GB" dirty="0">
+                <a:solidFill>
+                  <a:srgbClr val="000000"/>
+                </a:solidFill>
+                <a:latin typeface="Menlo"/>
+              </a:rPr>
+              <a:t>100</a:t>
+            </a:r>
+            <a:r>
+              <a:rPr lang="en-GB" b="0" i="0" dirty="0">
+                <a:solidFill>
+                  <a:srgbClr val="000000"/>
+                </a:solidFill>
+                <a:effectLst/>
+                <a:latin typeface="Menlo"/>
+              </a:rPr>
+              <a:t>e9;</a:t>
+            </a:r>
+          </a:p>
+          <a:p>
+            <a:r>
+              <a:rPr lang="en-GB" dirty="0" err="1">
+                <a:solidFill>
+                  <a:srgbClr val="000000"/>
+                </a:solidFill>
+                <a:latin typeface="Consolas Courier"/>
+              </a:rPr>
+              <a:t>u</a:t>
+            </a:r>
+            <a:r>
+              <a:rPr lang="en-GB" sz="1800" b="0" i="0" u="none" strike="noStrike" baseline="0" dirty="0" err="1">
+                <a:solidFill>
+                  <a:srgbClr val="000000"/>
+                </a:solidFill>
+                <a:latin typeface="Consolas Courier"/>
+              </a:rPr>
+              <a:t>psampling_factor</a:t>
+            </a:r>
+            <a:r>
+              <a:rPr lang="en-GB" sz="1800" b="0" i="0" u="none" strike="noStrike" baseline="0" dirty="0">
+                <a:solidFill>
+                  <a:srgbClr val="000000"/>
+                </a:solidFill>
+                <a:latin typeface="Consolas Courier"/>
+              </a:rPr>
+              <a:t> = 2;</a:t>
+            </a:r>
+          </a:p>
+          <a:p>
+            <a:r>
+              <a:rPr lang="pt-BR" b="0" i="0" dirty="0">
+                <a:solidFill>
+                  <a:srgbClr val="000000"/>
+                </a:solidFill>
+                <a:effectLst/>
+                <a:latin typeface="Menlo"/>
+              </a:rPr>
+              <a:t>z = 50e3; </a:t>
+            </a:r>
+            <a:r>
+              <a:rPr lang="pt-BR" b="0" i="0" u="none" strike="noStrike" dirty="0">
+                <a:solidFill>
+                  <a:srgbClr val="228B22"/>
+                </a:solidFill>
+                <a:effectLst/>
+                <a:latin typeface="Menlo"/>
+              </a:rPr>
+              <a:t>% m</a:t>
+            </a:r>
+            <a:endParaRPr lang="pt-BR" b="0" i="0" dirty="0">
+              <a:solidFill>
+                <a:srgbClr val="000000"/>
+              </a:solidFill>
+              <a:effectLst/>
+              <a:latin typeface="Menlo"/>
+            </a:endParaRPr>
+          </a:p>
+          <a:p>
+            <a:r>
+              <a:rPr lang="pt-BR" b="0" i="0" dirty="0">
+                <a:solidFill>
+                  <a:srgbClr val="000000"/>
+                </a:solidFill>
+                <a:effectLst/>
+                <a:latin typeface="Menlo"/>
+              </a:rPr>
+              <a:t>D = 17*10^-6; </a:t>
+            </a:r>
+            <a:r>
+              <a:rPr lang="pt-BR" b="0" i="0" u="none" strike="noStrike" dirty="0">
+                <a:solidFill>
+                  <a:srgbClr val="228B22"/>
+                </a:solidFill>
+                <a:effectLst/>
+                <a:latin typeface="Menlo"/>
+              </a:rPr>
+              <a:t>% s/m/m</a:t>
+            </a:r>
+            <a:endParaRPr lang="pt-BR" b="0" i="0" dirty="0">
+              <a:solidFill>
+                <a:srgbClr val="000000"/>
+              </a:solidFill>
+              <a:effectLst/>
+              <a:latin typeface="Menlo"/>
+            </a:endParaRPr>
+          </a:p>
+          <a:p>
+            <a:r>
+              <a:rPr lang="pt-BR" b="0" i="0" dirty="0">
+                <a:solidFill>
+                  <a:srgbClr val="000000"/>
+                </a:solidFill>
+                <a:effectLst/>
+                <a:latin typeface="Menlo"/>
+              </a:rPr>
+              <a:t>lambda = 1550*10^-9; </a:t>
+            </a:r>
+            <a:r>
+              <a:rPr lang="pt-BR" b="0" i="0" u="none" strike="noStrike" dirty="0">
+                <a:solidFill>
+                  <a:srgbClr val="228B22"/>
+                </a:solidFill>
+                <a:effectLst/>
+                <a:latin typeface="Menlo"/>
+              </a:rPr>
+              <a:t>% m</a:t>
+            </a:r>
+            <a:endParaRPr lang="pt-BR" b="0" i="0" dirty="0">
+              <a:solidFill>
+                <a:srgbClr val="000000"/>
+              </a:solidFill>
+              <a:effectLst/>
+              <a:latin typeface="Menlo"/>
+            </a:endParaRPr>
+          </a:p>
+          <a:p>
+            <a:endParaRPr lang="en-GB" dirty="0"/>
+          </a:p>
+          <a:p>
+            <a:endParaRPr lang="en-GB" dirty="0"/>
+          </a:p>
+        </p:txBody>
+      </p:sp>
+      <p:sp>
+        <p:nvSpPr>
+          <p:cNvPr id="10" name="TextBox 9">
+            <a:extLst>
+              <a:ext uri="{FF2B5EF4-FFF2-40B4-BE49-F238E27FC236}">
+                <a16:creationId xmlns:a16="http://schemas.microsoft.com/office/drawing/2014/main" id="{7EBB5B2F-A3FE-49EF-88CF-CED7BF878005}"/>
+              </a:ext>
+            </a:extLst>
+          </p:cNvPr>
+          <p:cNvSpPr txBox="1"/>
+          <p:nvPr/>
+        </p:nvSpPr>
+        <p:spPr>
+          <a:xfrm>
+            <a:off x="4809172" y="4982239"/>
+            <a:ext cx="2117567" cy="1754326"/>
+          </a:xfrm>
+          <a:prstGeom prst="rect">
+            <a:avLst/>
+          </a:prstGeom>
+          <a:noFill/>
+        </p:spPr>
+        <p:txBody>
+          <a:bodyPr wrap="none" rtlCol="0">
+            <a:spAutoFit/>
+          </a:bodyPr>
+          <a:lstStyle/>
+          <a:p>
+            <a:r>
+              <a:rPr lang="en-GB" dirty="0"/>
+              <a:t>CMA Algorithm:</a:t>
+            </a:r>
+          </a:p>
+          <a:p>
+            <a:r>
+              <a:rPr lang="en-GB" dirty="0" err="1"/>
+              <a:t>num_symbols</a:t>
+            </a:r>
+            <a:r>
+              <a:rPr lang="en-GB" dirty="0"/>
+              <a:t> = 32K;</a:t>
+            </a:r>
+          </a:p>
+          <a:p>
+            <a:r>
+              <a:rPr lang="en-GB" sz="1800" b="0" i="0" u="none" strike="noStrike" baseline="0" dirty="0" err="1">
+                <a:solidFill>
+                  <a:srgbClr val="000000"/>
+                </a:solidFill>
+                <a:latin typeface="Consolas Courier"/>
+              </a:rPr>
+              <a:t>h_taps</a:t>
+            </a:r>
+            <a:r>
+              <a:rPr lang="en-GB" sz="1800" b="0" i="0" u="none" strike="noStrike" baseline="0" dirty="0">
+                <a:solidFill>
+                  <a:srgbClr val="000000"/>
+                </a:solidFill>
+                <a:latin typeface="Consolas Courier"/>
+              </a:rPr>
+              <a:t> = 17; </a:t>
+            </a:r>
+            <a:endParaRPr lang="en-GB" sz="1800" b="0" i="0" u="none" strike="noStrike" baseline="0" dirty="0">
+              <a:solidFill>
+                <a:srgbClr val="228B22"/>
+              </a:solidFill>
+              <a:latin typeface="Consolas Courier"/>
+            </a:endParaRPr>
+          </a:p>
+          <a:p>
+            <a:r>
+              <a:rPr lang="en-GB" b="0" i="0" dirty="0">
+                <a:solidFill>
+                  <a:srgbClr val="000000"/>
+                </a:solidFill>
+                <a:effectLst/>
+                <a:latin typeface="Menlo"/>
+              </a:rPr>
+              <a:t>h(9) = 1; </a:t>
+            </a:r>
+          </a:p>
+          <a:p>
+            <a:r>
+              <a:rPr lang="en-GB" b="0" i="0" dirty="0" err="1">
+                <a:solidFill>
+                  <a:srgbClr val="000000"/>
+                </a:solidFill>
+                <a:effectLst/>
+                <a:latin typeface="Menlo"/>
+              </a:rPr>
+              <a:t>training_size</a:t>
+            </a:r>
+            <a:r>
+              <a:rPr lang="en-GB" b="0" i="0" dirty="0">
+                <a:solidFill>
+                  <a:srgbClr val="000000"/>
+                </a:solidFill>
+                <a:effectLst/>
+                <a:latin typeface="Menlo"/>
+              </a:rPr>
+              <a:t> = 1639;</a:t>
+            </a:r>
+          </a:p>
+          <a:p>
+            <a:r>
+              <a:rPr lang="en-GB" b="0" i="0" dirty="0">
+                <a:solidFill>
+                  <a:srgbClr val="000000"/>
+                </a:solidFill>
+                <a:effectLst/>
+                <a:latin typeface="Menlo"/>
+              </a:rPr>
+              <a:t>mu = 0.002;</a:t>
+            </a:r>
+          </a:p>
+        </p:txBody>
+      </p:sp>
+      <p:sp>
+        <p:nvSpPr>
+          <p:cNvPr id="12" name="TextBox 11">
+            <a:extLst>
+              <a:ext uri="{FF2B5EF4-FFF2-40B4-BE49-F238E27FC236}">
+                <a16:creationId xmlns:a16="http://schemas.microsoft.com/office/drawing/2014/main" id="{17230C1F-D129-4A9B-B49F-6458E8DB2DB8}"/>
+              </a:ext>
+            </a:extLst>
+          </p:cNvPr>
+          <p:cNvSpPr txBox="1"/>
+          <p:nvPr/>
+        </p:nvSpPr>
+        <p:spPr>
+          <a:xfrm>
+            <a:off x="8477867" y="4936072"/>
+            <a:ext cx="1972419" cy="923330"/>
+          </a:xfrm>
+          <a:prstGeom prst="rect">
+            <a:avLst/>
+          </a:prstGeom>
+          <a:noFill/>
+        </p:spPr>
+        <p:txBody>
+          <a:bodyPr wrap="square">
+            <a:spAutoFit/>
+          </a:bodyPr>
+          <a:lstStyle/>
+          <a:p>
+            <a:r>
+              <a:rPr lang="en-GB" b="0" i="0" dirty="0">
+                <a:solidFill>
+                  <a:srgbClr val="000000"/>
+                </a:solidFill>
+                <a:effectLst/>
+                <a:latin typeface="Menlo"/>
+              </a:rPr>
+              <a:t>Demodulation:</a:t>
+            </a:r>
+          </a:p>
+          <a:p>
+            <a:r>
+              <a:rPr lang="en-GB" b="0" i="0" dirty="0">
+                <a:solidFill>
+                  <a:srgbClr val="000000"/>
+                </a:solidFill>
+                <a:effectLst/>
+                <a:latin typeface="Menlo"/>
+              </a:rPr>
+              <a:t>errors = 2</a:t>
+            </a:r>
+          </a:p>
+          <a:p>
+            <a:r>
+              <a:rPr lang="en-GB" dirty="0">
+                <a:solidFill>
+                  <a:srgbClr val="000000"/>
+                </a:solidFill>
+                <a:latin typeface="Menlo"/>
+              </a:rPr>
+              <a:t>BER =  3.0604e-5</a:t>
+            </a:r>
+            <a:endParaRPr lang="en-GB" b="0" i="0" dirty="0">
+              <a:solidFill>
+                <a:srgbClr val="000000"/>
+              </a:solidFill>
+              <a:effectLst/>
+              <a:latin typeface="Menlo"/>
+            </a:endParaRPr>
+          </a:p>
+        </p:txBody>
+      </p:sp>
+      <p:pic>
+        <p:nvPicPr>
+          <p:cNvPr id="3" name="Picture 1">
+            <a:extLst>
+              <a:ext uri="{FF2B5EF4-FFF2-40B4-BE49-F238E27FC236}">
+                <a16:creationId xmlns:a16="http://schemas.microsoft.com/office/drawing/2014/main" id="{65C3FC9D-0599-4073-BEB0-9DBB79FF0EFD}"/>
+              </a:ext>
+            </a:extLst>
+          </p:cNvPr>
+          <p:cNvPicPr>
+            <a:picLocks noChangeAspect="1" noChangeArrowheads="1"/>
+          </p:cNvPicPr>
+          <p:nvPr/>
+        </p:nvPicPr>
+        <p:blipFill>
+          <a:blip r:embed="rId2">
+            <a:extLst>
+              <a:ext uri="{28A0092B-C50C-407E-A947-70E740481C1C}">
+                <a14:useLocalDpi xmlns:a14="http://schemas.microsoft.com/office/drawing/2010/main" val="0"/>
+              </a:ext>
+            </a:extLst>
+          </a:blip>
+          <a:srcRect/>
+          <a:stretch>
+            <a:fillRect/>
+          </a:stretch>
+        </p:blipFill>
+        <p:spPr bwMode="auto">
+          <a:xfrm>
+            <a:off x="137109" y="1690687"/>
+            <a:ext cx="4041601" cy="3031201"/>
+          </a:xfrm>
+          <a:prstGeom prst="rect">
+            <a:avLst/>
+          </a:prstGeom>
+          <a:noFill/>
+          <a:extLst>
+            <a:ext uri="{909E8E84-426E-40DD-AFC4-6F175D3DCCD1}">
+              <a14:hiddenFill xmlns:a14="http://schemas.microsoft.com/office/drawing/2010/main">
+                <a:solidFill>
+                  <a:srgbClr val="FFFFFF"/>
+                </a:solidFill>
+              </a14:hiddenFill>
+            </a:ext>
+          </a:extLst>
+        </p:spPr>
+      </p:pic>
+      <p:pic>
+        <p:nvPicPr>
+          <p:cNvPr id="1026" name="Picture 2">
+            <a:extLst>
+              <a:ext uri="{FF2B5EF4-FFF2-40B4-BE49-F238E27FC236}">
+                <a16:creationId xmlns:a16="http://schemas.microsoft.com/office/drawing/2014/main" id="{1250A937-76FE-4091-908A-8607C9B00C4A}"/>
+              </a:ext>
+            </a:extLst>
+          </p:cNvPr>
+          <p:cNvPicPr>
+            <a:picLocks noChangeAspect="1" noChangeArrowheads="1"/>
+          </p:cNvPicPr>
+          <p:nvPr/>
+        </p:nvPicPr>
+        <p:blipFill>
+          <a:blip r:embed="rId3">
+            <a:extLst>
+              <a:ext uri="{28A0092B-C50C-407E-A947-70E740481C1C}">
+                <a14:useLocalDpi xmlns:a14="http://schemas.microsoft.com/office/drawing/2010/main" val="0"/>
+              </a:ext>
+            </a:extLst>
+          </a:blip>
+          <a:srcRect/>
+          <a:stretch>
+            <a:fillRect/>
+          </a:stretch>
+        </p:blipFill>
+        <p:spPr bwMode="auto">
+          <a:xfrm>
+            <a:off x="4075199" y="1690686"/>
+            <a:ext cx="4041601" cy="3031201"/>
+          </a:xfrm>
+          <a:prstGeom prst="rect">
+            <a:avLst/>
+          </a:prstGeom>
+          <a:noFill/>
+          <a:extLst>
+            <a:ext uri="{909E8E84-426E-40DD-AFC4-6F175D3DCCD1}">
+              <a14:hiddenFill xmlns:a14="http://schemas.microsoft.com/office/drawing/2010/main">
+                <a:solidFill>
+                  <a:srgbClr val="FFFFFF"/>
+                </a:solidFill>
+              </a14:hiddenFill>
+            </a:ext>
+          </a:extLst>
+        </p:spPr>
+      </p:pic>
+      <p:pic>
+        <p:nvPicPr>
+          <p:cNvPr id="6" name="Picture 3">
+            <a:extLst>
+              <a:ext uri="{FF2B5EF4-FFF2-40B4-BE49-F238E27FC236}">
+                <a16:creationId xmlns:a16="http://schemas.microsoft.com/office/drawing/2014/main" id="{A9789B72-1414-4C96-9004-C14F3A071F1D}"/>
+              </a:ext>
+            </a:extLst>
+          </p:cNvPr>
+          <p:cNvPicPr>
+            <a:picLocks noChangeAspect="1" noChangeArrowheads="1"/>
+          </p:cNvPicPr>
+          <p:nvPr/>
+        </p:nvPicPr>
+        <p:blipFill>
+          <a:blip r:embed="rId4">
+            <a:extLst>
+              <a:ext uri="{28A0092B-C50C-407E-A947-70E740481C1C}">
+                <a14:useLocalDpi xmlns:a14="http://schemas.microsoft.com/office/drawing/2010/main" val="0"/>
+              </a:ext>
+            </a:extLst>
+          </a:blip>
+          <a:srcRect/>
+          <a:stretch>
+            <a:fillRect/>
+          </a:stretch>
+        </p:blipFill>
+        <p:spPr bwMode="auto">
+          <a:xfrm>
+            <a:off x="8116800" y="1690685"/>
+            <a:ext cx="4041602" cy="3031202"/>
+          </a:xfrm>
+          <a:prstGeom prst="rect">
+            <a:avLst/>
+          </a:prstGeom>
+          <a:noFill/>
+          <a:extLst>
+            <a:ext uri="{909E8E84-426E-40DD-AFC4-6F175D3DCCD1}">
+              <a14:hiddenFill xmlns:a14="http://schemas.microsoft.com/office/drawing/2010/main">
+                <a:solidFill>
+                  <a:srgbClr val="FFFFFF"/>
+                </a:solidFill>
+              </a14:hiddenFill>
+            </a:ext>
+          </a:extLst>
+        </p:spPr>
+      </p:pic>
+    </p:spTree>
+    <p:extLst>
+      <p:ext uri="{BB962C8B-B14F-4D97-AF65-F5344CB8AC3E}">
+        <p14:creationId xmlns:p14="http://schemas.microsoft.com/office/powerpoint/2010/main" val="1589741070"/>
+      </p:ext>
+    </p:extLst>
+  </p:cSld>
+  <p:clrMapOvr>
+    <a:masterClrMapping/>
+  </p:clrMapOvr>
+</p:sld>
+</file>
+
+<file path=ppt/slides/slide33.xml><?xml version="1.0" encoding="utf-8"?>
+<p:sld xmlns:a="http://schemas.openxmlformats.org/drawingml/2006/main" xmlns:r="http://schemas.openxmlformats.org/officeDocument/2006/relationships" xmlns:p="http://schemas.openxmlformats.org/presentationml/2006/main">
+  <p:cSld>
+    <p:spTree>
+      <p:nvGrpSpPr>
+        <p:cNvPr id="1" name=""/>
+        <p:cNvGrpSpPr/>
+        <p:nvPr/>
+      </p:nvGrpSpPr>
+      <p:grpSpPr>
+        <a:xfrm>
+          <a:off x="0" y="0"/>
+          <a:ext cx="0" cy="0"/>
+          <a:chOff x="0" y="0"/>
+          <a:chExt cx="0" cy="0"/>
+        </a:xfrm>
+      </p:grpSpPr>
+      <p:sp>
+        <p:nvSpPr>
+          <p:cNvPr id="2" name="Title 1">
+            <a:extLst>
+              <a:ext uri="{FF2B5EF4-FFF2-40B4-BE49-F238E27FC236}">
+                <a16:creationId xmlns:a16="http://schemas.microsoft.com/office/drawing/2014/main" id="{1CE25EDF-BE3E-4ED6-B5E2-4749D630D25C}"/>
+              </a:ext>
+            </a:extLst>
+          </p:cNvPr>
+          <p:cNvSpPr>
+            <a:spLocks noGrp="1"/>
+          </p:cNvSpPr>
+          <p:nvPr>
+            <p:ph type="title"/>
+          </p:nvPr>
+        </p:nvSpPr>
+        <p:spPr/>
+        <p:txBody>
+          <a:bodyPr/>
+          <a:lstStyle/>
+          <a:p>
+            <a:r>
+              <a:rPr lang="en-GB" dirty="0"/>
+              <a:t>Error Curve Considerations</a:t>
+            </a:r>
+          </a:p>
+        </p:txBody>
+      </p:sp>
+      <p:pic>
+        <p:nvPicPr>
+          <p:cNvPr id="2049" name="Picture 1">
+            <a:extLst>
+              <a:ext uri="{FF2B5EF4-FFF2-40B4-BE49-F238E27FC236}">
+                <a16:creationId xmlns:a16="http://schemas.microsoft.com/office/drawing/2014/main" id="{5CC394E9-EC7D-49E4-9521-80C727C9A6E0}"/>
+              </a:ext>
+            </a:extLst>
+          </p:cNvPr>
+          <p:cNvPicPr>
+            <a:picLocks noChangeAspect="1" noChangeArrowheads="1"/>
+          </p:cNvPicPr>
+          <p:nvPr/>
+        </p:nvPicPr>
+        <p:blipFill>
+          <a:blip r:embed="rId2">
+            <a:extLst>
+              <a:ext uri="{28A0092B-C50C-407E-A947-70E740481C1C}">
+                <a14:useLocalDpi xmlns:a14="http://schemas.microsoft.com/office/drawing/2010/main" val="0"/>
+              </a:ext>
+            </a:extLst>
+          </a:blip>
+          <a:srcRect/>
+          <a:stretch>
+            <a:fillRect/>
+          </a:stretch>
+        </p:blipFill>
+        <p:spPr bwMode="auto">
+          <a:xfrm>
+            <a:off x="324264" y="1573161"/>
+            <a:ext cx="5198603" cy="3898952"/>
+          </a:xfrm>
+          <a:prstGeom prst="rect">
+            <a:avLst/>
+          </a:prstGeom>
+          <a:noFill/>
+          <a:extLst>
+            <a:ext uri="{909E8E84-426E-40DD-AFC4-6F175D3DCCD1}">
+              <a14:hiddenFill xmlns:a14="http://schemas.microsoft.com/office/drawing/2010/main">
+                <a:solidFill>
+                  <a:srgbClr val="FFFFFF"/>
+                </a:solidFill>
+              </a14:hiddenFill>
+            </a:ext>
+          </a:extLst>
+        </p:spPr>
+      </p:pic>
+      <p:pic>
+        <p:nvPicPr>
+          <p:cNvPr id="2050" name="Picture 2">
+            <a:extLst>
+              <a:ext uri="{FF2B5EF4-FFF2-40B4-BE49-F238E27FC236}">
+                <a16:creationId xmlns:a16="http://schemas.microsoft.com/office/drawing/2014/main" id="{0098390F-06BF-4BA1-A0ED-50F5C353C9E8}"/>
+              </a:ext>
+            </a:extLst>
+          </p:cNvPr>
+          <p:cNvPicPr>
+            <a:picLocks noChangeAspect="1" noChangeArrowheads="1"/>
+          </p:cNvPicPr>
+          <p:nvPr/>
+        </p:nvPicPr>
+        <p:blipFill>
+          <a:blip r:embed="rId3">
+            <a:extLst>
+              <a:ext uri="{28A0092B-C50C-407E-A947-70E740481C1C}">
+                <a14:useLocalDpi xmlns:a14="http://schemas.microsoft.com/office/drawing/2010/main" val="0"/>
+              </a:ext>
+            </a:extLst>
+          </a:blip>
+          <a:srcRect/>
+          <a:stretch>
+            <a:fillRect/>
+          </a:stretch>
+        </p:blipFill>
+        <p:spPr bwMode="auto">
+          <a:xfrm>
+            <a:off x="6434186" y="1573161"/>
+            <a:ext cx="5198603" cy="3898952"/>
+          </a:xfrm>
+          <a:prstGeom prst="rect">
+            <a:avLst/>
+          </a:prstGeom>
+          <a:noFill/>
+          <a:extLst>
+            <a:ext uri="{909E8E84-426E-40DD-AFC4-6F175D3DCCD1}">
+              <a14:hiddenFill xmlns:a14="http://schemas.microsoft.com/office/drawing/2010/main">
+                <a:solidFill>
+                  <a:srgbClr val="FFFFFF"/>
+                </a:solidFill>
+              </a14:hiddenFill>
+            </a:ext>
+          </a:extLst>
+        </p:spPr>
+      </p:pic>
+      <p:sp>
+        <p:nvSpPr>
+          <p:cNvPr id="3" name="TextBox 2">
+            <a:extLst>
+              <a:ext uri="{FF2B5EF4-FFF2-40B4-BE49-F238E27FC236}">
+                <a16:creationId xmlns:a16="http://schemas.microsoft.com/office/drawing/2014/main" id="{01E66E9D-F681-4EA4-940B-9F6706B98D18}"/>
+              </a:ext>
+            </a:extLst>
+          </p:cNvPr>
+          <p:cNvSpPr txBox="1"/>
+          <p:nvPr/>
+        </p:nvSpPr>
+        <p:spPr>
+          <a:xfrm>
+            <a:off x="1630871" y="6123543"/>
+            <a:ext cx="2585388" cy="369332"/>
+          </a:xfrm>
+          <a:prstGeom prst="rect">
+            <a:avLst/>
+          </a:prstGeom>
+          <a:noFill/>
+        </p:spPr>
+        <p:txBody>
+          <a:bodyPr wrap="none" rtlCol="0">
+            <a:spAutoFit/>
+          </a:bodyPr>
+          <a:lstStyle/>
+          <a:p>
+            <a:r>
+              <a:rPr lang="en-GB" dirty="0"/>
+              <a:t>Personal Function Output</a:t>
+            </a:r>
+          </a:p>
+        </p:txBody>
+      </p:sp>
+      <p:sp>
+        <p:nvSpPr>
+          <p:cNvPr id="6" name="TextBox 5">
+            <a:extLst>
+              <a:ext uri="{FF2B5EF4-FFF2-40B4-BE49-F238E27FC236}">
+                <a16:creationId xmlns:a16="http://schemas.microsoft.com/office/drawing/2014/main" id="{CEE2E3EC-0C6C-4398-A843-739754F8391C}"/>
+              </a:ext>
+            </a:extLst>
+          </p:cNvPr>
+          <p:cNvSpPr txBox="1"/>
+          <p:nvPr/>
+        </p:nvSpPr>
+        <p:spPr>
+          <a:xfrm>
+            <a:off x="7293812" y="6123543"/>
+            <a:ext cx="3479350" cy="369332"/>
+          </a:xfrm>
+          <a:prstGeom prst="rect">
+            <a:avLst/>
+          </a:prstGeom>
+          <a:noFill/>
+        </p:spPr>
+        <p:txBody>
+          <a:bodyPr wrap="none" rtlCol="0">
+            <a:spAutoFit/>
+          </a:bodyPr>
+          <a:lstStyle/>
+          <a:p>
+            <a:r>
+              <a:rPr lang="en-GB" dirty="0"/>
+              <a:t>Expected Trend of Error Magnitude</a:t>
+            </a:r>
+          </a:p>
+        </p:txBody>
+      </p:sp>
+      <p:sp>
+        <p:nvSpPr>
+          <p:cNvPr id="4" name="TextBox 3">
+            <a:extLst>
+              <a:ext uri="{FF2B5EF4-FFF2-40B4-BE49-F238E27FC236}">
+                <a16:creationId xmlns:a16="http://schemas.microsoft.com/office/drawing/2014/main" id="{EC720CCA-EECB-4A60-BA11-838EAC773462}"/>
+              </a:ext>
+            </a:extLst>
+          </p:cNvPr>
+          <p:cNvSpPr txBox="1"/>
+          <p:nvPr/>
+        </p:nvSpPr>
+        <p:spPr>
+          <a:xfrm>
+            <a:off x="2202983" y="5243830"/>
+            <a:ext cx="1441164" cy="369332"/>
+          </a:xfrm>
+          <a:prstGeom prst="rect">
+            <a:avLst/>
+          </a:prstGeom>
+          <a:noFill/>
+        </p:spPr>
+        <p:txBody>
+          <a:bodyPr wrap="none" rtlCol="0">
+            <a:spAutoFit/>
+          </a:bodyPr>
+          <a:lstStyle/>
+          <a:p>
+            <a:r>
+              <a:rPr lang="en-GB" dirty="0"/>
+              <a:t>Sample Index</a:t>
+            </a:r>
+          </a:p>
+        </p:txBody>
+      </p:sp>
+      <p:sp>
+        <p:nvSpPr>
+          <p:cNvPr id="8" name="TextBox 7">
+            <a:extLst>
+              <a:ext uri="{FF2B5EF4-FFF2-40B4-BE49-F238E27FC236}">
+                <a16:creationId xmlns:a16="http://schemas.microsoft.com/office/drawing/2014/main" id="{5DF45296-B093-43AA-9269-5E13F2D82ED6}"/>
+              </a:ext>
+            </a:extLst>
+          </p:cNvPr>
+          <p:cNvSpPr txBox="1"/>
+          <p:nvPr/>
+        </p:nvSpPr>
+        <p:spPr>
+          <a:xfrm>
+            <a:off x="8461215" y="5243830"/>
+            <a:ext cx="1441164" cy="369332"/>
+          </a:xfrm>
+          <a:prstGeom prst="rect">
+            <a:avLst/>
+          </a:prstGeom>
+          <a:noFill/>
+        </p:spPr>
+        <p:txBody>
+          <a:bodyPr wrap="none" rtlCol="0">
+            <a:spAutoFit/>
+          </a:bodyPr>
+          <a:lstStyle/>
+          <a:p>
+            <a:r>
+              <a:rPr lang="en-GB" dirty="0"/>
+              <a:t>Sample Index</a:t>
+            </a:r>
+          </a:p>
+        </p:txBody>
+      </p:sp>
+      <p:sp>
+        <p:nvSpPr>
+          <p:cNvPr id="5" name="TextBox 4">
+            <a:extLst>
+              <a:ext uri="{FF2B5EF4-FFF2-40B4-BE49-F238E27FC236}">
+                <a16:creationId xmlns:a16="http://schemas.microsoft.com/office/drawing/2014/main" id="{F9DA77E2-1ACD-4FA5-A4D9-0994FC9EA903}"/>
+              </a:ext>
+            </a:extLst>
+          </p:cNvPr>
+          <p:cNvSpPr txBox="1"/>
+          <p:nvPr/>
+        </p:nvSpPr>
+        <p:spPr>
+          <a:xfrm>
+            <a:off x="324264" y="2634231"/>
+            <a:ext cx="461665" cy="1589538"/>
+          </a:xfrm>
+          <a:prstGeom prst="rect">
+            <a:avLst/>
+          </a:prstGeom>
+          <a:noFill/>
+        </p:spPr>
+        <p:txBody>
+          <a:bodyPr vert="vert270" wrap="none" rtlCol="0">
+            <a:spAutoFit/>
+          </a:bodyPr>
+          <a:lstStyle/>
+          <a:p>
+            <a:r>
+              <a:rPr lang="en-GB" dirty="0"/>
+              <a:t>Log(Magnitude)</a:t>
+            </a:r>
+          </a:p>
+        </p:txBody>
+      </p:sp>
+      <p:sp>
+        <p:nvSpPr>
+          <p:cNvPr id="10" name="TextBox 9">
+            <a:extLst>
+              <a:ext uri="{FF2B5EF4-FFF2-40B4-BE49-F238E27FC236}">
+                <a16:creationId xmlns:a16="http://schemas.microsoft.com/office/drawing/2014/main" id="{1A209C31-AFA7-483A-8EF3-0BF9DA9876AA}"/>
+              </a:ext>
+            </a:extLst>
+          </p:cNvPr>
+          <p:cNvSpPr txBox="1"/>
+          <p:nvPr/>
+        </p:nvSpPr>
+        <p:spPr>
+          <a:xfrm>
+            <a:off x="6392123" y="2727868"/>
+            <a:ext cx="461665" cy="1589538"/>
+          </a:xfrm>
+          <a:prstGeom prst="rect">
+            <a:avLst/>
+          </a:prstGeom>
+          <a:noFill/>
+        </p:spPr>
+        <p:txBody>
+          <a:bodyPr vert="vert270" wrap="none" rtlCol="0">
+            <a:spAutoFit/>
+          </a:bodyPr>
+          <a:lstStyle/>
+          <a:p>
+            <a:r>
+              <a:rPr lang="en-GB" dirty="0"/>
+              <a:t>Log(Magnitude)</a:t>
+            </a:r>
+          </a:p>
+        </p:txBody>
+      </p:sp>
+      <p:sp>
+        <p:nvSpPr>
+          <p:cNvPr id="7" name="TextBox 6">
+            <a:extLst>
+              <a:ext uri="{FF2B5EF4-FFF2-40B4-BE49-F238E27FC236}">
+                <a16:creationId xmlns:a16="http://schemas.microsoft.com/office/drawing/2014/main" id="{4F7C67FF-3C7D-4C1F-B789-C559045697AB}"/>
+              </a:ext>
+            </a:extLst>
+          </p:cNvPr>
+          <p:cNvSpPr txBox="1"/>
+          <p:nvPr/>
+        </p:nvSpPr>
+        <p:spPr>
+          <a:xfrm>
+            <a:off x="8873412" y="0"/>
+            <a:ext cx="3252685" cy="369332"/>
+          </a:xfrm>
+          <a:prstGeom prst="rect">
+            <a:avLst/>
+          </a:prstGeom>
+          <a:noFill/>
+        </p:spPr>
+        <p:txBody>
+          <a:bodyPr wrap="none" rtlCol="0">
+            <a:spAutoFit/>
+          </a:bodyPr>
+          <a:lstStyle/>
+          <a:p>
+            <a:r>
+              <a:rPr lang="en-GB" dirty="0"/>
+              <a:t>Is this a concerning discrepancy?</a:t>
+            </a:r>
+          </a:p>
+        </p:txBody>
+      </p:sp>
+      <p:sp>
+        <p:nvSpPr>
+          <p:cNvPr id="12" name="TextBox 11">
+            <a:extLst>
+              <a:ext uri="{FF2B5EF4-FFF2-40B4-BE49-F238E27FC236}">
+                <a16:creationId xmlns:a16="http://schemas.microsoft.com/office/drawing/2014/main" id="{00C8FF1B-D657-4150-BFD2-9DCBF779209E}"/>
+              </a:ext>
+            </a:extLst>
+          </p:cNvPr>
+          <p:cNvSpPr txBox="1"/>
+          <p:nvPr/>
+        </p:nvSpPr>
+        <p:spPr>
+          <a:xfrm>
+            <a:off x="11208774" y="6492875"/>
+            <a:ext cx="983226" cy="369332"/>
+          </a:xfrm>
+          <a:prstGeom prst="rect">
+            <a:avLst/>
+          </a:prstGeom>
+          <a:noFill/>
+        </p:spPr>
+        <p:txBody>
+          <a:bodyPr wrap="square">
+            <a:spAutoFit/>
+          </a:bodyPr>
+          <a:lstStyle/>
+          <a:p>
+            <a:r>
+              <a:rPr lang="en-GB" dirty="0"/>
+              <a:t>Week 6</a:t>
+            </a:r>
+          </a:p>
+        </p:txBody>
+      </p:sp>
+    </p:spTree>
+    <p:extLst>
+      <p:ext uri="{BB962C8B-B14F-4D97-AF65-F5344CB8AC3E}">
+        <p14:creationId xmlns:p14="http://schemas.microsoft.com/office/powerpoint/2010/main" val="3678966069"/>
       </p:ext>
     </p:extLst>
   </p:cSld>

</xml_diff>